<commit_message>
Issue 273 update: added testing for issue 269 and issue 253
</commit_message>
<xml_diff>
--- a/doc/test/AutoAnimate.pptx
+++ b/doc/test/AutoAnimate.pptx
@@ -13,19 +13,23 @@
     <p:sldId id="313" r:id="rId7"/>
     <p:sldId id="314" r:id="rId8"/>
     <p:sldId id="336" r:id="rId9"/>
-    <p:sldId id="332" r:id="rId10"/>
-    <p:sldId id="317" r:id="rId11"/>
-    <p:sldId id="318" r:id="rId12"/>
-    <p:sldId id="337" r:id="rId13"/>
-    <p:sldId id="334" r:id="rId14"/>
-    <p:sldId id="325" r:id="rId15"/>
-    <p:sldId id="326" r:id="rId16"/>
-    <p:sldId id="338" r:id="rId17"/>
-    <p:sldId id="339" r:id="rId18"/>
-    <p:sldId id="327" r:id="rId19"/>
-    <p:sldId id="328" r:id="rId20"/>
-    <p:sldId id="340" r:id="rId21"/>
-    <p:sldId id="274" r:id="rId22"/>
+    <p:sldId id="341" r:id="rId10"/>
+    <p:sldId id="342" r:id="rId11"/>
+    <p:sldId id="343" r:id="rId12"/>
+    <p:sldId id="346" r:id="rId13"/>
+    <p:sldId id="332" r:id="rId14"/>
+    <p:sldId id="317" r:id="rId15"/>
+    <p:sldId id="318" r:id="rId16"/>
+    <p:sldId id="337" r:id="rId17"/>
+    <p:sldId id="334" r:id="rId18"/>
+    <p:sldId id="325" r:id="rId19"/>
+    <p:sldId id="326" r:id="rId20"/>
+    <p:sldId id="338" r:id="rId21"/>
+    <p:sldId id="339" r:id="rId22"/>
+    <p:sldId id="327" r:id="rId23"/>
+    <p:sldId id="328" r:id="rId24"/>
+    <p:sldId id="340" r:id="rId25"/>
+    <p:sldId id="274" r:id="rId26"/>
   </p:sldIdLst>
   <p:sldSz cx="9144000" cy="6858000" type="screen4x3"/>
   <p:notesSz cx="6858000" cy="9144000"/>
@@ -139,6 +143,10 @@
             <p14:sldId id="313"/>
             <p14:sldId id="314"/>
             <p14:sldId id="336"/>
+            <p14:sldId id="341"/>
+            <p14:sldId id="342"/>
+            <p14:sldId id="343"/>
+            <p14:sldId id="346"/>
             <p14:sldId id="332"/>
             <p14:sldId id="317"/>
             <p14:sldId id="318"/>
@@ -229,8 +237,8 @@
       <inkml:brushProperty name="fitToCurve" value="1"/>
     </inkml:brush>
   </inkml:definitions>
-  <inkml:trace contextRef="#ctx0" brushRef="#br0">933 1850 6,'0'-2'31,"0"2"1,0 0-12,0 0-2,0 0-1,0 0-5,0 0 2,0 0 6,0 0-2,0 0-4,0 0-4,0 0 2,0 0-1,0 0 1,0 0-3,0 0 3,0 0 0,0 0-7,0 0-3,-6 0 1,-2 0 2,2 0 1,-5 5-3,1 3-1,-4 0 1,1 7-1,0 3-1,-1 2 2,3 2 0,3-1 4,-1 0-6,-1 0 1,1 2 3,-1 0-3,1 0 1,2 5-1,-1 0-1,-1-2 2,4 2-2,3 3-1,-2-3 2,4 0-2,0-2 2,0 5 2,0-6-3,0 3 2,11 4 1,-1-7-2,8-2-1,-5 5 0,3-5 1,0-2-1,1-1-1,10-6-1,-6 5 2,4-6-1,2-5 1,0 2-1,1-5 2,-4-2-1,5-1 2,-2-2-3,1 0 0,-7 0 2,6 0 1,1 0-2,-1 0 3,3-6-3,-3-8 1,-2-4 2,-1-5 0,0 0-3,0 0 3,-1-5-3,-5-1 1,-3 4-1,0 0 4,1-5 1,-5 8-2,-3-1 3,-2 5-2,-3-5 3,-3 2 0,2-2-4,-2 0-2,0-2 0,0-1 9,0 5-9,0 4 2,0-1-2,-13-5-1,-1 0 1,-3 2-2,7 3 1,3-1-1,-2 5 0,0-5 0,2 7 1,-1 1-1,1-1 1,-1 10-1,0-6-1,0-1 2,3-1 1,-6 3-1,6 2 0,-1 0-1,3 0 1,-1 0 0,0 2 0,2 3 0,-1 0 0,3 0 0,-2 0-1,2 0 0,0 0 0,0 0 0,0 0 1,0-2 0,0 2-1,0 0 0,0 0 0,0 0-1,0 0 1,0 0-1,0 0-1,0 0 0,0 0 0,0 0 0,0 0-2,0 0 0,0 0-2,0 0 0,0 0-4,0 0 1,0 0 3,0 0 6,0 0 1,2 10-1,11 7 0,3 3 0,4-4 0,-4 5 0,1 0 0,1 2-1,-1-3 2,7 0-1,-2 4 0,2 1-1,-5-2 1,8-2-1,-5-5 0,2 1 0,-4 4 0,2-9-4,-2 1-1,2-5 4,-2-3 0,-2 0 0,7 0-3,-6-1 2,3-4 2,-4 0-2,2 0 2,-2 0 2,7-4-1,-4-6 2,1 0-4,0-6 4,0-1-2,3-4 0,-3 0 0,-4 0 0,4-1 0,-1-4 0,1 3 0,-3 3 0,2-3 1,-1-3-1,-1 1 0,-3-5 0,0 0 0,0 2 0,-2 3 1,-4 3 2,-1-3 2,-4 5 0,-2-5-2,0-2-2,0-7 0,-3 4-1,0 4 2,0-3-2,0 3 3,0 6 1,0 1-1,0 1 3,-6 1-1,-4-2 0,-4 3-3,-1 1 3,2 3 0,-2 1-3,-1 1-3,-4 5 0,-2-3 0,0 3 1,1 0 0,-3 2 0,-4 1 0,1 2-2,-2 0 3,5 0-2,-2 0 0,2 0 3,5 0-5,0 0 1,0 0 2,6 7-3,-1 1 1,0 2 1,-4 3-1,1 1 0,1-5 1,5 1 2,2-5-1,2 1 0,4-2 2,0-4-4,3 0 1,0 0-2,0 0-2,0 0 0,0 0-2,0 0-4,0 0 2,0 0 1,0 0-2,0 0 7,0 0 4,13-10 1,5 4-1,0-5-1,4-2 0,-3 0 1,3-5-1,3 0 1,-1 1-2,1-7 2,-1 1 1,0-3-2,1-4 0,-1-1 1,0-6 1,0 7-1,-1-3 1,1-3-1,1 0 0,1 0 2,-10 0-1,1 1-1,-1 0 0,-1 0 4,-3 2-1,-6 14 1,1 0-4,-3-2 2,-2 3 2,0-8-2,-2 4-1,0-7 0,0 1 2,0 0-1,0 2-2,0 1 2,-11-7-2,-2 7 1,2 2 0,-2 0 3,-3 5-4,-1 6 1,-1-7-3,-6 3 3,4-1-2,-2 2 3,-2 5-2,2 5-2,1-3 1,-1 0 1,2 1 2,0 2-3,-2 0 0,2 1-3,2 4 2,0 0 1,3 0-1,-7 0-1,3 0 0,0 16 3,2 5-6,-1-4 7,2 7-2,1-2 0,-3 2 0,5-4 0,0 10-2,-5-4 2,7-2 0,-2 4-1,0-8 1,2 3 0,2 0-1,2 2 1,-2 2-1,5-7 0,-3-2-1,2 2 1,3 1-3,-4 2 3,6-1 0,0-5-2,0 6 0,0-8 1,0-2 0,0-3-1,0-1 1,0-6 0,0 0 1,0-3-1,0 0 1,0 0-2,0 0 2,0 0 1,0 0-1,0 0 1,0 0 1,0 0-1,0 0 0,0 0-1,0 0 0,0 0 0,0 0 0,0 0-4,0 0 4,0 0 6,0 0-3,0-5 0,6-13-1,1-7 2,4-6-3,-2-5 1,-2 0-1,2-7 0,2-3 1,2-8 1,-4 0-2,-5 2 1,0 2 1,-4 7 1,0-4-1,0 9-1,0-3 1,-8-4 2,-6 5-3,-8-6 1,-3 9 0,-5 6-1,-1 6 1,0 8 0,0 1-2,-2 1 0,5-1-1,1-5-2,-3 11 3,-2 5-1,8 3 1,-4 2 0,1 0-1,-3 0 1,6 0-2,2 0 2,-2 5-2,-4 11-1,4 3 3,-6 2-1,1 8-1,6 2 0,1 4 1,4-1 0,5-2-1,-2-1 1,5-3 1,4 8 0,-2-2-1,5-1 1,1 3-1,2-3-1,0-2 1,0 0 0,0 1 1,13 3-2,1 1 4,3-3-4,-1 0 2,-3-5 0,3 3 0,1-3 0,-6 0 0,8-4 0,-6-4 0,-2-5-1,-1-4 0,-3-4 0,-2-1 0,-3-4 1,2 3 1,-4-5 0,0 0-1,0 0 1,2 0 2,-2 0-1,0 0 0,0 0 3,0 0-1,0 0 2,0 0 0,0 0-1,0 0-2,0 0 1,0 0 0,0 0 3,0 0-1,0 0 2,0 0 0,0 0-4,0 0-2,0-5-1,-6-10 0,-12-2-1,-4-5 0,-5 2 0,3-6-1,-7 0 1,-2-4 0,6-2 0,-2-1-1,-1 3 0,0 2 1,0 0-1,-2 7 1,-1 2-3,-4 4 2,-2 3 1,-6-1 0,3 8 0,-1 0 0,8 2 1,4 3-2,-3-5 1,2 5 0,-1 0 1,-9 0-4,8 5 5,1 13-2,0 2-2,9 0 1,-1-4 0,-1 8 1,-2 5-1,10 8-1,-2-1 0,7-3 1,-3 6-1,-1-1 0,11 1 1,2 2 0,4 5-1,0-5 0,0 0 1,13 0 0,10 0-2,-7-2 3,5-4-1,4-2 0,4-4 0,1-3-1,-3 0 1,9-12-3,-2 4 3,2-8 2,4-2-1,2-3 0,-2-5-1,1 0 2,-9 0 2,3 0-3,-2 0 0,-6 0 0,0 0 0,3 0 1,-3-2-1,2-4 1,-1 1-1,-6-3 0,-6-2 0,-2 5 1,-9 3 1,-5 2 4,0 0-2,0 0-1,0 0 1,0 0-3,0 0 1,0 0 1,0 0 3,0 0 0,0 0 3,0 0 1,0 0-8,0 0-3,0 0-1,-25 0 1,-2 0 2,-2 0-1,-1 0-3,3 0 3,-4 0-1,4 0 0,-2 0 0,-15 15 0,4 6 1,-4 10-2,-2 2 2,6 0-2,-4 4 0,12-2 1,5-1-1,-3 1 0,8-1 0,2 7-1,0-1 2,-2 5 2,-2-4-1,4-3-1,11-1-1,2-5 2,1-4-2,-1 7 0,3-6 1,4 2-2,0 0 1,0-8-2,0 0 1,15 0 0,3 0 2,12-2-3,0-4 3,0-2 0,-3-1 0,11-1 3,-5-8-3,4-3 0,4-2 3,-6 0 2,3 0-2,3-2 1,0-16-1,2-1 1,-5 4-1,9-2 0,-10-7 0,3-6 1,-1 1 0,-7-1-1,-2-1 1,-5 2 0,2 3-1,-3-4 1,-2 2 0,-8 5 1,2-1-2,-8 9 2,0 3 0,-3-3 0,4-3 0,-2-8 0,4-3-1,-3 3 3,-5 6 1,-3 13-5,0 7 0,-3 0 0,-5 0 1,6 0 0,2-3-1,0-8 0,0 2 1,0 6 1,0 3-1,-3 0 1,-3 0-3,6 0 0,0 0-1,0 0 0,0 0-1,0 0-3,0 0-1,-3 0-4,-4 0-17,1 0-29,6 0-99,0 0-91</inkml:trace>
-  <inkml:trace contextRef="#ctx0" brushRef="#br0" timeOffset="1">876 1753 75,'0'2'45,"0"1"-25,0-3 29,0 0-11,0 0-11,0 0-3,0 0 6,0 0-4,0 0-3,0 0 4,0 0-1,-3 0-4,3 0-1,0 0-4,0 0-1,0 0-6,-6 0-5,1 0-3,-4 0 0,1 0 2,-5-8 0,0-3 3,1-5-2,-4-2-4,1-4 3,-3-4 1,3-2-1,1 1 2,1-4-2,2-5 0,0 0 0,2-5 0,7-3 0,0-2-1,2-3-3,0 3 4,0-6 1,0 4-4,7 5 0,6 4 0,2 6 2,-2 7-3,3-2 1,0 3-2,1-1-2,-1 3 3,3 5-1,4 0 1,6 0-1,4 3 1,-2-1-2,8 4-1,-1 1 3,0 4-1,0 4 1,-3 3-1,3 0-1,-3 0 1,0 0 0,1 0 0,-3 3 0,2 6 1,1 5-3,-7 2 2,-2-4-1,0 1 1,-2 7-1,-7-2 0,-1 3 2,8-1 0,-8 2-1,1 2 0,-3-1 0,-3 0 0,-5 3 0,4-2 2,-2 1-2,-1 3 3,-3 0-4,1 0 1,-3 0 2,-1 3-1,-2-3-5,0 3 6,0 0-3,0 3 4,0-2-1,0 5 1,0 1-2,-5-2 0,-6 2-2,0-7 2,3-2 0,-1-5-1,2 1 0,-6-5 2,-1-3 0,-4 3 1,3-9-1,-4 3 1,5-3 0,1 1-1,-6-5-1,0 1 0,-8-3-3,5-3 3,-6 1 0,4-3 0,-3 0 0,5 0 0,4 0 0,-2 0 0,2 2 0,1-2-1,-5 0 0,8 0 1,-1 0 0,2 0 0,-2 0 1,2 0-1,-4 0 1,4 0-1,4 0 0,0 0 0,-2 0 0,0 0 0,2 0 0,-2 0 0,2 0 0,0 0 0,1 0 1,-1 0 0,4 0-1,-4 0 0,-4 0 0,2 0 0,0-2 0,3-3 0,1 2 0,1 1-1,-2-1 0,4 3 1,0-2 0,1-1-1,0 1 1,0-1-1,3 3-6,-3-2-18,3 2-36,0 0-79,0-3-46</inkml:trace>
+  <inkml:trace contextRef="#ctx0" brushRef="#br0">933 1849 6,'0'-2'31,"0"2"1,0 0-12,0 0-2,0 0-1,0 0-5,0 0 2,0 0 6,0 0-2,0 0-4,0 0-4,0 0 2,0 0-1,0 0 1,0 0-3,0 0 3,0 0 0,0 0-7,0 0-3,-6 0 1,-2 0 2,2 0 1,-5 5-3,1 3-1,-4 0 1,1 7-1,0 3-1,-1 2 2,3 2 0,3-1 4,-1 0-6,-1 0 1,1 2 3,-1 0-3,1 0 1,2 5-1,-1 0-1,-1-2 2,4 2-2,3 3-1,-2-3 2,4 0-2,0-2 2,0 5 2,0-6-3,0 3 2,11 4 1,-1-7-2,8-2-1,-5 5 0,3-5 1,0-2-1,1-1-1,10-6-1,-6 5 2,4-6-1,2-5 1,0 2-1,1-5 2,-4-2-1,5-1 2,-2-2-3,1 0 0,-7 0 2,6 0 1,1 0-2,-1 0 3,3-6-3,-3-8 1,-2-4 2,-1-5 0,0 0-3,0 0 3,-1-5-3,-5-1 1,-3 4-1,0 0 4,1-5 1,-5 8-2,-3-1 3,-2 5-2,-3-5 3,-3 2 0,2-2-4,-2 0-2,0-2 0,0-1 9,0 5-9,0 4 2,0-1-2,-13-5-1,-1 0 1,-3 2-2,7 3 1,3-1-1,-2 5 0,0-5 0,2 7 1,-1 1-1,1-1 1,-1 10-1,0-6-1,0-1 2,3-1 1,-6 3-1,6 2 0,-1 0-1,3 0 1,-1 0 0,0 2 0,2 3 0,-1 0 0,3 0 0,-2 0-1,2 0 0,0 0 0,0 0 0,0 0 1,0-2 0,0 2-1,0 0 0,0 0 0,0 0-1,0 0 1,0 0-1,0 0-1,0 0 0,0 0 0,0 0 0,0 0-2,0 0 0,0 0-2,0 0 0,0 0-4,0 0 1,0 0 3,0 0 6,0 0 1,2 10-1,11 7 0,3 3 0,4-4 0,-4 5 0,1 0 0,1 2-1,-1-3 2,7 0-1,-2 4 0,2 1-1,-5-2 1,8-2-1,-5-5 0,2 1 0,-4 4 0,2-9-4,-2 1-1,2-5 4,-2-3 0,-2 0 0,7 0-3,-6-1 2,3-4 2,-4 0-2,2 0 2,-2 0 2,7-4-1,-4-6 2,1 0-4,0-6 4,0-1-2,3-4 0,-3 0 0,-4 0 0,4-1 0,-1-4 0,1 3 0,-3 3 0,2-3 1,-1-3-1,-1 1 0,-3-5 0,0 0 0,0 2 0,-2 3 1,-4 3 2,-1-3 2,-4 5 0,-2-5-2,0-2-2,0-7 0,-3 4-1,0 4 2,0-3-2,0 3 3,0 6 1,0 1-1,0 1 3,-6 1-1,-4-2 0,-4 3-3,-1 1 3,2 3 0,-2 1-3,-1 1-3,-4 5 0,-2-3 0,0 3 1,1 0 0,-3 2 0,-4 1 0,1 2-2,-2 0 3,5 0-2,-2 0 0,2 0 3,5 0-5,0 0 1,0 0 2,6 7-3,-1 1 1,0 2 1,-4 3-1,1 1 0,1-5 1,5 1 2,2-5-1,2 1 0,4-2 2,0-4-4,3 0 1,0 0-2,0 0-2,0 0 0,0 0-2,0 0-4,0 0 2,0 0 1,0 0-2,0 0 7,0 0 4,13-10 1,5 4-1,0-5-1,4-2 0,-3 0 1,3-5-1,3 0 1,-1 1-2,1-7 2,-1 1 1,0-3-2,1-3 0,-1-2 1,0-6 1,0 7-1,-1-3 1,1-3-1,1 0 0,1 0 2,-10 0-1,1 1-1,-1 0 0,-1 0 4,-3 2-1,-6 14 1,1 0-4,-3-2 2,-2 3 2,0-8-2,-2 4-1,0-7 0,0 1 2,0 0-1,0 2-2,0 1 2,-11-7-2,-2 7 1,2 2 0,-2 0 3,-3 5-4,-1 6 1,-1-7-3,-6 3 3,4-1-2,-2 2 3,-2 5-2,2 5-2,1-3 1,-1 0 1,2 1 2,0 2-3,-2 0 0,2 1-3,2 4 2,0 0 1,3 0-1,-7 0-1,3 0 0,0 16 3,2 5-6,-1-4 7,2 7-2,1-2 0,-3 2 0,5-4 0,0 10-2,-5-4 2,7-2 0,-2 4-1,0-8 1,2 3 0,2 0-1,2 2 1,-2 2-1,5-7 0,-3-2-1,2 2 1,3 1-3,-4 2 3,6-1 0,0-5-2,0 6 0,0-8 1,0-2 0,0-3-1,0-1 1,0-6 0,0 0 1,0-3-1,0 0 1,0 0-2,0 0 2,0 0 1,0 0-1,0 0 1,0 0 1,0 0-1,0 0 0,0 0-1,0 0 0,0 0 0,0 0 0,0 0-4,0 0 4,0 0 6,0 0-3,0-5 0,6-13-1,1-7 2,4-6-3,-2-5 1,-2 0-1,2-7 0,2-3 1,2-8 1,-4 0-2,-5 2 1,0 2 1,-4 7 1,0-4-1,0 9-1,0-3 1,-8-4 2,-6 5-3,-8-6 1,-3 9 0,-5 6-1,-1 6 1,0 8 0,0 1-2,-2 1 0,5-1-1,1-5-2,-3 11 3,-2 5-1,8 3 1,-4 2 0,1 0-1,-3 0 1,6 0-2,2 0 2,-2 5-2,-4 11-1,4 3 3,-6 2-1,1 8-1,6 2 0,1 4 1,4-1 0,5-2-1,-2-1 1,5-3 1,4 8 0,-2-2-1,5-1 1,1 3-1,2-3-1,0-2 1,0 0 0,0 1 1,13 3-2,1 1 4,3-3-4,-1 0 2,-3-5 0,3 3 0,1-3 0,-6 0 0,8-4 0,-6-4 0,-2-5-1,-1-4 0,-3-4 0,-2-1 0,-3-4 1,2 3 1,-4-5 0,0 0-1,0 0 1,2 0 2,-2 0-1,0 0 0,0 0 3,0 0-1,0 0 2,0 0 0,0 0-1,0 0-2,0 0 1,0 0 0,0 0 3,0 0-1,0 0 2,0 0 0,0 0-4,0 0-2,0-5-1,-6-10 0,-12-2-1,-4-5 0,-5 2 0,3-6-1,-7 0 1,-2-4 0,6-2 0,-2-1-1,-1 3 0,0 2 1,0 0-1,-2 7 1,-1 2-3,-4 4 2,-2 3 1,-6-1 0,3 8 0,-1 0 0,8 2 1,4 3-2,-3-5 1,2 5 0,-1 0 1,-9 0-4,8 5 5,1 13-2,0 2-2,9 0 1,-1-4 0,-1 8 1,-2 5-1,10 8-1,-2-1 0,7-3 1,-3 6-1,-1-1 0,11 1 1,2 2 0,4 5-1,0-5 0,0 0 1,13 0 0,10 0-2,-7-2 3,5-4-1,4-2 0,4-4 0,1-3-1,-3 0 1,9-12-3,-2 4 3,2-9 2,4-1-1,2-3 0,-2-5-1,1 0 2,-9 0 2,3 0-3,-2 0 0,-6 0 0,0 0 0,3 0 1,-3-2-1,2-4 1,-1 1-1,-6-2 0,-6-3 0,-2 5 1,-9 3 1,-5 2 4,0 0-2,0 0-1,0 0 1,0 0-3,0 0 1,0 0 1,0 0 3,0 0 0,0 0 3,0 0 1,0 0-8,0 0-3,0 0-1,-25 0 1,-2 0 2,-2 0-1,-1 0-3,3 0 3,-4 0-1,4 0 0,-2 0 0,-15 15 0,4 5 1,-4 11-2,-2 2 2,6 0-2,-4 4 0,12-2 1,5-1-1,-3 1 0,8-1 0,2 7-1,0-1 2,-2 5 2,-2-4-1,4-3-1,11-1-1,2-5 2,1-4-2,-1 7 0,3-6 1,4 2-2,0 0 1,0-8-2,0 0 1,15 0 0,3 0 2,12-2-3,0-4 3,0-2 0,-3-1 0,11-1 3,-5-8-3,4-3 0,4-2 3,-6 0 2,3 0-2,3-2 1,0-16-1,2-1 1,-5 4-1,9-2 0,-10-7 0,3-6 1,-1 1 0,-7-1-1,-2-1 1,-5 2 0,2 3-1,-3-4 1,-2 2 0,-8 5 1,2-1-2,-8 9 2,0 3 0,-3-3 0,4-3 0,-2-8 0,4-3-1,-3 3 3,-5 6 1,-3 13-5,0 7 0,-3 0 0,-5 0 1,6 0 0,2-3-1,0-8 0,0 2 1,0 6 1,0 3-1,-3 0 1,-3 0-3,6 0 0,0 0-1,0 0 0,0 0-1,0 0-3,0 0-1,-3 0-4,-4 0-17,1 0-29,6 0-99,0 0-91</inkml:trace>
+  <inkml:trace contextRef="#ctx0" brushRef="#br0" timeOffset="1">876 1752 75,'0'2'45,"0"1"-25,0-3 29,0 0-11,0 0-11,0 0-3,0 0 6,0 0-4,0 0-3,0 0 4,0 0-1,-3 0-4,3 0-1,0 0-4,0 0-1,0 0-6,-6 0-5,1 0-3,-4 0 0,1 0 2,-5-8 0,0-3 3,1-5-2,-4-2-4,1-4 3,-3-4 1,3-2-1,1 1 2,1-4-2,2-5 0,0 0 0,2-5 0,7-3 0,0-2-1,2-3-3,0 4 4,0-7 1,0 4-4,7 5 0,6 4 0,2 6 2,-2 7-3,3-2 1,0 3-2,1-1-2,-1 3 3,3 5-1,4 0 1,6 0-1,4 3 1,-2-1-2,8 4-1,-1 1 3,0 4-1,0 4 1,-3 3-1,3 0-1,-3 0 1,0 0 0,1 0 0,-3 3 0,2 6 1,1 5-3,-7 2 2,-2-4-1,0 1 1,-2 7-1,-7-2 0,-1 3 2,8-1 0,-8 2-1,1 2 0,-3-1 0,-3 0 0,-5 3 0,4-2 2,-2 1-2,-1 3 3,-3 0-4,1 0 1,-3 0 2,-1 3-1,-2-3-5,0 2 6,0 1-3,0 3 4,0-2-1,0 5 1,0 1-2,-5-2 0,-6 2-2,0-7 2,3-2 0,-1-5-1,2 1 0,-6-5 2,-1-3 0,-4 3 1,3-9-1,-4 3 1,5-3 0,1 1-1,-6-5-1,0 1 0,-8-3-3,5-3 3,-6 1 0,4-3 0,-3 0 0,5 0 0,4 0 0,-2 0 0,2 2 0,1-2-1,-5 0 0,8 0 1,-1 0 0,2 0 0,-2 0 1,2 0-1,-4 0 1,4 0-1,4 0 0,0 0 0,-2 0 0,0 0 0,2 0 0,-2 0 0,2 0 0,0 0 0,1 0 1,-1 0 0,4 0-1,-4 0 0,-4 0 0,2 0 0,0-2 0,3-3 0,1 2 0,1 1-1,-2-1 0,4 3 1,0-2 0,1-1-1,0 1 1,0-1-1,3 3-6,-3-2-18,3 2-36,0 0-79,0-3-46</inkml:trace>
 </inkml:ink>
 </file>
 
@@ -319,8 +327,8 @@
       <inkml:brushProperty name="fitToCurve" value="1"/>
     </inkml:brush>
   </inkml:definitions>
-  <inkml:trace contextRef="#ctx0" brushRef="#br0">883 1699 6,'0'-3'31,"0"3"1,0 0-12,0 0-2,0 0-1,0 0-5,0 0 2,0 0 6,0 0-2,0 0-4,0 0-4,0 0 2,0 0-1,0 0 1,0 0-3,0 0 3,0 0 0,0 0-7,0 0-3,-5 0 1,-3 0 2,2 0 1,-4 5-3,0 3-1,-3-1 1,1 6-1,-1 4-1,1 1 2,1 3 0,3-2 4,0 0-6,-2 0 1,2 3 3,-2-1-3,1-1 1,3 7-1,-2-2-1,0-1 2,4 1-2,1 4-1,0-3 2,3 0-2,0-3 2,0 6 2,0-6-3,0 3 2,10 3 1,0-6-2,7-2-1,-5 5 0,3-5 1,0-2-1,2 0-1,8-6-1,-5 4 2,4-5-1,1-5 1,0 2-1,2-4 2,-4-3-1,5 1 2,-3-3-3,2 0 0,-8 0 2,7 0 1,0 0-2,0 0 3,2-6-3,-3-7 1,-1-3 2,-1-6 0,-1 1-3,2 1 3,-3-7-3,-3 1 1,-5 3-1,1 0 4,2-4 1,-5 6-2,-4 0 3,-2 4-2,-1-4 3,-4 2 0,1-2-4,-1 0-2,0-2 0,0-1 9,0 5-9,0 3 2,0 0-2,-12-5-1,-1-1 1,-3 3-2,6 3 1,3-2-1,-1 5 0,-1-4 0,3 6 1,-2 1-1,2-1 1,-1 9-1,-1-6-1,0 1 2,3-2 1,-6 2-1,7 2 0,-2 0-1,4 1 1,-2-1 0,0 3 0,2 2 0,-1 0 0,3 0 0,-2 0-1,2 0 0,0 0 0,0 0 0,0 0 1,0-3 0,0 3-1,0 0 0,0 0 0,0 0-1,0 0 1,0 0-1,0 0-1,0 0 0,0 0 0,0 0 0,0 0-2,0 0 0,0 0-2,0 0 0,0 0-4,0 0 1,0 0 3,0 0 6,0 0 1,2 10-1,11 6 0,2 2 0,3-4 0,-2 6 0,0-1 0,1 2-1,-1-2 2,7-1-1,-3 4 0,3 1-1,-5-2 1,8-2-1,-5-4 0,1 0 0,-3 5 0,2-9-4,-2 1-1,2-4 4,-2-4 0,-2 1 0,6-1-3,-4-1 2,1-3 2,-2 0-2,0 0 2,-1 0 2,7-3-1,-4-6 2,1 0-4,0-6 4,-1-1-2,4-3 0,-3 0 0,-4 0 0,4-2 0,-1-3 0,1 3 0,-4 3 0,4-3 1,-3-3-1,0 1 0,-3-4 0,1-1 0,-1 2 0,-2 4 1,-3 2 2,-2-4 2,-3 6 0,-2-5-2,-1-2-2,1-6 0,-3 4-1,0 3 2,0-3-2,0 3 3,0 5 1,0 2-1,0 1 3,-5 0-1,-5-1 0,-3 2-3,-1 1 3,1 3 0,-1 2-3,-1-1-3,-4 5 0,-2-2 0,0 2 1,2 1 0,-4 1 0,-4 1 0,2 2-2,-3 0 3,5 0-2,-1 0 0,1 0 3,6 0-5,-2 0 1,1 0 2,6 7-3,-2 0 1,2 2 1,-6 4-1,2-1 0,1-4 1,5 2 2,1-6-1,3 2 0,3-3 2,0-3-4,3 0 1,0 0-2,0 0-2,0 0 0,0 0-2,0 0-4,0 0 2,0 0 1,0 0-2,0 0 7,0 0 4,12-9 1,5 3-1,0-4-1,4-2 0,-2 1 1,1-6-1,3 1 1,0 0-2,1-6 2,-2 0 1,1-1-2,1-5 0,-2 0 1,2-6 1,-1 6-1,-2-2 1,1-3-1,2 0 0,1 0 2,-10 0-1,1 1-1,0-1 0,-2 2 4,-3 0-1,-5 14 1,0-1-4,-2-1 2,-2 2 2,0-6-2,-2 2-1,0-5 0,0 0 2,0 0-1,0 2-2,0 1 2,-10-6-2,-3 6 1,3 2 0,-2 0 3,-4 5-4,0 4 1,-1-5-3,-6 3 3,4-3-2,-2 4 3,-1 3-2,2 6-2,-1-3 1,0-1 1,3 2 2,-2 1-3,-1 1 0,3 1-3,1 3 2,0 0 1,3 0-1,-7 0-1,2 0 0,2 13 3,1 7-6,-1-4 7,2 5-2,0 0 0,-1 1 0,3-4 0,0 10-2,-4-4 2,7-2 0,-2 3-1,-1-6 1,3 2 0,2 0-1,1 2 1,-2 2-1,5-7 0,-2-1-1,1 1 1,4 1-3,-5 2 3,6 0 0,0-6-2,0 6 0,0-7 1,0-2 0,0-3-1,0-1 1,0-4 0,0-2 1,0-2-1,0 0 1,0 0-2,0 0 2,0 0 1,0 0-1,0 0 1,0 0 1,0 0-1,0 0 0,0 0-1,0 0 0,0 0 0,0 0 0,0 0-4,0 0 4,0 0 6,0 0-3,0-5 0,6-11-1,0-7 2,4-6-3,-1-4 1,-2 0-1,1-6 0,2-4 1,3-6 1,-5 0-2,-4 1 1,0 1 1,-4 8 1,0-4-1,0 8-1,0-3 1,-8-2 2,-4 3-3,-10-6 1,-1 10 0,-6 4-1,0 6 1,-1 7 0,1 1-2,-2 2 0,5-1-1,0-6-2,-2 11 3,-3 4-1,8 3 1,-3 2 0,1 0-1,-4 0 1,6 0-2,2 0 2,-1 5-2,-5 9-1,5 4 3,-7 1-1,1 8-1,7 1 0,0 5 1,4-3 0,5 1-1,-3-3 1,6-2 1,3 7 0,-1-2-1,4-1 1,1 3-1,2-2-1,0-3 1,0 0 0,0 2 1,12 2-2,2 1 4,2-3-4,-1 0 2,-2-4 0,1 3 0,3-4 0,-7 1 0,7-4 0,-4-3 0,-3-6-1,0-3 0,-4-3 0,-1-2 0,-3-3 1,2 3 1,-4-5 0,0 0-1,0 0 1,2 0 2,-2 0-1,0 0 0,0 0 3,0 0-1,0 0 2,0 0 0,0 0-1,0 0-2,0 0 1,0 0 0,0 0 3,0 0-1,0 0 2,0 0 0,0 0-4,0 0-2,0-5-1,-6-9 0,-11-1-1,-4-6 0,-4 3 0,2-6-1,-6 1 1,-3-5 0,7-1 0,-3-2-1,0 4 0,0 0 1,-1 2-1,-1 6 1,-1 2-3,-4 3 2,-2 2 1,-6 1 0,3 6 0,0 1 0,7 1 1,3 3-2,-2-5 1,1 5 0,0 0 1,-8 0-4,7 5 5,0 11-2,1 3-2,9-1 1,-2-3 0,-1 7 1,-1 5-1,8 7-1,0-2 0,5-1 1,-2 4-1,-1 0 0,11 1 1,1 2 0,4 4-1,0-5 0,0 1 1,12 0 0,9 0-2,-6-3 3,6-2-1,2-3 0,5-3 0,0-3-1,-2-1 1,7-10-3,0 4 3,1-8 2,4-2-1,1-2 0,-1-5-1,1 0 2,-8 0 2,2 0-3,-2 0 0,-6 0 0,1 0 0,3 0 1,-4-2-1,3-3 1,-2 0-1,-5-3 0,-6-1 0,-2 5 1,-8 2 1,-5 2 4,0 0-2,0 0-1,0 0 1,0 0-3,0 0 1,0 0 1,0 0 3,0 0 0,0 0 3,0 0 1,0 0-8,0 0-3,0 0-1,-24 0 1,-1 0 2,-3 0-1,0 0-3,2 0 3,-3 0-1,4 0 0,-3 0 0,-13 14 0,3 5 1,-4 9-2,-2 3 2,6-1-2,-3 4 0,11-2 1,4-1-1,-2 1 0,7-1 0,2 7-1,0-1 2,-2 4 2,-2-3-1,5-3-1,9-1-1,2-5 2,2-3-2,-2 6 0,3-5 1,4 1-2,0 1 1,0-8-2,0-1 1,14 2 0,4-1 2,10-2-3,0-3 3,1-2 0,-4-2 0,11 0 3,-5-7-3,5-3 0,2-2 3,-5 0 2,3 0-2,3-2 1,0-15-1,2 0 1,-6 4-1,10-4 0,-10-4 0,3-7 1,-1 2 0,-7-2-1,-1 0 1,-5 1 0,1 3-1,-2-3 1,-2 0 0,-9 7 1,3-2-2,-7 8 2,0 3 0,-3-3 0,3-3 0,-1-6 0,3-4-1,-2 3 3,-5 6 1,-3 11-5,0 7 0,-3 0 0,-5 0 1,6 0 0,2-2-1,0-8 0,0 1 1,0 7 1,0 2-1,-2 0 1,-4 0-3,6 0 0,0 0-1,0 0 0,0 0-1,0 0-3,0 0-1,-3 0-4,-4 0-17,2 0-29,5 0-99,0 0-91</inkml:trace>
-  <inkml:trace contextRef="#ctx0" brushRef="#br0" timeOffset="1">829 1609 75,'0'2'45,"0"1"-25,0-3 29,0 0-11,0 0-11,0 0-3,0 0 6,0 0-4,0 0-3,0 0 4,0 0-1,-3 0-4,3 0-1,0 0-4,0 0-1,0 0-6,-5 0-5,0 0-3,-3 0 0,0 0 2,-4-7 0,-1-3 3,2-6-2,-4 0-4,1-4 3,-3-4 1,3-1-1,0-1 2,1-2-2,3-5 0,0 0 0,2-5 0,5-2 0,2-2-1,1-3-3,0 3 4,0-6 1,0 4-4,6 5 0,7 2 0,0 7 2,0 6-3,2-1 1,0 2-2,1-1-2,0 2 3,2 6-1,3 0 1,7-1-1,3 3 1,-2-1-2,8 5-1,0 0 3,-2 3-1,1 4 1,-3 3-1,3 0-1,-2 0 1,-1 0 0,0 0 0,-1 3 0,1 5 1,1 5-3,-6 2 2,-3-4-1,1 1 1,-2 7-1,-8-3 0,0 3 2,8 0 0,-7 1-1,0 2 0,-3-1 0,-3 0 0,-4 3 0,3-2 2,-2 1-2,1 2 3,-5 1-4,2 0 1,-4 0 2,0 2-1,-2-2-5,0 2 6,0 1-3,0 2 4,0-1-1,0 3 1,0 2-2,-4-2 0,-6 2-2,-1-6 2,3-3 0,0-4-1,1 1 0,-6-5 2,1-2 0,-5 2 1,2-7-1,-3 1 1,5-2 0,1 1-1,-7-4-1,2 0 0,-9-2-3,5-3 3,-5 0 0,3-2 0,-3 0 0,5 0 0,4 0 0,-1 0 0,0 2 0,2-2-1,-5 0 0,9 0 1,-3 0 0,3 0 0,-2 0 1,2 0-1,-4 0 1,3 0-1,5 0 0,-1 0 0,-2 0 0,1 0 0,2 0 0,-2 0 0,1 0 0,0 0 0,1 0 1,0 0 0,4 0-1,-5 0 0,-3 0 0,2 0 0,-1-2 0,3-2 0,1 1 0,1 1-1,-1 0 0,3 2 1,0-3 0,2 1-1,-1 0 1,0-1-1,3 3-6,-3-2-18,3 2-36,0 0-79,0-2-46</inkml:trace>
+  <inkml:trace contextRef="#ctx0" brushRef="#br0">880 1695 6,'0'-2'31,"0"2"1,0 0-12,0 0-2,0 0-1,0 0-5,0 0 2,0 0 6,0 0-2,0 0-4,0 0-4,0 0 2,0 0-1,0 0 1,0 0-3,0 0 3,0 0 0,0 0-7,0 0-3,-5 0 1,-3 0 2,2 0 1,-4 4-3,0 4-1,-3-1 1,1 6-1,-1 4-1,1 1 2,1 3 0,3-2 4,0 0-6,-1 0 1,1 3 3,-2-1-3,1-1 1,3 7-1,-2-2-1,0-1 2,4 1-2,1 4-1,0-3 2,3 0-2,0-3 2,0 6 2,0-6-3,0 2 2,10 4 1,0-6-2,7-2-1,-5 5 0,2-5 1,1-2-1,2 0-1,8-6-1,-5 4 2,4-5-1,1-5 1,0 2-1,2-4 2,-4-3-1,5 1 2,-3-3-3,2 0 0,-8 0 2,6 0 1,1 0-2,0 0 3,2-6-3,-3-7 1,-1-3 2,-1-6 0,-1 1-3,2 1 3,-3-7-3,-3 1 1,-5 3-1,1 0 4,2-4 1,-6 7-2,-3-1 3,-2 4-2,-1-4 3,-4 2 0,1-2-4,-1 0-2,0-2 0,0-1 9,0 5-9,0 3 2,0 0-2,-12-5-1,-1-1 1,-2 3-2,5 3 1,3-2-1,-1 5 0,-1-4 0,3 6 1,-2 1-1,2-1 1,-1 9-1,-1-6-1,0 1 2,3-2 1,-6 2-1,7 2 0,-2 0-1,4 1 1,-2-1 0,0 3 0,2 2 0,-1 0 0,3 0 0,-2 0-1,2 0 0,0 0 0,0 0 0,0 0 1,0-3 0,0 3-1,0 0 0,0 0 0,0 0-1,0 0 1,0 0-1,0 0-1,0 0 0,0 0 0,0 0 0,0 0-2,0 0 0,0 0-2,0 0 0,0 0-4,0 0 1,0 0 3,0 0 6,0 0 1,2 10-1,11 6 0,2 2 0,3-4 0,-2 6 0,0-1 0,1 2-1,-1-2 2,6-1-1,-2 4 0,3 1-1,-5-2 1,8-2-1,-5-4 0,1 0 0,-3 5 0,2-9-4,-2 1-1,2-4 4,-2-4 0,-2 1 0,6-1-3,-4-1 2,0-3 2,-1 0-2,0 0 2,-1 0 2,7-3-1,-4-6 2,1 0-4,0-6 4,-1-1-2,4-3 0,-3 0 0,-4 0 0,4-2 0,-1-3 0,1 3 0,-5 3 0,5-3 1,-3-3-1,0 1 0,-3-4 0,1-1 0,-1 2 0,-2 4 1,-3 3 2,-2-5 2,-3 6 0,-2-5-2,-1-2-2,1-6 0,-3 4-1,0 3 2,0-3-2,0 3 3,0 5 1,0 2-1,0 1 3,-5 0-1,-5-1 0,-3 2-3,-1 1 3,1 3 0,-1 2-3,-1-1-3,-4 5 0,-2-2 0,0 2 1,3 1 0,-5 1 0,-4 1 0,2 2-2,-3 0 3,5 0-2,-1 0 0,1 0 3,6 0-5,-2 0 1,1 0 2,6 7-3,-2 0 1,2 2 1,-6 4-1,3-1 0,0-4 1,5 2 2,1-6-1,3 2 0,3-3 2,0-3-4,3 0 1,0 0-2,0 0-2,0 0 0,0 0-2,0 0-4,0 0 2,0 0 1,0 0-2,0 0 7,0 0 4,12-9 1,5 3-1,0-4-1,3-2 0,-1 1 1,1-6-1,3 1 1,0 0-2,1-6 2,-2 0 1,1-1-2,1-4 0,-2-1 1,2-6 1,-1 6-1,-2-2 1,1-3-1,1 0 0,2 0 2,-10 0-1,1 1-1,0-1 0,-2 2 4,-3 0-1,-5 14 1,0-1-4,-2-1 2,-2 2 2,0-5-2,-2 1-1,0-5 0,0 0 2,0 0-1,0 2-2,0 1 2,-10-6-2,-3 6 1,3 2 0,-2 0 3,-4 5-4,0 4 1,-1-5-3,-6 3 3,4-3-2,-1 4 3,-2 3-2,2 6-2,-1-3 1,0-1 1,3 2 2,-2 1-3,-1 1 0,3 1-3,1 3 2,0 0 1,3 0-1,-7 0-1,2 0 0,2 13 3,1 7-6,0-4 7,1 5-2,0 0 0,-1 1 0,3-4 0,0 10-2,-4-4 2,7-2 0,-2 3-1,-1-6 1,3 2 0,2 0-1,1 2 1,-2 2-1,5-7 0,-2-1-1,1 0 1,4 2-3,-5 2 3,6 0 0,0-6-2,0 6 0,0-7 1,0-2 0,0-3-1,0-1 1,0-4 0,0-2 1,0-2-1,0 0 1,0 0-2,0 0 2,0 0 1,0 0-1,0 0 1,0 0 1,0 0-1,0 0 0,0 0-1,0 0 0,0 0 0,0 0 0,0 0-4,0 0 4,0 0 6,0 0-3,0-5 0,6-11-1,0-7 2,4-6-3,-1-4 1,-2 0-1,1-5 0,2-5 1,3-6 1,-5 0-2,-4 1 1,0 1 1,-4 8 1,0-4-1,0 8-1,0-3 1,-8-2 2,-4 4-3,-10-7 1,-1 10 0,-6 4-1,0 6 1,-1 7 0,1 1-2,-1 2 0,4-1-1,0-6-2,-2 11 3,-3 4-1,8 3 1,-3 2 0,1 0-1,-4 0 1,6 0-2,2 0 2,-1 5-2,-4 9-1,4 4 3,-7 1-1,1 8-1,7 1 0,0 5 1,4-3 0,5 1-1,-3-3 1,6-3 1,3 8 0,-1-2-1,4-1 1,1 3-1,2-2-1,0-3 1,0 0 0,0 2 1,12 2-2,2 1 4,2-3-4,-1 0 2,-2-4 0,1 3 0,3-4 0,-7 0 0,7-3 0,-4-3 0,-3-6-1,0-3 0,-4-3 0,-1-2 0,-3-3 1,2 3 1,-4-5 0,0 0-1,0 0 1,2 0 2,-2 0-1,0 0 0,0 0 3,0 0-1,0 0 2,0 0 0,0 0-1,0 0-2,0 0 1,0 0 0,0 0 3,0 0-1,0 0 2,0 0 0,0 0-4,0 0-2,0-5-1,-6-9 0,-11-1-1,-4-6 0,-4 3 0,2-5-1,-6 0 1,-3-5 0,7-1 0,-3-2-1,0 4 0,0 0 1,0 2-1,-2 6 1,-1 2-3,-4 3 2,-2 2 1,-6 1 0,3 6 0,0 1 0,8 1 1,2 3-2,-2-5 1,1 5 0,0 0 1,-8 0-4,7 5 5,0 11-2,1 3-2,9-1 1,-1-3 0,-2 7 1,-1 5-1,8 7-1,0-2 0,5-1 1,-2 4-1,-1-1 0,11 2 1,1 2 0,4 4-1,0-5 0,0 1 1,12 0 0,9 0-2,-6-3 3,6-2-1,2-3 0,5-3 0,-1-3-1,-1-1 1,7-10-3,0 4 3,1-9 2,4-1-1,1-2 0,-1-5-1,1 0 2,-9 0 2,3 0-3,-2 0 0,-6 0 0,1 0 0,3 0 1,-4-2-1,3-3 1,-2 0-1,-5-2 0,-6-2 0,-2 5 1,-8 2 1,-5 2 4,0 0-2,0 0-1,0 0 1,0 0-3,0 0 1,0 0 1,0 0 3,0 0 0,0 0 3,0 0 1,0 0-8,0 0-3,0 0-1,-24 0 1,-1 0 2,-3 0-1,0 0-3,2 0 3,-3 0-1,4 0 0,-3 0 0,-13 14 0,4 4 1,-5 10-2,-2 3 2,6-1-2,-3 4 0,11-2 1,4-1-1,-2 1 0,7-1 0,2 7-1,1-1 2,-3 4 2,-2-3-1,5-3-1,9-1-1,2-6 2,2-2-2,-2 6 0,3-5 1,4 1-2,0 1 1,0-8-2,0-1 1,14 2 0,4-1 2,10-2-3,0-3 3,0-2 0,-3-2 0,11 0 3,-5-7-3,5-3 0,2-2 3,-5 0 2,3 0-2,3-2 1,-1-15-1,3 0 1,-6 4-1,10-4 0,-10-4 0,3-7 1,-1 2 0,-7-2-1,-2 0 1,-4 1 0,1 3-1,-2-3 1,-2 0 0,-9 7 1,3-1-2,-7 7 2,0 3 0,-3-3 0,3-3 0,-1-6 0,3-4-1,-2 3 3,-5 6 1,-3 11-5,0 7 0,-3 0 0,-5 0 1,6 0 0,2-2-1,0-8 0,0 1 1,0 7 1,0 2-1,-2 0 1,-4 0-3,6 0 0,0 0-1,0 0 0,0 0-1,0 0-3,0 0-1,-3 0-4,-4 0-17,2 0-29,5 0-99,0 0-91</inkml:trace>
+  <inkml:trace contextRef="#ctx0" brushRef="#br0" timeOffset="1">826 1606 75,'0'2'45,"0"1"-25,0-3 29,0 0-11,0 0-11,0 0-3,0 0 6,0 0-4,0 0-3,0 0 4,0 0-1,-3 0-4,3 0-1,0 0-4,0 0-1,0 0-6,-5 0-5,0 0-3,-3 0 0,0 0 2,-4-7 0,-1-3 3,2-6-2,-3 0-4,0-4 3,-3-4 1,3-1-1,0-1 2,1-2-2,3-5 0,0 0 0,2-5 0,5-2 0,2-2-1,1-3-3,0 4 4,0-7 1,0 4-4,6 5 0,7 2 0,0 7 2,0 6-3,2-1 1,0 2-2,1-1-2,0 2 3,1 6-1,4 0 1,7-1-1,3 3 1,-2-1-2,8 5-1,0 0 3,-2 3-1,1 4 1,-3 3-1,2 0-1,-1 0 1,-1 0 0,0 0 0,-1 3 0,1 5 1,1 5-3,-6 2 2,-3-4-1,0 1 1,-1 7-1,-8-3 0,0 3 2,8 0 0,-7 1-1,0 2 0,-3-1 0,-3 0 0,-4 3 0,3-2 2,-2 1-2,1 2 3,-5 1-4,2 0 1,-4 0 2,0 2-1,-2-2-5,0 1 6,0 2-3,0 2 4,0-1-1,0 3 1,0 2-2,-4-2 0,-6 2-2,-1-6 2,3-3 0,0-4-1,1 1 0,-6-5 2,1-2 0,-5 2 1,2-7-1,-3 1 1,5-2 0,1 1-1,-7-4-1,2 0 0,-8-2-3,4-3 3,-5 0 0,3-2 0,-3 0 0,5 0 0,4 0 0,-1 0 0,0 2 0,2-2-1,-5 0 0,9 0 1,-3 0 0,3 0 0,-2 0 1,2 0-1,-3 0 1,2 0-1,5 0 0,-1 0 0,-2 0 0,1 0 0,2 0 0,-2 0 0,1 0 0,0 0 0,1 0 1,0 0 0,4 0-1,-5 0 0,-3 0 0,2 0 0,-1-2 0,3-2 0,1 1 0,1 1-1,-1 0 0,3 2 1,0-3 0,2 1-1,-1 0 1,0-1-1,3 3-6,-3-2-18,3 2-36,0 0-79,0-2-46</inkml:trace>
 </inkml:ink>
 </file>
 
@@ -379,8 +387,8 @@
       <inkml:brushProperty name="fitToCurve" value="1"/>
     </inkml:brush>
   </inkml:definitions>
-  <inkml:trace contextRef="#ctx0" brushRef="#br0">848 1595 6,'0'-2'31,"0"2"1,0 0-12,0 0-2,0 0-1,0 0-5,0 0 2,0 0 6,0 0-2,0 0-4,0 0-4,0 0 2,0 0-1,0 0 1,0 0-3,0 0 3,0 0 0,0 0-7,0 0-3,-4 0 1,-4 0 2,3 0 1,-5 4-3,0 3-1,-2 0 1,0 6-1,0 2-1,0 2 2,1 3 0,4-2 4,-1-1-6,-1 1 1,1 3 3,-2-2-3,2 1 1,2 4-1,-2 0-1,0-1 2,4 1-2,2 2-1,-1-1 2,3-1-2,0-2 2,0 5 2,0-5-3,0 2 2,9 3 1,1-5-2,6-2-1,-4 4 0,2-4 1,1-2-1,1-1-1,8-4-1,-5 2 2,4-3-1,1-5 1,1 1-1,0-3 2,-3-3-1,5 0 2,-3-2-3,2 0 0,-7 0 2,6 0 1,0 0-2,-1 0 3,4-5-3,-4-7 1,-1-4 2,-2-4 0,1 1-3,1-1 3,-3-5-3,-3 1 1,-4 2-1,1 0 4,0-3 1,-3 5-2,-4 1 3,-2 3-2,-2-4 3,-3 2 0,2-1-4,-2-2-2,0 0 0,0-2 9,0 6-9,0 2 2,0-1-2,-12-3-1,0-1 1,-4 2-2,7 2 1,2 0-1,-1 3 0,0-3 0,1 6 1,0 1-1,1-2 1,-1 10-1,0-7-1,-1 1 2,4-2 1,-7 3-1,7 2 0,-1-1-1,2 1 1,-1 0 0,1 1 0,0 3 0,1 0 0,2 0 0,-2 0-1,2 0 0,0 0 0,0 0 0,0 0 1,0-2 0,0 2-1,0 0 0,0 0 0,0 0-1,0 0 1,0 0-1,0 0-1,0 0 0,0 0 0,0 0 0,0 0-2,0 0 0,0 0-2,0 0 0,0 0-4,0 0 1,0 0 3,0 0 6,0 0 1,2 9-1,10 6 0,3 2 0,2-4 0,-2 6 0,0-1 0,2 2-1,-1-3 2,6 1-1,-3 2 0,3 2-1,-4-3 1,6-1-1,-4-4 0,2 1 0,-4 3 0,2-7-4,-1-1-1,1-2 4,-2-4 0,-2 0 0,6 1-3,-4-2 2,2-3 2,-3 0-2,0 0 2,0 0 2,6-3-1,-4-6 2,1 0-4,0-4 4,0-3-2,2-2 0,-2 1 0,-3-1 0,3-2 0,-1-2 0,1 2 0,-3 3 0,3-3 1,-2-2-1,-1 0 0,-3-3 0,2-1 0,-2 1 0,-2 4 1,-2 2 2,-2-2 2,-4 3 0,-1-4-2,0-1-2,-1-6 0,-2 3-1,0 4 2,0-4-2,0 4 3,0 5 1,0 1-1,0 0 3,-5 1-1,-4-1 0,-4 3-3,0 0 3,1 2 0,-2 2-3,-1 0-3,-3 4 0,-2-1 0,0 1 1,1 1 0,-2 2 0,-5 0 0,1 2-2,-1 0 3,4 0-2,-2 0 0,3 0 3,4 0-5,-1 0 1,1 0 2,5 6-3,-1 1 1,1 1 1,-5 4-1,1 0 0,2-4 1,4 0 2,2-3-1,1 0 0,5-2 2,-1-3-4,3 0 1,0 0-2,0 0-2,0 0 0,0 0-2,0 0-4,0 0 2,0 0 1,0 0-2,0 0 7,0 0 4,12-8 1,4 2-1,0-4-1,5 0 0,-4-1 1,3-5-1,2 1 1,0-1-2,1-4 2,-1 0 1,0-2-2,0-4 0,0-1 1,1-5 1,-1 6-1,-2-2 1,2-3-1,0 0 0,2 0 2,-9 0-1,0 1-1,0-1 0,-1 2 4,-4 0-1,-4 13 1,0-1-4,-2-1 2,-2 2 2,0-6-2,-2 3-1,0-6 0,0 1 2,0 0-1,0 1-2,0 2 2,-10-7-2,-2 7 1,2 1 0,-2 0 3,-3 5-4,0 4 1,-2-5-3,-5 2 3,4-1-2,-2 2 3,-2 4-2,3 5-2,0-2 1,-2-2 1,4 3 2,-2 0-3,-1 1 0,2 1-3,2 3 2,0 0 1,2 0-1,-6 0-1,2 0 0,1 13 3,1 5-6,0-3 7,2 6-2,0-2 0,-2 1 0,4-2 0,-1 8-2,-3-4 2,7-1 0,-4 3-1,1-7 1,3 3 0,1 0-1,1 1 1,-1 3-1,4-7 0,-2-2-1,1 3 1,4 0-3,-5 1 3,6 1 0,0-6-2,0 6 0,0-7 1,0-2 0,0-3-1,0 0 1,0-5 0,0-1 1,0-2-1,0 0 1,0 0-2,0 0 2,0 0 1,0 0-1,0 0 1,0 0 1,0 0-1,0 0 0,0 0-1,0 0 0,0 0 0,0 0 0,0 0-4,0 0 4,0 0 6,0 0-3,0-4 0,6-11-1,0-7 2,4-5-3,-2-4 1,-1 0-1,1-6 0,1-3 1,3-6 1,-3 0-2,-5 1 1,-1 1 1,-3 7 1,0-3-1,0 7-1,0-2 1,-7-4 2,-6 5-3,-7-6 1,-2 9 0,-6 4-1,0 5 1,-1 7 0,1 1-2,-2 2 0,5-2-1,0-4-2,-2 9 3,-3 5-1,9 2 1,-4 2 0,0 0-1,-2 0 1,5 0-2,2 0 2,-2 4-2,-3 10-1,3 3 3,-6 1-1,2 7-1,6 1 0,-1 4 1,5-1 0,4 0-1,-2-3 1,5-2 1,4 8 0,-3-4-1,6 1 1,0 2-1,2-2-1,0-2 1,0-1 0,0 2 1,12 2-2,1 1 4,2-3-4,0 0 2,-3-3 0,1 2 0,4-3 0,-8-1 0,8-2 0,-5-3 0,-2-5-1,0-4 0,-4-3 0,-2-1 0,-2-3 1,2 3 1,-4-5 0,0 0-1,0 0 1,2 0 2,-2 0-1,0 0 0,0 0 3,0 0-1,0 0 2,0 0 0,0 0-1,0 0-2,0 0 1,0 0 0,0 0 3,0 0-1,0 0 2,0 0 0,0 0-4,0 0-2,0-5-1,-6-8 0,-10-1-1,-4-6 0,-5 3 0,3-6-1,-6 2 1,-2-5 0,6-2 0,-3 0-1,0 2 0,0 1 1,0 1-1,-3 6 1,1 2-3,-5 3 2,-2 2 1,-5 0 0,3 7 0,-1 0 0,7 2 1,4 2-2,-4-5 1,3 5 0,-1 0 1,-8 0-4,8 5 5,0 10-2,0 2-2,8 0 1,-1-3 0,-1 7 1,-1 4-1,8 7-1,-1-2 0,6-1 1,-2 4-1,-2 0 0,11 1 1,1 2 0,4 3-1,0-4 0,0 1 1,12-1 0,9 1-2,-7-3 3,6-3-1,2-1 0,5-4 0,0-3-1,-2 0 1,7-10-3,0 4 3,0-7 2,4-2-1,2-3 0,-1-4-1,0 0 2,-7 0 2,1 0-3,-1 0 0,-5 0 0,0 0 0,2 0 1,-3-2-1,3-3 1,-2 1-1,-5-3 0,-5-2 0,-3 5 1,-7 2 1,-5 2 4,0 0-2,0 0-1,0 0 1,0 0-3,0 0 1,0 0 1,0 0 3,0 0 0,0 0 3,0 0 1,0 0-8,0 0-3,0 0-1,-23 0 1,-1 0 2,-3 0-1,0 0-3,3 0 3,-5 0-1,5 0 0,-3 0 0,-12 13 0,2 5 1,-3 9-2,-2 1 2,5 1-2,-2 3 0,10-2 1,4-1-1,-2 1 0,7-1 0,2 7-1,-1-1 2,-1 3 2,-2-3-1,4-2-1,10 0-1,2-7 2,0-1-2,0 5 0,3-5 1,3 2-2,0 0 1,0-8-2,0 1 1,12 0 0,5 0 2,11-2-3,-1-3 3,0-2 0,-3-1 0,11-2 3,-5-5-3,4-3 0,3-2 3,-5 0 2,3 0-2,2-2 1,0-13-1,3-1 1,-6 3-1,9-3 0,-10-4 0,4-6 1,-2 1 0,-5-1-1,-3 0 1,-4 1 0,1 2-1,-2-3 1,-2 2 0,-8 4 1,3 0-2,-8 7 2,1 2 0,-4-2 0,4-2 0,-1-8 0,2-1-1,0 1 3,-7 6 1,-2 10-5,0 7 0,-2 0 0,-7 0 1,8 0 0,1-2-1,0-7 0,0 1 1,0 6 1,0 2-1,-3 0 1,-2 0-3,5 0 0,0 0-1,0 0 0,0 0-1,0 0-3,0 0-1,-3 0-4,-3 0-17,0 0-29,6 0-99,0 0-91</inkml:trace>
-  <inkml:trace contextRef="#ctx0" brushRef="#br0" timeOffset="1">797 1511 75,'0'2'45,"0"0"-25,0-2 29,0 0-11,0 0-11,0 0-3,0 0 6,0 0-4,0 0-3,0 0 4,0 0-1,-3 0-4,3 0-1,0 0-4,0 0-1,0 0-6,-5 0-5,1 0-3,-5 0 0,2 0 2,-5-6 0,0-4 3,1-4-2,-3-2-4,0-2 3,-2-5 1,2-1-1,1 0 2,1-2-2,2-5 0,1 0 0,1-4 0,5-3 0,2-2-1,1-2-3,0 2 4,0-5 1,0 4-4,6 4 0,6 3 0,1 6 2,-1 5-3,3-1 1,-1 3-2,2-2-2,-2 3 3,4 5-1,2 0 1,7-1-1,3 3 1,-2-1-2,8 4-1,-1 0 3,-1 4-1,0 4 1,-2 2-1,3 0-1,-3 0 1,0 0 0,0 0 0,-2 2 0,2 6 1,1 4-3,-7 2 2,-1-4-1,0 2 1,-3 5-1,-6-2 0,0 3 2,6 0 0,-5 0-1,-1 3 0,-2-1 0,-4 0 0,-3 2 0,2-1 2,-1 1-2,0 2 3,-4 0-4,2 0 1,-3 0 2,-2 3-1,-1-3-5,0 3 6,0-1-3,0 3 4,0 0-1,0 2 1,0 2-2,-4-2 0,-6 2-2,0-6 2,3-3 0,-1-3-1,1 0 0,-5-3 2,0-3 0,-4 1 1,2-5-1,-4 0 1,6-1 0,0 0-1,-6-4-1,1 1 0,-7-3-3,4-2 3,-6 0 0,4-2 0,-2 0 0,3 0 0,5 0 0,-2 0 0,1 3 0,2-3-1,-5 0 0,8 0 1,-2 0 0,2 0 0,-1 0 1,1 0-1,-4 0 1,4 0-1,4 0 0,0 0 0,-2 0 0,0 0 0,2 0 0,-2 0 0,2 0 0,-1 0 0,2 0 1,-1 0 0,4 0-1,-4 0 0,-5 0 0,4 0 0,-2-3 0,4-1 0,0 2 0,2 0-1,-3 0 0,5 2 1,-1-3 0,2 1-1,-1 0 1,0 0-1,3 2-6,-2-2-18,2 2-36,0 0-79,0-3-46</inkml:trace>
+  <inkml:trace contextRef="#ctx0" brushRef="#br0">846 1596 6,'0'-2'31,"0"2"1,0 0-12,0 0-2,0 0-1,0 0-5,0 0 2,0 0 6,0 0-2,0 0-4,0 0-4,0 0 2,0 0-1,0 0 1,0 0-3,0 0 3,0 0 0,0 0-7,0 0-3,-4 0 1,-4 0 2,3 0 1,-5 4-3,0 3-1,-2 0 1,0 6-1,0 2-1,1 2 2,0 3 0,4-2 4,-1 0-6,-1 0 1,1 3 3,-2-2-3,2 1 1,2 4-1,-2 0-1,0-1 2,4 1-2,2 2-1,-1-1 2,3-1-2,0-2 2,0 5 2,0-5-3,0 2 2,9 3 1,1-5-2,6-2-1,-4 4 0,2-4 1,1-2-1,1-1-1,7-4-1,-4 2 2,4-3-1,1-5 1,1 1-1,0-3 2,-3-3-1,5 0 2,-3-2-3,2 0 0,-7 0 2,6 0 1,0 0-2,-1 0 3,4-5-3,-4-7 1,-1-4 2,-2-4 0,1 1-3,1-1 3,-3-5-3,-3 1 1,-5 2-1,2 0 4,0-3 1,-3 5-2,-4 1 3,-2 3-2,-2-4 3,-3 2 0,2-1-4,-2-2-2,0 0 0,0-2 9,0 6-9,0 2 2,0-1-2,-12-3-1,0-1 1,-4 2-2,7 2 1,2 0-1,0 3 0,-1-3 0,1 5 1,0 2-1,1-2 1,-1 10-1,0-7-1,-1 1 2,4-2 1,-7 3-1,7 2 0,-1-1-1,2 1 1,-1 0 0,1 1 0,0 3 0,1 0 0,2 0 0,-2 0-1,2 0 0,0 0 0,0 0 0,0 0 1,0-2 0,0 2-1,0 0 0,0 0 0,0 0-1,0 0 1,0 0-1,0 0-1,0 0 0,0 0 0,0 0 0,0 0-2,0 0 0,0 0-2,0 0 0,0 0-4,0 0 1,0 0 3,0 0 6,0 0 1,2 9-1,10 6 0,3 2 0,2-4 0,-2 6 0,0 0 0,2 1-1,-2-3 2,7 1-1,-3 2 0,3 2-1,-4-3 1,6-1-1,-4-4 0,2 1 0,-4 3 0,2-7-4,-1-1-1,1-2 4,-2-4 0,-2 0 0,6 1-3,-4-2 2,2-3 2,-3 0-2,0 0 2,0 0 2,6-3-1,-4-6 2,1 0-4,0-4 4,0-3-2,2-2 0,-3 1 0,-2-1 0,3-2 0,-1-2 0,1 2 0,-3 3 0,3-3 1,-2-2-1,-1-1 0,-3-2 0,2-1 0,-2 1 0,-2 4 1,-2 2 2,-2-2 2,-4 3 0,-1-4-2,0-1-2,-1-6 0,-2 3-1,0 4 2,0-4-2,0 4 3,0 5 1,0 1-1,0 0 3,-5 1-1,-4-1 0,-4 3-3,0 0 3,1 2 0,-2 2-3,-1 0-3,-3 4 0,-2-1 0,0 1 1,1 1 0,-2 2 0,-5 0 0,1 2-2,0 0 3,3 0-2,-2 0 0,3 0 3,4 0-5,-1 0 1,1 0 2,5 6-3,-1 1 1,1 1 1,-5 4-1,1 0 0,2-4 1,4 0 2,2-3-1,1 0 0,5-2 2,-1-3-4,3 0 1,0 0-2,0 0-2,0 0 0,0 0-2,0 0-4,0 0 2,0 0 1,0 0-2,0 0 7,0 0 4,12-8 1,4 2-1,0-4-1,5 0 0,-4-1 1,3-5-1,2 1 1,0-1-2,1-4 2,-1 0 1,0-2-2,0-4 0,-1-1 1,2-5 1,-1 6-1,-2-2 1,2-3-1,0 0 0,2 0 2,-9 0-1,0 1-1,0-1 0,-1 2 4,-4 0-1,-4 13 1,0-1-4,-2-1 2,-2 2 2,0-6-2,-2 3-1,0-6 0,0 1 2,0 0-1,0 0-2,0 3 2,-10-7-2,-2 7 1,2 1 0,-2 0 3,-3 5-4,0 4 1,-2-5-3,-5 2 3,4-1-2,-2 2 3,-2 4-2,3 5-2,0-2 1,-2-2 1,5 3 2,-3 0-3,-1 1 0,2 1-3,2 3 2,0 0 1,2 0-1,-6 0-1,2 0 0,1 13 3,1 5-6,0-3 7,2 6-2,0-2 0,-2 1 0,4-2 0,-1 8-2,-3-4 2,7-1 0,-4 3-1,1-7 1,3 3 0,1 1-1,1 0 1,-1 3-1,4-7 0,-2-2-1,1 3 1,4 0-3,-5 1 3,6 1 0,0-6-2,0 6 0,0-7 1,0-2 0,0-3-1,0 0 1,0-5 0,0-1 1,0-2-1,0 0 1,0 0-2,0 0 2,0 0 1,0 0-1,0 0 1,0 0 1,0 0-1,0 0 0,0 0-1,0 0 0,0 0 0,0 0 0,0 0-4,0 0 4,0 0 6,0 0-3,0-4 0,6-11-1,0-7 2,4-5-3,-2-4 1,-1 0-1,1-6 0,1-3 1,3-7 1,-3 1-2,-5 1 1,-1 1 1,-3 7 1,0-3-1,0 7-1,0-2 1,-7-4 2,-6 5-3,-7-6 1,-2 9 0,-6 4-1,0 5 1,-1 7 0,1 1-2,-2 2 0,6-2-1,-1-4-2,-2 9 3,-3 5-1,9 2 1,-4 2 0,0 0-1,-2 0 1,5 0-2,2 0 2,-2 4-2,-3 10-1,3 3 3,-6 1-1,2 7-1,6 1 0,-1 4 1,5-1 0,4 0-1,-2-3 1,5-2 1,4 8 0,-3-4-1,6 1 1,0 2-1,2-2-1,0-2 1,0-1 0,0 2 1,12 2-2,1 1 4,2-3-4,0 1 2,-3-4 0,1 2 0,4-3 0,-8-1 0,8-2 0,-5-3 0,-2-5-1,0-4 0,-4-3 0,-2-1 0,-2-3 1,2 3 1,-4-5 0,0 0-1,0 0 1,2 0 2,-2 0-1,0 0 0,0 0 3,0 0-1,0 0 2,0 0 0,0 0-1,0 0-2,0 0 1,0 0 0,0 0 3,0 0-1,0 0 2,0 0 0,0 0-4,0 0-2,0-5-1,-6-8 0,-10-1-1,-4-6 0,-5 3 0,3-6-1,-6 2 1,-2-5 0,6-2 0,-3 0-1,1 1 0,-1 2 1,0 1-1,-3 6 1,1 2-3,-5 3 2,-2 2 1,-5 0 0,3 7 0,-1 0 0,7 2 1,4 2-2,-4-5 1,3 5 0,-1 0 1,-8 0-4,9 5 5,-1 10-2,0 2-2,8 0 1,-1-3 0,-1 7 1,-1 4-1,8 7-1,-1-1 0,6-2 1,-2 4-1,-2 0 0,11 1 1,1 2 0,4 3-1,0-4 0,0 1 1,12-1 0,9 1-2,-7-3 3,6-3-1,2-1 0,5-4 0,0-3-1,-2 0 1,7-10-3,0 4 3,-1-7 2,5-2-1,2-3 0,-1-4-1,0 0 2,-7 0 2,1 0-3,-1 0 0,-5 0 0,0 0 0,2 0 1,-3-2-1,3-3 1,-2 1-1,-5-3 0,-5-2 0,-3 5 1,-7 2 1,-5 2 4,0 0-2,0 0-1,0 0 1,0 0-3,0 0 1,0 0 1,0 0 3,0 0 0,0 0 3,0 0 1,0 0-8,0 0-3,0 0-1,-23 0 1,-1 0 2,-3 0-1,0 0-3,3 0 3,-5 0-1,5 0 0,-3 0 0,-12 13 0,2 5 1,-3 9-2,-2 1 2,5 1-2,-2 3 0,11-2 1,3-1-1,-2 1 0,7-1 0,2 7-1,-1-1 2,-1 3 2,-2-3-1,4-2-1,10 0-1,2-7 2,0-1-2,0 5 0,3-5 1,3 3-2,0-1 1,0-8-2,0 1 1,12 0 0,5 0 2,11-2-3,-1-3 3,0-2 0,-3-1 0,11-2 3,-5-5-3,3-3 0,4-2 3,-5 0 2,3 0-2,2-2 1,0-13-1,3-1 1,-6 3-1,9-3 0,-10-4 0,4-6 1,-2 1 0,-5-1-1,-3 0 1,-4 0 0,0 3-1,-1-3 1,-2 2 0,-8 4 1,3 0-2,-8 7 2,1 2 0,-4-2 0,4-2 0,-1-8 0,2-1-1,0 1 3,-7 6 1,-2 10-5,0 7 0,-2 0 0,-7 0 1,8 0 0,1-2-1,0-7 0,0 1 1,0 6 1,0 2-1,-3 0 1,-2 0-3,5 0 0,0 0-1,0 0 0,0 0-1,0 0-3,0 0-1,-3 0-4,-3 0-17,0 0-29,6 0-99,0 0-91</inkml:trace>
+  <inkml:trace contextRef="#ctx0" brushRef="#br0" timeOffset="1">795 1512 75,'0'2'45,"0"0"-25,0-2 29,0 0-11,0 0-11,0 0-3,0 0 6,0 0-4,0 0-3,0 0 4,0 0-1,-3 0-4,3 0-1,0 0-4,0 0-1,0 0-6,-5 0-5,1 0-3,-5 0 0,3 0 2,-6-6 0,0-4 3,1-4-2,-3-2-4,0-2 3,-2-5 1,2-1-1,1 0 2,1-2-2,2-5 0,1 0 0,1-4 0,5-3 0,2-2-1,1-2-3,0 2 4,0-5 1,0 4-4,6 4 0,6 3 0,1 6 2,-1 5-3,3-1 1,-1 3-2,2-2-2,-2 3 3,4 5-1,2 0 1,6-1-1,4 3 1,-2-1-2,8 4-1,-1 0 3,-1 4-1,0 4 1,-2 2-1,3 0-1,-3 0 1,0 0 0,0 0 0,-2 2 0,2 6 1,1 4-3,-7 2 2,-2-4-1,1 2 1,-3 5-1,-6-2 0,0 3 2,6 0 0,-5 0-1,-1 3 0,-2-1 0,-4 0 0,-3 2 0,2-1 2,-1 1-2,0 2 3,-4 0-4,2 0 1,-3 0 2,-2 3-1,-1-3-5,0 3 6,0-1-3,0 3 4,0 0-1,0 2 1,0 2-2,-4-2 0,-6 2-2,0-6 2,3-3 0,-1-3-1,1 0 0,-5-3 2,0-3 0,-4 1 1,2-5-1,-4 0 1,6-1 0,0 0-1,-6-4-1,1 1 0,-7-3-3,5-2 3,-7 0 0,4-2 0,-2 0 0,3 0 0,5 0 0,-2 0 0,1 3 0,2-3-1,-5 0 0,8 0 1,-2 0 0,2 0 0,-1 0 1,1 0-1,-4 0 1,4 0-1,4 0 0,0 0 0,-2 0 0,0 0 0,2 0 0,-2 0 0,2 0 0,-1 0 0,2 0 1,-1 0 0,4 0-1,-4 0 0,-5 0 0,4 0 0,-2-3 0,4-1 0,0 2 0,2 0-1,-3 0 0,5 2 1,-1-3 0,2 1-1,-1 0 1,0 0-1,3 2-6,-2-2-18,2 2-36,0 0-79,0-3-46</inkml:trace>
 </inkml:ink>
 </file>
 
@@ -469,8 +477,8 @@
       <inkml:brushProperty name="fitToCurve" value="1"/>
     </inkml:brush>
   </inkml:definitions>
-  <inkml:trace contextRef="#ctx0" brushRef="#br0">1036 2153 6,'0'-3'31,"0"3"1,0 0-12,0 0-2,0 0-1,0 0-5,0 0 2,0 0 6,0 0-2,0 0-4,0 0-4,0 0 2,0 0-1,0 0 1,0 0-3,0 0 3,0 0 0,0 0-7,0 0-3,-6 0 1,-3 0 2,2 0 1,-5 6-3,0 4-1,-3-1 1,1 8-1,-1 4-1,0 2 2,2 4 0,4-3 4,-1-1-6,0 2 1,0 2 3,-2 0-3,2-1 1,2 7-1,-1 0-1,-1-3 2,5 2-2,2 4-1,-1-3 2,4 0-2,0-3 2,0 6 2,0-6-3,0 2 2,12 5 1,0-8-2,8-2-1,-5 6 0,2-7 1,0-1-1,3-2-1,10-6-1,-7 4 2,5-5-1,2-7 1,-1 2-1,3-5 2,-5-3-1,5 0 2,-2-3-3,1 0 0,-8 0 2,8 0 1,-1 0-2,0 0 3,3-7-3,-3-9 1,-2-5 2,-2-6 0,1 0-3,1 1 3,-4-7-3,-3 0 1,-5 3-1,1 1 4,0-5 1,-4 7-2,-4 1 3,-3 4-2,-2-4 3,-4 2 0,2-3-4,-2 0-2,0-2 0,0-2 9,0 8-9,0 2 2,0 1-2,-15-7-1,0 0 1,-3 3-2,6 3 1,4-1-1,-2 5 0,0-5 0,2 8 1,-1 2-1,2-3 1,-1 13-1,-1-7-1,-1-1 2,5-2 1,-8 3-1,8 3 0,-2 1-1,4-1 1,-2 0 0,1 3 0,1 3 0,0 0 0,3 0 0,-2 0-1,2 0 0,0 0 0,0 0 0,0 0 1,0-3 0,0 3-1,0 0 0,0 0 0,0 0-1,0 0 1,0 0-1,0 0-1,0 0 0,0 0 0,0 0 0,0 0-2,0 0 0,0 0-2,0 0 0,0 0-4,0 0 1,0 0 3,0 0 6,0 0 1,2 12-1,13 8 0,3 4 0,4-7 0,-5 8 0,2-1 0,2 4-1,-2-5 2,7 0-1,-2 5 0,3 1-1,-6-2 1,9-3-1,-5-5 0,1 0 0,-4 6 0,3-11-4,-2 1-1,1-5 4,-2-5 0,-2 1 0,7 0-3,-5-2 2,2-4 2,-3 0-2,0 0 2,-1 0 2,9-4-1,-7-8 2,3 1-4,0-8 4,-2-1-2,5-5 0,-3 2 0,-6-2 0,6-1 0,-1-4 0,1 3 0,-5 4 0,4-4 1,-2-3-1,-2 1 0,-2-5 0,1-2 0,-1 3 0,-3 5 1,-4 2 2,-1-3 2,-5 6 0,-1-7-2,-1-1-2,0-8 0,-3 4-1,0 4 2,0-3-2,0 4 3,0 6 1,0 3-1,0 0 3,-6 1-1,-6-2 0,-2 4-3,-3 0 3,2 4 0,-2 2-3,-1 0-3,-3 5 0,-4-1 0,0 2 1,3 0 0,-5 3 0,-5 0 0,3 3-2,-4 0 3,6 0-2,-1 0 0,1 0 3,6 0-5,0 0 1,0 0 2,6 9-3,-1 0 1,2 2 1,-7 5-1,2 0 0,1-6 1,6 2 2,3-6-1,1 1 0,5-3 2,-1-4-4,4 0 1,0 0-2,0 0-2,0 0 0,0 0-2,0 0-4,0 0 2,0 0 1,0 0-2,0 0 7,0 0 4,15-11 1,4 3-1,1-5-1,5-1 0,-4-1 1,3-6-1,4 0 1,-2 0-2,2-6 2,-1 0 1,-1-3-2,2-5 0,-1-1 1,0-7 1,0 8-1,-2-3 1,1-4-1,2 0 0,2 0 2,-13 1-1,2 0-1,-1 0 0,-1 0 4,-4 2-1,-7 18 1,2-2-4,-4-1 2,-1 2 2,-1-7-2,-2 3-1,0-8 0,0 1 2,0 1-1,0 2-2,0 0 2,-12-7-2,-2 9 1,2 1 0,-3 0 3,-3 7-4,-1 5 1,-1-7-3,-7 4 3,5-3-2,-2 4 3,-3 5-2,3 6-2,1-3 1,-2 0 1,3 1 2,-1 2-3,-1 0 0,2 2-3,2 4 2,1 0 1,2 0-1,-8 0-1,3 0 0,2 18 3,1 6-6,-1-3 7,2 6-2,2-1 0,-4 2 0,5-5 0,0 12-2,-5-4 2,9-4 0,-4 5-1,0-8 1,3 3 0,2 0-1,2 2 1,-2 2-1,6-7 0,-3-4-1,1 4 1,4 0-3,-5 2 3,7 1 0,0-8-2,0 8 0,0-10 1,0-2 0,0-3-1,0-1 1,0-8 0,0 0 1,0-3-1,0 0 1,0 0-2,0 0 2,0 0 1,0 0-1,0 0 1,0 0 1,0 0-1,0 0 0,0 0-1,0 0 0,0 0 0,0 0 0,0 0-4,0 0 4,0 0 6,0 0-3,0-6 0,7-14-1,1-9 2,3-8-3,-1-5 1,-2 0-1,2-7 0,2-5 1,3-9 1,-5 1-2,-5 1 1,-1 2 1,-4 10 1,0-6-1,0 11-1,0-4 1,-9-4 2,-6 5-3,-10-6 1,-3 11 0,-5 5-1,-2 8 1,1 9 0,-1 1-2,-1 2 0,5-1-1,0-7-2,-1 14 3,-5 5-1,11 3 1,-5 3 0,1 0-1,-3 0 1,6 0-2,3 0 2,-3 6-2,-4 12-1,5 5 3,-8 1-1,1 10-1,9 2 0,-1 5 1,5-2 0,6-1-1,-3-2 1,6-4 1,4 10 0,-2-3-1,6-1 1,0 4-1,3-2-1,0-4 1,0-1 0,0 3 1,15 2-2,1 2 4,3-4-4,-2 0 2,-2-4 0,2 2 0,3-4 0,-8 0 0,8-3 0,-5-6 0,-3-5-1,0-6 0,-5-4 0,-1-1 0,-4-4 1,3 3 1,-5-6 0,0 0-1,0 0 1,1 0 2,-1 0-1,0 0 0,0 0 3,0 0-1,0 0 2,0 0 0,0 0-1,0 0-2,0 0 1,0 0 0,0 0 3,0 0-1,0 0 2,0 0 0,0 0-4,0 0-2,0-6-1,-6-12 0,-14-1-1,-5-8 0,-4 4 0,2-7-1,-8 0 1,-1-5 0,6-2 0,-2-1-1,-2 3 0,1 2 1,0 0-1,-3 9 1,0 2-3,-6 5 2,-1 2 1,-8 0 0,5 10 0,-1-1 0,8 3 1,5 3-2,-5-7 1,4 7 0,-2 0 1,-9 0-4,8 7 5,2 13-2,-1 4-2,10-2 1,0-2 0,-3 7 1,-1 7-1,11 9-1,-2-2 0,7-2 1,-3 6-1,0-1 0,12 2 1,1 2 0,5 5-1,0-5 0,0 0 1,15 0 0,9 0-2,-6-3 3,6-4-1,3-3 0,6-4 0,1-4-1,-5 0 1,11-14-3,-2 6 3,2-11 2,4-2-1,3-3 0,-3-6-1,1 0 2,-8 0 2,1 0-3,-1 0 0,-7 0 0,0 0 0,4 0 1,-5-2-1,4-5 1,-2 1-1,-7-3 0,-6-3 0,-3 6 1,-9 4 1,-6 2 4,0 0-2,0 0-1,0 0 1,0 0-3,0 0 1,0 0 1,0 0 3,0 0 0,0 0 3,0 0 1,0 0-8,0 0-3,0 0-1,-28 0 1,-1 0 2,-4 0-1,-1 0-3,5 0 3,-6 0-1,6 0 0,-4 0 0,-15 18 0,3 6 1,-4 11-2,-3 4 2,8 0-2,-4 4 0,12-2 1,5-2-1,-1 2 0,7-2 0,4 9-1,-2-1 2,-2 4 2,-2-3-1,6-4-1,11 0-1,2-8 2,1-2-2,-1 7 0,4-8 1,4 3-2,0 0 1,0-9-2,0-1 1,16 1 0,5 0 2,12-3-3,0-3 3,0-4 0,-3-1 0,13-1 3,-7-9-3,6-4 0,3-2 3,-7 0 2,5 0-2,2-2 1,1-19-1,2-1 1,-6 5-1,10-4 0,-11-6 0,4-8 1,-2 2 0,-7-3-1,-3 0 1,-5 3 0,2 3-1,-4-5 1,-1 1 0,-10 8 1,3-1-2,-10 9 2,2 3 0,-5-2 0,5-4 0,-2-9 0,4-3-1,-2 2 3,-7 8 1,-3 14-5,0 9 0,-3 0 0,-7 0 1,8 0 0,2-3-1,0-10 0,0 3 1,0 7 1,0 3-1,-3 0 1,-4 0-3,7 0 0,0 0-1,0 0 0,0 0-1,0 0-3,0 0-1,-3 0-4,-5 0-17,1 0-29,7 0-99,0 0-91</inkml:trace>
-  <inkml:trace contextRef="#ctx0" brushRef="#br0" timeOffset="1">973 2040 75,'0'3'45,"0"0"-25,0-3 29,0 0-11,0 0-11,0 0-3,0 0 6,0 0-4,0 0-3,0 0 4,0 0-1,-3 0-4,3 0-1,0 0-4,0 0-1,0 0-6,-7 0-5,2 0-3,-5 0 0,1 0 2,-6-9 0,0-4 3,2-6-2,-4-2-4,0-4 3,-3-6 1,3-1-1,2 0 2,0-4-2,3-5 0,0-1 0,2-6 0,7-3 0,1-3-1,2-3-3,0 4 4,0-8 1,0 5-4,8 6 0,7 5 0,1 6 2,-1 9-3,2-2 1,1 3-2,1-2-2,-1 4 3,3 6-1,4 1 1,8-2-1,3 5 1,-1-2-2,8 5-1,0 2 3,-2 3-1,2 6 1,-5 3-1,5 0-1,-4 0 1,0 0 0,0 0 0,-2 3 0,2 8 1,1 5-3,-8 3 2,-2-5-1,0 1 1,-2 9-1,-8-4 0,-1 5 2,8-2 0,-7 3-1,0 2 0,-4-2 0,-3 1 0,-5 3 0,4-2 2,-2 2-2,0 2 3,-5 0-4,2 1 1,-4 0 2,-1 3-1,-2-4-5,0 4 6,0 0-3,0 3 4,0 0-1,0 3 1,0 3-2,-5-3 0,-7 2-2,-1-8 2,4-3 0,-1-5-1,2 1 0,-6-6 2,-1-2 0,-5 1 1,3-8-1,-5 1 1,8-2 0,-1 1-1,-7-5-1,1-1 0,-8-2-3,4-3 3,-6 0 0,4-3 0,-3 0 0,6 0 0,4 0 0,-2 0 0,1 3 0,3-3-1,-7 0 0,10 0 1,-2 0 0,2 0 0,0 0 1,0 0-1,-4 0 1,4 0-1,5 0 0,1 0 0,-4 0 0,1 0 0,2 0 0,-2 0 0,2 0 0,-1 0 0,2 0 1,0 0 0,4 0-1,-5 0 0,-5 0 0,3 0 0,-1-3 0,4-3 0,2 3 0,0 0-1,-2 0 0,5 3 1,-1-2 0,2-1-1,0 0 1,-1 0-1,4 3-6,-3-3-18,3 3-36,0 0-79,0-3-46</inkml:trace>
+  <inkml:trace contextRef="#ctx0" brushRef="#br0">1034 2153 6,'0'-3'31,"0"3"1,0 0-12,0 0-2,0 0-1,0 0-5,0 0 2,0 0 6,0 0-2,0 0-4,0 0-4,0 0 2,0 0-1,0 0 1,0 0-3,0 0 3,0 0 0,0 0-7,0 0-3,-6 0 1,-3 0 2,2 0 1,-5 6-3,0 4-1,-3-1 1,1 8-1,-1 4-1,0 2 2,2 4 0,4-3 4,-1-1-6,0 2 1,0 2 3,-2 0-3,2-1 1,2 7-1,-1 0-1,-1-3 2,5 2-2,2 4-1,-1-3 2,4 0-2,0-3 2,0 6 2,0-6-3,0 2 2,12 5 1,0-8-2,8-2-1,-5 6 0,2-7 1,0-1-1,3-2-1,10-6-1,-7 4 2,5-5-1,2-7 1,-1 2-1,3-5 2,-5-3-1,5 0 2,-2-3-3,1 0 0,-8 0 2,7 0 1,0 0-2,0 0 3,3-7-3,-3-9 1,-2-5 2,-2-6 0,1 0-3,1 1 3,-4-7-3,-3 0 1,-5 3-1,1 1 4,0-5 1,-4 7-2,-4 1 3,-3 4-2,-2-4 3,-4 2 0,2-3-4,-2 0-2,0-2 0,0-2 9,0 8-9,0 2 2,0 1-2,-15-7-1,0 0 1,-3 3-2,6 3 1,4-1-1,-2 5 0,0-5 0,2 8 1,-1 2-1,2-3 1,-1 13-1,-1-7-1,-1-1 2,5-2 1,-8 3-1,8 3 0,-2 1-1,4-1 1,-2 0 0,1 3 0,1 3 0,0 0 0,3 0 0,-2 0-1,2 0 0,0 0 0,0 0 0,0 0 1,0-3 0,0 3-1,0 0 0,0 0 0,0 0-1,0 0 1,0 0-1,0 0-1,0 0 0,0 0 0,0 0 0,0 0-2,0 0 0,0 0-2,0 0 0,0 0-4,0 0 1,0 0 3,0 0 6,0 0 1,2 12-1,13 8 0,3 4 0,4-7 0,-5 8 0,2-1 0,2 4-1,-2-5 2,7 0-1,-2 5 0,3 1-1,-6-2 1,9-3-1,-5-5 0,1 0 0,-5 6 0,4-11-4,-2 1-1,1-5 4,-2-5 0,-2 1 0,7 0-3,-5-2 2,2-4 2,-3 0-2,0 0 2,-1 0 2,9-4-1,-7-8 2,3 1-4,0-8 4,-2-1-2,5-5 0,-3 2 0,-6-2 0,6-1 0,-2-4 0,2 3 0,-5 4 0,4-4 1,-2-3-1,-2 1 0,-2-5 0,1-2 0,-1 3 0,-3 5 1,-4 2 2,-1-3 2,-5 6 0,-1-7-2,-1-1-2,0-8 0,-3 4-1,0 4 2,0-3-2,0 4 3,0 6 1,0 3-1,0 0 3,-6 1-1,-6-2 0,-2 4-3,-3 0 3,2 4 0,-2 2-3,-1 0-3,-3 5 0,-4-1 0,0 2 1,3 0 0,-5 3 0,-4 0 0,2 3-2,-4 0 3,6 0-2,-1 0 0,1 0 3,6 0-5,0 0 1,0 0 2,6 9-3,-1 0 1,2 2 1,-7 5-1,2 0 0,1-6 1,6 2 2,3-6-1,1 1 0,5-3 2,-1-4-4,4 0 1,0 0-2,0 0-2,0 0 0,0 0-2,0 0-4,0 0 2,0 0 1,0 0-2,0 0 7,0 0 4,15-11 1,4 3-1,1-5-1,5-1 0,-4-1 1,3-6-1,4 0 1,-2 0-2,2-6 2,-1 0 1,-1-3-2,2-5 0,-1-1 1,0-7 1,-1 8-1,-1-3 1,1-4-1,2 0 0,2 0 2,-13 1-1,2 0-1,-1 0 0,-1 0 4,-4 2-1,-7 18 1,2-2-4,-4-1 2,-1 2 2,-1-7-2,-2 3-1,0-8 0,0 1 2,0 1-1,0 2-2,0 0 2,-12-7-2,-2 9 1,2 1 0,-3 0 3,-3 7-4,-1 5 1,-1-7-3,-7 4 3,5-3-2,-2 4 3,-3 5-2,4 6-2,0-3 1,-2 0 1,3 1 2,-1 2-3,-1 0 0,2 2-3,2 4 2,1 0 1,2 0-1,-8 0-1,3 0 0,2 18 3,1 6-6,-1-3 7,2 6-2,2-1 0,-4 2 0,5-5 0,0 12-2,-5-4 2,9-4 0,-4 5-1,0-8 1,3 3 0,2 0-1,2 2 1,-1 2-1,5-7 0,-3-4-1,1 4 1,4 0-3,-5 2 3,7 1 0,0-8-2,0 8 0,0-10 1,0-2 0,0-3-1,0-1 1,0-8 0,0 0 1,0-3-1,0 0 1,0 0-2,0 0 2,0 0 1,0 0-1,0 0 1,0 0 1,0 0-1,0 0 0,0 0-1,0 0 0,0 0 0,0 0 0,0 0-4,0 0 4,0 0 6,0 0-3,0-6 0,7-14-1,1-9 2,3-8-3,-2-5 1,-1 0-1,2-7 0,2-5 1,3-9 1,-5 1-2,-5 1 1,-1 2 1,-4 10 1,0-6-1,0 11-1,0-4 1,-9-4 2,-6 5-3,-10-6 1,-2 11 0,-6 5-1,-2 8 1,1 9 0,-1 1-2,-1 2 0,5-1-1,0-7-2,-1 14 3,-5 5-1,11 3 1,-5 3 0,1 0-1,-3 0 1,6 0-2,3 0 2,-2 6-2,-5 12-1,5 5 3,-8 1-1,1 10-1,9 2 0,-1 5 1,5-2 0,6-1-1,-3-2 1,6-4 1,4 10 0,-2-3-1,6-1 1,0 4-1,3-2-1,0-4 1,0-1 0,0 3 1,15 2-2,1 2 4,3-4-4,-2 0 2,-2-4 0,2 2 0,3-4 0,-8 0 0,8-3 0,-5-6 0,-3-5-1,0-6 0,-5-4 0,-1-1 0,-4-4 1,3 3 1,-5-6 0,0 0-1,0 0 1,1 0 2,-1 0-1,0 0 0,0 0 3,0 0-1,0 0 2,0 0 0,0 0-1,0 0-2,0 0 1,0 0 0,0 0 3,0 0-1,0 0 2,0 0 0,0 0-4,0 0-2,0-6-1,-6-12 0,-14-1-1,-5-8 0,-4 4 0,2-7-1,-8 0 1,-1-5 0,6-2 0,-2-1-1,-2 3 0,1 2 1,0 0-1,-3 9 1,0 2-3,-5 5 2,-2 2 1,-8 0 0,5 10 0,-1-1 0,8 3 1,5 3-2,-5-7 1,4 7 0,-2 0 1,-9 0-4,8 7 5,2 13-2,0 4-2,9-2 1,0-2 0,-3 7 1,-1 7-1,11 9-1,-2-2 0,7-2 1,-3 6-1,0-1 0,12 2 1,1 2 0,5 5-1,0-5 0,0 0 1,15 0 0,9 0-2,-6-3 3,6-4-1,3-3 0,6-4 0,1-4-1,-5 0 1,11-14-3,-3 6 3,3-11 2,4-2-1,3-3 0,-3-6-1,1 0 2,-8 0 2,1 0-3,-1 0 0,-7 0 0,0 0 0,4 0 1,-5-2-1,3-5 1,-1 1-1,-7-3 0,-6-3 0,-3 6 1,-9 4 1,-6 2 4,0 0-2,0 0-1,0 0 1,0 0-3,0 0 1,0 0 1,0 0 3,0 0 0,0 0 3,0 0 1,0 0-8,0 0-3,0 0-1,-28 0 1,-1 0 2,-4 0-1,0 0-3,4 0 3,-6 0-1,6 0 0,-4 0 0,-15 18 0,3 6 1,-4 11-2,-3 4 2,8 0-2,-4 4 0,12-2 1,5-2-1,0 2 0,6-2 0,4 9-1,-2-1 2,-2 4 2,-2-3-1,6-4-1,11 0-1,2-8 2,1-2-2,-1 7 0,4-8 1,4 3-2,0 0 1,0-9-2,0-1 1,16 1 0,5 0 2,12-3-3,0-3 3,0-4 0,-3-1 0,12-1 3,-6-9-3,6-4 0,3-2 3,-7 0 2,5 0-2,2-2 1,1-19-1,2-1 1,-6 5-1,10-4 0,-11-6 0,3-8 1,-1 2 0,-7-3-1,-3 0 1,-5 3 0,2 3-1,-4-5 1,-1 1 0,-10 8 1,3-1-2,-10 9 2,2 3 0,-5-2 0,5-4 0,-2-9 0,4-3-1,-2 2 3,-7 8 1,-3 14-5,0 9 0,-3 0 0,-7 0 1,8 0 0,2-3-1,0-10 0,0 3 1,0 7 1,0 3-1,-3 0 1,-4 0-3,7 0 0,0 0-1,0 0 0,0 0-1,0 0-3,0 0-1,-3 0-4,-5 0-17,1 0-29,7 0-99,0 0-91</inkml:trace>
+  <inkml:trace contextRef="#ctx0" brushRef="#br0" timeOffset="1">971 2040 75,'0'3'45,"0"0"-25,0-3 29,0 0-11,0 0-11,0 0-3,0 0 6,0 0-4,0 0-3,0 0 4,0 0-1,-3 0-4,3 0-1,0 0-4,0 0-1,0 0-6,-7 0-5,2 0-3,-5 0 0,1 0 2,-6-9 0,0-4 3,2-6-2,-4-2-4,0-4 3,-3-6 1,3-1-1,2 0 2,0-4-2,3-5 0,0-1 0,2-6 0,8-3 0,0-3-1,2-3-3,0 4 4,0-8 1,0 5-4,7 6 0,8 5 0,1 6 2,-1 9-3,2-2 1,1 3-2,1-2-2,-1 4 3,3 6-1,4 1 1,8-2-1,3 5 1,-1-2-2,8 5-1,0 2 3,-2 3-1,2 6 1,-5 3-1,4 0-1,-3 0 1,0 0 0,0 0 0,-2 3 0,2 8 1,1 5-3,-8 3 2,-2-5-1,0 1 1,-2 9-1,-8-4 0,-1 5 2,8-2 0,-7 3-1,0 2 0,-4-2 0,-4 1 0,-4 3 0,4-2 2,-2 2-2,0 2 3,-5 0-4,2 1 1,-4 0 2,-1 3-1,-2-4-5,0 4 6,0 0-3,0 3 4,0 0-1,0 3 1,0 3-2,-5-3 0,-7 2-2,-1-8 2,4-3 0,-1-5-1,2 1 0,-5-6 2,-2-2 0,-5 1 1,3-8-1,-5 1 1,8-2 0,-1 1-1,-7-5-1,1-1 0,-8-2-3,4-3 3,-6 0 0,4-3 0,-3 0 0,6 0 0,4 0 0,-2 0 0,1 3 0,3-3-1,-7 0 0,10 0 1,-2 0 0,2 0 0,0 0 1,0 0-1,-3 0 1,3 0-1,5 0 0,1 0 0,-4 0 0,1 0 0,2 0 0,-2 0 0,2 0 0,-1 0 0,2 0 1,0 0 0,4 0-1,-5 0 0,-5 0 0,3 0 0,-1-3 0,4-3 0,2 3 0,0 0-1,-2 0 0,5 3 1,-1-2 0,2-1-1,0 0 1,-1 0-1,4 3-6,-3-3-18,3 3-36,0 0-79,0-3-46</inkml:trace>
 </inkml:ink>
 </file>
 
@@ -529,8 +537,8 @@
       <inkml:brushProperty name="fitToCurve" value="1"/>
     </inkml:brush>
   </inkml:definitions>
-  <inkml:trace contextRef="#ctx0" brushRef="#br0">999 2053 6,'0'-3'31,"0"3"1,0 0-12,0 0-2,0 0-1,0 0-5,0 0 2,0 0 6,0 0-2,0 0-4,0 0-4,0 0 2,0 0-1,0 0 1,0 0-3,0 0 3,0 0 0,0 0-7,0 0-3,-6 0 1,-2 0 2,1 0 1,-5 5-3,1 5-1,-3-2 1,-1 9-1,1 2-1,0 4 2,2 2 0,3-2 4,-1 0-6,0 0 1,0 3 3,-1-1-3,1 0 1,3 7-1,-2-1-1,0-2 2,4 1-2,2 5-1,-1-3 2,4-2-2,0-1 2,0 6 2,0-7-3,0 2 2,12 6 1,-1-8-2,8-3-1,-4 7 0,1-7 1,1-2-1,2-1-1,9-6-1,-5 5 2,4-6-1,2-7 1,-1 3-1,3-5 2,-6-3-1,7-1 2,-4-2-3,3 0 0,-9 0 2,7 0 1,1 0-2,-2 0 3,5-6-3,-5-10 1,-1-4 2,-1-6 0,-1 1-3,2 0 3,-3-7-3,-4 1 1,-5 3-1,1 0 4,1-5 1,-4 8-2,-5 0 3,-2 4-2,-2-4 3,-4 2 0,2-2-4,-2-1-2,0-2 0,0-1 9,0 6-9,0 4 2,0-1-2,-15-5-1,1-1 1,-4 3-2,7 3 1,3-1-1,-2 5 0,1-5 0,1 7 1,0 3-1,1-3 1,-1 12-1,-1-7-1,-1 0 2,6-2 1,-9 2-1,9 4 0,-3-1-1,4 0 1,-2 1 0,1 2 0,2 3 0,-1 0 0,3 0 0,-2 0-1,2 0 0,0 0 0,0 0 0,0 0 1,0-3 0,0 3-1,0 0 0,0 0 0,0 0-1,0 0 1,0 0-1,0 0-1,0 0 0,0 0 0,0 0 0,0 0-2,0 0 0,0 0-2,0 0 0,0 0-4,0 0 1,0 0 3,0 0 6,0 0 1,2 11-1,12 9 0,3 2 0,4-5 0,-4 6 0,1 1 0,2 2-1,-2-4 2,8 1-1,-3 3 0,3 2-1,-5-3 1,7-2-1,-4-5 0,2 0 0,-5 6 0,2-10-4,-1 0-1,2-5 4,-3-3 0,-2-1 0,8 1-3,-6-3 2,2-3 2,-3 0-2,1 0 2,-2 0 2,8-3-1,-5-8 2,2-1-4,0-5 4,-1-3-2,3-3 0,-2 0 0,-5 0 0,5-2 0,-1-4 0,1 4 0,-4 3 0,2-4 1,-1-2-1,-1 0 0,-2-5 0,0-1 0,-1 3 0,-3 4 1,-3 2 2,-1-2 2,-5 4 0,-1-5-2,-2-2-2,1-7 0,-3 4-1,0 4 2,0-4-2,0 4 3,0 7 1,0 1-1,0 2 3,-5-1-1,-7 0 0,-2 2-3,-2 1 3,1 3 0,-1 3-3,-1 0-3,-4 4 0,-3-1 0,0 2 1,3 1 0,-5 2 0,-5 0 0,3 3-2,-4 0 3,7 0-2,-3 0 0,2 0 3,6 0-5,-1 0 1,1 0 2,6 9-3,-1-1 1,1 3 1,-6 4-1,2 0 0,0-5 1,7 1 2,1-5-1,3 1 0,4-4 2,-1-3-4,4 0 1,0 0-2,0 0-2,0 0 0,0 0-2,0 0-4,0 0 2,0 0 1,0 0-2,0 0 7,0 0 4,14-10 1,6 3-1,-1-6-1,4-1 0,-2 0 1,2-6-1,4 0 1,-1 1-2,0-7 2,0 0 1,0-2-2,0-6 0,0 0 1,1-7 1,-2 7-1,-1-2 1,2-4-1,1 0 0,1 0 2,-11 0-1,1 1-1,-1 0 0,0 1 4,-5 1-1,-5 16 1,0 0-4,-3-3 2,-1 4 2,-1-8-2,-2 3-1,0-7 0,0 0 2,0 2-1,0 1-2,0 1 2,-12-8-2,-2 9 1,3 1 0,-4 1 3,-2 6-4,-1 5 1,-2-7-3,-5 3 3,4-1-2,-3 2 3,-2 6-2,3 5-2,0-2 1,0-1 1,2 1 2,-1 3-3,-2-1 0,3 2-3,2 4 2,0 0 1,3 0-1,-8 0-1,3 0 0,1 17 3,2 6-6,-1-3 7,2 6-2,0-1 0,-2 1 0,5-3 0,0 10-2,-5-4 2,7-3 0,-2 5-1,0-9 1,2 4 0,3 0-1,1 1 1,-1 3-1,4-7 0,-2-4-1,2 4 1,3 0-3,-5 2 3,7 0 0,0-6-2,0 6 0,0-8 1,0-3 0,0-3-1,0-1 1,0-6 0,0-1 1,0-3-1,0 0 1,0 0-2,0 0 2,0 0 1,0 0-1,0 0 1,0 0 1,0 0-1,0 0 0,0 0-1,0 0 0,0 0 0,0 0 0,0 0-4,0 0 4,0 0 6,0 0-3,0-6 0,7-13-1,0-9 2,5-7-3,-3-5 1,-1 0-1,1-8 0,3-3 1,2-8 1,-4-1-2,-6 2 1,0 2 1,-4 9 1,0-5-1,0 10-1,0-4 1,-8-3 2,-7 4-3,-8-6 1,-4 10 0,-6 7-1,0 6 1,0 8 0,0 3-2,-3 1 0,7-2-1,-1-5-2,-1 12 3,-4 5-1,9 3 1,-4 3 0,2 0-1,-5 0 1,8 0-2,1 0 2,-2 6-2,-3 12-1,3 3 3,-6 2-1,0 10-1,8 1 0,1 5 1,4-2 0,4-1-1,-1-1 1,6-4 1,3 9 0,-2-3-1,6-1 1,1 4-1,2-2-1,0-4 1,0 0 0,0 2 1,14 2-2,1 2 4,3-3-4,-1-1 2,-2-4 0,1 2 0,3-3 0,-8 0 0,9-4 0,-5-5 0,-4-5-1,0-5 0,-4-5 0,-1 0 0,-4-4 1,2 2 1,-4-5 0,0 0-1,0 0 1,2 0 2,-2 0-1,0 0 0,0 0 3,0 0-1,0 0 2,0 0 0,0 0-1,0 0-2,0 0 1,0 0 0,0 0 3,0 0-1,0 0 2,0 0 0,0 0-4,0 0-2,0-5-1,-6-12 0,-13-2-1,-5-6 0,-5 3 0,4-7-1,-9 1 1,-1-6 0,6-1 0,-2-1-1,-1 2 0,0 2 1,0 2-1,-2 6 1,-2 4-3,-4 3 2,-2 3 1,-6 0 0,3 8 0,-1 1 0,9 2 1,4 3-2,-4-6 1,3 6 0,-2 0 1,-8 0-4,7 6 5,2 14-2,0 2-2,9-1 1,0-2 0,-3 7 1,-1 7-1,10 8-1,0-2 0,5-2 1,-2 6-1,-1-1 0,12 2 1,2 1 0,4 6-1,0-6 0,0 1 1,14 0 0,10-1-2,-7-2 3,6-4-1,3-2 0,6-5 0,0-3-1,-3-1 1,9-12-3,-1 5 3,1-10 2,5-3-1,2-2 0,-3-6-1,2 0 2,-9 0 2,3 0-3,-3 0 0,-7 0 0,2 0 0,2 0 1,-3-2-1,2-5 1,-1 2-1,-6-5 0,-7-1 0,-3 6 1,-8 3 1,-6 2 4,0 0-2,0 0-1,0 0 1,0 0-3,0 0 1,0 0 1,0 0 3,0 0 0,0 0 3,0 0 1,0 0-8,0 0-3,0 0-1,-27 0 1,-2 0 2,-2 0-1,-1 0-3,3 0 3,-4 0-1,4 0 0,-2 0 0,-16 17 0,4 6 1,-4 10-2,-3 5 2,7-2-2,-3 5 0,11-2 1,6-2-1,-3 3 0,9-3 0,2 8-1,-1 0 2,-2 5 2,-2-5-1,5-3-1,12 0-1,1-7 2,2-4-2,-2 8 0,4-7 1,4 3-2,0-1 1,0-9-2,0 0 1,15 1 0,5 0 2,13-3-3,-2-4 3,1-2 0,-3-2 0,12-1 3,-6-8-3,5-4 0,4-2 3,-7 0 2,4 0-2,3-2 1,0-18-1,2 0 1,-6 3-1,11-3 0,-11-6 0,3-7 1,-1 1 0,-8-2-1,-2 0 1,-5 2 0,1 3-1,-2-4 1,-2 1 0,-10 7 1,3-1-2,-8 9 2,1 3 0,-6-3 0,6-2 0,-3-10 0,5-3-1,-3 3 3,-6 7 1,-3 14-5,0 8 0,-3 0 0,-6 0 1,7 0 0,2-3-1,0-9 0,0 1 1,0 9 1,0 2-1,-3 0 1,-4 0-3,7 0 0,0 0-1,0 0 0,0 0-1,0 0-3,0 0-1,-2 0-4,-6 0-17,1 0-29,7 0-99,0 0-91</inkml:trace>
-  <inkml:trace contextRef="#ctx0" brushRef="#br0" timeOffset="1">938 1945 75,'0'2'45,"0"1"-25,0-3 29,0 0-11,0 0-11,0 0-3,0 0 6,0 0-4,0 0-3,0 0 4,0 0-1,-3 0-4,3 0-1,0 0-4,0 0-1,0 0-6,-7 0-5,3 0-3,-6 0 0,2 0 2,-7-8 0,1-4 3,2-7-2,-6-1-4,2-4 3,-3-5 1,3-1-1,1-1 2,0-4-2,4-4 0,0-1 0,1-6 0,7-2 0,1-3-1,2-3-3,0 2 4,0-5 1,0 4-4,8 5 0,6 4 0,1 8 2,0 7-3,2-2 1,0 3-2,1-1-2,-1 3 3,4 7-1,3-1 1,7 0-1,5 3 1,-3-1-2,9 5-1,-1 1 3,-1 4-1,1 5 1,-4 3-1,4 0-1,-3 0 1,-1 0 0,1 0 0,-3 3 0,4 7 1,-1 6-3,-7 1 2,-2-3-1,0 0 1,-2 9-1,-8-4 0,-1 5 2,9-2 0,-8 2-1,0 3 0,-3-2 0,-4 1 0,-4 2 0,3-1 2,-1 1-2,-1 3 3,-4 0-4,2 1 1,-4-2 2,-1 5-1,-2-4-5,0 3 6,0 1-3,0 2 4,0-1-1,0 4 1,0 3-2,-5-3 0,-7 2-2,0-7 2,3-4 0,0-4-1,1 0 0,-6-4 2,0-4 0,-5 3 1,2-9-1,-3 2 1,5-3 0,1 1-1,-7-5-1,1 1 0,-9-4-3,6-2 3,-7 0 0,3-3 0,-1 0 0,4 0 0,5 0 0,-2 0 0,1 3 0,2-3-1,-6 0 0,10 0 1,-2 0 0,1 0 0,0 0 1,1 0-1,-4 0 1,4 0-1,4 0 0,0 0 0,-2 0 0,1 0 0,1 0 0,-1 0 0,1 0 0,0 0 0,1 0 1,0 0 0,4 0-1,-5 0 0,-4 0 0,3 0 0,-2-3 0,5-3 0,0 3 0,1 1-1,-1-1 0,4 3 1,-1-3 0,2 0-1,1 0 1,-2 1-1,4 2-6,-3-3-18,3 3-36,0 0-79,0-3-46</inkml:trace>
+  <inkml:trace contextRef="#ctx0" brushRef="#br0">998 2052 6,'0'-3'31,"0"3"1,0 0-12,0 0-2,0 0-1,0 0-5,0 0 2,0 0 6,0 0-2,0 0-4,0 0-4,0 0 2,0 0-1,0 0 1,0 0-3,0 0 3,0 0 0,0 0-7,0 0-3,-6 0 1,-2 0 2,1 0 1,-5 5-3,1 5-1,-3-2 1,-1 9-1,1 2-1,0 4 2,2 2 0,3-2 4,-1 0-6,0 0 1,0 3 3,-1-1-3,1 0 1,3 7-1,-2-1-1,0-2 2,4 1-2,2 5-1,-1-3 2,4-2-2,0-1 2,0 6 2,0-7-3,0 2 2,12 6 1,-1-8-2,8-3-1,-4 7 0,1-7 1,1-2-1,2-1-1,9-6-1,-5 5 2,4-6-1,2-7 1,-1 3-1,3-5 2,-6-3-1,7-1 2,-4-2-3,3 0 0,-9 0 2,7 0 1,1 0-2,-2 0 3,5-6-3,-5-10 1,-1-4 2,-1-6 0,-1 1-3,2 0 3,-3-7-3,-4 1 1,-5 3-1,1 0 4,1-5 1,-4 8-2,-5 0 3,-2 4-2,-2-4 3,-4 2 0,2-2-4,-2-1-2,0-2 0,0-1 9,0 6-9,0 4 2,0-1-2,-15-5-1,1-1 1,-4 3-2,7 3 1,3-1-1,-2 5 0,1-5 0,1 7 1,0 3-1,1-3 1,-1 12-1,-1-7-1,-1 0 2,6-2 1,-9 2-1,9 4 0,-3-1-1,4 0 1,-2 1 0,1 2 0,2 3 0,-1 0 0,3 0 0,-2 0-1,2 0 0,0 0 0,0 0 0,0 0 1,0-3 0,0 3-1,0 0 0,0 0 0,0 0-1,0 0 1,0 0-1,0 0-1,0 0 0,0 0 0,0 0 0,0 0-2,0 0 0,0 0-2,0 0 0,0 0-4,0 0 1,0 0 3,0 0 6,0 0 1,2 11-1,12 9 0,3 2 0,4-5 0,-4 6 0,1 1 0,2 2-1,-2-4 2,8 1-1,-3 3 0,3 2-1,-5-3 1,7-2-1,-4-5 0,2 0 0,-5 6 0,2-10-4,-1 0-1,2-5 4,-4-3 0,-1-1 0,8 1-3,-6-3 2,2-3 2,-3 0-2,1 0 2,-2 0 2,8-3-1,-5-8 2,2-1-4,0-5 4,-1-3-2,3-3 0,-2 0 0,-5 0 0,5-2 0,-1-4 0,1 4 0,-4 3 0,2-4 1,-1-2-1,-1 0 0,-2-5 0,0-1 0,-1 3 0,-3 4 1,-3 2 2,-1-2 2,-5 4 0,-1-5-2,-2-2-2,1-7 0,-3 4-1,0 4 2,0-4-2,0 4 3,0 7 1,0 1-1,0 2 3,-5-1-1,-7 0 0,-2 2-3,-2 1 3,1 3 0,-1 3-3,-1 0-3,-4 4 0,-3-1 0,0 2 1,3 1 0,-5 2 0,-5 0 0,3 3-2,-4 0 3,7 0-2,-3 0 0,2 0 3,6 0-5,-1 0 1,1 0 2,6 9-3,-1-1 1,1 3 1,-6 4-1,2 0 0,0-5 1,7 1 2,1-5-1,3 1 0,4-4 2,-1-3-4,4 0 1,0 0-2,0 0-2,0 0 0,0 0-2,0 0-4,0 0 2,0 0 1,0 0-2,0 0 7,0 0 4,14-10 1,6 3-1,-1-6-1,4-1 0,-2 0 1,2-6-1,4 0 1,-1 1-2,0-7 2,0 0 1,0-2-2,0-5 0,0-1 1,1-7 1,-2 7-1,-1-2 1,2-4-1,1 0 0,1 0 2,-11 0-1,1 1-1,-1 0 0,0 1 4,-5 1-1,-5 16 1,0 0-4,-3-3 2,-1 4 2,-1-8-2,-2 3-1,0-7 0,0 0 2,0 2-1,0 1-2,0 1 2,-12-8-2,-2 9 1,3 1 0,-4 1 3,-2 6-4,-1 5 1,-2-7-3,-5 3 3,4-1-2,-3 2 3,-2 6-2,3 5-2,0-2 1,0-1 1,2 1 2,-1 3-3,-2-1 0,3 2-3,2 4 2,0 0 1,3 0-1,-8 0-1,3 0 0,1 17 3,2 6-6,-1-3 7,2 6-2,0-1 0,-2 1 0,5-3 0,1 10-2,-6-4 2,7-3 0,-2 5-1,0-9 1,2 4 0,3 0-1,1 1 1,-1 3-1,4-7 0,-2-4-1,2 4 1,3 0-3,-5 2 3,7 0 0,0-6-2,0 6 0,0-8 1,0-3 0,0-3-1,0-1 1,0-6 0,0-1 1,0-3-1,0 0 1,0 0-2,0 0 2,0 0 1,0 0-1,0 0 1,0 0 1,0 0-1,0 0 0,0 0-1,0 0 0,0 0 0,0 0 0,0 0-4,0 0 4,0 0 6,0 0-3,0-6 0,7-13-1,0-9 2,5-7-3,-3-5 1,-1 0-1,1-8 0,3-3 1,2-8 1,-4-1-2,-6 2 1,0 2 1,-4 9 1,0-5-1,0 10-1,0-4 1,-8-3 2,-7 4-3,-8-6 1,-4 10 0,-6 7-1,0 6 1,0 8 0,0 3-2,-3 1 0,7-2-1,-1-5-2,-1 12 3,-4 5-1,9 3 1,-4 3 0,2 0-1,-5 0 1,8 0-2,1 0 2,-2 6-2,-3 12-1,3 3 3,-6 2-1,0 10-1,8 1 0,1 5 1,4-2 0,4-1-1,-1-1 1,6-4 1,3 9 0,-2-3-1,6-1 1,1 4-1,2-2-1,0-4 1,0 0 0,0 2 1,14 2-2,1 2 4,3-3-4,-1-1 2,-2-4 0,1 2 0,3-3 0,-8 0 0,9-4 0,-5-5 0,-4-5-1,0-5 0,-4-5 0,-1 0 0,-4-4 1,2 2 1,-4-5 0,0 0-1,0 0 1,2 0 2,-2 0-1,0 0 0,0 0 3,0 0-1,0 0 2,0 0 0,0 0-1,0 0-2,0 0 1,0 0 0,0 0 3,0 0-1,0 0 2,0 0 0,0 0-4,0 0-2,0-5-1,-6-12 0,-13-2-1,-5-6 0,-5 3 0,4-7-1,-9 1 1,-1-6 0,6-1 0,-2-1-1,-1 2 0,0 2 1,0 2-1,-2 6 1,-2 4-3,-4 3 2,-2 3 1,-6 0 0,4 8 0,-2 1 0,9 2 1,4 3-2,-4-6 1,3 6 0,-2 0 1,-8 0-4,7 6 5,2 14-2,0 2-2,9-1 1,0-2 0,-3 7 1,-1 7-1,10 8-1,0-2 0,5-2 1,-2 6-1,-1-1 0,12 2 1,2 1 0,4 6-1,0-6 0,0 1 1,14 0 0,10-1-2,-7-2 3,6-4-1,3-2 0,6-5 0,0-3-1,-3-1 1,9-12-3,-1 5 3,1-11 2,5-2-1,2-2 0,-3-6-1,2 0 2,-9 0 2,3 0-3,-3 0 0,-8 0 0,3 0 0,2 0 1,-3-2-1,2-5 1,-1 2-1,-6-4 0,-7-2 0,-3 6 1,-8 3 1,-6 2 4,0 0-2,0 0-1,0 0 1,0 0-3,0 0 1,0 0 1,0 0 3,0 0 0,0 0 3,0 0 1,0 0-8,0 0-3,0 0-1,-27 0 1,-2 0 2,-2 0-1,-1 0-3,3 0 3,-4 0-1,4 0 0,-1 0 0,-17 17 0,4 5 1,-4 11-2,-3 5 2,7-2-2,-3 5 0,11-2 1,6-2-1,-3 3 0,9-3 0,2 8-1,-1 0 2,-2 5 2,-2-5-1,5-3-1,12 0-1,1-7 2,2-4-2,-2 8 0,4-7 1,4 3-2,0-1 1,0-9-2,0 0 1,15 1 0,5 0 2,13-3-3,-2-4 3,1-2 0,-3-2 0,12-1 3,-6-8-3,5-4 0,4-2 3,-7 0 2,4 0-2,3-2 1,0-18-1,2 0 1,-7 3-1,12-3 0,-11-6 0,3-7 1,-1 1 0,-8-2-1,-2 0 1,-5 2 0,1 3-1,-2-4 1,-2 1 0,-10 7 1,3-1-2,-8 9 2,1 3 0,-6-3 0,6-2 0,-3-10 0,5-3-1,-3 3 3,-6 7 1,-3 14-5,0 8 0,-3 0 0,-6 0 1,7 0 0,2-3-1,0-9 0,0 1 1,0 9 1,0 2-1,-3 0 1,-4 0-3,7 0 0,0 0-1,0 0 0,0 0-1,0 0-3,0 0-1,-2 0-4,-6 0-17,1 0-29,7 0-99,0 0-91</inkml:trace>
+  <inkml:trace contextRef="#ctx0" brushRef="#br0" timeOffset="1">937 1944 75,'0'2'45,"0"1"-25,0-3 29,0 0-11,0 0-11,0 0-3,0 0 6,0 0-4,0 0-3,0 0 4,0 0-1,-3 0-4,3 0-1,0 0-4,0 0-1,0 0-6,-7 0-5,3 0-3,-6 0 0,2 0 2,-7-8 0,1-4 3,2-7-2,-6-1-4,2-4 3,-3-5 1,3-1-1,1-1 2,0-4-2,4-4 0,0-1 0,1-6 0,7-2 0,1-3-1,2-3-3,0 3 4,0-6 1,0 4-4,8 5 0,6 4 0,1 8 2,0 7-3,2-2 1,0 3-2,1-1-2,-1 3 3,4 7-1,3-1 1,7 0-1,5 3 1,-3-1-2,9 5-1,-1 1 3,-1 4-1,1 5 1,-4 3-1,4 0-1,-3 0 1,-1 0 0,1 0 0,-3 3 0,4 7 1,-1 6-3,-7 1 2,-2-3-1,0 0 1,-2 9-1,-8-4 0,-1 5 2,9-2 0,-8 2-1,0 3 0,-3-2 0,-4 1 0,-4 2 0,3-1 2,-1 1-2,-1 3 3,-4 0-4,2 1 1,-4-2 2,-1 5-1,-2-4-5,0 2 6,0 2-3,0 2 4,0-1-1,0 4 1,0 3-2,-5-3 0,-7 2-2,0-7 2,3-4 0,0-4-1,1 0 0,-6-4 2,0-4 0,-5 3 1,2-9-1,-3 2 1,5-3 0,1 1-1,-7-5-1,1 1 0,-9-4-3,6-2 3,-7 0 0,3-3 0,-1 0 0,4 0 0,5 0 0,-2 0 0,1 3 0,2-3-1,-6 0 0,10 0 1,-2 0 0,1 0 0,0 0 1,1 0-1,-4 0 1,4 0-1,4 0 0,0 0 0,-2 0 0,1 0 0,1 0 0,-1 0 0,1 0 0,0 0 0,1 0 1,0 0 0,4 0-1,-5 0 0,-4 0 0,3 0 0,-2-3 0,5-3 0,0 3 0,1 1-1,-1-1 0,4 3 1,-1-3 0,2 0-1,1 0 1,-2 1-1,4 2-6,-3-3-18,3 3-36,0 0-79,0-3-46</inkml:trace>
 </inkml:ink>
 </file>
 
@@ -805,7 +813,7 @@
           <a:p>
             <a:fld id="{699DC775-C286-4358-8C92-D7E584E969B3}" type="datetimeFigureOut">
               <a:rPr lang="en-US" smtClean="0"/>
-              <a:t>3/26/2014</a:t>
+              <a:t>3/31/2014</a:t>
             </a:fld>
             <a:endParaRPr lang="en-US"/>
           </a:p>
@@ -975,7 +983,7 @@
           <a:p>
             <a:fld id="{699DC775-C286-4358-8C92-D7E584E969B3}" type="datetimeFigureOut">
               <a:rPr lang="en-US" smtClean="0"/>
-              <a:t>3/26/2014</a:t>
+              <a:t>3/31/2014</a:t>
             </a:fld>
             <a:endParaRPr lang="en-US"/>
           </a:p>
@@ -1155,7 +1163,7 @@
           <a:p>
             <a:fld id="{699DC775-C286-4358-8C92-D7E584E969B3}" type="datetimeFigureOut">
               <a:rPr lang="en-US" smtClean="0"/>
-              <a:t>3/26/2014</a:t>
+              <a:t>3/31/2014</a:t>
             </a:fld>
             <a:endParaRPr lang="en-US"/>
           </a:p>
@@ -1397,7 +1405,7 @@
           <a:p>
             <a:fld id="{699DC775-C286-4358-8C92-D7E584E969B3}" type="datetimeFigureOut">
               <a:rPr lang="en-US" smtClean="0"/>
-              <a:t>3/26/2014</a:t>
+              <a:t>3/31/2014</a:t>
             </a:fld>
             <a:endParaRPr lang="en-US"/>
           </a:p>
@@ -1567,7 +1575,7 @@
           <a:p>
             <a:fld id="{699DC775-C286-4358-8C92-D7E584E969B3}" type="datetimeFigureOut">
               <a:rPr lang="en-US" smtClean="0"/>
-              <a:t>3/26/2014</a:t>
+              <a:t>3/31/2014</a:t>
             </a:fld>
             <a:endParaRPr lang="en-US"/>
           </a:p>
@@ -1813,7 +1821,7 @@
           <a:p>
             <a:fld id="{699DC775-C286-4358-8C92-D7E584E969B3}" type="datetimeFigureOut">
               <a:rPr lang="en-US" smtClean="0"/>
-              <a:t>3/26/2014</a:t>
+              <a:t>3/31/2014</a:t>
             </a:fld>
             <a:endParaRPr lang="en-US"/>
           </a:p>
@@ -2101,7 +2109,7 @@
           <a:p>
             <a:fld id="{699DC775-C286-4358-8C92-D7E584E969B3}" type="datetimeFigureOut">
               <a:rPr lang="en-US" smtClean="0"/>
-              <a:t>3/26/2014</a:t>
+              <a:t>3/31/2014</a:t>
             </a:fld>
             <a:endParaRPr lang="en-US"/>
           </a:p>
@@ -2523,7 +2531,7 @@
           <a:p>
             <a:fld id="{699DC775-C286-4358-8C92-D7E584E969B3}" type="datetimeFigureOut">
               <a:rPr lang="en-US" smtClean="0"/>
-              <a:t>3/26/2014</a:t>
+              <a:t>3/31/2014</a:t>
             </a:fld>
             <a:endParaRPr lang="en-US"/>
           </a:p>
@@ -2641,7 +2649,7 @@
           <a:p>
             <a:fld id="{699DC775-C286-4358-8C92-D7E584E969B3}" type="datetimeFigureOut">
               <a:rPr lang="en-US" smtClean="0"/>
-              <a:t>3/26/2014</a:t>
+              <a:t>3/31/2014</a:t>
             </a:fld>
             <a:endParaRPr lang="en-US"/>
           </a:p>
@@ -2736,7 +2744,7 @@
           <a:p>
             <a:fld id="{699DC775-C286-4358-8C92-D7E584E969B3}" type="datetimeFigureOut">
               <a:rPr lang="en-US" smtClean="0"/>
-              <a:t>3/26/2014</a:t>
+              <a:t>3/31/2014</a:t>
             </a:fld>
             <a:endParaRPr lang="en-US"/>
           </a:p>
@@ -3013,7 +3021,7 @@
           <a:p>
             <a:fld id="{699DC775-C286-4358-8C92-D7E584E969B3}" type="datetimeFigureOut">
               <a:rPr lang="en-US" smtClean="0"/>
-              <a:t>3/26/2014</a:t>
+              <a:t>3/31/2014</a:t>
             </a:fld>
             <a:endParaRPr lang="en-US"/>
           </a:p>
@@ -3183,7 +3191,7 @@
           <a:p>
             <a:fld id="{699DC775-C286-4358-8C92-D7E584E969B3}" type="datetimeFigureOut">
               <a:rPr lang="en-US" smtClean="0"/>
-              <a:t>3/26/2014</a:t>
+              <a:t>3/31/2014</a:t>
             </a:fld>
             <a:endParaRPr lang="en-US"/>
           </a:p>
@@ -3436,7 +3444,7 @@
           <a:p>
             <a:fld id="{699DC775-C286-4358-8C92-D7E584E969B3}" type="datetimeFigureOut">
               <a:rPr lang="en-US" smtClean="0"/>
-              <a:t>3/26/2014</a:t>
+              <a:t>3/31/2014</a:t>
             </a:fld>
             <a:endParaRPr lang="en-US"/>
           </a:p>
@@ -3606,7 +3614,7 @@
           <a:p>
             <a:fld id="{699DC775-C286-4358-8C92-D7E584E969B3}" type="datetimeFigureOut">
               <a:rPr lang="en-US" smtClean="0"/>
-              <a:t>3/26/2014</a:t>
+              <a:t>3/31/2014</a:t>
             </a:fld>
             <a:endParaRPr lang="en-US"/>
           </a:p>
@@ -3786,7 +3794,7 @@
           <a:p>
             <a:fld id="{699DC775-C286-4358-8C92-D7E584E969B3}" type="datetimeFigureOut">
               <a:rPr lang="en-US" smtClean="0"/>
-              <a:t>3/26/2014</a:t>
+              <a:t>3/31/2014</a:t>
             </a:fld>
             <a:endParaRPr lang="en-US"/>
           </a:p>
@@ -4036,7 +4044,7 @@
           <a:p>
             <a:fld id="{699DC775-C286-4358-8C92-D7E584E969B3}" type="datetimeFigureOut">
               <a:rPr lang="en-US" smtClean="0"/>
-              <a:t>3/26/2014</a:t>
+              <a:t>3/31/2014</a:t>
             </a:fld>
             <a:endParaRPr lang="en-US"/>
           </a:p>
@@ -4214,7 +4222,7 @@
           <a:p>
             <a:fld id="{699DC775-C286-4358-8C92-D7E584E969B3}" type="datetimeFigureOut">
               <a:rPr lang="en-US" smtClean="0"/>
-              <a:t>3/26/2014</a:t>
+              <a:t>3/31/2014</a:t>
             </a:fld>
             <a:endParaRPr lang="en-US"/>
           </a:p>
@@ -4468,7 +4476,7 @@
           <a:p>
             <a:fld id="{699DC775-C286-4358-8C92-D7E584E969B3}" type="datetimeFigureOut">
               <a:rPr lang="en-US" smtClean="0"/>
-              <a:t>3/26/2014</a:t>
+              <a:t>3/31/2014</a:t>
             </a:fld>
             <a:endParaRPr lang="en-US"/>
           </a:p>
@@ -4764,7 +4772,7 @@
           <a:p>
             <a:fld id="{699DC775-C286-4358-8C92-D7E584E969B3}" type="datetimeFigureOut">
               <a:rPr lang="en-US" smtClean="0"/>
-              <a:t>3/26/2014</a:t>
+              <a:t>3/31/2014</a:t>
             </a:fld>
             <a:endParaRPr lang="en-US"/>
           </a:p>
@@ -5194,7 +5202,7 @@
           <a:p>
             <a:fld id="{699DC775-C286-4358-8C92-D7E584E969B3}" type="datetimeFigureOut">
               <a:rPr lang="en-US" smtClean="0"/>
-              <a:t>3/26/2014</a:t>
+              <a:t>3/31/2014</a:t>
             </a:fld>
             <a:endParaRPr lang="en-US"/>
           </a:p>
@@ -5320,7 +5328,7 @@
           <a:p>
             <a:fld id="{699DC775-C286-4358-8C92-D7E584E969B3}" type="datetimeFigureOut">
               <a:rPr lang="en-US" smtClean="0"/>
-              <a:t>3/26/2014</a:t>
+              <a:t>3/31/2014</a:t>
             </a:fld>
             <a:endParaRPr lang="en-US"/>
           </a:p>
@@ -5423,7 +5431,7 @@
           <a:p>
             <a:fld id="{699DC775-C286-4358-8C92-D7E584E969B3}" type="datetimeFigureOut">
               <a:rPr lang="en-US" smtClean="0"/>
-              <a:t>3/26/2014</a:t>
+              <a:t>3/31/2014</a:t>
             </a:fld>
             <a:endParaRPr lang="en-US"/>
           </a:p>
@@ -5669,7 +5677,7 @@
           <a:p>
             <a:fld id="{699DC775-C286-4358-8C92-D7E584E969B3}" type="datetimeFigureOut">
               <a:rPr lang="en-US" smtClean="0"/>
-              <a:t>3/26/2014</a:t>
+              <a:t>3/31/2014</a:t>
             </a:fld>
             <a:endParaRPr lang="en-US"/>
           </a:p>
@@ -5954,7 +5962,7 @@
           <a:p>
             <a:fld id="{699DC775-C286-4358-8C92-D7E584E969B3}" type="datetimeFigureOut">
               <a:rPr lang="en-US" smtClean="0"/>
-              <a:t>3/26/2014</a:t>
+              <a:t>3/31/2014</a:t>
             </a:fld>
             <a:endParaRPr lang="en-US"/>
           </a:p>
@@ -6215,7 +6223,7 @@
           <a:p>
             <a:fld id="{699DC775-C286-4358-8C92-D7E584E969B3}" type="datetimeFigureOut">
               <a:rPr lang="en-US" smtClean="0"/>
-              <a:t>3/26/2014</a:t>
+              <a:t>3/31/2014</a:t>
             </a:fld>
             <a:endParaRPr lang="en-US"/>
           </a:p>
@@ -6393,7 +6401,7 @@
           <a:p>
             <a:fld id="{699DC775-C286-4358-8C92-D7E584E969B3}" type="datetimeFigureOut">
               <a:rPr lang="en-US" smtClean="0"/>
-              <a:t>3/26/2014</a:t>
+              <a:t>3/31/2014</a:t>
             </a:fld>
             <a:endParaRPr lang="en-US"/>
           </a:p>
@@ -6581,7 +6589,7 @@
           <a:p>
             <a:fld id="{699DC775-C286-4358-8C92-D7E584E969B3}" type="datetimeFigureOut">
               <a:rPr lang="en-US" smtClean="0"/>
-              <a:t>3/26/2014</a:t>
+              <a:t>3/31/2014</a:t>
             </a:fld>
             <a:endParaRPr lang="en-US"/>
           </a:p>
@@ -6869,7 +6877,7 @@
           <a:p>
             <a:fld id="{699DC775-C286-4358-8C92-D7E584E969B3}" type="datetimeFigureOut">
               <a:rPr lang="en-US" smtClean="0"/>
-              <a:t>3/26/2014</a:t>
+              <a:t>3/31/2014</a:t>
             </a:fld>
             <a:endParaRPr lang="en-US"/>
           </a:p>
@@ -7291,7 +7299,7 @@
           <a:p>
             <a:fld id="{699DC775-C286-4358-8C92-D7E584E969B3}" type="datetimeFigureOut">
               <a:rPr lang="en-US" smtClean="0"/>
-              <a:t>3/26/2014</a:t>
+              <a:t>3/31/2014</a:t>
             </a:fld>
             <a:endParaRPr lang="en-US"/>
           </a:p>
@@ -7409,7 +7417,7 @@
           <a:p>
             <a:fld id="{699DC775-C286-4358-8C92-D7E584E969B3}" type="datetimeFigureOut">
               <a:rPr lang="en-US" smtClean="0"/>
-              <a:t>3/26/2014</a:t>
+              <a:t>3/31/2014</a:t>
             </a:fld>
             <a:endParaRPr lang="en-US"/>
           </a:p>
@@ -7504,7 +7512,7 @@
           <a:p>
             <a:fld id="{699DC775-C286-4358-8C92-D7E584E969B3}" type="datetimeFigureOut">
               <a:rPr lang="en-US" smtClean="0"/>
-              <a:t>3/26/2014</a:t>
+              <a:t>3/31/2014</a:t>
             </a:fld>
             <a:endParaRPr lang="en-US"/>
           </a:p>
@@ -7781,7 +7789,7 @@
           <a:p>
             <a:fld id="{699DC775-C286-4358-8C92-D7E584E969B3}" type="datetimeFigureOut">
               <a:rPr lang="en-US" smtClean="0"/>
-              <a:t>3/26/2014</a:t>
+              <a:t>3/31/2014</a:t>
             </a:fld>
             <a:endParaRPr lang="en-US"/>
           </a:p>
@@ -8034,7 +8042,7 @@
           <a:p>
             <a:fld id="{699DC775-C286-4358-8C92-D7E584E969B3}" type="datetimeFigureOut">
               <a:rPr lang="en-US" smtClean="0"/>
-              <a:t>3/26/2014</a:t>
+              <a:t>3/31/2014</a:t>
             </a:fld>
             <a:endParaRPr lang="en-US"/>
           </a:p>
@@ -8247,7 +8255,7 @@
           <a:p>
             <a:fld id="{699DC775-C286-4358-8C92-D7E584E969B3}" type="datetimeFigureOut">
               <a:rPr lang="en-US" smtClean="0"/>
-              <a:t>3/26/2014</a:t>
+              <a:t>3/31/2014</a:t>
             </a:fld>
             <a:endParaRPr lang="en-US"/>
           </a:p>
@@ -8762,7 +8770,7 @@
           <a:p>
             <a:fld id="{699DC775-C286-4358-8C92-D7E584E969B3}" type="datetimeFigureOut">
               <a:rPr lang="en-US" smtClean="0"/>
-              <a:t>3/26/2014</a:t>
+              <a:t>3/31/2014</a:t>
             </a:fld>
             <a:endParaRPr lang="en-US"/>
           </a:p>
@@ -9275,7 +9283,7 @@
           <a:p>
             <a:fld id="{699DC775-C286-4358-8C92-D7E584E969B3}" type="datetimeFigureOut">
               <a:rPr lang="en-US" smtClean="0"/>
-              <a:t>3/26/2014</a:t>
+              <a:t>3/31/2014</a:t>
             </a:fld>
             <a:endParaRPr lang="en-US"/>
           </a:p>
@@ -9832,6 +9840,1547 @@
 
 <file path=ppt/slides/slide10.xml><?xml version="1.0" encoding="utf-8"?>
 <p:sld xmlns:a="http://schemas.openxmlformats.org/drawingml/2006/main" xmlns:r="http://schemas.openxmlformats.org/officeDocument/2006/relationships" xmlns:p="http://schemas.openxmlformats.org/presentationml/2006/main">
+  <p:cSld name="PPSlideAnimated201403311937382787">
+    <p:bg>
+      <p:bgPr>
+        <a:solidFill>
+          <a:schemeClr val="bg1"/>
+        </a:solidFill>
+        <a:effectLst/>
+      </p:bgPr>
+    </p:bg>
+    <p:spTree>
+      <p:nvGrpSpPr>
+        <p:cNvPr id="1" name=""/>
+        <p:cNvGrpSpPr/>
+        <p:nvPr/>
+      </p:nvGrpSpPr>
+      <p:grpSpPr>
+        <a:xfrm>
+          <a:off x="0" y="0"/>
+          <a:ext cx="0" cy="0"/>
+          <a:chOff x="0" y="0"/>
+          <a:chExt cx="0" cy="0"/>
+        </a:xfrm>
+      </p:grpSpPr>
+      <p:sp>
+        <p:nvSpPr>
+          <p:cNvPr id="4" name="[Notched Right Arrow 3]"/>
+          <p:cNvSpPr/>
+          <p:nvPr/>
+        </p:nvSpPr>
+        <p:spPr>
+          <a:xfrm rot="19804930">
+            <a:off x="1752600" y="1752600"/>
+            <a:ext cx="1371600" cy="838200"/>
+          </a:xfrm>
+          <a:prstGeom prst="notchedRightArrow">
+            <a:avLst/>
+          </a:prstGeom>
+        </p:spPr>
+        <p:style>
+          <a:lnRef idx="2">
+            <a:schemeClr val="accent1">
+              <a:shade val="50000"/>
+            </a:schemeClr>
+          </a:lnRef>
+          <a:fillRef idx="1">
+            <a:schemeClr val="accent1"/>
+          </a:fillRef>
+          <a:effectRef idx="0">
+            <a:schemeClr val="accent1"/>
+          </a:effectRef>
+          <a:fontRef idx="minor">
+            <a:schemeClr val="lt1"/>
+          </a:fontRef>
+        </p:style>
+        <p:txBody>
+          <a:bodyPr rtlCol="0" anchor="ctr"/>
+          <a:lstStyle/>
+          <a:p>
+            <a:pPr algn="ctr"/>
+            <a:endParaRPr lang="en-SG"/>
+          </a:p>
+        </p:txBody>
+      </p:sp>
+      <p:grpSp>
+        <p:nvGrpSpPr>
+          <p:cNvPr id="2" name="[Group 2]"/>
+          <p:cNvGrpSpPr/>
+          <p:nvPr/>
+        </p:nvGrpSpPr>
+        <p:grpSpPr>
+          <a:xfrm>
+            <a:off x="3962400" y="3276600"/>
+            <a:ext cx="3581400" cy="2362200"/>
+            <a:chOff x="3962400" y="3276600"/>
+            <a:chExt cx="3581400" cy="2362200"/>
+          </a:xfrm>
+        </p:grpSpPr>
+        <p:sp>
+          <p:nvSpPr>
+            <p:cNvPr id="5" name="Notched Right Arrow 4"/>
+            <p:cNvSpPr/>
+            <p:nvPr/>
+          </p:nvSpPr>
+          <p:spPr>
+            <a:xfrm rot="20389402">
+              <a:off x="3962400" y="3276600"/>
+              <a:ext cx="1371600" cy="838200"/>
+            </a:xfrm>
+            <a:prstGeom prst="notchedRightArrow">
+              <a:avLst/>
+            </a:prstGeom>
+          </p:spPr>
+          <p:style>
+            <a:lnRef idx="2">
+              <a:schemeClr val="accent1">
+                <a:shade val="50000"/>
+              </a:schemeClr>
+            </a:lnRef>
+            <a:fillRef idx="1">
+              <a:schemeClr val="accent1"/>
+            </a:fillRef>
+            <a:effectRef idx="0">
+              <a:schemeClr val="accent1"/>
+            </a:effectRef>
+            <a:fontRef idx="minor">
+              <a:schemeClr val="lt1"/>
+            </a:fontRef>
+          </p:style>
+          <p:txBody>
+            <a:bodyPr rtlCol="0" anchor="ctr"/>
+            <a:lstStyle/>
+            <a:p>
+              <a:pPr algn="ctr"/>
+              <a:endParaRPr lang="en-SG"/>
+            </a:p>
+          </p:txBody>
+        </p:sp>
+        <p:sp>
+          <p:nvSpPr>
+            <p:cNvPr id="6" name="Notched Right Arrow 5"/>
+            <p:cNvSpPr/>
+            <p:nvPr/>
+          </p:nvSpPr>
+          <p:spPr>
+            <a:xfrm rot="1690524">
+              <a:off x="6172200" y="4800600"/>
+              <a:ext cx="1371600" cy="838200"/>
+            </a:xfrm>
+            <a:prstGeom prst="notchedRightArrow">
+              <a:avLst/>
+            </a:prstGeom>
+          </p:spPr>
+          <p:style>
+            <a:lnRef idx="2">
+              <a:schemeClr val="accent1">
+                <a:shade val="50000"/>
+              </a:schemeClr>
+            </a:lnRef>
+            <a:fillRef idx="1">
+              <a:schemeClr val="accent1"/>
+            </a:fillRef>
+            <a:effectRef idx="0">
+              <a:schemeClr val="accent1"/>
+            </a:effectRef>
+            <a:fontRef idx="minor">
+              <a:schemeClr val="lt1"/>
+            </a:fontRef>
+          </p:style>
+          <p:txBody>
+            <a:bodyPr rtlCol="0" anchor="ctr"/>
+            <a:lstStyle/>
+            <a:p>
+              <a:pPr algn="ctr"/>
+              <a:endParaRPr lang="en-SG"/>
+            </a:p>
+          </p:txBody>
+        </p:sp>
+      </p:grpSp>
+      <p:sp>
+        <p:nvSpPr>
+          <p:cNvPr id="8" name="text 3"/>
+          <p:cNvSpPr txBox="1"/>
+          <p:nvPr/>
+        </p:nvSpPr>
+        <p:spPr>
+          <a:xfrm>
+            <a:off x="430386" y="6043939"/>
+            <a:ext cx="2644122" cy="523220"/>
+          </a:xfrm>
+          <a:prstGeom prst="rect">
+            <a:avLst/>
+          </a:prstGeom>
+          <a:noFill/>
+        </p:spPr>
+        <p:txBody>
+          <a:bodyPr wrap="none" rtlCol="0">
+            <a:spAutoFit/>
+          </a:bodyPr>
+          <a:lstStyle/>
+          <a:p>
+            <a:r>
+              <a:rPr lang="en-US" sz="2800" b="1" dirty="0" smtClean="0">
+                <a:solidFill>
+                  <a:schemeClr val="bg1">
+                    <a:lumMod val="75000"/>
+                  </a:schemeClr>
+                </a:solidFill>
+              </a:rPr>
+              <a:t>Expected output</a:t>
+            </a:r>
+            <a:endParaRPr lang="en-SG" sz="2800" b="1" dirty="0">
+              <a:solidFill>
+                <a:schemeClr val="bg1">
+                  <a:lumMod val="75000"/>
+                </a:schemeClr>
+              </a:solidFill>
+            </a:endParaRPr>
+          </a:p>
+        </p:txBody>
+      </p:sp>
+      <p:pic>
+        <p:nvPicPr>
+          <p:cNvPr id="3" name="PPIndicator201403311937383607"/>
+          <p:cNvPicPr>
+            <a:picLocks/>
+          </p:cNvPicPr>
+          <p:nvPr/>
+        </p:nvPicPr>
+        <p:blipFill>
+          <a:blip r:embed="rId2" cstate="print">
+            <a:extLst>
+              <a:ext uri="{28A0092B-C50C-407E-A947-70E740481C1C}">
+                <a14:useLocalDpi xmlns:a14="http://schemas.microsoft.com/office/drawing/2010/main" val="0"/>
+              </a:ext>
+            </a:extLst>
+          </a:blip>
+          <a:stretch>
+            <a:fillRect/>
+          </a:stretch>
+        </p:blipFill>
+        <p:spPr>
+          <a:xfrm>
+            <a:off x="7620000" y="0"/>
+            <a:ext cx="1524000" cy="1066800"/>
+          </a:xfrm>
+          <a:prstGeom prst="rect">
+            <a:avLst/>
+          </a:prstGeom>
+        </p:spPr>
+      </p:pic>
+    </p:spTree>
+    <p:extLst>
+      <p:ext uri="{BB962C8B-B14F-4D97-AF65-F5344CB8AC3E}">
+        <p14:creationId xmlns:p14="http://schemas.microsoft.com/office/powerpoint/2010/main" val="370724177"/>
+      </p:ext>
+    </p:extLst>
+  </p:cSld>
+  <p:clrMapOvr>
+    <a:masterClrMapping/>
+  </p:clrMapOvr>
+  <p:transition spd="slow" advClick="0" advTm="0"/>
+  <p:timing>
+    <p:tnLst>
+      <p:par>
+        <p:cTn id="1" dur="indefinite" restart="never" nodeType="tmRoot">
+          <p:childTnLst>
+            <p:seq concurrent="1" nextAc="seek">
+              <p:cTn id="2" dur="indefinite" nodeType="mainSeq">
+                <p:childTnLst>
+                  <p:par>
+                    <p:cTn id="3" fill="hold">
+                      <p:stCondLst>
+                        <p:cond delay="indefinite"/>
+                        <p:cond evt="onBegin" delay="0">
+                          <p:tn val="2"/>
+                        </p:cond>
+                      </p:stCondLst>
+                      <p:childTnLst>
+                        <p:par>
+                          <p:cTn id="4" fill="hold">
+                            <p:stCondLst>
+                              <p:cond delay="0"/>
+                            </p:stCondLst>
+                            <p:childTnLst>
+                              <p:par>
+                                <p:cTn id="5" presetID="1" presetClass="entr" presetSubtype="0" fill="hold" nodeType="withEffect">
+                                  <p:stCondLst>
+                                    <p:cond delay="0"/>
+                                  </p:stCondLst>
+                                  <p:childTnLst>
+                                    <p:set>
+                                      <p:cBhvr>
+                                        <p:cTn id="6" dur="1" fill="hold">
+                                          <p:stCondLst>
+                                            <p:cond delay="0"/>
+                                          </p:stCondLst>
+                                        </p:cTn>
+                                        <p:tgtEl>
+                                          <p:spTgt spid="3"/>
+                                        </p:tgtEl>
+                                        <p:attrNameLst>
+                                          <p:attrName>style.visibility</p:attrName>
+                                        </p:attrNameLst>
+                                      </p:cBhvr>
+                                      <p:to>
+                                        <p:strVal val="visible"/>
+                                      </p:to>
+                                    </p:set>
+                                  </p:childTnLst>
+                                </p:cTn>
+                              </p:par>
+                              <p:par>
+                                <p:cTn id="7" presetID="1" presetClass="exit" presetSubtype="0" fill="hold" nodeType="withEffect">
+                                  <p:stCondLst>
+                                    <p:cond delay="0"/>
+                                  </p:stCondLst>
+                                  <p:childTnLst>
+                                    <p:set>
+                                      <p:cBhvr>
+                                        <p:cTn id="8" dur="1" fill="hold">
+                                          <p:stCondLst>
+                                            <p:cond delay="0"/>
+                                          </p:stCondLst>
+                                        </p:cTn>
+                                        <p:tgtEl>
+                                          <p:spTgt spid="3"/>
+                                        </p:tgtEl>
+                                        <p:attrNameLst>
+                                          <p:attrName>style.visibility</p:attrName>
+                                        </p:attrNameLst>
+                                      </p:cBhvr>
+                                      <p:to>
+                                        <p:strVal val="hidden"/>
+                                      </p:to>
+                                    </p:set>
+                                  </p:childTnLst>
+                                </p:cTn>
+                              </p:par>
+                              <p:par>
+                                <p:cTn id="9" presetID="10" presetClass="exit" presetSubtype="0" fill="hold" grpId="0" nodeType="withEffect">
+                                  <p:stCondLst>
+                                    <p:cond delay="0"/>
+                                  </p:stCondLst>
+                                  <p:childTnLst>
+                                    <p:animEffect transition="out" filter="fade">
+                                      <p:cBhvr>
+                                        <p:cTn id="10" dur="500"/>
+                                        <p:tgtEl>
+                                          <p:spTgt spid="8"/>
+                                        </p:tgtEl>
+                                      </p:cBhvr>
+                                    </p:animEffect>
+                                    <p:set>
+                                      <p:cBhvr>
+                                        <p:cTn id="11" dur="1" fill="hold">
+                                          <p:stCondLst>
+                                            <p:cond delay="499"/>
+                                          </p:stCondLst>
+                                        </p:cTn>
+                                        <p:tgtEl>
+                                          <p:spTgt spid="8"/>
+                                        </p:tgtEl>
+                                        <p:attrNameLst>
+                                          <p:attrName>style.visibility</p:attrName>
+                                        </p:attrNameLst>
+                                      </p:cBhvr>
+                                      <p:to>
+                                        <p:strVal val="hidden"/>
+                                      </p:to>
+                                    </p:set>
+                                  </p:childTnLst>
+                                </p:cTn>
+                              </p:par>
+                            </p:childTnLst>
+                          </p:cTn>
+                        </p:par>
+                        <p:par>
+                          <p:cTn id="12" fill="hold">
+                            <p:stCondLst>
+                              <p:cond delay="500"/>
+                            </p:stCondLst>
+                            <p:childTnLst>
+                              <p:par>
+                                <p:cTn id="13" presetID="8" presetClass="emph" presetSubtype="0" fill="hold" grpId="0" nodeType="afterEffect">
+                                  <p:stCondLst>
+                                    <p:cond delay="0"/>
+                                  </p:stCondLst>
+                                  <p:childTnLst>
+                                    <p:animRot by="5395071">
+                                      <p:cBhvr>
+                                        <p:cTn id="14" dur="500" fill="hold"/>
+                                        <p:tgtEl>
+                                          <p:spTgt spid="4"/>
+                                        </p:tgtEl>
+                                        <p:attrNameLst>
+                                          <p:attrName>r</p:attrName>
+                                        </p:attrNameLst>
+                                      </p:cBhvr>
+                                    </p:animRot>
+                                  </p:childTnLst>
+                                </p:cTn>
+                              </p:par>
+                              <p:par>
+                                <p:cTn id="15" presetID="8" presetClass="emph" presetSubtype="0" fill="hold" nodeType="withEffect">
+                                  <p:stCondLst>
+                                    <p:cond delay="0"/>
+                                  </p:stCondLst>
+                                  <p:childTnLst>
+                                    <p:animRot by="5395070">
+                                      <p:cBhvr>
+                                        <p:cTn id="16" dur="500" fill="hold"/>
+                                        <p:tgtEl>
+                                          <p:spTgt spid="2"/>
+                                        </p:tgtEl>
+                                        <p:attrNameLst>
+                                          <p:attrName>r</p:attrName>
+                                        </p:attrNameLst>
+                                      </p:cBhvr>
+                                    </p:animRot>
+                                  </p:childTnLst>
+                                </p:cTn>
+                              </p:par>
+                            </p:childTnLst>
+                          </p:cTn>
+                        </p:par>
+                      </p:childTnLst>
+                    </p:cTn>
+                  </p:par>
+                </p:childTnLst>
+              </p:cTn>
+              <p:prevCondLst>
+                <p:cond evt="onPrev" delay="0">
+                  <p:tgtEl>
+                    <p:sldTgt/>
+                  </p:tgtEl>
+                </p:cond>
+              </p:prevCondLst>
+              <p:nextCondLst>
+                <p:cond evt="onNext" delay="0">
+                  <p:tgtEl>
+                    <p:sldTgt/>
+                  </p:tgtEl>
+                </p:cond>
+              </p:nextCondLst>
+            </p:seq>
+          </p:childTnLst>
+        </p:cTn>
+      </p:par>
+    </p:tnLst>
+    <p:bldLst>
+      <p:bldP spid="4" grpId="0" animBg="1"/>
+      <p:bldP spid="8" grpId="0"/>
+    </p:bldLst>
+  </p:timing>
+</p:sld>
+</file>
+
+<file path=ppt/slides/slide11.xml><?xml version="1.0" encoding="utf-8"?>
+<p:sld xmlns:a="http://schemas.openxmlformats.org/drawingml/2006/main" xmlns:r="http://schemas.openxmlformats.org/officeDocument/2006/relationships" xmlns:p="http://schemas.openxmlformats.org/presentationml/2006/main">
+  <p:cSld>
+    <p:spTree>
+      <p:nvGrpSpPr>
+        <p:cNvPr id="1" name=""/>
+        <p:cNvGrpSpPr/>
+        <p:nvPr/>
+      </p:nvGrpSpPr>
+      <p:grpSpPr>
+        <a:xfrm>
+          <a:off x="0" y="0"/>
+          <a:ext cx="0" cy="0"/>
+          <a:chOff x="0" y="0"/>
+          <a:chExt cx="0" cy="0"/>
+        </a:xfrm>
+      </p:grpSpPr>
+      <p:sp>
+        <p:nvSpPr>
+          <p:cNvPr id="2" name="Title 1"/>
+          <p:cNvSpPr>
+            <a:spLocks noGrp="1"/>
+          </p:cNvSpPr>
+          <p:nvPr>
+            <p:ph type="title"/>
+          </p:nvPr>
+        </p:nvSpPr>
+        <p:spPr/>
+        <p:txBody>
+          <a:bodyPr/>
+          <a:lstStyle/>
+          <a:p>
+            <a:r>
+              <a:rPr lang="en-US" dirty="0" smtClean="0"/>
+              <a:t>Auto Animate:: Shapes with text</a:t>
+            </a:r>
+            <a:endParaRPr lang="en-SG" dirty="0"/>
+          </a:p>
+        </p:txBody>
+      </p:sp>
+    </p:spTree>
+    <p:extLst>
+      <p:ext uri="{BB962C8B-B14F-4D97-AF65-F5344CB8AC3E}">
+        <p14:creationId xmlns:p14="http://schemas.microsoft.com/office/powerpoint/2010/main" val="3673044682"/>
+      </p:ext>
+    </p:extLst>
+  </p:cSld>
+  <p:clrMapOvr>
+    <a:masterClrMapping/>
+  </p:clrMapOvr>
+  <p:timing>
+    <p:tnLst>
+      <p:par>
+        <p:cTn id="1" dur="indefinite" restart="never" nodeType="tmRoot"/>
+      </p:par>
+    </p:tnLst>
+  </p:timing>
+</p:sld>
+</file>
+
+<file path=ppt/slides/slide12.xml><?xml version="1.0" encoding="utf-8"?>
+<p:sld xmlns:a="http://schemas.openxmlformats.org/drawingml/2006/main" xmlns:r="http://schemas.openxmlformats.org/officeDocument/2006/relationships" xmlns:p="http://schemas.openxmlformats.org/presentationml/2006/main">
+  <p:cSld name="PPSlideStart201403260226267770">
+    <p:bg>
+      <p:bgPr>
+        <a:solidFill>
+          <a:schemeClr val="bg1"/>
+        </a:solidFill>
+        <a:effectLst/>
+      </p:bgPr>
+    </p:bg>
+    <p:spTree>
+      <p:nvGrpSpPr>
+        <p:cNvPr id="1" name=""/>
+        <p:cNvGrpSpPr/>
+        <p:nvPr/>
+      </p:nvGrpSpPr>
+      <p:grpSpPr>
+        <a:xfrm>
+          <a:off x="0" y="0"/>
+          <a:ext cx="0" cy="0"/>
+          <a:chOff x="0" y="0"/>
+          <a:chExt cx="0" cy="0"/>
+        </a:xfrm>
+      </p:grpSpPr>
+      <p:sp>
+        <p:nvSpPr>
+          <p:cNvPr id="4" name="Rectangle 3"/>
+          <p:cNvSpPr/>
+          <p:nvPr/>
+        </p:nvSpPr>
+        <p:spPr>
+          <a:xfrm>
+            <a:off x="838200" y="1143000"/>
+            <a:ext cx="3657600" cy="914400"/>
+          </a:xfrm>
+          <a:prstGeom prst="rect">
+            <a:avLst/>
+          </a:prstGeom>
+        </p:spPr>
+        <p:style>
+          <a:lnRef idx="2">
+            <a:schemeClr val="accent1">
+              <a:shade val="50000"/>
+            </a:schemeClr>
+          </a:lnRef>
+          <a:fillRef idx="1">
+            <a:schemeClr val="accent1"/>
+          </a:fillRef>
+          <a:effectRef idx="0">
+            <a:schemeClr val="accent1"/>
+          </a:effectRef>
+          <a:fontRef idx="minor">
+            <a:schemeClr val="lt1"/>
+          </a:fontRef>
+        </p:style>
+        <p:txBody>
+          <a:bodyPr rtlCol="0" anchor="ctr"/>
+          <a:lstStyle/>
+          <a:p>
+            <a:r>
+              <a:rPr lang="en-US" dirty="0" err="1">
+                <a:solidFill>
+                  <a:schemeClr val="bg1"/>
+                </a:solidFill>
+              </a:rPr>
+              <a:t>Lorem</a:t>
+            </a:r>
+            <a:r>
+              <a:rPr lang="en-US" dirty="0">
+                <a:solidFill>
+                  <a:schemeClr val="bg1"/>
+                </a:solidFill>
+              </a:rPr>
+              <a:t> </a:t>
+            </a:r>
+            <a:r>
+              <a:rPr lang="en-US" dirty="0" err="1">
+                <a:solidFill>
+                  <a:schemeClr val="bg1"/>
+                </a:solidFill>
+              </a:rPr>
+              <a:t>ipsum</a:t>
+            </a:r>
+            <a:r>
+              <a:rPr lang="en-US" dirty="0">
+                <a:solidFill>
+                  <a:schemeClr val="bg1"/>
+                </a:solidFill>
+              </a:rPr>
+              <a:t> dolor sit </a:t>
+            </a:r>
+            <a:r>
+              <a:rPr lang="en-US" dirty="0" err="1">
+                <a:solidFill>
+                  <a:schemeClr val="bg1"/>
+                </a:solidFill>
+              </a:rPr>
+              <a:t>amet</a:t>
+            </a:r>
+            <a:r>
+              <a:rPr lang="en-US" dirty="0">
+                <a:solidFill>
+                  <a:schemeClr val="bg1"/>
+                </a:solidFill>
+              </a:rPr>
+              <a:t>, </a:t>
+            </a:r>
+            <a:r>
+              <a:rPr lang="en-US" dirty="0" err="1">
+                <a:solidFill>
+                  <a:schemeClr val="bg1"/>
+                </a:solidFill>
+              </a:rPr>
+              <a:t>consectetur</a:t>
+            </a:r>
+            <a:r>
+              <a:rPr lang="en-US" dirty="0">
+                <a:solidFill>
+                  <a:schemeClr val="bg1"/>
+                </a:solidFill>
+              </a:rPr>
+              <a:t> </a:t>
+            </a:r>
+            <a:r>
+              <a:rPr lang="en-US" dirty="0" err="1">
+                <a:solidFill>
+                  <a:schemeClr val="bg1"/>
+                </a:solidFill>
+              </a:rPr>
+              <a:t>adipiscing</a:t>
+            </a:r>
+            <a:r>
+              <a:rPr lang="en-US" dirty="0">
+                <a:solidFill>
+                  <a:schemeClr val="bg1"/>
+                </a:solidFill>
+              </a:rPr>
+              <a:t> </a:t>
+            </a:r>
+            <a:r>
+              <a:rPr lang="en-US" dirty="0" err="1">
+                <a:solidFill>
+                  <a:schemeClr val="bg1"/>
+                </a:solidFill>
+              </a:rPr>
+              <a:t>elit</a:t>
+            </a:r>
+            <a:r>
+              <a:rPr lang="en-US" dirty="0">
+                <a:solidFill>
+                  <a:schemeClr val="bg1"/>
+                </a:solidFill>
+              </a:rPr>
+              <a:t>. </a:t>
+            </a:r>
+            <a:r>
+              <a:rPr lang="en-US" dirty="0" err="1">
+                <a:solidFill>
+                  <a:schemeClr val="bg1"/>
+                </a:solidFill>
+              </a:rPr>
+              <a:t>Sed</a:t>
+            </a:r>
+            <a:r>
+              <a:rPr lang="en-US" dirty="0">
+                <a:solidFill>
+                  <a:schemeClr val="bg1"/>
+                </a:solidFill>
+              </a:rPr>
+              <a:t> </a:t>
+            </a:r>
+            <a:r>
+              <a:rPr lang="en-US" dirty="0" err="1">
+                <a:solidFill>
+                  <a:schemeClr val="bg1"/>
+                </a:solidFill>
+              </a:rPr>
+              <a:t>accumsan</a:t>
+            </a:r>
+            <a:r>
+              <a:rPr lang="en-US" dirty="0">
+                <a:solidFill>
+                  <a:schemeClr val="bg1"/>
+                </a:solidFill>
+              </a:rPr>
+              <a:t> vitae </a:t>
+            </a:r>
+            <a:r>
+              <a:rPr lang="en-US" dirty="0" err="1">
+                <a:solidFill>
+                  <a:schemeClr val="bg1"/>
+                </a:solidFill>
+              </a:rPr>
+              <a:t>eros</a:t>
+            </a:r>
+            <a:r>
+              <a:rPr lang="en-US" dirty="0">
+                <a:solidFill>
+                  <a:schemeClr val="bg1"/>
+                </a:solidFill>
+              </a:rPr>
+              <a:t> a </a:t>
+            </a:r>
+            <a:r>
+              <a:rPr lang="en-US" dirty="0" err="1">
+                <a:solidFill>
+                  <a:schemeClr val="bg1"/>
+                </a:solidFill>
+              </a:rPr>
+              <a:t>luctus</a:t>
+            </a:r>
+            <a:r>
+              <a:rPr lang="en-US" dirty="0">
+                <a:solidFill>
+                  <a:schemeClr val="bg1"/>
+                </a:solidFill>
+              </a:rPr>
+              <a:t>. </a:t>
+            </a:r>
+            <a:r>
+              <a:rPr lang="en-US" dirty="0" err="1">
+                <a:solidFill>
+                  <a:schemeClr val="bg1"/>
+                </a:solidFill>
+              </a:rPr>
+              <a:t>Aenean</a:t>
+            </a:r>
+            <a:endParaRPr lang="en-SG" dirty="0">
+              <a:solidFill>
+                <a:schemeClr val="bg1"/>
+              </a:solidFill>
+            </a:endParaRPr>
+          </a:p>
+        </p:txBody>
+      </p:sp>
+      <p:sp>
+        <p:nvSpPr>
+          <p:cNvPr id="6" name="Rectangle 5"/>
+          <p:cNvSpPr/>
+          <p:nvPr/>
+        </p:nvSpPr>
+        <p:spPr>
+          <a:xfrm>
+            <a:off x="4876800" y="1137138"/>
+            <a:ext cx="3657600" cy="914400"/>
+          </a:xfrm>
+          <a:prstGeom prst="rect">
+            <a:avLst/>
+          </a:prstGeom>
+          <a:solidFill>
+            <a:srgbClr val="00B050"/>
+          </a:solidFill>
+          <a:ln>
+            <a:solidFill>
+              <a:srgbClr val="002060"/>
+            </a:solidFill>
+          </a:ln>
+        </p:spPr>
+        <p:style>
+          <a:lnRef idx="2">
+            <a:schemeClr val="accent1">
+              <a:shade val="50000"/>
+            </a:schemeClr>
+          </a:lnRef>
+          <a:fillRef idx="1">
+            <a:schemeClr val="accent1"/>
+          </a:fillRef>
+          <a:effectRef idx="0">
+            <a:schemeClr val="accent1"/>
+          </a:effectRef>
+          <a:fontRef idx="minor">
+            <a:schemeClr val="lt1"/>
+          </a:fontRef>
+        </p:style>
+        <p:txBody>
+          <a:bodyPr rtlCol="0" anchor="ctr"/>
+          <a:lstStyle/>
+          <a:p>
+            <a:r>
+              <a:rPr lang="en-US" dirty="0" err="1">
+                <a:solidFill>
+                  <a:schemeClr val="bg1"/>
+                </a:solidFill>
+              </a:rPr>
+              <a:t>Lorem</a:t>
+            </a:r>
+            <a:r>
+              <a:rPr lang="en-US" dirty="0">
+                <a:solidFill>
+                  <a:schemeClr val="bg1"/>
+                </a:solidFill>
+              </a:rPr>
+              <a:t> </a:t>
+            </a:r>
+            <a:r>
+              <a:rPr lang="en-US" dirty="0" err="1">
+                <a:solidFill>
+                  <a:schemeClr val="bg1"/>
+                </a:solidFill>
+              </a:rPr>
+              <a:t>ipsum</a:t>
+            </a:r>
+            <a:r>
+              <a:rPr lang="en-US" dirty="0">
+                <a:solidFill>
+                  <a:schemeClr val="bg1"/>
+                </a:solidFill>
+              </a:rPr>
+              <a:t> dolor sit </a:t>
+            </a:r>
+            <a:r>
+              <a:rPr lang="en-US" dirty="0" err="1">
+                <a:solidFill>
+                  <a:schemeClr val="bg1"/>
+                </a:solidFill>
+              </a:rPr>
+              <a:t>amet</a:t>
+            </a:r>
+            <a:r>
+              <a:rPr lang="en-US" dirty="0">
+                <a:solidFill>
+                  <a:schemeClr val="bg1"/>
+                </a:solidFill>
+              </a:rPr>
+              <a:t>, </a:t>
+            </a:r>
+            <a:r>
+              <a:rPr lang="en-US" dirty="0" err="1">
+                <a:solidFill>
+                  <a:schemeClr val="bg1"/>
+                </a:solidFill>
+              </a:rPr>
+              <a:t>consectetur</a:t>
+            </a:r>
+            <a:r>
+              <a:rPr lang="en-US" dirty="0">
+                <a:solidFill>
+                  <a:schemeClr val="bg1"/>
+                </a:solidFill>
+              </a:rPr>
+              <a:t> </a:t>
+            </a:r>
+            <a:r>
+              <a:rPr lang="en-US" dirty="0" err="1">
+                <a:solidFill>
+                  <a:schemeClr val="bg1"/>
+                </a:solidFill>
+              </a:rPr>
+              <a:t>adipiscing</a:t>
+            </a:r>
+            <a:r>
+              <a:rPr lang="en-US" dirty="0">
+                <a:solidFill>
+                  <a:schemeClr val="bg1"/>
+                </a:solidFill>
+              </a:rPr>
+              <a:t> </a:t>
+            </a:r>
+            <a:r>
+              <a:rPr lang="en-US" dirty="0" err="1">
+                <a:solidFill>
+                  <a:schemeClr val="bg1"/>
+                </a:solidFill>
+              </a:rPr>
+              <a:t>elit</a:t>
+            </a:r>
+            <a:r>
+              <a:rPr lang="en-US" dirty="0">
+                <a:solidFill>
+                  <a:schemeClr val="bg1"/>
+                </a:solidFill>
+              </a:rPr>
+              <a:t>. </a:t>
+            </a:r>
+            <a:r>
+              <a:rPr lang="en-US" dirty="0" err="1">
+                <a:solidFill>
+                  <a:schemeClr val="bg1"/>
+                </a:solidFill>
+              </a:rPr>
+              <a:t>Sed</a:t>
+            </a:r>
+            <a:r>
+              <a:rPr lang="en-US" dirty="0">
+                <a:solidFill>
+                  <a:schemeClr val="bg1"/>
+                </a:solidFill>
+              </a:rPr>
+              <a:t> </a:t>
+            </a:r>
+            <a:r>
+              <a:rPr lang="en-US" dirty="0" err="1">
+                <a:solidFill>
+                  <a:schemeClr val="bg1"/>
+                </a:solidFill>
+              </a:rPr>
+              <a:t>accumsan</a:t>
+            </a:r>
+            <a:r>
+              <a:rPr lang="en-US" dirty="0">
+                <a:solidFill>
+                  <a:schemeClr val="bg1"/>
+                </a:solidFill>
+              </a:rPr>
+              <a:t> vitae </a:t>
+            </a:r>
+            <a:r>
+              <a:rPr lang="en-US" dirty="0" err="1">
+                <a:solidFill>
+                  <a:schemeClr val="bg1"/>
+                </a:solidFill>
+              </a:rPr>
+              <a:t>eros</a:t>
+            </a:r>
+            <a:r>
+              <a:rPr lang="en-US" dirty="0">
+                <a:solidFill>
+                  <a:schemeClr val="bg1"/>
+                </a:solidFill>
+              </a:rPr>
+              <a:t> a </a:t>
+            </a:r>
+            <a:r>
+              <a:rPr lang="en-US" dirty="0" err="1">
+                <a:solidFill>
+                  <a:schemeClr val="bg1"/>
+                </a:solidFill>
+              </a:rPr>
+              <a:t>luctus</a:t>
+            </a:r>
+            <a:r>
+              <a:rPr lang="en-US" dirty="0">
+                <a:solidFill>
+                  <a:schemeClr val="bg1"/>
+                </a:solidFill>
+              </a:rPr>
+              <a:t>. </a:t>
+            </a:r>
+            <a:r>
+              <a:rPr lang="en-US" dirty="0" err="1">
+                <a:solidFill>
+                  <a:schemeClr val="bg1"/>
+                </a:solidFill>
+              </a:rPr>
+              <a:t>Aenean</a:t>
+            </a:r>
+            <a:endParaRPr lang="en-SG" dirty="0">
+              <a:solidFill>
+                <a:schemeClr val="bg1"/>
+              </a:solidFill>
+            </a:endParaRPr>
+          </a:p>
+        </p:txBody>
+      </p:sp>
+      <p:sp>
+        <p:nvSpPr>
+          <p:cNvPr id="5" name="text 3"/>
+          <p:cNvSpPr txBox="1"/>
+          <p:nvPr/>
+        </p:nvSpPr>
+        <p:spPr>
+          <a:xfrm>
+            <a:off x="430386" y="6043939"/>
+            <a:ext cx="1814920" cy="523220"/>
+          </a:xfrm>
+          <a:prstGeom prst="rect">
+            <a:avLst/>
+          </a:prstGeom>
+          <a:noFill/>
+        </p:spPr>
+        <p:txBody>
+          <a:bodyPr wrap="none" rtlCol="0">
+            <a:spAutoFit/>
+          </a:bodyPr>
+          <a:lstStyle/>
+          <a:p>
+            <a:r>
+              <a:rPr lang="en-US" sz="2800" b="1" dirty="0" smtClean="0">
+                <a:solidFill>
+                  <a:schemeClr val="bg1">
+                    <a:lumMod val="75000"/>
+                  </a:schemeClr>
+                </a:solidFill>
+              </a:rPr>
+              <a:t>Initial slide</a:t>
+            </a:r>
+            <a:endParaRPr lang="en-SG" sz="2800" b="1" dirty="0">
+              <a:solidFill>
+                <a:schemeClr val="bg1">
+                  <a:lumMod val="75000"/>
+                </a:schemeClr>
+              </a:solidFill>
+            </a:endParaRPr>
+          </a:p>
+        </p:txBody>
+      </p:sp>
+    </p:spTree>
+    <p:extLst>
+      <p:ext uri="{BB962C8B-B14F-4D97-AF65-F5344CB8AC3E}">
+        <p14:creationId xmlns:p14="http://schemas.microsoft.com/office/powerpoint/2010/main" val="367874720"/>
+      </p:ext>
+    </p:extLst>
+  </p:cSld>
+  <p:clrMapOvr>
+    <a:masterClrMapping/>
+  </p:clrMapOvr>
+  <p:timing>
+    <p:tnLst>
+      <p:par>
+        <p:cTn id="1" dur="indefinite" restart="never" nodeType="tmRoot"/>
+      </p:par>
+    </p:tnLst>
+  </p:timing>
+</p:sld>
+</file>
+
+<file path=ppt/slides/slide13.xml><?xml version="1.0" encoding="utf-8"?>
+<p:sld xmlns:a="http://schemas.openxmlformats.org/drawingml/2006/main" xmlns:r="http://schemas.openxmlformats.org/officeDocument/2006/relationships" xmlns:p="http://schemas.openxmlformats.org/presentationml/2006/main">
+  <p:cSld name="PPSlideEnd201403260226268020">
+    <p:bg>
+      <p:bgPr>
+        <a:solidFill>
+          <a:schemeClr val="bg1"/>
+        </a:solidFill>
+        <a:effectLst/>
+      </p:bgPr>
+    </p:bg>
+    <p:spTree>
+      <p:nvGrpSpPr>
+        <p:cNvPr id="1" name=""/>
+        <p:cNvGrpSpPr/>
+        <p:nvPr/>
+      </p:nvGrpSpPr>
+      <p:grpSpPr>
+        <a:xfrm>
+          <a:off x="0" y="0"/>
+          <a:ext cx="0" cy="0"/>
+          <a:chOff x="0" y="0"/>
+          <a:chExt cx="0" cy="0"/>
+        </a:xfrm>
+      </p:grpSpPr>
+      <p:sp>
+        <p:nvSpPr>
+          <p:cNvPr id="4" name="Rectangle 3"/>
+          <p:cNvSpPr/>
+          <p:nvPr/>
+        </p:nvSpPr>
+        <p:spPr>
+          <a:xfrm>
+            <a:off x="304800" y="4572000"/>
+            <a:ext cx="5181600" cy="1600200"/>
+          </a:xfrm>
+          <a:prstGeom prst="rect">
+            <a:avLst/>
+          </a:prstGeom>
+        </p:spPr>
+        <p:style>
+          <a:lnRef idx="2">
+            <a:schemeClr val="accent1">
+              <a:shade val="50000"/>
+            </a:schemeClr>
+          </a:lnRef>
+          <a:fillRef idx="1">
+            <a:schemeClr val="accent1"/>
+          </a:fillRef>
+          <a:effectRef idx="0">
+            <a:schemeClr val="accent1"/>
+          </a:effectRef>
+          <a:fontRef idx="minor">
+            <a:schemeClr val="lt1"/>
+          </a:fontRef>
+        </p:style>
+        <p:txBody>
+          <a:bodyPr rtlCol="0" anchor="ctr"/>
+          <a:lstStyle/>
+          <a:p>
+            <a:r>
+              <a:rPr lang="en-US" sz="2400" dirty="0" err="1">
+                <a:solidFill>
+                  <a:schemeClr val="bg1"/>
+                </a:solidFill>
+              </a:rPr>
+              <a:t>Lorem</a:t>
+            </a:r>
+            <a:r>
+              <a:rPr lang="en-US" sz="2400" dirty="0">
+                <a:solidFill>
+                  <a:schemeClr val="bg1"/>
+                </a:solidFill>
+              </a:rPr>
+              <a:t> </a:t>
+            </a:r>
+            <a:r>
+              <a:rPr lang="en-US" sz="2400" dirty="0" err="1">
+                <a:solidFill>
+                  <a:schemeClr val="bg1"/>
+                </a:solidFill>
+              </a:rPr>
+              <a:t>ipsum</a:t>
+            </a:r>
+            <a:r>
+              <a:rPr lang="en-US" sz="2400" dirty="0">
+                <a:solidFill>
+                  <a:schemeClr val="bg1"/>
+                </a:solidFill>
+              </a:rPr>
+              <a:t> dolor sit </a:t>
+            </a:r>
+            <a:r>
+              <a:rPr lang="en-US" sz="2400" dirty="0" err="1">
+                <a:solidFill>
+                  <a:schemeClr val="bg1"/>
+                </a:solidFill>
+              </a:rPr>
+              <a:t>amet</a:t>
+            </a:r>
+            <a:r>
+              <a:rPr lang="en-US" sz="2400" dirty="0">
+                <a:solidFill>
+                  <a:schemeClr val="bg1"/>
+                </a:solidFill>
+              </a:rPr>
+              <a:t>, </a:t>
+            </a:r>
+            <a:r>
+              <a:rPr lang="en-US" sz="2400" dirty="0" err="1">
+                <a:solidFill>
+                  <a:schemeClr val="bg1"/>
+                </a:solidFill>
+              </a:rPr>
+              <a:t>consectetur</a:t>
+            </a:r>
+            <a:r>
+              <a:rPr lang="en-US" sz="2400" dirty="0">
+                <a:solidFill>
+                  <a:schemeClr val="bg1"/>
+                </a:solidFill>
+              </a:rPr>
+              <a:t> </a:t>
+            </a:r>
+            <a:r>
+              <a:rPr lang="en-US" sz="2400" dirty="0" err="1">
+                <a:solidFill>
+                  <a:schemeClr val="bg1"/>
+                </a:solidFill>
+              </a:rPr>
+              <a:t>adipiscing</a:t>
+            </a:r>
+            <a:r>
+              <a:rPr lang="en-US" sz="2400" dirty="0">
+                <a:solidFill>
+                  <a:schemeClr val="bg1"/>
+                </a:solidFill>
+              </a:rPr>
+              <a:t> </a:t>
+            </a:r>
+            <a:r>
+              <a:rPr lang="en-US" sz="2400" dirty="0" err="1">
+                <a:solidFill>
+                  <a:schemeClr val="bg1"/>
+                </a:solidFill>
+              </a:rPr>
+              <a:t>elit</a:t>
+            </a:r>
+            <a:r>
+              <a:rPr lang="en-US" sz="2400" dirty="0">
+                <a:solidFill>
+                  <a:schemeClr val="bg1"/>
+                </a:solidFill>
+              </a:rPr>
+              <a:t>. </a:t>
+            </a:r>
+            <a:r>
+              <a:rPr lang="en-US" sz="2400" dirty="0" err="1">
+                <a:solidFill>
+                  <a:schemeClr val="bg1"/>
+                </a:solidFill>
+              </a:rPr>
+              <a:t>Sed</a:t>
+            </a:r>
+            <a:r>
+              <a:rPr lang="en-US" sz="2400" dirty="0">
+                <a:solidFill>
+                  <a:schemeClr val="bg1"/>
+                </a:solidFill>
+              </a:rPr>
+              <a:t> </a:t>
+            </a:r>
+            <a:r>
+              <a:rPr lang="en-US" sz="2400" dirty="0" err="1">
+                <a:solidFill>
+                  <a:schemeClr val="bg1"/>
+                </a:solidFill>
+              </a:rPr>
+              <a:t>accumsan</a:t>
+            </a:r>
+            <a:r>
+              <a:rPr lang="en-US" sz="2400" dirty="0">
+                <a:solidFill>
+                  <a:schemeClr val="bg1"/>
+                </a:solidFill>
+              </a:rPr>
+              <a:t> vitae </a:t>
+            </a:r>
+            <a:r>
+              <a:rPr lang="en-US" sz="2400" dirty="0" err="1">
+                <a:solidFill>
+                  <a:schemeClr val="bg1"/>
+                </a:solidFill>
+              </a:rPr>
+              <a:t>eros</a:t>
+            </a:r>
+            <a:r>
+              <a:rPr lang="en-US" sz="2400" dirty="0">
+                <a:solidFill>
+                  <a:schemeClr val="bg1"/>
+                </a:solidFill>
+              </a:rPr>
+              <a:t> a </a:t>
+            </a:r>
+            <a:r>
+              <a:rPr lang="en-US" sz="2400" dirty="0" err="1">
+                <a:solidFill>
+                  <a:schemeClr val="bg1"/>
+                </a:solidFill>
+              </a:rPr>
+              <a:t>luctus</a:t>
+            </a:r>
+            <a:r>
+              <a:rPr lang="en-US" sz="2400" dirty="0">
+                <a:solidFill>
+                  <a:schemeClr val="bg1"/>
+                </a:solidFill>
+              </a:rPr>
+              <a:t>. </a:t>
+            </a:r>
+            <a:r>
+              <a:rPr lang="en-US" sz="2400" dirty="0" err="1">
+                <a:solidFill>
+                  <a:schemeClr val="bg1"/>
+                </a:solidFill>
+              </a:rPr>
+              <a:t>Aenean</a:t>
+            </a:r>
+            <a:endParaRPr lang="en-SG" sz="2400" dirty="0">
+              <a:solidFill>
+                <a:schemeClr val="bg1"/>
+              </a:solidFill>
+            </a:endParaRPr>
+          </a:p>
+        </p:txBody>
+      </p:sp>
+      <p:sp>
+        <p:nvSpPr>
+          <p:cNvPr id="3" name="Rectangle 5"/>
+          <p:cNvSpPr/>
+          <p:nvPr/>
+        </p:nvSpPr>
+        <p:spPr>
+          <a:xfrm>
+            <a:off x="5638800" y="5334000"/>
+            <a:ext cx="2514600" cy="838200"/>
+          </a:xfrm>
+          <a:prstGeom prst="rect">
+            <a:avLst/>
+          </a:prstGeom>
+          <a:solidFill>
+            <a:srgbClr val="00B050"/>
+          </a:solidFill>
+          <a:ln>
+            <a:solidFill>
+              <a:srgbClr val="002060"/>
+            </a:solidFill>
+          </a:ln>
+        </p:spPr>
+        <p:style>
+          <a:lnRef idx="2">
+            <a:schemeClr val="accent1">
+              <a:shade val="50000"/>
+            </a:schemeClr>
+          </a:lnRef>
+          <a:fillRef idx="1">
+            <a:schemeClr val="accent1"/>
+          </a:fillRef>
+          <a:effectRef idx="0">
+            <a:schemeClr val="accent1"/>
+          </a:effectRef>
+          <a:fontRef idx="minor">
+            <a:schemeClr val="lt1"/>
+          </a:fontRef>
+        </p:style>
+        <p:txBody>
+          <a:bodyPr rtlCol="0" anchor="ctr"/>
+          <a:lstStyle/>
+          <a:p>
+            <a:r>
+              <a:rPr lang="en-US" sz="1200" dirty="0" err="1">
+                <a:solidFill>
+                  <a:schemeClr val="bg1"/>
+                </a:solidFill>
+              </a:rPr>
+              <a:t>Lorem</a:t>
+            </a:r>
+            <a:r>
+              <a:rPr lang="en-US" sz="1200" dirty="0">
+                <a:solidFill>
+                  <a:schemeClr val="bg1"/>
+                </a:solidFill>
+              </a:rPr>
+              <a:t> </a:t>
+            </a:r>
+            <a:r>
+              <a:rPr lang="en-US" sz="1200" dirty="0" err="1">
+                <a:solidFill>
+                  <a:schemeClr val="bg1"/>
+                </a:solidFill>
+              </a:rPr>
+              <a:t>ipsum</a:t>
+            </a:r>
+            <a:r>
+              <a:rPr lang="en-US" sz="1200" dirty="0">
+                <a:solidFill>
+                  <a:schemeClr val="bg1"/>
+                </a:solidFill>
+              </a:rPr>
+              <a:t> dolor sit </a:t>
+            </a:r>
+            <a:r>
+              <a:rPr lang="en-US" sz="1200" dirty="0" err="1">
+                <a:solidFill>
+                  <a:schemeClr val="bg1"/>
+                </a:solidFill>
+              </a:rPr>
+              <a:t>amet</a:t>
+            </a:r>
+            <a:r>
+              <a:rPr lang="en-US" sz="1200" dirty="0">
+                <a:solidFill>
+                  <a:schemeClr val="bg1"/>
+                </a:solidFill>
+              </a:rPr>
+              <a:t>, </a:t>
+            </a:r>
+            <a:r>
+              <a:rPr lang="en-US" sz="1200" dirty="0" err="1">
+                <a:solidFill>
+                  <a:schemeClr val="bg1"/>
+                </a:solidFill>
+              </a:rPr>
+              <a:t>consectetur</a:t>
+            </a:r>
+            <a:r>
+              <a:rPr lang="en-US" sz="1200" dirty="0">
+                <a:solidFill>
+                  <a:schemeClr val="bg1"/>
+                </a:solidFill>
+              </a:rPr>
+              <a:t> </a:t>
+            </a:r>
+            <a:r>
+              <a:rPr lang="en-US" sz="1200" dirty="0" err="1">
+                <a:solidFill>
+                  <a:schemeClr val="bg1"/>
+                </a:solidFill>
+              </a:rPr>
+              <a:t>adipiscing</a:t>
+            </a:r>
+            <a:r>
+              <a:rPr lang="en-US" sz="1200" dirty="0">
+                <a:solidFill>
+                  <a:schemeClr val="bg1"/>
+                </a:solidFill>
+              </a:rPr>
+              <a:t> </a:t>
+            </a:r>
+            <a:r>
+              <a:rPr lang="en-US" sz="1200" dirty="0" err="1">
+                <a:solidFill>
+                  <a:schemeClr val="bg1"/>
+                </a:solidFill>
+              </a:rPr>
+              <a:t>elit</a:t>
+            </a:r>
+            <a:r>
+              <a:rPr lang="en-US" sz="1200" dirty="0">
+                <a:solidFill>
+                  <a:schemeClr val="bg1"/>
+                </a:solidFill>
+              </a:rPr>
+              <a:t>. </a:t>
+            </a:r>
+            <a:r>
+              <a:rPr lang="en-US" sz="1200" dirty="0" err="1">
+                <a:solidFill>
+                  <a:schemeClr val="bg1"/>
+                </a:solidFill>
+              </a:rPr>
+              <a:t>Sed</a:t>
+            </a:r>
+            <a:r>
+              <a:rPr lang="en-US" sz="1200" dirty="0">
+                <a:solidFill>
+                  <a:schemeClr val="bg1"/>
+                </a:solidFill>
+              </a:rPr>
+              <a:t> </a:t>
+            </a:r>
+            <a:r>
+              <a:rPr lang="en-US" sz="1200" dirty="0" err="1">
+                <a:solidFill>
+                  <a:schemeClr val="bg1"/>
+                </a:solidFill>
+              </a:rPr>
+              <a:t>accumsan</a:t>
+            </a:r>
+            <a:r>
+              <a:rPr lang="en-US" sz="1200" dirty="0">
+                <a:solidFill>
+                  <a:schemeClr val="bg1"/>
+                </a:solidFill>
+              </a:rPr>
+              <a:t> vitae </a:t>
+            </a:r>
+            <a:r>
+              <a:rPr lang="en-US" sz="1200" dirty="0" err="1">
+                <a:solidFill>
+                  <a:schemeClr val="bg1"/>
+                </a:solidFill>
+              </a:rPr>
+              <a:t>eros</a:t>
+            </a:r>
+            <a:r>
+              <a:rPr lang="en-US" sz="1200" dirty="0">
+                <a:solidFill>
+                  <a:schemeClr val="bg1"/>
+                </a:solidFill>
+              </a:rPr>
+              <a:t> a </a:t>
+            </a:r>
+            <a:r>
+              <a:rPr lang="en-US" sz="1200" dirty="0" err="1">
+                <a:solidFill>
+                  <a:schemeClr val="bg1"/>
+                </a:solidFill>
+              </a:rPr>
+              <a:t>luctus</a:t>
+            </a:r>
+            <a:r>
+              <a:rPr lang="en-US" sz="1200" dirty="0">
+                <a:solidFill>
+                  <a:schemeClr val="bg1"/>
+                </a:solidFill>
+              </a:rPr>
+              <a:t>. </a:t>
+            </a:r>
+            <a:r>
+              <a:rPr lang="en-US" sz="1200" dirty="0" err="1">
+                <a:solidFill>
+                  <a:schemeClr val="bg1"/>
+                </a:solidFill>
+              </a:rPr>
+              <a:t>Aenean</a:t>
+            </a:r>
+            <a:endParaRPr lang="en-SG" sz="1200" dirty="0">
+              <a:solidFill>
+                <a:schemeClr val="bg1"/>
+              </a:solidFill>
+            </a:endParaRPr>
+          </a:p>
+        </p:txBody>
+      </p:sp>
+      <p:sp>
+        <p:nvSpPr>
+          <p:cNvPr id="5" name="text 4"/>
+          <p:cNvSpPr txBox="1"/>
+          <p:nvPr/>
+        </p:nvSpPr>
+        <p:spPr>
+          <a:xfrm>
+            <a:off x="430386" y="6043939"/>
+            <a:ext cx="1518364" cy="523220"/>
+          </a:xfrm>
+          <a:prstGeom prst="rect">
+            <a:avLst/>
+          </a:prstGeom>
+          <a:noFill/>
+        </p:spPr>
+        <p:txBody>
+          <a:bodyPr wrap="none" rtlCol="0">
+            <a:spAutoFit/>
+          </a:bodyPr>
+          <a:lstStyle/>
+          <a:p>
+            <a:r>
+              <a:rPr lang="en-US" sz="2800" b="1" dirty="0" smtClean="0">
+                <a:solidFill>
+                  <a:schemeClr val="bg1">
+                    <a:lumMod val="75000"/>
+                  </a:schemeClr>
+                </a:solidFill>
+              </a:rPr>
+              <a:t>End slide</a:t>
+            </a:r>
+            <a:endParaRPr lang="en-SG" sz="2800" b="1" dirty="0">
+              <a:solidFill>
+                <a:schemeClr val="bg1">
+                  <a:lumMod val="75000"/>
+                </a:schemeClr>
+              </a:solidFill>
+            </a:endParaRPr>
+          </a:p>
+        </p:txBody>
+      </p:sp>
+    </p:spTree>
+    <p:extLst>
+      <p:ext uri="{BB962C8B-B14F-4D97-AF65-F5344CB8AC3E}">
+        <p14:creationId xmlns:p14="http://schemas.microsoft.com/office/powerpoint/2010/main" val="1777491528"/>
+      </p:ext>
+    </p:extLst>
+  </p:cSld>
+  <p:clrMapOvr>
+    <a:masterClrMapping/>
+  </p:clrMapOvr>
+  <mc:AlternateContent xmlns:mc="http://schemas.openxmlformats.org/markup-compatibility/2006" xmlns:p14="http://schemas.microsoft.com/office/powerpoint/2010/main">
+    <mc:Choice Requires="p14">
+      <p:transition spd="slow" p14:dur="2000"/>
+    </mc:Choice>
+    <mc:Fallback xmlns="">
+      <p:transition spd="slow"/>
+    </mc:Fallback>
+  </mc:AlternateContent>
+  <p:timing>
+    <p:tnLst>
+      <p:par>
+        <p:cTn id="1" dur="indefinite" restart="never" nodeType="tmRoot"/>
+      </p:par>
+    </p:tnLst>
+  </p:timing>
+</p:sld>
+</file>
+
+<file path=ppt/slides/slide14.xml><?xml version="1.0" encoding="utf-8"?>
+<p:sld xmlns:a="http://schemas.openxmlformats.org/drawingml/2006/main" xmlns:r="http://schemas.openxmlformats.org/officeDocument/2006/relationships" xmlns:p="http://schemas.openxmlformats.org/presentationml/2006/main">
   <p:cSld name="PPSlideAnimated201403260226267770">
     <p:bg>
       <p:bgPr>
@@ -15575,11 +17124,11 @@
   <p:clrMapOvr>
     <a:masterClrMapping/>
   </p:clrMapOvr>
-  <mc:AlternateContent xmlns:mc="http://schemas.openxmlformats.org/markup-compatibility/2006">
-    <mc:Choice xmlns:p14="http://schemas.microsoft.com/office/powerpoint/2010/main" Requires="p14">
+  <mc:AlternateContent xmlns:mc="http://schemas.openxmlformats.org/markup-compatibility/2006" xmlns:p14="http://schemas.microsoft.com/office/powerpoint/2010/main">
+    <mc:Choice Requires="p14">
       <p:transition spd="slow" p14:dur="2000" advClick="0" advTm="0"/>
     </mc:Choice>
-    <mc:Fallback>
+    <mc:Fallback xmlns="">
       <p:transition spd="slow" advClick="0" advTm="0"/>
     </mc:Fallback>
   </mc:AlternateContent>
@@ -17073,7 +18622,7 @@
 </p:sld>
 </file>
 
-<file path=ppt/slides/slide11.xml><?xml version="1.0" encoding="utf-8"?>
+<file path=ppt/slides/slide15.xml><?xml version="1.0" encoding="utf-8"?>
 <p:sld xmlns:a="http://schemas.openxmlformats.org/drawingml/2006/main" xmlns:r="http://schemas.openxmlformats.org/officeDocument/2006/relationships" xmlns:p="http://schemas.openxmlformats.org/presentationml/2006/main">
   <p:cSld>
     <p:spTree>
@@ -17133,7 +18682,7 @@
 </p:sld>
 </file>
 
-<file path=ppt/slides/slide12.xml><?xml version="1.0" encoding="utf-8"?>
+<file path=ppt/slides/slide16.xml><?xml version="1.0" encoding="utf-8"?>
 <p:sld xmlns:a="http://schemas.openxmlformats.org/drawingml/2006/main" xmlns:r="http://schemas.openxmlformats.org/officeDocument/2006/relationships" xmlns:p="http://schemas.openxmlformats.org/presentationml/2006/main">
   <p:cSld name="PPSlideStart201403260226551476">
     <p:bg>
@@ -18145,13 +19694,13 @@
   <p:clrMapOvr>
     <a:masterClrMapping/>
   </p:clrMapOvr>
-  <mc:AlternateContent xmlns:mc="http://schemas.openxmlformats.org/markup-compatibility/2006">
-    <mc:Choice xmlns:p14="http://schemas.microsoft.com/office/powerpoint/2010/main" Requires="p14">
+  <mc:AlternateContent xmlns:mc="http://schemas.openxmlformats.org/markup-compatibility/2006" xmlns:p14="http://schemas.microsoft.com/office/powerpoint/2010/main">
+    <mc:Choice Requires="p14">
       <p:transition spd="med" p14:dur="700">
         <p:fade/>
       </p:transition>
     </mc:Choice>
-    <mc:Fallback>
+    <mc:Fallback xmlns="">
       <p:transition spd="med">
         <p:fade/>
       </p:transition>
@@ -18167,7 +19716,7 @@
 </p:sld>
 </file>
 
-<file path=ppt/slides/slide13.xml><?xml version="1.0" encoding="utf-8"?>
+<file path=ppt/slides/slide17.xml><?xml version="1.0" encoding="utf-8"?>
 <p:sld xmlns:a="http://schemas.openxmlformats.org/drawingml/2006/main" xmlns:r="http://schemas.openxmlformats.org/officeDocument/2006/relationships" xmlns:p="http://schemas.openxmlformats.org/presentationml/2006/main">
   <p:cSld name="PPSlideEnd201403260226551666">
     <p:bg>
@@ -18417,7 +19966,7 @@
 </p:sld>
 </file>
 
-<file path=ppt/slides/slide14.xml><?xml version="1.0" encoding="utf-8"?>
+<file path=ppt/slides/slide18.xml><?xml version="1.0" encoding="utf-8"?>
 <p:sld xmlns:a="http://schemas.openxmlformats.org/drawingml/2006/main" xmlns:r="http://schemas.openxmlformats.org/officeDocument/2006/relationships" xmlns:p="http://schemas.openxmlformats.org/presentationml/2006/main">
   <p:cSld name="PPSlideAnimated201403260226551476">
     <p:bg>
@@ -19461,11 +21010,11 @@
   <p:clrMapOvr>
     <a:masterClrMapping/>
   </p:clrMapOvr>
-  <mc:AlternateContent xmlns:mc="http://schemas.openxmlformats.org/markup-compatibility/2006">
-    <mc:Choice xmlns:p14="http://schemas.microsoft.com/office/powerpoint/2010/main" Requires="p14">
+  <mc:AlternateContent xmlns:mc="http://schemas.openxmlformats.org/markup-compatibility/2006" xmlns:p14="http://schemas.microsoft.com/office/powerpoint/2010/main">
+    <mc:Choice Requires="p14">
       <p:transition spd="med" p14:dur="700" advClick="0" advTm="0"/>
     </mc:Choice>
-    <mc:Fallback>
+    <mc:Fallback xmlns="">
       <p:transition spd="med" advClick="0" advTm="0"/>
     </mc:Fallback>
   </mc:AlternateContent>
@@ -19986,7 +21535,7 @@
 </p:sld>
 </file>
 
-<file path=ppt/slides/slide15.xml><?xml version="1.0" encoding="utf-8"?>
+<file path=ppt/slides/slide19.xml><?xml version="1.0" encoding="utf-8"?>
 <p:sld xmlns:a="http://schemas.openxmlformats.org/drawingml/2006/main" xmlns:r="http://schemas.openxmlformats.org/officeDocument/2006/relationships" xmlns:p="http://schemas.openxmlformats.org/presentationml/2006/main">
   <p:cSld>
     <p:spTree>
@@ -20050,7 +21599,276 @@
 </p:sld>
 </file>
 
-<file path=ppt/slides/slide16.xml><?xml version="1.0" encoding="utf-8"?>
+<file path=ppt/slides/slide2.xml><?xml version="1.0" encoding="utf-8"?>
+<p:sld xmlns:a="http://schemas.openxmlformats.org/drawingml/2006/main" xmlns:r="http://schemas.openxmlformats.org/officeDocument/2006/relationships" xmlns:p="http://schemas.openxmlformats.org/presentationml/2006/main">
+  <p:cSld>
+    <p:bg>
+      <p:bgPr>
+        <a:solidFill>
+          <a:schemeClr val="accent6">
+            <a:lumMod val="75000"/>
+          </a:schemeClr>
+        </a:solidFill>
+        <a:effectLst/>
+      </p:bgPr>
+    </p:bg>
+    <p:spTree>
+      <p:nvGrpSpPr>
+        <p:cNvPr id="1" name=""/>
+        <p:cNvGrpSpPr/>
+        <p:nvPr/>
+      </p:nvGrpSpPr>
+      <p:grpSpPr>
+        <a:xfrm>
+          <a:off x="0" y="0"/>
+          <a:ext cx="0" cy="0"/>
+          <a:chOff x="0" y="0"/>
+          <a:chExt cx="0" cy="0"/>
+        </a:xfrm>
+      </p:grpSpPr>
+      <p:sp>
+        <p:nvSpPr>
+          <p:cNvPr id="2" name="Title 1"/>
+          <p:cNvSpPr>
+            <a:spLocks noGrp="1"/>
+          </p:cNvSpPr>
+          <p:nvPr>
+            <p:ph type="title"/>
+          </p:nvPr>
+        </p:nvSpPr>
+        <p:spPr>
+          <a:xfrm>
+            <a:off x="381000" y="609600"/>
+            <a:ext cx="8229600" cy="1143000"/>
+          </a:xfrm>
+        </p:spPr>
+        <p:txBody>
+          <a:bodyPr>
+            <a:noAutofit/>
+          </a:bodyPr>
+          <a:lstStyle/>
+          <a:p>
+            <a:pPr algn="l"/>
+            <a:r>
+              <a:rPr lang="en-US" sz="7200" dirty="0" smtClean="0">
+                <a:solidFill>
+                  <a:schemeClr val="bg1"/>
+                </a:solidFill>
+              </a:rPr>
+              <a:t>Auto Animate</a:t>
+            </a:r>
+            <a:endParaRPr lang="en-SG" sz="7200" dirty="0">
+              <a:solidFill>
+                <a:schemeClr val="bg1"/>
+              </a:solidFill>
+            </a:endParaRPr>
+          </a:p>
+        </p:txBody>
+      </p:sp>
+      <p:sp>
+        <p:nvSpPr>
+          <p:cNvPr id="3" name="text 5"/>
+          <p:cNvSpPr txBox="1"/>
+          <p:nvPr/>
+        </p:nvSpPr>
+        <p:spPr>
+          <a:xfrm>
+            <a:off x="542636" y="2819400"/>
+            <a:ext cx="7620000" cy="3785652"/>
+          </a:xfrm>
+          <a:prstGeom prst="rect">
+            <a:avLst/>
+          </a:prstGeom>
+          <a:noFill/>
+        </p:spPr>
+        <p:txBody>
+          <a:bodyPr wrap="square" rtlCol="0">
+            <a:spAutoFit/>
+          </a:bodyPr>
+          <a:lstStyle/>
+          <a:p>
+            <a:r>
+              <a:rPr lang="en-US" sz="2400" b="1" dirty="0" smtClean="0">
+                <a:solidFill>
+                  <a:schemeClr val="bg1"/>
+                </a:solidFill>
+              </a:rPr>
+              <a:t>Additional instructions:</a:t>
+            </a:r>
+          </a:p>
+          <a:p>
+            <a:pPr marL="285750" indent="-285750">
+              <a:buFont typeface="Arial" panose="020B0604020202020204" pitchFamily="34" charset="0"/>
+              <a:buChar char="•"/>
+            </a:pPr>
+            <a:r>
+              <a:rPr lang="en-US" sz="2400" dirty="0" smtClean="0">
+                <a:solidFill>
+                  <a:schemeClr val="bg1"/>
+                </a:solidFill>
+              </a:rPr>
+              <a:t>Select the </a:t>
+            </a:r>
+            <a:r>
+              <a:rPr lang="en-US" sz="2400" b="1" dirty="0" smtClean="0">
+                <a:solidFill>
+                  <a:schemeClr val="bg1"/>
+                </a:solidFill>
+              </a:rPr>
+              <a:t>initial slide.</a:t>
+            </a:r>
+            <a:endParaRPr lang="en-US" sz="2400" dirty="0" smtClean="0">
+              <a:solidFill>
+                <a:schemeClr val="bg1"/>
+              </a:solidFill>
+            </a:endParaRPr>
+          </a:p>
+          <a:p>
+            <a:pPr marL="285750" indent="-285750">
+              <a:buFont typeface="Arial" panose="020B0604020202020204" pitchFamily="34" charset="0"/>
+              <a:buChar char="•"/>
+            </a:pPr>
+            <a:r>
+              <a:rPr lang="en-US" sz="2400" dirty="0" smtClean="0">
+                <a:solidFill>
+                  <a:schemeClr val="bg1"/>
+                </a:solidFill>
+              </a:rPr>
+              <a:t>Click </a:t>
+            </a:r>
+            <a:r>
+              <a:rPr lang="en-US" sz="2400" b="1" dirty="0" smtClean="0">
+                <a:solidFill>
+                  <a:schemeClr val="bg1"/>
+                </a:solidFill>
+              </a:rPr>
+              <a:t>“Add Animation Slide”</a:t>
+            </a:r>
+            <a:r>
+              <a:rPr lang="en-US" sz="2400" dirty="0" smtClean="0">
+                <a:solidFill>
+                  <a:schemeClr val="bg1"/>
+                </a:solidFill>
+              </a:rPr>
+              <a:t> button in the ribbon or right click the initial slide and then select </a:t>
+            </a:r>
+            <a:r>
+              <a:rPr lang="en-US" sz="2400" b="1" dirty="0" smtClean="0">
+                <a:solidFill>
+                  <a:schemeClr val="bg1"/>
+                </a:solidFill>
+              </a:rPr>
+              <a:t>“Add Animation Slide” </a:t>
+            </a:r>
+            <a:r>
+              <a:rPr lang="en-US" sz="2400" dirty="0" smtClean="0">
+                <a:solidFill>
+                  <a:schemeClr val="bg1"/>
+                </a:solidFill>
+              </a:rPr>
+              <a:t>in the context menu. </a:t>
+            </a:r>
+          </a:p>
+          <a:p>
+            <a:pPr marL="285750" indent="-285750">
+              <a:buFont typeface="Arial" panose="020B0604020202020204" pitchFamily="34" charset="0"/>
+              <a:buChar char="•"/>
+            </a:pPr>
+            <a:r>
+              <a:rPr lang="en-US" sz="2400" dirty="0" smtClean="0">
+                <a:solidFill>
+                  <a:schemeClr val="bg1"/>
+                </a:solidFill>
+              </a:rPr>
+              <a:t>Compare the result with the expected output.</a:t>
+            </a:r>
+          </a:p>
+          <a:p>
+            <a:pPr marL="285750" indent="-285750">
+              <a:buFont typeface="Arial" panose="020B0604020202020204" pitchFamily="34" charset="0"/>
+              <a:buChar char="•"/>
+            </a:pPr>
+            <a:r>
+              <a:rPr lang="en-SG" sz="2400" dirty="0">
+                <a:solidFill>
+                  <a:schemeClr val="bg1"/>
+                </a:solidFill>
+              </a:rPr>
+              <a:t>Also try tweaking these:</a:t>
+            </a:r>
+          </a:p>
+          <a:p>
+            <a:pPr marL="742950" lvl="1" indent="-285750">
+              <a:buFont typeface="Arial" panose="020B0604020202020204" pitchFamily="34" charset="0"/>
+              <a:buChar char="•"/>
+            </a:pPr>
+            <a:r>
+              <a:rPr lang="en-SG" sz="2400" dirty="0" smtClean="0">
+                <a:solidFill>
+                  <a:schemeClr val="bg1"/>
+                </a:solidFill>
+              </a:rPr>
+              <a:t>Animation Duration</a:t>
+            </a:r>
+            <a:endParaRPr lang="en-SG" sz="2400" dirty="0">
+              <a:solidFill>
+                <a:schemeClr val="bg1"/>
+              </a:solidFill>
+            </a:endParaRPr>
+          </a:p>
+          <a:p>
+            <a:pPr marL="742950" lvl="1" indent="-285750">
+              <a:buFont typeface="Arial" panose="020B0604020202020204" pitchFamily="34" charset="0"/>
+              <a:buChar char="•"/>
+            </a:pPr>
+            <a:r>
+              <a:rPr lang="en-SG" sz="2400" dirty="0" smtClean="0">
+                <a:solidFill>
+                  <a:schemeClr val="bg1"/>
+                </a:solidFill>
+              </a:rPr>
+              <a:t>Use Smoother Animation</a:t>
+            </a:r>
+            <a:endParaRPr lang="en-SG" sz="2400" dirty="0">
+              <a:solidFill>
+                <a:schemeClr val="bg1"/>
+              </a:solidFill>
+            </a:endParaRPr>
+          </a:p>
+          <a:p>
+            <a:pPr marL="285750" indent="-285750">
+              <a:buFont typeface="Arial" panose="020B0604020202020204" pitchFamily="34" charset="0"/>
+              <a:buChar char="•"/>
+            </a:pPr>
+            <a:endParaRPr lang="en-SG" sz="2400" dirty="0">
+              <a:solidFill>
+                <a:schemeClr val="bg1"/>
+              </a:solidFill>
+            </a:endParaRPr>
+          </a:p>
+        </p:txBody>
+      </p:sp>
+    </p:spTree>
+    <p:extLst>
+      <p:ext uri="{BB962C8B-B14F-4D97-AF65-F5344CB8AC3E}">
+        <p14:creationId xmlns:p14="http://schemas.microsoft.com/office/powerpoint/2010/main" val="1569131388"/>
+      </p:ext>
+    </p:extLst>
+  </p:cSld>
+  <p:clrMapOvr>
+    <a:masterClrMapping/>
+  </p:clrMapOvr>
+  <p:timing>
+    <p:tnLst>
+      <p:par>
+        <p:cTn id="1" dur="indefinite" restart="never" nodeType="tmRoot"/>
+      </p:par>
+    </p:tnLst>
+  </p:timing>
+</p:sld>
+</file>
+
+<file path=ppt/slides/slide20.xml><?xml version="1.0" encoding="utf-8"?>
 <p:sld xmlns:a="http://schemas.openxmlformats.org/drawingml/2006/main" xmlns:r="http://schemas.openxmlformats.org/officeDocument/2006/relationships" xmlns:p="http://schemas.openxmlformats.org/presentationml/2006/main">
   <p:cSld name="PPSlideStart201403260241445275">
     <p:bg>
@@ -21062,13 +22880,13 @@
   <p:clrMapOvr>
     <a:masterClrMapping/>
   </p:clrMapOvr>
-  <mc:AlternateContent xmlns:mc="http://schemas.openxmlformats.org/markup-compatibility/2006">
-    <mc:Choice xmlns:p14="http://schemas.microsoft.com/office/powerpoint/2010/main" Requires="p14">
+  <mc:AlternateContent xmlns:mc="http://schemas.openxmlformats.org/markup-compatibility/2006" xmlns:p14="http://schemas.microsoft.com/office/powerpoint/2010/main">
+    <mc:Choice Requires="p14">
       <p:transition spd="med" p14:dur="700">
         <p:fade/>
       </p:transition>
     </mc:Choice>
-    <mc:Fallback>
+    <mc:Fallback xmlns="">
       <p:transition spd="med">
         <p:fade/>
       </p:transition>
@@ -21084,7 +22902,7 @@
 </p:sld>
 </file>
 
-<file path=ppt/slides/slide17.xml><?xml version="1.0" encoding="utf-8"?>
+<file path=ppt/slides/slide21.xml><?xml version="1.0" encoding="utf-8"?>
 <p:sld xmlns:a="http://schemas.openxmlformats.org/drawingml/2006/main" xmlns:r="http://schemas.openxmlformats.org/officeDocument/2006/relationships" xmlns:p="http://schemas.openxmlformats.org/presentationml/2006/main">
   <p:cSld name="PPSlideEnd201403260241445455">
     <p:bg>
@@ -22096,11 +23914,11 @@
   <p:clrMapOvr>
     <a:masterClrMapping/>
   </p:clrMapOvr>
-  <mc:AlternateContent xmlns:mc="http://schemas.openxmlformats.org/markup-compatibility/2006">
-    <mc:Choice xmlns:p14="http://schemas.microsoft.com/office/powerpoint/2010/main" Requires="p14">
+  <mc:AlternateContent xmlns:mc="http://schemas.openxmlformats.org/markup-compatibility/2006" xmlns:p14="http://schemas.microsoft.com/office/powerpoint/2010/main">
+    <mc:Choice Requires="p14">
       <p:transition p14:dur="0"/>
     </mc:Choice>
-    <mc:Fallback>
+    <mc:Fallback xmlns="">
       <p:transition/>
     </mc:Fallback>
   </mc:AlternateContent>
@@ -22114,7 +23932,7 @@
 </p:sld>
 </file>
 
-<file path=ppt/slides/slide18.xml><?xml version="1.0" encoding="utf-8"?>
+<file path=ppt/slides/slide22.xml><?xml version="1.0" encoding="utf-8"?>
 <p:sld xmlns:a="http://schemas.openxmlformats.org/drawingml/2006/main" xmlns:r="http://schemas.openxmlformats.org/officeDocument/2006/relationships" xmlns:p="http://schemas.openxmlformats.org/presentationml/2006/main">
   <p:cSld name="PPSlideAnimated201403260241445275">
     <p:bg>
@@ -23158,11 +24976,11 @@
   <p:clrMapOvr>
     <a:masterClrMapping/>
   </p:clrMapOvr>
-  <mc:AlternateContent xmlns:mc="http://schemas.openxmlformats.org/markup-compatibility/2006">
-    <mc:Choice xmlns:p14="http://schemas.microsoft.com/office/powerpoint/2010/main" Requires="p14">
+  <mc:AlternateContent xmlns:mc="http://schemas.openxmlformats.org/markup-compatibility/2006" xmlns:p14="http://schemas.microsoft.com/office/powerpoint/2010/main">
+    <mc:Choice Requires="p14">
       <p:transition spd="med" p14:dur="700" advClick="0" advTm="0"/>
     </mc:Choice>
-    <mc:Fallback>
+    <mc:Fallback xmlns="">
       <p:transition spd="med" advClick="0" advTm="0"/>
     </mc:Fallback>
   </mc:AlternateContent>
@@ -23351,7 +25169,7 @@
 </p:sld>
 </file>
 
-<file path=ppt/slides/slide19.xml><?xml version="1.0" encoding="utf-8"?>
+<file path=ppt/slides/slide23.xml><?xml version="1.0" encoding="utf-8"?>
 <p:sld xmlns:a="http://schemas.openxmlformats.org/drawingml/2006/main" xmlns:r="http://schemas.openxmlformats.org/officeDocument/2006/relationships" xmlns:p="http://schemas.openxmlformats.org/presentationml/2006/main" show="0">
   <p:cSld name="PPAck201403240026082737">
     <p:spTree>
@@ -23444,307 +25262,6 @@
 </p:sld>
 </file>
 
-<file path=ppt/slides/slide2.xml><?xml version="1.0" encoding="utf-8"?>
-<p:sld xmlns:a="http://schemas.openxmlformats.org/drawingml/2006/main" xmlns:r="http://schemas.openxmlformats.org/officeDocument/2006/relationships" xmlns:p="http://schemas.openxmlformats.org/presentationml/2006/main">
-  <p:cSld>
-    <p:bg>
-      <p:bgPr>
-        <a:solidFill>
-          <a:schemeClr val="accent6">
-            <a:lumMod val="75000"/>
-          </a:schemeClr>
-        </a:solidFill>
-        <a:effectLst/>
-      </p:bgPr>
-    </p:bg>
-    <p:spTree>
-      <p:nvGrpSpPr>
-        <p:cNvPr id="1" name=""/>
-        <p:cNvGrpSpPr/>
-        <p:nvPr/>
-      </p:nvGrpSpPr>
-      <p:grpSpPr>
-        <a:xfrm>
-          <a:off x="0" y="0"/>
-          <a:ext cx="0" cy="0"/>
-          <a:chOff x="0" y="0"/>
-          <a:chExt cx="0" cy="0"/>
-        </a:xfrm>
-      </p:grpSpPr>
-      <p:sp>
-        <p:nvSpPr>
-          <p:cNvPr id="2" name="Title 1"/>
-          <p:cNvSpPr>
-            <a:spLocks noGrp="1"/>
-          </p:cNvSpPr>
-          <p:nvPr>
-            <p:ph type="title"/>
-          </p:nvPr>
-        </p:nvSpPr>
-        <p:spPr>
-          <a:xfrm>
-            <a:off x="381000" y="609600"/>
-            <a:ext cx="8229600" cy="1143000"/>
-          </a:xfrm>
-        </p:spPr>
-        <p:txBody>
-          <a:bodyPr>
-            <a:noAutofit/>
-          </a:bodyPr>
-          <a:lstStyle/>
-          <a:p>
-            <a:pPr algn="l"/>
-            <a:r>
-              <a:rPr lang="en-US" sz="7200" dirty="0" smtClean="0">
-                <a:solidFill>
-                  <a:schemeClr val="bg1"/>
-                </a:solidFill>
-              </a:rPr>
-              <a:t>Auto Animate</a:t>
-            </a:r>
-            <a:endParaRPr lang="en-SG" sz="7200" dirty="0">
-              <a:solidFill>
-                <a:schemeClr val="bg1"/>
-              </a:solidFill>
-            </a:endParaRPr>
-          </a:p>
-        </p:txBody>
-      </p:sp>
-      <p:sp>
-        <p:nvSpPr>
-          <p:cNvPr id="3" name="text 5"/>
-          <p:cNvSpPr txBox="1"/>
-          <p:nvPr/>
-        </p:nvSpPr>
-        <p:spPr>
-          <a:xfrm>
-            <a:off x="542636" y="2819400"/>
-            <a:ext cx="7620000" cy="3785652"/>
-          </a:xfrm>
-          <a:prstGeom prst="rect">
-            <a:avLst/>
-          </a:prstGeom>
-          <a:noFill/>
-        </p:spPr>
-        <p:txBody>
-          <a:bodyPr wrap="square" rtlCol="0">
-            <a:spAutoFit/>
-          </a:bodyPr>
-          <a:lstStyle/>
-          <a:p>
-            <a:r>
-              <a:rPr lang="en-US" sz="2400" b="1" dirty="0" smtClean="0">
-                <a:solidFill>
-                  <a:schemeClr val="bg1"/>
-                </a:solidFill>
-              </a:rPr>
-              <a:t>Additional instructions:</a:t>
-            </a:r>
-          </a:p>
-          <a:p>
-            <a:pPr marL="285750" indent="-285750">
-              <a:buFont typeface="Arial" panose="020B0604020202020204" pitchFamily="34" charset="0"/>
-              <a:buChar char="•"/>
-            </a:pPr>
-            <a:r>
-              <a:rPr lang="en-US" sz="2400" dirty="0" smtClean="0">
-                <a:solidFill>
-                  <a:schemeClr val="bg1"/>
-                </a:solidFill>
-              </a:rPr>
-              <a:t>Select the </a:t>
-            </a:r>
-            <a:r>
-              <a:rPr lang="en-US" sz="2400" b="1" dirty="0" smtClean="0">
-                <a:solidFill>
-                  <a:schemeClr val="bg1"/>
-                </a:solidFill>
-              </a:rPr>
-              <a:t>initial slide.</a:t>
-            </a:r>
-            <a:endParaRPr lang="en-US" sz="2400" dirty="0" smtClean="0">
-              <a:solidFill>
-                <a:schemeClr val="bg1"/>
-              </a:solidFill>
-            </a:endParaRPr>
-          </a:p>
-          <a:p>
-            <a:pPr marL="285750" indent="-285750">
-              <a:buFont typeface="Arial" panose="020B0604020202020204" pitchFamily="34" charset="0"/>
-              <a:buChar char="•"/>
-            </a:pPr>
-            <a:r>
-              <a:rPr lang="en-US" sz="2400" dirty="0" smtClean="0">
-                <a:solidFill>
-                  <a:schemeClr val="bg1"/>
-                </a:solidFill>
-              </a:rPr>
-              <a:t>Click </a:t>
-            </a:r>
-            <a:r>
-              <a:rPr lang="en-US" sz="2400" b="1" dirty="0" smtClean="0">
-                <a:solidFill>
-                  <a:schemeClr val="bg1"/>
-                </a:solidFill>
-              </a:rPr>
-              <a:t>“Add Animation Slide”</a:t>
-            </a:r>
-            <a:r>
-              <a:rPr lang="en-US" sz="2400" dirty="0" smtClean="0">
-                <a:solidFill>
-                  <a:schemeClr val="bg1"/>
-                </a:solidFill>
-              </a:rPr>
-              <a:t> </a:t>
-            </a:r>
-            <a:r>
-              <a:rPr lang="en-US" sz="2400" dirty="0" smtClean="0">
-                <a:solidFill>
-                  <a:schemeClr val="bg1"/>
-                </a:solidFill>
-              </a:rPr>
-              <a:t>button in the ribbon or right </a:t>
-            </a:r>
-            <a:r>
-              <a:rPr lang="en-US" sz="2400" dirty="0" smtClean="0">
-                <a:solidFill>
-                  <a:schemeClr val="bg1"/>
-                </a:solidFill>
-              </a:rPr>
-              <a:t>click the initial slide </a:t>
-            </a:r>
-            <a:r>
-              <a:rPr lang="en-US" sz="2400" dirty="0" smtClean="0">
-                <a:solidFill>
-                  <a:schemeClr val="bg1"/>
-                </a:solidFill>
-              </a:rPr>
-              <a:t>and then select </a:t>
-            </a:r>
-            <a:r>
-              <a:rPr lang="en-US" sz="2400" b="1" dirty="0" smtClean="0">
-                <a:solidFill>
-                  <a:schemeClr val="bg1"/>
-                </a:solidFill>
-              </a:rPr>
-              <a:t>“Add </a:t>
-            </a:r>
-            <a:r>
-              <a:rPr lang="en-US" sz="2400" b="1" dirty="0" smtClean="0">
-                <a:solidFill>
-                  <a:schemeClr val="bg1"/>
-                </a:solidFill>
-              </a:rPr>
-              <a:t>Animation Slide” </a:t>
-            </a:r>
-            <a:r>
-              <a:rPr lang="en-US" sz="2400" dirty="0" smtClean="0">
-                <a:solidFill>
-                  <a:schemeClr val="bg1"/>
-                </a:solidFill>
-              </a:rPr>
-              <a:t>in the context menu. </a:t>
-            </a:r>
-          </a:p>
-          <a:p>
-            <a:pPr marL="285750" indent="-285750">
-              <a:buFont typeface="Arial" panose="020B0604020202020204" pitchFamily="34" charset="0"/>
-              <a:buChar char="•"/>
-            </a:pPr>
-            <a:r>
-              <a:rPr lang="en-US" sz="2400" dirty="0" smtClean="0">
-                <a:solidFill>
-                  <a:schemeClr val="bg1"/>
-                </a:solidFill>
-              </a:rPr>
-              <a:t>Compare the result with the expected output.</a:t>
-            </a:r>
-          </a:p>
-          <a:p>
-            <a:pPr marL="285750" indent="-285750">
-              <a:buFont typeface="Arial" panose="020B0604020202020204" pitchFamily="34" charset="0"/>
-              <a:buChar char="•"/>
-            </a:pPr>
-            <a:r>
-              <a:rPr lang="en-SG" sz="2400" dirty="0">
-                <a:solidFill>
-                  <a:schemeClr val="bg1"/>
-                </a:solidFill>
-              </a:rPr>
-              <a:t>Also try tweaking these:</a:t>
-            </a:r>
-          </a:p>
-          <a:p>
-            <a:pPr marL="742950" lvl="1" indent="-285750">
-              <a:buFont typeface="Arial" panose="020B0604020202020204" pitchFamily="34" charset="0"/>
-              <a:buChar char="•"/>
-            </a:pPr>
-            <a:r>
-              <a:rPr lang="en-SG" sz="2400" dirty="0" smtClean="0">
-                <a:solidFill>
-                  <a:schemeClr val="bg1"/>
-                </a:solidFill>
-              </a:rPr>
-              <a:t>Animation Duration</a:t>
-            </a:r>
-            <a:endParaRPr lang="en-SG" sz="2400" dirty="0">
-              <a:solidFill>
-                <a:schemeClr val="bg1"/>
-              </a:solidFill>
-            </a:endParaRPr>
-          </a:p>
-          <a:p>
-            <a:pPr marL="742950" lvl="1" indent="-285750">
-              <a:buFont typeface="Arial" panose="020B0604020202020204" pitchFamily="34" charset="0"/>
-              <a:buChar char="•"/>
-            </a:pPr>
-            <a:r>
-              <a:rPr lang="en-SG" sz="2400" dirty="0" smtClean="0">
-                <a:solidFill>
-                  <a:schemeClr val="bg1"/>
-                </a:solidFill>
-              </a:rPr>
-              <a:t>Use Smoother Animation</a:t>
-            </a:r>
-            <a:endParaRPr lang="en-SG" sz="2400" dirty="0">
-              <a:solidFill>
-                <a:schemeClr val="bg1"/>
-              </a:solidFill>
-            </a:endParaRPr>
-          </a:p>
-          <a:p>
-            <a:pPr marL="285750" indent="-285750">
-              <a:buFont typeface="Arial" panose="020B0604020202020204" pitchFamily="34" charset="0"/>
-              <a:buChar char="•"/>
-            </a:pPr>
-            <a:endParaRPr lang="en-SG" sz="2400" dirty="0">
-              <a:solidFill>
-                <a:schemeClr val="bg1"/>
-              </a:solidFill>
-            </a:endParaRPr>
-          </a:p>
-        </p:txBody>
-      </p:sp>
-    </p:spTree>
-    <p:extLst>
-      <p:ext uri="{BB962C8B-B14F-4D97-AF65-F5344CB8AC3E}">
-        <p14:creationId xmlns:p14="http://schemas.microsoft.com/office/powerpoint/2010/main" val="1569131388"/>
-      </p:ext>
-    </p:extLst>
-  </p:cSld>
-  <p:clrMapOvr>
-    <a:masterClrMapping/>
-  </p:clrMapOvr>
-  <p:timing>
-    <p:tnLst>
-      <p:par>
-        <p:cTn id="1" dur="indefinite" restart="never" nodeType="tmRoot"/>
-      </p:par>
-    </p:tnLst>
-  </p:timing>
-</p:sld>
-</file>
-
 <file path=ppt/slides/slide3.xml><?xml version="1.0" encoding="utf-8"?>
 <p:sld xmlns:a="http://schemas.openxmlformats.org/drawingml/2006/main" xmlns:r="http://schemas.openxmlformats.org/officeDocument/2006/relationships" xmlns:p="http://schemas.openxmlformats.org/presentationml/2006/main">
   <p:cSld>
@@ -23779,15 +25296,7 @@
           <a:p>
             <a:r>
               <a:rPr lang="en-US" dirty="0" smtClean="0"/>
-              <a:t>Auto Animate:: </a:t>
-            </a:r>
-            <a:r>
-              <a:rPr lang="en-US" dirty="0" smtClean="0"/>
-              <a:t>normal </a:t>
-            </a:r>
-            <a:r>
-              <a:rPr lang="en-US" dirty="0" smtClean="0"/>
-              <a:t>shapes</a:t>
+              <a:t>Auto Animate:: normal shapes</a:t>
             </a:r>
             <a:endParaRPr lang="en-SG" dirty="0"/>
           </a:p>
@@ -23958,8 +25467,8 @@
           </a:p>
         </p:txBody>
       </p:sp>
-      <mc:AlternateContent xmlns:mc="http://schemas.openxmlformats.org/markup-compatibility/2006">
-        <mc:Choice xmlns:p14="http://schemas.microsoft.com/office/powerpoint/2010/main" Requires="p14">
+      <mc:AlternateContent xmlns:mc="http://schemas.openxmlformats.org/markup-compatibility/2006" xmlns:p14="http://schemas.microsoft.com/office/powerpoint/2010/main">
+        <mc:Choice Requires="p14">
           <p:contentPart p14:bwMode="auto" r:id="rId2">
             <p14:nvContentPartPr>
               <p14:cNvPr id="7" name="Ink 6"/>
@@ -23972,7 +25481,7 @@
             </p14:xfrm>
           </p:contentPart>
         </mc:Choice>
-        <mc:Fallback>
+        <mc:Fallback xmlns="">
           <p:pic>
             <p:nvPicPr>
               <p:cNvPr id="7" name="Ink 6"/>
@@ -24207,8 +25716,8 @@
           </a:p>
         </p:txBody>
       </p:sp>
-      <mc:AlternateContent xmlns:mc="http://schemas.openxmlformats.org/markup-compatibility/2006">
-        <mc:Choice xmlns:p14="http://schemas.microsoft.com/office/powerpoint/2010/main" Requires="p14">
+      <mc:AlternateContent xmlns:mc="http://schemas.openxmlformats.org/markup-compatibility/2006" xmlns:p14="http://schemas.microsoft.com/office/powerpoint/2010/main">
+        <mc:Choice Requires="p14">
           <p:contentPart p14:bwMode="auto" r:id="rId2">
             <p14:nvContentPartPr>
               <p14:cNvPr id="7" name="Ink 6"/>
@@ -24221,7 +25730,7 @@
             </p14:xfrm>
           </p:contentPart>
         </mc:Choice>
-        <mc:Fallback>
+        <mc:Fallback xmlns="">
           <p:pic>
             <p:nvPicPr>
               <p:cNvPr id="7" name="Ink 6"/>
@@ -24298,11 +25807,11 @@
   <p:clrMapOvr>
     <a:masterClrMapping/>
   </p:clrMapOvr>
-  <mc:AlternateContent xmlns:mc="http://schemas.openxmlformats.org/markup-compatibility/2006">
-    <mc:Choice xmlns:p14="http://schemas.microsoft.com/office/powerpoint/2010/main" Requires="p14">
+  <mc:AlternateContent xmlns:mc="http://schemas.openxmlformats.org/markup-compatibility/2006" xmlns:p14="http://schemas.microsoft.com/office/powerpoint/2010/main">
+    <mc:Choice Requires="p14">
       <p:transition spd="slow" p14:dur="2000"/>
     </mc:Choice>
-    <mc:Fallback>
+    <mc:Fallback xmlns="">
       <p:transition spd="slow"/>
     </mc:Fallback>
   </mc:AlternateContent>
@@ -24461,8 +25970,8 @@
           </a:p>
         </p:txBody>
       </p:sp>
-      <mc:AlternateContent xmlns:mc="http://schemas.openxmlformats.org/markup-compatibility/2006">
-        <mc:Choice xmlns:p14="http://schemas.microsoft.com/office/powerpoint/2010/main" Requires="p14">
+      <mc:AlternateContent xmlns:mc="http://schemas.openxmlformats.org/markup-compatibility/2006" xmlns:p14="http://schemas.microsoft.com/office/powerpoint/2010/main">
+        <mc:Choice Requires="p14">
           <p:contentPart p14:bwMode="auto" r:id="rId2">
             <p14:nvContentPartPr>
               <p14:cNvPr id="7" name="Ink 6"/>
@@ -24475,7 +25984,7 @@
             </p14:xfrm>
           </p:contentPart>
         </mc:Choice>
-        <mc:Fallback>
+        <mc:Fallback xmlns="">
           <p:pic>
             <p:nvPicPr>
               <p:cNvPr id="7" name="Ink 6"/>
@@ -26054,8 +27563,8 @@
           </a:p>
         </p:txBody>
       </p:sp>
-      <mc:AlternateContent xmlns:mc="http://schemas.openxmlformats.org/markup-compatibility/2006">
-        <mc:Choice xmlns:p14="http://schemas.microsoft.com/office/powerpoint/2010/main" Requires="p14">
+      <mc:AlternateContent xmlns:mc="http://schemas.openxmlformats.org/markup-compatibility/2006" xmlns:p14="http://schemas.microsoft.com/office/powerpoint/2010/main">
+        <mc:Choice Requires="p14">
           <p:contentPart p14:bwMode="auto" r:id="rId4">
             <p14:nvContentPartPr>
               <p14:cNvPr id="45" name="Ink 6"/>
@@ -26070,7 +27579,7 @@
             </p14:xfrm>
           </p:contentPart>
         </mc:Choice>
-        <mc:Fallback>
+        <mc:Fallback xmlns="">
           <p:pic>
             <p:nvPicPr>
               <p:cNvPr id="45" name="Ink 6"/>
@@ -26097,8 +27606,8 @@
           </p:pic>
         </mc:Fallback>
       </mc:AlternateContent>
-      <mc:AlternateContent xmlns:mc="http://schemas.openxmlformats.org/markup-compatibility/2006">
-        <mc:Choice xmlns:p14="http://schemas.microsoft.com/office/powerpoint/2010/main" Requires="p14">
+      <mc:AlternateContent xmlns:mc="http://schemas.openxmlformats.org/markup-compatibility/2006" xmlns:p14="http://schemas.microsoft.com/office/powerpoint/2010/main">
+        <mc:Choice Requires="p14">
           <p:contentPart p14:bwMode="auto" r:id="rId6">
             <p14:nvContentPartPr>
               <p14:cNvPr id="46" name="Ink 6"/>
@@ -26113,7 +27622,7 @@
             </p14:xfrm>
           </p:contentPart>
         </mc:Choice>
-        <mc:Fallback>
+        <mc:Fallback xmlns="">
           <p:pic>
             <p:nvPicPr>
               <p:cNvPr id="46" name="Ink 6"/>
@@ -26140,8 +27649,8 @@
           </p:pic>
         </mc:Fallback>
       </mc:AlternateContent>
-      <mc:AlternateContent xmlns:mc="http://schemas.openxmlformats.org/markup-compatibility/2006">
-        <mc:Choice xmlns:p14="http://schemas.microsoft.com/office/powerpoint/2010/main" Requires="p14">
+      <mc:AlternateContent xmlns:mc="http://schemas.openxmlformats.org/markup-compatibility/2006" xmlns:p14="http://schemas.microsoft.com/office/powerpoint/2010/main">
+        <mc:Choice Requires="p14">
           <p:contentPart p14:bwMode="auto" r:id="rId8">
             <p14:nvContentPartPr>
               <p14:cNvPr id="47" name="Ink 6"/>
@@ -26156,7 +27665,7 @@
             </p14:xfrm>
           </p:contentPart>
         </mc:Choice>
-        <mc:Fallback>
+        <mc:Fallback xmlns="">
           <p:pic>
             <p:nvPicPr>
               <p:cNvPr id="47" name="Ink 6"/>
@@ -26183,8 +27692,8 @@
           </p:pic>
         </mc:Fallback>
       </mc:AlternateContent>
-      <mc:AlternateContent xmlns:mc="http://schemas.openxmlformats.org/markup-compatibility/2006">
-        <mc:Choice xmlns:p14="http://schemas.microsoft.com/office/powerpoint/2010/main" Requires="p14">
+      <mc:AlternateContent xmlns:mc="http://schemas.openxmlformats.org/markup-compatibility/2006" xmlns:p14="http://schemas.microsoft.com/office/powerpoint/2010/main">
+        <mc:Choice Requires="p14">
           <p:contentPart p14:bwMode="auto" r:id="rId10">
             <p14:nvContentPartPr>
               <p14:cNvPr id="48" name="Ink 6"/>
@@ -26199,7 +27708,7 @@
             </p14:xfrm>
           </p:contentPart>
         </mc:Choice>
-        <mc:Fallback>
+        <mc:Fallback xmlns="">
           <p:pic>
             <p:nvPicPr>
               <p:cNvPr id="48" name="Ink 6"/>
@@ -26226,8 +27735,8 @@
           </p:pic>
         </mc:Fallback>
       </mc:AlternateContent>
-      <mc:AlternateContent xmlns:mc="http://schemas.openxmlformats.org/markup-compatibility/2006">
-        <mc:Choice xmlns:p14="http://schemas.microsoft.com/office/powerpoint/2010/main" Requires="p14">
+      <mc:AlternateContent xmlns:mc="http://schemas.openxmlformats.org/markup-compatibility/2006" xmlns:p14="http://schemas.microsoft.com/office/powerpoint/2010/main">
+        <mc:Choice Requires="p14">
           <p:contentPart p14:bwMode="auto" r:id="rId12">
             <p14:nvContentPartPr>
               <p14:cNvPr id="49" name="Ink 6"/>
@@ -26242,7 +27751,7 @@
             </p14:xfrm>
           </p:contentPart>
         </mc:Choice>
-        <mc:Fallback>
+        <mc:Fallback xmlns="">
           <p:pic>
             <p:nvPicPr>
               <p:cNvPr id="49" name="Ink 6"/>
@@ -26269,8 +27778,8 @@
           </p:pic>
         </mc:Fallback>
       </mc:AlternateContent>
-      <mc:AlternateContent xmlns:mc="http://schemas.openxmlformats.org/markup-compatibility/2006">
-        <mc:Choice xmlns:p14="http://schemas.microsoft.com/office/powerpoint/2010/main" Requires="p14">
+      <mc:AlternateContent xmlns:mc="http://schemas.openxmlformats.org/markup-compatibility/2006" xmlns:p14="http://schemas.microsoft.com/office/powerpoint/2010/main">
+        <mc:Choice Requires="p14">
           <p:contentPart p14:bwMode="auto" r:id="rId14">
             <p14:nvContentPartPr>
               <p14:cNvPr id="50" name="Ink 6"/>
@@ -26285,7 +27794,7 @@
             </p14:xfrm>
           </p:contentPart>
         </mc:Choice>
-        <mc:Fallback>
+        <mc:Fallback xmlns="">
           <p:pic>
             <p:nvPicPr>
               <p:cNvPr id="50" name="Ink 6"/>
@@ -26312,8 +27821,8 @@
           </p:pic>
         </mc:Fallback>
       </mc:AlternateContent>
-      <mc:AlternateContent xmlns:mc="http://schemas.openxmlformats.org/markup-compatibility/2006">
-        <mc:Choice xmlns:p14="http://schemas.microsoft.com/office/powerpoint/2010/main" Requires="p14">
+      <mc:AlternateContent xmlns:mc="http://schemas.openxmlformats.org/markup-compatibility/2006" xmlns:p14="http://schemas.microsoft.com/office/powerpoint/2010/main">
+        <mc:Choice Requires="p14">
           <p:contentPart p14:bwMode="auto" r:id="rId16">
             <p14:nvContentPartPr>
               <p14:cNvPr id="51" name="Ink 6"/>
@@ -26328,7 +27837,7 @@
             </p14:xfrm>
           </p:contentPart>
         </mc:Choice>
-        <mc:Fallback>
+        <mc:Fallback xmlns="">
           <p:pic>
             <p:nvPicPr>
               <p:cNvPr id="51" name="Ink 6"/>
@@ -26355,8 +27864,8 @@
           </p:pic>
         </mc:Fallback>
       </mc:AlternateContent>
-      <mc:AlternateContent xmlns:mc="http://schemas.openxmlformats.org/markup-compatibility/2006">
-        <mc:Choice xmlns:p14="http://schemas.microsoft.com/office/powerpoint/2010/main" Requires="p14">
+      <mc:AlternateContent xmlns:mc="http://schemas.openxmlformats.org/markup-compatibility/2006" xmlns:p14="http://schemas.microsoft.com/office/powerpoint/2010/main">
+        <mc:Choice Requires="p14">
           <p:contentPart p14:bwMode="auto" r:id="rId18">
             <p14:nvContentPartPr>
               <p14:cNvPr id="52" name="Ink 6"/>
@@ -26371,7 +27880,7 @@
             </p14:xfrm>
           </p:contentPart>
         </mc:Choice>
-        <mc:Fallback>
+        <mc:Fallback xmlns="">
           <p:pic>
             <p:nvPicPr>
               <p:cNvPr id="52" name="Ink 6"/>
@@ -26398,8 +27907,8 @@
           </p:pic>
         </mc:Fallback>
       </mc:AlternateContent>
-      <mc:AlternateContent xmlns:mc="http://schemas.openxmlformats.org/markup-compatibility/2006">
-        <mc:Choice xmlns:p14="http://schemas.microsoft.com/office/powerpoint/2010/main" Requires="p14">
+      <mc:AlternateContent xmlns:mc="http://schemas.openxmlformats.org/markup-compatibility/2006" xmlns:p14="http://schemas.microsoft.com/office/powerpoint/2010/main">
+        <mc:Choice Requires="p14">
           <p:contentPart p14:bwMode="auto" r:id="rId20">
             <p14:nvContentPartPr>
               <p14:cNvPr id="53" name="Ink 6"/>
@@ -26414,7 +27923,7 @@
             </p14:xfrm>
           </p:contentPart>
         </mc:Choice>
-        <mc:Fallback>
+        <mc:Fallback xmlns="">
           <p:pic>
             <p:nvPicPr>
               <p:cNvPr id="53" name="Ink 6"/>
@@ -26441,8 +27950,8 @@
           </p:pic>
         </mc:Fallback>
       </mc:AlternateContent>
-      <mc:AlternateContent xmlns:mc="http://schemas.openxmlformats.org/markup-compatibility/2006">
-        <mc:Choice xmlns:p14="http://schemas.microsoft.com/office/powerpoint/2010/main" Requires="p14">
+      <mc:AlternateContent xmlns:mc="http://schemas.openxmlformats.org/markup-compatibility/2006" xmlns:p14="http://schemas.microsoft.com/office/powerpoint/2010/main">
+        <mc:Choice Requires="p14">
           <p:contentPart p14:bwMode="auto" r:id="rId22">
             <p14:nvContentPartPr>
               <p14:cNvPr id="54" name="Ink 6"/>
@@ -26457,7 +27966,7 @@
             </p14:xfrm>
           </p:contentPart>
         </mc:Choice>
-        <mc:Fallback>
+        <mc:Fallback xmlns="">
           <p:pic>
             <p:nvPicPr>
               <p:cNvPr id="54" name="Ink 6"/>
@@ -26484,8 +27993,8 @@
           </p:pic>
         </mc:Fallback>
       </mc:AlternateContent>
-      <mc:AlternateContent xmlns:mc="http://schemas.openxmlformats.org/markup-compatibility/2006">
-        <mc:Choice xmlns:p14="http://schemas.microsoft.com/office/powerpoint/2010/main" Requires="p14">
+      <mc:AlternateContent xmlns:mc="http://schemas.openxmlformats.org/markup-compatibility/2006" xmlns:p14="http://schemas.microsoft.com/office/powerpoint/2010/main">
+        <mc:Choice Requires="p14">
           <p:contentPart p14:bwMode="auto" r:id="rId24">
             <p14:nvContentPartPr>
               <p14:cNvPr id="55" name="Ink 6"/>
@@ -26500,7 +28009,7 @@
             </p14:xfrm>
           </p:contentPart>
         </mc:Choice>
-        <mc:Fallback>
+        <mc:Fallback xmlns="">
           <p:pic>
             <p:nvPicPr>
               <p:cNvPr id="55" name="Ink 6"/>
@@ -26527,8 +28036,8 @@
           </p:pic>
         </mc:Fallback>
       </mc:AlternateContent>
-      <mc:AlternateContent xmlns:mc="http://schemas.openxmlformats.org/markup-compatibility/2006">
-        <mc:Choice xmlns:p14="http://schemas.microsoft.com/office/powerpoint/2010/main" Requires="p14">
+      <mc:AlternateContent xmlns:mc="http://schemas.openxmlformats.org/markup-compatibility/2006" xmlns:p14="http://schemas.microsoft.com/office/powerpoint/2010/main">
+        <mc:Choice Requires="p14">
           <p:contentPart p14:bwMode="auto" r:id="rId26">
             <p14:nvContentPartPr>
               <p14:cNvPr id="56" name="Ink 6"/>
@@ -26543,7 +28052,7 @@
             </p14:xfrm>
           </p:contentPart>
         </mc:Choice>
-        <mc:Fallback>
+        <mc:Fallback xmlns="">
           <p:pic>
             <p:nvPicPr>
               <p:cNvPr id="56" name="Ink 6"/>
@@ -29455,7 +30964,56 @@
           <a:p>
             <a:r>
               <a:rPr lang="en-US" dirty="0" smtClean="0"/>
-              <a:t>Auto Animate:: Shapes with text</a:t>
+              <a:t>Auto Animate:: </a:t>
+            </a:r>
+            <a:r>
+              <a:rPr lang="en-US" dirty="0" smtClean="0"/>
+              <a:t>copy &amp; paste shapes</a:t>
+            </a:r>
+            <a:endParaRPr lang="en-SG" dirty="0"/>
+          </a:p>
+        </p:txBody>
+      </p:sp>
+      <p:sp>
+        <p:nvSpPr>
+          <p:cNvPr id="3" name="[Content Placeholder 2]"/>
+          <p:cNvSpPr>
+            <a:spLocks noGrp="1"/>
+          </p:cNvSpPr>
+          <p:nvPr>
+            <p:ph idx="1"/>
+          </p:nvPr>
+        </p:nvSpPr>
+        <p:spPr>
+          <a:xfrm>
+            <a:off x="457200" y="3124200"/>
+            <a:ext cx="8229600" cy="3001963"/>
+          </a:xfrm>
+        </p:spPr>
+        <p:txBody>
+          <a:bodyPr/>
+          <a:lstStyle/>
+          <a:p>
+            <a:r>
+              <a:rPr lang="en-US" dirty="0" smtClean="0"/>
+              <a:t>Select all blue </a:t>
+            </a:r>
+            <a:r>
+              <a:rPr lang="en-US" dirty="0" smtClean="0"/>
+              <a:t>shapes in the initial slide and copy them.</a:t>
+            </a:r>
+            <a:endParaRPr lang="en-US" dirty="0" smtClean="0"/>
+          </a:p>
+          <a:p>
+            <a:r>
+              <a:rPr lang="en-US" dirty="0" smtClean="0"/>
+              <a:t>Paste them in the end slide and rotate them 90 degrees clockwise by holding the Shift key.</a:t>
+            </a:r>
+          </a:p>
+          <a:p>
+            <a:r>
+              <a:rPr lang="en-US" dirty="0" smtClean="0"/>
+              <a:t>Click ‘Add Animation Slide’ on the initial slide</a:t>
             </a:r>
             <a:endParaRPr lang="en-SG" dirty="0"/>
           </a:p>
@@ -29464,7 +31022,7 @@
     </p:spTree>
     <p:extLst>
       <p:ext uri="{BB962C8B-B14F-4D97-AF65-F5344CB8AC3E}">
-        <p14:creationId xmlns:p14="http://schemas.microsoft.com/office/powerpoint/2010/main" val="3673044682"/>
+        <p14:creationId xmlns:p14="http://schemas.microsoft.com/office/powerpoint/2010/main" val="303035316"/>
       </p:ext>
     </p:extLst>
   </p:cSld>
@@ -29483,7 +31041,7 @@
 
 <file path=ppt/slides/slide8.xml><?xml version="1.0" encoding="utf-8"?>
 <p:sld xmlns:a="http://schemas.openxmlformats.org/drawingml/2006/main" xmlns:r="http://schemas.openxmlformats.org/officeDocument/2006/relationships" xmlns:p="http://schemas.openxmlformats.org/presentationml/2006/main">
-  <p:cSld name="PPSlideStart201403260226267770">
+  <p:cSld>
     <p:bg>
       <p:bgPr>
         <a:solidFill>
@@ -29508,16 +31066,16 @@
       </p:grpSpPr>
       <p:sp>
         <p:nvSpPr>
-          <p:cNvPr id="4" name="Rectangle 3"/>
+          <p:cNvPr id="4" name="Notched Right Arrow 3"/>
           <p:cNvSpPr/>
           <p:nvPr/>
         </p:nvSpPr>
         <p:spPr>
-          <a:xfrm>
-            <a:off x="838200" y="1143000"/>
-            <a:ext cx="3657600" cy="914400"/>
+          <a:xfrm rot="19804930">
+            <a:off x="1752600" y="1752600"/>
+            <a:ext cx="1371600" cy="838200"/>
           </a:xfrm>
-          <a:prstGeom prst="rect">
+          <a:prstGeom prst="notchedRightArrow">
             <a:avLst/>
           </a:prstGeom>
         </p:spPr>
@@ -29541,404 +31099,109 @@
           <a:bodyPr rtlCol="0" anchor="ctr"/>
           <a:lstStyle/>
           <a:p>
-            <a:r>
-              <a:rPr lang="en-US" dirty="0" err="1">
-                <a:solidFill>
-                  <a:schemeClr val="bg1"/>
-                </a:solidFill>
-              </a:rPr>
-              <a:t>Lorem</a:t>
-            </a:r>
-            <a:r>
-              <a:rPr lang="en-US" dirty="0">
-                <a:solidFill>
-                  <a:schemeClr val="bg1"/>
-                </a:solidFill>
-              </a:rPr>
-              <a:t> </a:t>
-            </a:r>
-            <a:r>
-              <a:rPr lang="en-US" dirty="0" err="1">
-                <a:solidFill>
-                  <a:schemeClr val="bg1"/>
-                </a:solidFill>
-              </a:rPr>
-              <a:t>ipsum</a:t>
-            </a:r>
-            <a:r>
-              <a:rPr lang="en-US" dirty="0">
-                <a:solidFill>
-                  <a:schemeClr val="bg1"/>
-                </a:solidFill>
-              </a:rPr>
-              <a:t> dolor sit </a:t>
-            </a:r>
-            <a:r>
-              <a:rPr lang="en-US" dirty="0" err="1">
-                <a:solidFill>
-                  <a:schemeClr val="bg1"/>
-                </a:solidFill>
-              </a:rPr>
-              <a:t>amet</a:t>
-            </a:r>
-            <a:r>
-              <a:rPr lang="en-US" dirty="0">
-                <a:solidFill>
-                  <a:schemeClr val="bg1"/>
-                </a:solidFill>
-              </a:rPr>
-              <a:t>, </a:t>
-            </a:r>
-            <a:r>
-              <a:rPr lang="en-US" dirty="0" err="1">
-                <a:solidFill>
-                  <a:schemeClr val="bg1"/>
-                </a:solidFill>
-              </a:rPr>
-              <a:t>consectetur</a:t>
-            </a:r>
-            <a:r>
-              <a:rPr lang="en-US" dirty="0">
-                <a:solidFill>
-                  <a:schemeClr val="bg1"/>
-                </a:solidFill>
-              </a:rPr>
-              <a:t> </a:t>
-            </a:r>
-            <a:r>
-              <a:rPr lang="en-US" dirty="0" err="1">
-                <a:solidFill>
-                  <a:schemeClr val="bg1"/>
-                </a:solidFill>
-              </a:rPr>
-              <a:t>adipiscing</a:t>
-            </a:r>
-            <a:r>
-              <a:rPr lang="en-US" dirty="0">
-                <a:solidFill>
-                  <a:schemeClr val="bg1"/>
-                </a:solidFill>
-              </a:rPr>
-              <a:t> </a:t>
-            </a:r>
-            <a:r>
-              <a:rPr lang="en-US" dirty="0" err="1">
-                <a:solidFill>
-                  <a:schemeClr val="bg1"/>
-                </a:solidFill>
-              </a:rPr>
-              <a:t>elit</a:t>
-            </a:r>
-            <a:r>
-              <a:rPr lang="en-US" dirty="0">
-                <a:solidFill>
-                  <a:schemeClr val="bg1"/>
-                </a:solidFill>
-              </a:rPr>
-              <a:t>. </a:t>
-            </a:r>
-            <a:r>
-              <a:rPr lang="en-US" dirty="0" err="1">
-                <a:solidFill>
-                  <a:schemeClr val="bg1"/>
-                </a:solidFill>
-              </a:rPr>
-              <a:t>Sed</a:t>
-            </a:r>
-            <a:r>
-              <a:rPr lang="en-US" dirty="0">
-                <a:solidFill>
-                  <a:schemeClr val="bg1"/>
-                </a:solidFill>
-              </a:rPr>
-              <a:t> </a:t>
-            </a:r>
-            <a:r>
-              <a:rPr lang="en-US" dirty="0" err="1">
-                <a:solidFill>
-                  <a:schemeClr val="bg1"/>
-                </a:solidFill>
-              </a:rPr>
-              <a:t>accumsan</a:t>
-            </a:r>
-            <a:r>
-              <a:rPr lang="en-US" dirty="0">
-                <a:solidFill>
-                  <a:schemeClr val="bg1"/>
-                </a:solidFill>
-              </a:rPr>
-              <a:t> vitae </a:t>
-            </a:r>
-            <a:r>
-              <a:rPr lang="en-US" dirty="0" err="1">
-                <a:solidFill>
-                  <a:schemeClr val="bg1"/>
-                </a:solidFill>
-              </a:rPr>
-              <a:t>eros</a:t>
-            </a:r>
-            <a:r>
-              <a:rPr lang="en-US" dirty="0">
-                <a:solidFill>
-                  <a:schemeClr val="bg1"/>
-                </a:solidFill>
-              </a:rPr>
-              <a:t> a </a:t>
-            </a:r>
-            <a:r>
-              <a:rPr lang="en-US" dirty="0" err="1">
-                <a:solidFill>
-                  <a:schemeClr val="bg1"/>
-                </a:solidFill>
-              </a:rPr>
-              <a:t>luctus</a:t>
-            </a:r>
-            <a:r>
-              <a:rPr lang="en-US" dirty="0">
-                <a:solidFill>
-                  <a:schemeClr val="bg1"/>
-                </a:solidFill>
-              </a:rPr>
-              <a:t>. </a:t>
-            </a:r>
-            <a:r>
-              <a:rPr lang="en-US" dirty="0" err="1">
-                <a:solidFill>
-                  <a:schemeClr val="bg1"/>
-                </a:solidFill>
-              </a:rPr>
-              <a:t>Aenean</a:t>
-            </a:r>
-            <a:endParaRPr lang="en-SG" dirty="0">
-              <a:solidFill>
-                <a:schemeClr val="bg1"/>
-              </a:solidFill>
-            </a:endParaRPr>
-          </a:p>
-        </p:txBody>
-      </p:sp>
-      <p:sp>
-        <p:nvSpPr>
-          <p:cNvPr id="6" name="Rectangle 5"/>
-          <p:cNvSpPr/>
+            <a:pPr algn="ctr"/>
+            <a:endParaRPr lang="en-SG"/>
+          </a:p>
+        </p:txBody>
+      </p:sp>
+      <p:grpSp>
+        <p:nvGrpSpPr>
+          <p:cNvPr id="2" name="Group 2"/>
+          <p:cNvGrpSpPr/>
           <p:nvPr/>
-        </p:nvSpPr>
-        <p:spPr>
+        </p:nvGrpSpPr>
+        <p:grpSpPr>
           <a:xfrm>
-            <a:off x="4876800" y="1137138"/>
-            <a:ext cx="3657600" cy="914400"/>
+            <a:off x="3962400" y="3276600"/>
+            <a:ext cx="3581400" cy="2362200"/>
+            <a:chOff x="3962400" y="3276600"/>
+            <a:chExt cx="3581400" cy="2362200"/>
           </a:xfrm>
-          <a:prstGeom prst="rect">
-            <a:avLst/>
-          </a:prstGeom>
-          <a:solidFill>
-            <a:srgbClr val="00B050"/>
-          </a:solidFill>
-          <a:ln>
-            <a:solidFill>
-              <a:srgbClr val="002060"/>
-            </a:solidFill>
-          </a:ln>
-        </p:spPr>
-        <p:style>
-          <a:lnRef idx="2">
-            <a:schemeClr val="accent1">
-              <a:shade val="50000"/>
-            </a:schemeClr>
-          </a:lnRef>
-          <a:fillRef idx="1">
-            <a:schemeClr val="accent1"/>
-          </a:fillRef>
-          <a:effectRef idx="0">
-            <a:schemeClr val="accent1"/>
-          </a:effectRef>
-          <a:fontRef idx="minor">
-            <a:schemeClr val="lt1"/>
-          </a:fontRef>
-        </p:style>
-        <p:txBody>
-          <a:bodyPr rtlCol="0" anchor="ctr"/>
-          <a:lstStyle/>
-          <a:p>
-            <a:r>
-              <a:rPr lang="en-US" dirty="0" err="1">
-                <a:solidFill>
-                  <a:schemeClr val="bg1"/>
-                </a:solidFill>
-              </a:rPr>
-              <a:t>Lorem</a:t>
-            </a:r>
-            <a:r>
-              <a:rPr lang="en-US" dirty="0">
-                <a:solidFill>
-                  <a:schemeClr val="bg1"/>
-                </a:solidFill>
-              </a:rPr>
-              <a:t> </a:t>
-            </a:r>
-            <a:r>
-              <a:rPr lang="en-US" dirty="0" err="1">
-                <a:solidFill>
-                  <a:schemeClr val="bg1"/>
-                </a:solidFill>
-              </a:rPr>
-              <a:t>ipsum</a:t>
-            </a:r>
-            <a:r>
-              <a:rPr lang="en-US" dirty="0">
-                <a:solidFill>
-                  <a:schemeClr val="bg1"/>
-                </a:solidFill>
-              </a:rPr>
-              <a:t> dolor sit </a:t>
-            </a:r>
-            <a:r>
-              <a:rPr lang="en-US" dirty="0" err="1">
-                <a:solidFill>
-                  <a:schemeClr val="bg1"/>
-                </a:solidFill>
-              </a:rPr>
-              <a:t>amet</a:t>
-            </a:r>
-            <a:r>
-              <a:rPr lang="en-US" dirty="0">
-                <a:solidFill>
-                  <a:schemeClr val="bg1"/>
-                </a:solidFill>
-              </a:rPr>
-              <a:t>, </a:t>
-            </a:r>
-            <a:r>
-              <a:rPr lang="en-US" dirty="0" err="1">
-                <a:solidFill>
-                  <a:schemeClr val="bg1"/>
-                </a:solidFill>
-              </a:rPr>
-              <a:t>consectetur</a:t>
-            </a:r>
-            <a:r>
-              <a:rPr lang="en-US" dirty="0">
-                <a:solidFill>
-                  <a:schemeClr val="bg1"/>
-                </a:solidFill>
-              </a:rPr>
-              <a:t> </a:t>
-            </a:r>
-            <a:r>
-              <a:rPr lang="en-US" dirty="0" err="1">
-                <a:solidFill>
-                  <a:schemeClr val="bg1"/>
-                </a:solidFill>
-              </a:rPr>
-              <a:t>adipiscing</a:t>
-            </a:r>
-            <a:r>
-              <a:rPr lang="en-US" dirty="0">
-                <a:solidFill>
-                  <a:schemeClr val="bg1"/>
-                </a:solidFill>
-              </a:rPr>
-              <a:t> </a:t>
-            </a:r>
-            <a:r>
-              <a:rPr lang="en-US" dirty="0" err="1">
-                <a:solidFill>
-                  <a:schemeClr val="bg1"/>
-                </a:solidFill>
-              </a:rPr>
-              <a:t>elit</a:t>
-            </a:r>
-            <a:r>
-              <a:rPr lang="en-US" dirty="0">
-                <a:solidFill>
-                  <a:schemeClr val="bg1"/>
-                </a:solidFill>
-              </a:rPr>
-              <a:t>. </a:t>
-            </a:r>
-            <a:r>
-              <a:rPr lang="en-US" dirty="0" err="1">
-                <a:solidFill>
-                  <a:schemeClr val="bg1"/>
-                </a:solidFill>
-              </a:rPr>
-              <a:t>Sed</a:t>
-            </a:r>
-            <a:r>
-              <a:rPr lang="en-US" dirty="0">
-                <a:solidFill>
-                  <a:schemeClr val="bg1"/>
-                </a:solidFill>
-              </a:rPr>
-              <a:t> </a:t>
-            </a:r>
-            <a:r>
-              <a:rPr lang="en-US" dirty="0" err="1">
-                <a:solidFill>
-                  <a:schemeClr val="bg1"/>
-                </a:solidFill>
-              </a:rPr>
-              <a:t>accumsan</a:t>
-            </a:r>
-            <a:r>
-              <a:rPr lang="en-US" dirty="0">
-                <a:solidFill>
-                  <a:schemeClr val="bg1"/>
-                </a:solidFill>
-              </a:rPr>
-              <a:t> vitae </a:t>
-            </a:r>
-            <a:r>
-              <a:rPr lang="en-US" dirty="0" err="1">
-                <a:solidFill>
-                  <a:schemeClr val="bg1"/>
-                </a:solidFill>
-              </a:rPr>
-              <a:t>eros</a:t>
-            </a:r>
-            <a:r>
-              <a:rPr lang="en-US" dirty="0">
-                <a:solidFill>
-                  <a:schemeClr val="bg1"/>
-                </a:solidFill>
-              </a:rPr>
-              <a:t> a </a:t>
-            </a:r>
-            <a:r>
-              <a:rPr lang="en-US" dirty="0" err="1">
-                <a:solidFill>
-                  <a:schemeClr val="bg1"/>
-                </a:solidFill>
-              </a:rPr>
-              <a:t>luctus</a:t>
-            </a:r>
-            <a:r>
-              <a:rPr lang="en-US" dirty="0">
-                <a:solidFill>
-                  <a:schemeClr val="bg1"/>
-                </a:solidFill>
-              </a:rPr>
-              <a:t>. </a:t>
-            </a:r>
-            <a:r>
-              <a:rPr lang="en-US" dirty="0" err="1">
-                <a:solidFill>
-                  <a:schemeClr val="bg1"/>
-                </a:solidFill>
-              </a:rPr>
-              <a:t>Aenean</a:t>
-            </a:r>
-            <a:endParaRPr lang="en-SG" dirty="0">
-              <a:solidFill>
-                <a:schemeClr val="bg1"/>
-              </a:solidFill>
-            </a:endParaRPr>
-          </a:p>
-        </p:txBody>
-      </p:sp>
-      <p:sp>
-        <p:nvSpPr>
-          <p:cNvPr id="5" name="text 3"/>
+        </p:grpSpPr>
+        <p:sp>
+          <p:nvSpPr>
+            <p:cNvPr id="5" name="Notched Right Arrow 4"/>
+            <p:cNvSpPr/>
+            <p:nvPr/>
+          </p:nvSpPr>
+          <p:spPr>
+            <a:xfrm rot="20389402">
+              <a:off x="3962400" y="3276600"/>
+              <a:ext cx="1371600" cy="838200"/>
+            </a:xfrm>
+            <a:prstGeom prst="notchedRightArrow">
+              <a:avLst/>
+            </a:prstGeom>
+          </p:spPr>
+          <p:style>
+            <a:lnRef idx="2">
+              <a:schemeClr val="accent1">
+                <a:shade val="50000"/>
+              </a:schemeClr>
+            </a:lnRef>
+            <a:fillRef idx="1">
+              <a:schemeClr val="accent1"/>
+            </a:fillRef>
+            <a:effectRef idx="0">
+              <a:schemeClr val="accent1"/>
+            </a:effectRef>
+            <a:fontRef idx="minor">
+              <a:schemeClr val="lt1"/>
+            </a:fontRef>
+          </p:style>
+          <p:txBody>
+            <a:bodyPr rtlCol="0" anchor="ctr"/>
+            <a:lstStyle/>
+            <a:p>
+              <a:pPr algn="ctr"/>
+              <a:endParaRPr lang="en-SG"/>
+            </a:p>
+          </p:txBody>
+        </p:sp>
+        <p:sp>
+          <p:nvSpPr>
+            <p:cNvPr id="6" name="Notched Right Arrow 5"/>
+            <p:cNvSpPr/>
+            <p:nvPr/>
+          </p:nvSpPr>
+          <p:spPr>
+            <a:xfrm rot="1690524">
+              <a:off x="6172200" y="4800600"/>
+              <a:ext cx="1371600" cy="838200"/>
+            </a:xfrm>
+            <a:prstGeom prst="notchedRightArrow">
+              <a:avLst/>
+            </a:prstGeom>
+          </p:spPr>
+          <p:style>
+            <a:lnRef idx="2">
+              <a:schemeClr val="accent1">
+                <a:shade val="50000"/>
+              </a:schemeClr>
+            </a:lnRef>
+            <a:fillRef idx="1">
+              <a:schemeClr val="accent1"/>
+            </a:fillRef>
+            <a:effectRef idx="0">
+              <a:schemeClr val="accent1"/>
+            </a:effectRef>
+            <a:fontRef idx="minor">
+              <a:schemeClr val="lt1"/>
+            </a:fontRef>
+          </p:style>
+          <p:txBody>
+            <a:bodyPr rtlCol="0" anchor="ctr"/>
+            <a:lstStyle/>
+            <a:p>
+              <a:pPr algn="ctr"/>
+              <a:endParaRPr lang="en-SG"/>
+            </a:p>
+          </p:txBody>
+        </p:sp>
+      </p:grpSp>
+      <p:sp>
+        <p:nvSpPr>
+          <p:cNvPr id="8" name="text 3"/>
           <p:cNvSpPr txBox="1"/>
           <p:nvPr/>
         </p:nvSpPr>
@@ -29981,13 +31244,16 @@
     </p:spTree>
     <p:extLst>
       <p:ext uri="{BB962C8B-B14F-4D97-AF65-F5344CB8AC3E}">
-        <p14:creationId xmlns:p14="http://schemas.microsoft.com/office/powerpoint/2010/main" val="367874720"/>
+        <p14:creationId xmlns:p14="http://schemas.microsoft.com/office/powerpoint/2010/main" val="4012632288"/>
       </p:ext>
     </p:extLst>
   </p:cSld>
   <p:clrMapOvr>
     <a:masterClrMapping/>
   </p:clrMapOvr>
+  <p:transition spd="slow">
+    <p:push dir="u"/>
+  </p:transition>
   <p:timing>
     <p:tnLst>
       <p:par>
@@ -30000,7 +31266,7 @@
 
 <file path=ppt/slides/slide9.xml><?xml version="1.0" encoding="utf-8"?>
 <p:sld xmlns:a="http://schemas.openxmlformats.org/drawingml/2006/main" xmlns:r="http://schemas.openxmlformats.org/officeDocument/2006/relationships" xmlns:p="http://schemas.openxmlformats.org/presentationml/2006/main">
-  <p:cSld name="PPSlideEnd201403260226268020">
+  <p:cSld>
     <p:bg>
       <p:bgPr>
         <a:solidFill>
@@ -30025,437 +31291,7 @@
       </p:grpSpPr>
       <p:sp>
         <p:nvSpPr>
-          <p:cNvPr id="4" name="Rectangle 3"/>
-          <p:cNvSpPr/>
-          <p:nvPr/>
-        </p:nvSpPr>
-        <p:spPr>
-          <a:xfrm>
-            <a:off x="304800" y="4572000"/>
-            <a:ext cx="5181600" cy="1600200"/>
-          </a:xfrm>
-          <a:prstGeom prst="rect">
-            <a:avLst/>
-          </a:prstGeom>
-        </p:spPr>
-        <p:style>
-          <a:lnRef idx="2">
-            <a:schemeClr val="accent1">
-              <a:shade val="50000"/>
-            </a:schemeClr>
-          </a:lnRef>
-          <a:fillRef idx="1">
-            <a:schemeClr val="accent1"/>
-          </a:fillRef>
-          <a:effectRef idx="0">
-            <a:schemeClr val="accent1"/>
-          </a:effectRef>
-          <a:fontRef idx="minor">
-            <a:schemeClr val="lt1"/>
-          </a:fontRef>
-        </p:style>
-        <p:txBody>
-          <a:bodyPr rtlCol="0" anchor="ctr"/>
-          <a:lstStyle/>
-          <a:p>
-            <a:r>
-              <a:rPr lang="en-US" sz="2400" dirty="0" err="1">
-                <a:solidFill>
-                  <a:schemeClr val="bg1"/>
-                </a:solidFill>
-              </a:rPr>
-              <a:t>Lorem</a:t>
-            </a:r>
-            <a:r>
-              <a:rPr lang="en-US" sz="2400" dirty="0">
-                <a:solidFill>
-                  <a:schemeClr val="bg1"/>
-                </a:solidFill>
-              </a:rPr>
-              <a:t> </a:t>
-            </a:r>
-            <a:r>
-              <a:rPr lang="en-US" sz="2400" dirty="0" err="1">
-                <a:solidFill>
-                  <a:schemeClr val="bg1"/>
-                </a:solidFill>
-              </a:rPr>
-              <a:t>ipsum</a:t>
-            </a:r>
-            <a:r>
-              <a:rPr lang="en-US" sz="2400" dirty="0">
-                <a:solidFill>
-                  <a:schemeClr val="bg1"/>
-                </a:solidFill>
-              </a:rPr>
-              <a:t> dolor sit </a:t>
-            </a:r>
-            <a:r>
-              <a:rPr lang="en-US" sz="2400" dirty="0" err="1">
-                <a:solidFill>
-                  <a:schemeClr val="bg1"/>
-                </a:solidFill>
-              </a:rPr>
-              <a:t>amet</a:t>
-            </a:r>
-            <a:r>
-              <a:rPr lang="en-US" sz="2400" dirty="0">
-                <a:solidFill>
-                  <a:schemeClr val="bg1"/>
-                </a:solidFill>
-              </a:rPr>
-              <a:t>, </a:t>
-            </a:r>
-            <a:r>
-              <a:rPr lang="en-US" sz="2400" dirty="0" err="1">
-                <a:solidFill>
-                  <a:schemeClr val="bg1"/>
-                </a:solidFill>
-              </a:rPr>
-              <a:t>consectetur</a:t>
-            </a:r>
-            <a:r>
-              <a:rPr lang="en-US" sz="2400" dirty="0">
-                <a:solidFill>
-                  <a:schemeClr val="bg1"/>
-                </a:solidFill>
-              </a:rPr>
-              <a:t> </a:t>
-            </a:r>
-            <a:r>
-              <a:rPr lang="en-US" sz="2400" dirty="0" err="1">
-                <a:solidFill>
-                  <a:schemeClr val="bg1"/>
-                </a:solidFill>
-              </a:rPr>
-              <a:t>adipiscing</a:t>
-            </a:r>
-            <a:r>
-              <a:rPr lang="en-US" sz="2400" dirty="0">
-                <a:solidFill>
-                  <a:schemeClr val="bg1"/>
-                </a:solidFill>
-              </a:rPr>
-              <a:t> </a:t>
-            </a:r>
-            <a:r>
-              <a:rPr lang="en-US" sz="2400" dirty="0" err="1">
-                <a:solidFill>
-                  <a:schemeClr val="bg1"/>
-                </a:solidFill>
-              </a:rPr>
-              <a:t>elit</a:t>
-            </a:r>
-            <a:r>
-              <a:rPr lang="en-US" sz="2400" dirty="0">
-                <a:solidFill>
-                  <a:schemeClr val="bg1"/>
-                </a:solidFill>
-              </a:rPr>
-              <a:t>. </a:t>
-            </a:r>
-            <a:r>
-              <a:rPr lang="en-US" sz="2400" dirty="0" err="1">
-                <a:solidFill>
-                  <a:schemeClr val="bg1"/>
-                </a:solidFill>
-              </a:rPr>
-              <a:t>Sed</a:t>
-            </a:r>
-            <a:r>
-              <a:rPr lang="en-US" sz="2400" dirty="0">
-                <a:solidFill>
-                  <a:schemeClr val="bg1"/>
-                </a:solidFill>
-              </a:rPr>
-              <a:t> </a:t>
-            </a:r>
-            <a:r>
-              <a:rPr lang="en-US" sz="2400" dirty="0" err="1">
-                <a:solidFill>
-                  <a:schemeClr val="bg1"/>
-                </a:solidFill>
-              </a:rPr>
-              <a:t>accumsan</a:t>
-            </a:r>
-            <a:r>
-              <a:rPr lang="en-US" sz="2400" dirty="0">
-                <a:solidFill>
-                  <a:schemeClr val="bg1"/>
-                </a:solidFill>
-              </a:rPr>
-              <a:t> vitae </a:t>
-            </a:r>
-            <a:r>
-              <a:rPr lang="en-US" sz="2400" dirty="0" err="1">
-                <a:solidFill>
-                  <a:schemeClr val="bg1"/>
-                </a:solidFill>
-              </a:rPr>
-              <a:t>eros</a:t>
-            </a:r>
-            <a:r>
-              <a:rPr lang="en-US" sz="2400" dirty="0">
-                <a:solidFill>
-                  <a:schemeClr val="bg1"/>
-                </a:solidFill>
-              </a:rPr>
-              <a:t> a </a:t>
-            </a:r>
-            <a:r>
-              <a:rPr lang="en-US" sz="2400" dirty="0" err="1">
-                <a:solidFill>
-                  <a:schemeClr val="bg1"/>
-                </a:solidFill>
-              </a:rPr>
-              <a:t>luctus</a:t>
-            </a:r>
-            <a:r>
-              <a:rPr lang="en-US" sz="2400" dirty="0">
-                <a:solidFill>
-                  <a:schemeClr val="bg1"/>
-                </a:solidFill>
-              </a:rPr>
-              <a:t>. </a:t>
-            </a:r>
-            <a:r>
-              <a:rPr lang="en-US" sz="2400" dirty="0" err="1">
-                <a:solidFill>
-                  <a:schemeClr val="bg1"/>
-                </a:solidFill>
-              </a:rPr>
-              <a:t>Aenean</a:t>
-            </a:r>
-            <a:endParaRPr lang="en-SG" sz="2400" dirty="0">
-              <a:solidFill>
-                <a:schemeClr val="bg1"/>
-              </a:solidFill>
-            </a:endParaRPr>
-          </a:p>
-        </p:txBody>
-      </p:sp>
-      <p:sp>
-        <p:nvSpPr>
-          <p:cNvPr id="3" name="Rectangle 5"/>
-          <p:cNvSpPr/>
-          <p:nvPr/>
-        </p:nvSpPr>
-        <p:spPr>
-          <a:xfrm>
-            <a:off x="5638800" y="5334000"/>
-            <a:ext cx="2514600" cy="838200"/>
-          </a:xfrm>
-          <a:prstGeom prst="rect">
-            <a:avLst/>
-          </a:prstGeom>
-          <a:solidFill>
-            <a:srgbClr val="00B050"/>
-          </a:solidFill>
-          <a:ln>
-            <a:solidFill>
-              <a:srgbClr val="002060"/>
-            </a:solidFill>
-          </a:ln>
-        </p:spPr>
-        <p:style>
-          <a:lnRef idx="2">
-            <a:schemeClr val="accent1">
-              <a:shade val="50000"/>
-            </a:schemeClr>
-          </a:lnRef>
-          <a:fillRef idx="1">
-            <a:schemeClr val="accent1"/>
-          </a:fillRef>
-          <a:effectRef idx="0">
-            <a:schemeClr val="accent1"/>
-          </a:effectRef>
-          <a:fontRef idx="minor">
-            <a:schemeClr val="lt1"/>
-          </a:fontRef>
-        </p:style>
-        <p:txBody>
-          <a:bodyPr rtlCol="0" anchor="ctr"/>
-          <a:lstStyle/>
-          <a:p>
-            <a:r>
-              <a:rPr lang="en-US" sz="1200" dirty="0" err="1">
-                <a:solidFill>
-                  <a:schemeClr val="bg1"/>
-                </a:solidFill>
-              </a:rPr>
-              <a:t>Lorem</a:t>
-            </a:r>
-            <a:r>
-              <a:rPr lang="en-US" sz="1200" dirty="0">
-                <a:solidFill>
-                  <a:schemeClr val="bg1"/>
-                </a:solidFill>
-              </a:rPr>
-              <a:t> </a:t>
-            </a:r>
-            <a:r>
-              <a:rPr lang="en-US" sz="1200" dirty="0" err="1">
-                <a:solidFill>
-                  <a:schemeClr val="bg1"/>
-                </a:solidFill>
-              </a:rPr>
-              <a:t>ipsum</a:t>
-            </a:r>
-            <a:r>
-              <a:rPr lang="en-US" sz="1200" dirty="0">
-                <a:solidFill>
-                  <a:schemeClr val="bg1"/>
-                </a:solidFill>
-              </a:rPr>
-              <a:t> dolor sit </a:t>
-            </a:r>
-            <a:r>
-              <a:rPr lang="en-US" sz="1200" dirty="0" err="1">
-                <a:solidFill>
-                  <a:schemeClr val="bg1"/>
-                </a:solidFill>
-              </a:rPr>
-              <a:t>amet</a:t>
-            </a:r>
-            <a:r>
-              <a:rPr lang="en-US" sz="1200" dirty="0">
-                <a:solidFill>
-                  <a:schemeClr val="bg1"/>
-                </a:solidFill>
-              </a:rPr>
-              <a:t>, </a:t>
-            </a:r>
-            <a:r>
-              <a:rPr lang="en-US" sz="1200" dirty="0" err="1">
-                <a:solidFill>
-                  <a:schemeClr val="bg1"/>
-                </a:solidFill>
-              </a:rPr>
-              <a:t>consectetur</a:t>
-            </a:r>
-            <a:r>
-              <a:rPr lang="en-US" sz="1200" dirty="0">
-                <a:solidFill>
-                  <a:schemeClr val="bg1"/>
-                </a:solidFill>
-              </a:rPr>
-              <a:t> </a:t>
-            </a:r>
-            <a:r>
-              <a:rPr lang="en-US" sz="1200" dirty="0" err="1">
-                <a:solidFill>
-                  <a:schemeClr val="bg1"/>
-                </a:solidFill>
-              </a:rPr>
-              <a:t>adipiscing</a:t>
-            </a:r>
-            <a:r>
-              <a:rPr lang="en-US" sz="1200" dirty="0">
-                <a:solidFill>
-                  <a:schemeClr val="bg1"/>
-                </a:solidFill>
-              </a:rPr>
-              <a:t> </a:t>
-            </a:r>
-            <a:r>
-              <a:rPr lang="en-US" sz="1200" dirty="0" err="1">
-                <a:solidFill>
-                  <a:schemeClr val="bg1"/>
-                </a:solidFill>
-              </a:rPr>
-              <a:t>elit</a:t>
-            </a:r>
-            <a:r>
-              <a:rPr lang="en-US" sz="1200" dirty="0">
-                <a:solidFill>
-                  <a:schemeClr val="bg1"/>
-                </a:solidFill>
-              </a:rPr>
-              <a:t>. </a:t>
-            </a:r>
-            <a:r>
-              <a:rPr lang="en-US" sz="1200" dirty="0" err="1">
-                <a:solidFill>
-                  <a:schemeClr val="bg1"/>
-                </a:solidFill>
-              </a:rPr>
-              <a:t>Sed</a:t>
-            </a:r>
-            <a:r>
-              <a:rPr lang="en-US" sz="1200" dirty="0">
-                <a:solidFill>
-                  <a:schemeClr val="bg1"/>
-                </a:solidFill>
-              </a:rPr>
-              <a:t> </a:t>
-            </a:r>
-            <a:r>
-              <a:rPr lang="en-US" sz="1200" dirty="0" err="1">
-                <a:solidFill>
-                  <a:schemeClr val="bg1"/>
-                </a:solidFill>
-              </a:rPr>
-              <a:t>accumsan</a:t>
-            </a:r>
-            <a:r>
-              <a:rPr lang="en-US" sz="1200" dirty="0">
-                <a:solidFill>
-                  <a:schemeClr val="bg1"/>
-                </a:solidFill>
-              </a:rPr>
-              <a:t> vitae </a:t>
-            </a:r>
-            <a:r>
-              <a:rPr lang="en-US" sz="1200" dirty="0" err="1">
-                <a:solidFill>
-                  <a:schemeClr val="bg1"/>
-                </a:solidFill>
-              </a:rPr>
-              <a:t>eros</a:t>
-            </a:r>
-            <a:r>
-              <a:rPr lang="en-US" sz="1200" dirty="0">
-                <a:solidFill>
-                  <a:schemeClr val="bg1"/>
-                </a:solidFill>
-              </a:rPr>
-              <a:t> a </a:t>
-            </a:r>
-            <a:r>
-              <a:rPr lang="en-US" sz="1200" dirty="0" err="1">
-                <a:solidFill>
-                  <a:schemeClr val="bg1"/>
-                </a:solidFill>
-              </a:rPr>
-              <a:t>luctus</a:t>
-            </a:r>
-            <a:r>
-              <a:rPr lang="en-US" sz="1200" dirty="0">
-                <a:solidFill>
-                  <a:schemeClr val="bg1"/>
-                </a:solidFill>
-              </a:rPr>
-              <a:t>. </a:t>
-            </a:r>
-            <a:r>
-              <a:rPr lang="en-US" sz="1200" dirty="0" err="1">
-                <a:solidFill>
-                  <a:schemeClr val="bg1"/>
-                </a:solidFill>
-              </a:rPr>
-              <a:t>Aenean</a:t>
-            </a:r>
-            <a:endParaRPr lang="en-SG" sz="1200" dirty="0">
-              <a:solidFill>
-                <a:schemeClr val="bg1"/>
-              </a:solidFill>
-            </a:endParaRPr>
-          </a:p>
-        </p:txBody>
-      </p:sp>
-      <p:sp>
-        <p:nvSpPr>
-          <p:cNvPr id="5" name="text 4"/>
+          <p:cNvPr id="8" name="text 4"/>
           <p:cNvSpPr txBox="1"/>
           <p:nvPr/>
         </p:nvSpPr>
@@ -30498,7 +31334,7 @@
     </p:spTree>
     <p:extLst>
       <p:ext uri="{BB962C8B-B14F-4D97-AF65-F5344CB8AC3E}">
-        <p14:creationId xmlns:p14="http://schemas.microsoft.com/office/powerpoint/2010/main" val="1777491528"/>
+        <p14:creationId xmlns:p14="http://schemas.microsoft.com/office/powerpoint/2010/main" val="1917589626"/>
       </p:ext>
     </p:extLst>
   </p:cSld>

</xml_diff>

<commit_message>
update FT framework, added test cases
</commit_message>
<xml_diff>
--- a/doc/test/AutoAnimate.pptx
+++ b/doc/test/AutoAnimate.pptx
@@ -12,7 +12,7 @@
     <p:sldId id="292" r:id="rId6"/>
     <p:sldId id="313" r:id="rId7"/>
     <p:sldId id="314" r:id="rId8"/>
-    <p:sldId id="336" r:id="rId9"/>
+    <p:sldId id="347" r:id="rId9"/>
     <p:sldId id="341" r:id="rId10"/>
     <p:sldId id="342" r:id="rId11"/>
     <p:sldId id="343" r:id="rId12"/>
@@ -142,7 +142,7 @@
             <p14:sldId id="292"/>
             <p14:sldId id="313"/>
             <p14:sldId id="314"/>
-            <p14:sldId id="336"/>
+            <p14:sldId id="347"/>
             <p14:sldId id="341"/>
             <p14:sldId id="342"/>
             <p14:sldId id="343"/>
@@ -228,7 +228,7 @@
           <inkml:channelProperty channel="F" name="resolution" value="2.82441E-6" units="1/dev"/>
         </inkml:channelProperties>
       </inkml:inkSource>
-      <inkml:timestamp xml:id="ts0" timeString="2014-03-25T18:25:39.871"/>
+      <inkml:timestamp xml:id="ts0" timeString="2015-06-06T13:13:27.447"/>
     </inkml:context>
     <inkml:brush xml:id="br0">
       <inkml:brushProperty name="width" value="0.06667" units="cm"/>
@@ -237,8 +237,8 @@
       <inkml:brushProperty name="fitToCurve" value="1"/>
     </inkml:brush>
   </inkml:definitions>
-  <inkml:trace contextRef="#ctx0" brushRef="#br0">933 1849 6,'0'-2'31,"0"2"1,0 0-12,0 0-2,0 0-1,0 0-5,0 0 2,0 0 6,0 0-2,0 0-4,0 0-4,0 0 2,0 0-1,0 0 1,0 0-3,0 0 3,0 0 0,0 0-7,0 0-3,-6 0 1,-2 0 2,2 0 1,-5 5-3,1 3-1,-4 0 1,1 7-1,0 3-1,-1 2 2,3 2 0,3-1 4,-1 0-6,-1 0 1,1 2 3,-1 0-3,1 0 1,2 5-1,-1 0-1,-1-2 2,4 2-2,3 3-1,-2-3 2,4 0-2,0-2 2,0 5 2,0-6-3,0 3 2,11 4 1,-1-7-2,8-2-1,-5 5 0,3-5 1,0-2-1,1-1-1,10-6-1,-6 5 2,4-6-1,2-5 1,0 2-1,1-5 2,-4-2-1,5-1 2,-2-2-3,1 0 0,-7 0 2,6 0 1,1 0-2,-1 0 3,3-6-3,-3-8 1,-2-4 2,-1-5 0,0 0-3,0 0 3,-1-5-3,-5-1 1,-3 4-1,0 0 4,1-5 1,-5 8-2,-3-1 3,-2 5-2,-3-5 3,-3 2 0,2-2-4,-2 0-2,0-2 0,0-1 9,0 5-9,0 4 2,0-1-2,-13-5-1,-1 0 1,-3 2-2,7 3 1,3-1-1,-2 5 0,0-5 0,2 7 1,-1 1-1,1-1 1,-1 10-1,0-6-1,0-1 2,3-1 1,-6 3-1,6 2 0,-1 0-1,3 0 1,-1 0 0,0 2 0,2 3 0,-1 0 0,3 0 0,-2 0-1,2 0 0,0 0 0,0 0 0,0 0 1,0-2 0,0 2-1,0 0 0,0 0 0,0 0-1,0 0 1,0 0-1,0 0-1,0 0 0,0 0 0,0 0 0,0 0-2,0 0 0,0 0-2,0 0 0,0 0-4,0 0 1,0 0 3,0 0 6,0 0 1,2 10-1,11 7 0,3 3 0,4-4 0,-4 5 0,1 0 0,1 2-1,-1-3 2,7 0-1,-2 4 0,2 1-1,-5-2 1,8-2-1,-5-5 0,2 1 0,-4 4 0,2-9-4,-2 1-1,2-5 4,-2-3 0,-2 0 0,7 0-3,-6-1 2,3-4 2,-4 0-2,2 0 2,-2 0 2,7-4-1,-4-6 2,1 0-4,0-6 4,0-1-2,3-4 0,-3 0 0,-4 0 0,4-1 0,-1-4 0,1 3 0,-3 3 0,2-3 1,-1-3-1,-1 1 0,-3-5 0,0 0 0,0 2 0,-2 3 1,-4 3 2,-1-3 2,-4 5 0,-2-5-2,0-2-2,0-7 0,-3 4-1,0 4 2,0-3-2,0 3 3,0 6 1,0 1-1,0 1 3,-6 1-1,-4-2 0,-4 3-3,-1 1 3,2 3 0,-2 1-3,-1 1-3,-4 5 0,-2-3 0,0 3 1,1 0 0,-3 2 0,-4 1 0,1 2-2,-2 0 3,5 0-2,-2 0 0,2 0 3,5 0-5,0 0 1,0 0 2,6 7-3,-1 1 1,0 2 1,-4 3-1,1 1 0,1-5 1,5 1 2,2-5-1,2 1 0,4-2 2,0-4-4,3 0 1,0 0-2,0 0-2,0 0 0,0 0-2,0 0-4,0 0 2,0 0 1,0 0-2,0 0 7,0 0 4,13-10 1,5 4-1,0-5-1,4-2 0,-3 0 1,3-5-1,3 0 1,-1 1-2,1-7 2,-1 1 1,0-3-2,1-3 0,-1-2 1,0-6 1,0 7-1,-1-3 1,1-3-1,1 0 0,1 0 2,-10 0-1,1 1-1,-1 0 0,-1 0 4,-3 2-1,-6 14 1,1 0-4,-3-2 2,-2 3 2,0-8-2,-2 4-1,0-7 0,0 1 2,0 0-1,0 2-2,0 1 2,-11-7-2,-2 7 1,2 2 0,-2 0 3,-3 5-4,-1 6 1,-1-7-3,-6 3 3,4-1-2,-2 2 3,-2 5-2,2 5-2,1-3 1,-1 0 1,2 1 2,0 2-3,-2 0 0,2 1-3,2 4 2,0 0 1,3 0-1,-7 0-1,3 0 0,0 16 3,2 5-6,-1-4 7,2 7-2,1-2 0,-3 2 0,5-4 0,0 10-2,-5-4 2,7-2 0,-2 4-1,0-8 1,2 3 0,2 0-1,2 2 1,-2 2-1,5-7 0,-3-2-1,2 2 1,3 1-3,-4 2 3,6-1 0,0-5-2,0 6 0,0-8 1,0-2 0,0-3-1,0-1 1,0-6 0,0 0 1,0-3-1,0 0 1,0 0-2,0 0 2,0 0 1,0 0-1,0 0 1,0 0 1,0 0-1,0 0 0,0 0-1,0 0 0,0 0 0,0 0 0,0 0-4,0 0 4,0 0 6,0 0-3,0-5 0,6-13-1,1-7 2,4-6-3,-2-5 1,-2 0-1,2-7 0,2-3 1,2-8 1,-4 0-2,-5 2 1,0 2 1,-4 7 1,0-4-1,0 9-1,0-3 1,-8-4 2,-6 5-3,-8-6 1,-3 9 0,-5 6-1,-1 6 1,0 8 0,0 1-2,-2 1 0,5-1-1,1-5-2,-3 11 3,-2 5-1,8 3 1,-4 2 0,1 0-1,-3 0 1,6 0-2,2 0 2,-2 5-2,-4 11-1,4 3 3,-6 2-1,1 8-1,6 2 0,1 4 1,4-1 0,5-2-1,-2-1 1,5-3 1,4 8 0,-2-2-1,5-1 1,1 3-1,2-3-1,0-2 1,0 0 0,0 1 1,13 3-2,1 1 4,3-3-4,-1 0 2,-3-5 0,3 3 0,1-3 0,-6 0 0,8-4 0,-6-4 0,-2-5-1,-1-4 0,-3-4 0,-2-1 0,-3-4 1,2 3 1,-4-5 0,0 0-1,0 0 1,2 0 2,-2 0-1,0 0 0,0 0 3,0 0-1,0 0 2,0 0 0,0 0-1,0 0-2,0 0 1,0 0 0,0 0 3,0 0-1,0 0 2,0 0 0,0 0-4,0 0-2,0-5-1,-6-10 0,-12-2-1,-4-5 0,-5 2 0,3-6-1,-7 0 1,-2-4 0,6-2 0,-2-1-1,-1 3 0,0 2 1,0 0-1,-2 7 1,-1 2-3,-4 4 2,-2 3 1,-6-1 0,3 8 0,-1 0 0,8 2 1,4 3-2,-3-5 1,2 5 0,-1 0 1,-9 0-4,8 5 5,1 13-2,0 2-2,9 0 1,-1-4 0,-1 8 1,-2 5-1,10 8-1,-2-1 0,7-3 1,-3 6-1,-1-1 0,11 1 1,2 2 0,4 5-1,0-5 0,0 0 1,13 0 0,10 0-2,-7-2 3,5-4-1,4-2 0,4-4 0,1-3-1,-3 0 1,9-12-3,-2 4 3,2-9 2,4-1-1,2-3 0,-2-5-1,1 0 2,-9 0 2,3 0-3,-2 0 0,-6 0 0,0 0 0,3 0 1,-3-2-1,2-4 1,-1 1-1,-6-2 0,-6-3 0,-2 5 1,-9 3 1,-5 2 4,0 0-2,0 0-1,0 0 1,0 0-3,0 0 1,0 0 1,0 0 3,0 0 0,0 0 3,0 0 1,0 0-8,0 0-3,0 0-1,-25 0 1,-2 0 2,-2 0-1,-1 0-3,3 0 3,-4 0-1,4 0 0,-2 0 0,-15 15 0,4 5 1,-4 11-2,-2 2 2,6 0-2,-4 4 0,12-2 1,5-1-1,-3 1 0,8-1 0,2 7-1,0-1 2,-2 5 2,-2-4-1,4-3-1,11-1-1,2-5 2,1-4-2,-1 7 0,3-6 1,4 2-2,0 0 1,0-8-2,0 0 1,15 0 0,3 0 2,12-2-3,0-4 3,0-2 0,-3-1 0,11-1 3,-5-8-3,4-3 0,4-2 3,-6 0 2,3 0-2,3-2 1,0-16-1,2-1 1,-5 4-1,9-2 0,-10-7 0,3-6 1,-1 1 0,-7-1-1,-2-1 1,-5 2 0,2 3-1,-3-4 1,-2 2 0,-8 5 1,2-1-2,-8 9 2,0 3 0,-3-3 0,4-3 0,-2-8 0,4-3-1,-3 3 3,-5 6 1,-3 13-5,0 7 0,-3 0 0,-5 0 1,6 0 0,2-3-1,0-8 0,0 2 1,0 6 1,0 3-1,-3 0 1,-3 0-3,6 0 0,0 0-1,0 0 0,0 0-1,0 0-3,0 0-1,-3 0-4,-4 0-17,1 0-29,6 0-99,0 0-91</inkml:trace>
-  <inkml:trace contextRef="#ctx0" brushRef="#br0" timeOffset="1">876 1752 75,'0'2'45,"0"1"-25,0-3 29,0 0-11,0 0-11,0 0-3,0 0 6,0 0-4,0 0-3,0 0 4,0 0-1,-3 0-4,3 0-1,0 0-4,0 0-1,0 0-6,-6 0-5,1 0-3,-4 0 0,1 0 2,-5-8 0,0-3 3,1-5-2,-4-2-4,1-4 3,-3-4 1,3-2-1,1 1 2,1-4-2,2-5 0,0 0 0,2-5 0,7-3 0,0-2-1,2-3-3,0 4 4,0-7 1,0 4-4,7 5 0,6 4 0,2 6 2,-2 7-3,3-2 1,0 3-2,1-1-2,-1 3 3,3 5-1,4 0 1,6 0-1,4 3 1,-2-1-2,8 4-1,-1 1 3,0 4-1,0 4 1,-3 3-1,3 0-1,-3 0 1,0 0 0,1 0 0,-3 3 0,2 6 1,1 5-3,-7 2 2,-2-4-1,0 1 1,-2 7-1,-7-2 0,-1 3 2,8-1 0,-8 2-1,1 2 0,-3-1 0,-3 0 0,-5 3 0,4-2 2,-2 1-2,-1 3 3,-3 0-4,1 0 1,-3 0 2,-1 3-1,-2-3-5,0 2 6,0 1-3,0 3 4,0-2-1,0 5 1,0 1-2,-5-2 0,-6 2-2,0-7 2,3-2 0,-1-5-1,2 1 0,-6-5 2,-1-3 0,-4 3 1,3-9-1,-4 3 1,5-3 0,1 1-1,-6-5-1,0 1 0,-8-3-3,5-3 3,-6 1 0,4-3 0,-3 0 0,5 0 0,4 0 0,-2 0 0,2 2 0,1-2-1,-5 0 0,8 0 1,-1 0 0,2 0 0,-2 0 1,2 0-1,-4 0 1,4 0-1,4 0 0,0 0 0,-2 0 0,0 0 0,2 0 0,-2 0 0,2 0 0,0 0 0,1 0 1,-1 0 0,4 0-1,-4 0 0,-4 0 0,2 0 0,0-2 0,3-3 0,1 2 0,1 1-1,-2-1 0,4 3 1,0-2 0,1-1-1,0 1 1,0-1-1,3 3-6,-3-2-18,3 2-36,0 0-79,0-3-46</inkml:trace>
+  <inkml:trace contextRef="#ctx0" brushRef="#br0">933 1850 6,'0'-2'31,"0"2"1,0 0-12,0 0-2,0 0-1,0 0-5,0 0 2,0 0 6,0 0-2,0 0-4,0 0-4,0 0 2,0 0-1,0 0 1,0 0-3,0 0 3,0 0 0,0 0-7,0 0-3,-6 0 1,-2 0 2,2 0 1,-5 5-3,1 3-1,-4 0 1,1 7-1,0 3-1,-1 2 2,3 2 0,3-1 4,-1 0-6,-1 0 1,1 2 3,-1 0-3,1 0 1,2 5-1,-1 0-1,-1-2 2,4 2-2,3 3-1,-2-3 2,4 0-2,0-2 2,0 5 2,0-6-3,0 3 2,11 4 1,-1-7-2,8-2-1,-5 5 0,3-5 1,0-2-1,1-1-1,10-6-1,-6 5 2,4-6-1,2-5 1,0 2-1,1-5 2,-4-2-1,5-1 2,-2-2-3,1 0 0,-7 0 2,6 0 1,1 0-2,-1 0 3,3-6-3,-3-8 1,-2-4 2,-1-5 0,0 0-3,0 0 3,-1-5-3,-5-1 1,-3 4-1,0 0 4,1-5 1,-5 8-2,-3-1 3,-2 5-2,-3-5 3,-3 2 0,2-2-4,-2 0-2,0-2 0,0-1 9,0 5-9,0 4 2,0-1-2,-13-5-1,-1 0 1,-3 2-2,7 3 1,3-1-1,-2 5 0,0-5 0,2 7 1,-1 1-1,1-1 1,-1 10-1,0-6-1,0-1 2,3-1 1,-6 3-1,6 2 0,-1 0-1,3 0 1,-1 0 0,0 2 0,2 3 0,-1 0 0,3 0 0,-2 0-1,2 0 0,0 0 0,0 0 0,0 0 1,0-2 0,0 2-1,0 0 0,0 0 0,0 0-1,0 0 1,0 0-1,0 0-1,0 0 0,0 0 0,0 0 0,0 0-2,0 0 0,0 0-2,0 0 0,0 0-4,0 0 1,0 0 3,0 0 6,0 0 1,2 10-1,11 7 0,3 3 0,4-4 0,-4 5 0,1 0 0,1 2-1,-1-3 2,7 0-1,-2 4 0,2 1-1,-5-2 1,8-2-1,-5-5 0,2 1 0,-4 4 0,2-9-4,-2 1-1,2-5 4,-2-3 0,-2 0 0,7 0-3,-6-1 2,3-4 2,-4 0-2,2 0 2,-2 0 2,7-4-1,-4-6 2,1 0-4,0-6 4,0-1-2,3-4 0,-3 0 0,-4 0 0,4-1 0,-1-4 0,1 3 0,-3 3 0,2-3 1,-1-3-1,-1 1 0,-3-5 0,0 0 0,0 2 0,-2 3 1,-4 3 2,-1-3 2,-4 5 0,-2-5-2,0-2-2,0-7 0,-3 4-1,0 4 2,0-3-2,0 3 3,0 6 1,0 1-1,0 1 3,-6 1-1,-4-2 0,-4 3-3,-1 1 3,2 3 0,-2 1-3,-1 1-3,-4 5 0,-2-3 0,0 3 1,1 0 0,-3 2 0,-4 1 0,1 2-2,-2 0 3,5 0-2,-2 0 0,2 0 3,5 0-5,0 0 1,0 0 2,6 7-3,-1 1 1,0 2 1,-4 3-1,1 1 0,1-5 1,5 1 2,2-5-1,2 1 0,4-2 2,0-4-4,3 0 1,0 0-2,0 0-2,0 0 0,0 0-2,0 0-4,0 0 2,0 0 1,0 0-2,0 0 7,0 0 4,13-10 1,5 4-1,0-5-1,4-2 0,-3 0 1,3-5-1,3 0 1,-1 1-2,1-7 2,-1 1 1,0-3-2,1-4 0,-1-1 1,0-6 1,0 7-1,-1-3 1,1-3-1,1 0 0,1 0 2,-10 0-1,1 1-1,-1 0 0,-1 0 4,-3 2-1,-6 14 1,1 0-4,-3-2 2,-2 3 2,0-8-2,-2 4-1,0-7 0,0 1 2,0 0-1,0 2-2,0 1 2,-11-7-2,-2 7 1,2 2 0,-2 0 3,-3 5-4,-1 6 1,-1-7-3,-6 3 3,4-1-2,-2 2 3,-2 5-2,2 5-2,1-3 1,-1 0 1,2 1 2,0 2-3,-2 0 0,2 1-3,2 4 2,0 0 1,3 0-1,-7 0-1,3 0 0,0 16 3,2 5-6,-1-4 7,2 7-2,1-2 0,-3 2 0,5-4 0,0 10-2,-5-4 2,7-2 0,-2 4-1,0-8 1,2 3 0,2 0-1,2 2 1,-2 2-1,5-7 0,-3-2-1,2 2 1,3 1-3,-4 2 3,6-1 0,0-5-2,0 6 0,0-8 1,0-2 0,0-3-1,0-1 1,0-6 0,0 0 1,0-3-1,0 0 1,0 0-2,0 0 2,0 0 1,0 0-1,0 0 1,0 0 1,0 0-1,0 0 0,0 0-1,0 0 0,0 0 0,0 0 0,0 0-4,0 0 4,0 0 6,0 0-3,0-5 0,6-13-1,1-7 2,4-6-3,-2-5 1,-2 0-1,2-7 0,2-3 1,2-8 1,-4 0-2,-5 2 1,0 2 1,-4 7 1,0-4-1,0 9-1,0-3 1,-8-4 2,-6 5-3,-8-6 1,-3 9 0,-5 6-1,-1 6 1,0 8 0,0 1-2,-2 1 0,5-1-1,1-5-2,-3 11 3,-2 5-1,8 3 1,-4 2 0,1 0-1,-3 0 1,6 0-2,2 0 2,-2 5-2,-4 11-1,4 3 3,-6 2-1,1 8-1,6 2 0,1 4 1,4-1 0,5-2-1,-2-1 1,5-3 1,4 8 0,-2-2-1,5-1 1,1 3-1,2-3-1,0-2 1,0 0 0,0 1 1,13 3-2,1 1 4,3-3-4,-1 0 2,-3-5 0,3 3 0,1-3 0,-6 0 0,8-4 0,-6-4 0,-2-5-1,-1-4 0,-3-4 0,-2-1 0,-3-4 1,2 3 1,-4-5 0,0 0-1,0 0 1,2 0 2,-2 0-1,0 0 0,0 0 3,0 0-1,0 0 2,0 0 0,0 0-1,0 0-2,0 0 1,0 0 0,0 0 3,0 0-1,0 0 2,0 0 0,0 0-4,0 0-2,0-5-1,-6-10 0,-12-2-1,-4-5 0,-5 2 0,3-6-1,-7 0 1,-2-4 0,6-2 0,-2-1-1,-1 3 0,0 2 1,0 0-1,-2 7 1,-1 2-3,-4 4 2,-2 3 1,-6-1 0,3 8 0,-1 0 0,8 2 1,4 3-2,-3-5 1,2 5 0,-1 0 1,-9 0-4,8 5 5,1 13-2,0 2-2,9 0 1,-1-4 0,-1 8 1,-2 5-1,10 8-1,-2-1 0,7-3 1,-3 6-1,-1-1 0,11 1 1,2 2 0,4 5-1,0-5 0,0 0 1,13 0 0,10 0-2,-7-2 3,5-4-1,4-2 0,4-4 0,1-3-1,-3 0 1,9-12-3,-2 4 3,2-8 2,4-2-1,2-3 0,-2-5-1,1 0 2,-9 0 2,3 0-3,-2 0 0,-6 0 0,0 0 0,3 0 1,-3-2-1,2-4 1,-1 1-1,-6-3 0,-6-2 0,-2 5 1,-9 3 1,-5 2 4,0 0-2,0 0-1,0 0 1,0 0-3,0 0 1,0 0 1,0 0 3,0 0 0,0 0 3,0 0 1,0 0-8,0 0-3,0 0-1,-25 0 1,-2 0 2,-2 0-1,-1 0-3,3 0 3,-4 0-1,4 0 0,-2 0 0,-15 15 0,4 6 1,-4 10-2,-2 2 2,6 0-2,-4 4 0,12-2 1,5-1-1,-3 1 0,8-1 0,2 7-1,0-1 2,-2 5 2,-2-4-1,4-3-1,11-1-1,2-5 2,1-4-2,-1 7 0,3-6 1,4 2-2,0 0 1,0-8-2,0 0 1,15 0 0,3 0 2,12-2-3,0-4 3,0-2 0,-3-1 0,11-1 3,-5-8-3,4-3 0,4-2 3,-6 0 2,3 0-2,3-2 1,0-16-1,2-1 1,-5 4-1,9-2 0,-10-7 0,3-6 1,-1 1 0,-7-1-1,-2-1 1,-5 2 0,2 3-1,-3-4 1,-2 2 0,-8 5 1,2-1-2,-8 9 2,0 3 0,-3-3 0,4-3 0,-2-8 0,4-3-1,-3 3 3,-5 6 1,-3 13-5,0 7 0,-3 0 0,-5 0 1,6 0 0,2-3-1,0-8 0,0 2 1,0 6 1,0 3-1,-3 0 1,-3 0-3,6 0 0,0 0-1,0 0 0,0 0-1,0 0-3,0 0-1,-3 0-4,-4 0-17,1 0-29,6 0-99,0 0-91</inkml:trace>
+  <inkml:trace contextRef="#ctx0" brushRef="#br0" timeOffset="1">876 1753 75,'0'2'45,"0"1"-25,0-3 29,0 0-11,0 0-11,0 0-3,0 0 6,0 0-4,0 0-3,0 0 4,0 0-1,-3 0-4,3 0-1,0 0-4,0 0-1,0 0-6,-6 0-5,1 0-3,-4 0 0,1 0 2,-5-8 0,0-3 3,1-5-2,-4-2-4,1-4 3,-3-4 1,3-2-1,1 1 2,1-4-2,2-5 0,0 0 0,2-5 0,7-3 0,0-2-1,2-3-3,0 3 4,0-6 1,0 4-4,7 5 0,6 4 0,2 6 2,-2 7-3,3-2 1,0 3-2,1-1-2,-1 3 3,3 5-1,4 0 1,6 0-1,4 3 1,-2-1-2,8 4-1,-1 1 3,0 4-1,0 4 1,-3 3-1,3 0-1,-3 0 1,0 0 0,1 0 0,-3 3 0,2 6 1,1 5-3,-7 2 2,-2-4-1,0 1 1,-2 7-1,-7-2 0,-1 3 2,8-1 0,-8 2-1,1 2 0,-3-1 0,-3 0 0,-5 3 0,4-2 2,-2 1-2,-1 3 3,-3 0-4,1 0 1,-3 0 2,-1 3-1,-2-3-5,0 3 6,0 0-3,0 3 4,0-2-1,0 5 1,0 1-2,-5-2 0,-6 2-2,0-7 2,3-2 0,-1-5-1,2 1 0,-6-5 2,-1-3 0,-4 3 1,3-9-1,-4 3 1,5-3 0,1 1-1,-6-5-1,0 1 0,-8-3-3,5-3 3,-6 1 0,4-3 0,-3 0 0,5 0 0,4 0 0,-2 0 0,2 2 0,1-2-1,-5 0 0,8 0 1,-1 0 0,2 0 0,-2 0 1,2 0-1,-4 0 1,4 0-1,4 0 0,0 0 0,-2 0 0,0 0 0,2 0 0,-2 0 0,2 0 0,0 0 0,1 0 1,-1 0 0,4 0-1,-4 0 0,-4 0 0,2 0 0,0-2 0,3-3 0,1 2 0,1 1-1,-2-1 0,4 3 1,0-2 0,1-1-1,0 1 1,0-1-1,3 3-6,-3-2-18,3 2-36,0 0-79,0-3-46</inkml:trace>
 </inkml:ink>
 </file>
 
@@ -258,7 +258,7 @@
           <inkml:channelProperty channel="F" name="resolution" value="2.82441E-6" units="1/dev"/>
         </inkml:channelProperties>
       </inkml:inkSource>
-      <inkml:timestamp xml:id="ts0" timeString="2014-03-25T18:25:39.881"/>
+      <inkml:timestamp xml:id="ts0" timeString="2015-06-06T13:13:27.457"/>
     </inkml:context>
     <inkml:brush xml:id="br0">
       <inkml:brushProperty name="width" value="0.06667" units="cm"/>
@@ -288,7 +288,7 @@
           <inkml:channelProperty channel="F" name="resolution" value="2.82441E-6" units="1/dev"/>
         </inkml:channelProperties>
       </inkml:inkSource>
-      <inkml:timestamp xml:id="ts0" timeString="2014-03-25T18:25:39.891"/>
+      <inkml:timestamp xml:id="ts0" timeString="2015-06-06T13:13:27.467"/>
     </inkml:context>
     <inkml:brush xml:id="br0">
       <inkml:brushProperty name="width" value="0.06667" units="cm"/>
@@ -318,7 +318,7 @@
           <inkml:channelProperty channel="F" name="resolution" value="2.82441E-6" units="1/dev"/>
         </inkml:channelProperties>
       </inkml:inkSource>
-      <inkml:timestamp xml:id="ts0" timeString="2014-03-25T18:25:39.904"/>
+      <inkml:timestamp xml:id="ts0" timeString="2015-06-06T13:13:27.477"/>
     </inkml:context>
     <inkml:brush xml:id="br0">
       <inkml:brushProperty name="width" value="0.06667" units="cm"/>
@@ -327,8 +327,8 @@
       <inkml:brushProperty name="fitToCurve" value="1"/>
     </inkml:brush>
   </inkml:definitions>
-  <inkml:trace contextRef="#ctx0" brushRef="#br0">880 1695 6,'0'-2'31,"0"2"1,0 0-12,0 0-2,0 0-1,0 0-5,0 0 2,0 0 6,0 0-2,0 0-4,0 0-4,0 0 2,0 0-1,0 0 1,0 0-3,0 0 3,0 0 0,0 0-7,0 0-3,-5 0 1,-3 0 2,2 0 1,-4 4-3,0 4-1,-3-1 1,1 6-1,-1 4-1,1 1 2,1 3 0,3-2 4,0 0-6,-1 0 1,1 3 3,-2-1-3,1-1 1,3 7-1,-2-2-1,0-1 2,4 1-2,1 4-1,0-3 2,3 0-2,0-3 2,0 6 2,0-6-3,0 2 2,10 4 1,0-6-2,7-2-1,-5 5 0,2-5 1,1-2-1,2 0-1,8-6-1,-5 4 2,4-5-1,1-5 1,0 2-1,2-4 2,-4-3-1,5 1 2,-3-3-3,2 0 0,-8 0 2,6 0 1,1 0-2,0 0 3,2-6-3,-3-7 1,-1-3 2,-1-6 0,-1 1-3,2 1 3,-3-7-3,-3 1 1,-5 3-1,1 0 4,2-4 1,-6 7-2,-3-1 3,-2 4-2,-1-4 3,-4 2 0,1-2-4,-1 0-2,0-2 0,0-1 9,0 5-9,0 3 2,0 0-2,-12-5-1,-1-1 1,-2 3-2,5 3 1,3-2-1,-1 5 0,-1-4 0,3 6 1,-2 1-1,2-1 1,-1 9-1,-1-6-1,0 1 2,3-2 1,-6 2-1,7 2 0,-2 0-1,4 1 1,-2-1 0,0 3 0,2 2 0,-1 0 0,3 0 0,-2 0-1,2 0 0,0 0 0,0 0 0,0 0 1,0-3 0,0 3-1,0 0 0,0 0 0,0 0-1,0 0 1,0 0-1,0 0-1,0 0 0,0 0 0,0 0 0,0 0-2,0 0 0,0 0-2,0 0 0,0 0-4,0 0 1,0 0 3,0 0 6,0 0 1,2 10-1,11 6 0,2 2 0,3-4 0,-2 6 0,0-1 0,1 2-1,-1-2 2,6-1-1,-2 4 0,3 1-1,-5-2 1,8-2-1,-5-4 0,1 0 0,-3 5 0,2-9-4,-2 1-1,2-4 4,-2-4 0,-2 1 0,6-1-3,-4-1 2,0-3 2,-1 0-2,0 0 2,-1 0 2,7-3-1,-4-6 2,1 0-4,0-6 4,-1-1-2,4-3 0,-3 0 0,-4 0 0,4-2 0,-1-3 0,1 3 0,-5 3 0,5-3 1,-3-3-1,0 1 0,-3-4 0,1-1 0,-1 2 0,-2 4 1,-3 3 2,-2-5 2,-3 6 0,-2-5-2,-1-2-2,1-6 0,-3 4-1,0 3 2,0-3-2,0 3 3,0 5 1,0 2-1,0 1 3,-5 0-1,-5-1 0,-3 2-3,-1 1 3,1 3 0,-1 2-3,-1-1-3,-4 5 0,-2-2 0,0 2 1,3 1 0,-5 1 0,-4 1 0,2 2-2,-3 0 3,5 0-2,-1 0 0,1 0 3,6 0-5,-2 0 1,1 0 2,6 7-3,-2 0 1,2 2 1,-6 4-1,3-1 0,0-4 1,5 2 2,1-6-1,3 2 0,3-3 2,0-3-4,3 0 1,0 0-2,0 0-2,0 0 0,0 0-2,0 0-4,0 0 2,0 0 1,0 0-2,0 0 7,0 0 4,12-9 1,5 3-1,0-4-1,3-2 0,-1 1 1,1-6-1,3 1 1,0 0-2,1-6 2,-2 0 1,1-1-2,1-4 0,-2-1 1,2-6 1,-1 6-1,-2-2 1,1-3-1,1 0 0,2 0 2,-10 0-1,1 1-1,0-1 0,-2 2 4,-3 0-1,-5 14 1,0-1-4,-2-1 2,-2 2 2,0-5-2,-2 1-1,0-5 0,0 0 2,0 0-1,0 2-2,0 1 2,-10-6-2,-3 6 1,3 2 0,-2 0 3,-4 5-4,0 4 1,-1-5-3,-6 3 3,4-3-2,-1 4 3,-2 3-2,2 6-2,-1-3 1,0-1 1,3 2 2,-2 1-3,-1 1 0,3 1-3,1 3 2,0 0 1,3 0-1,-7 0-1,2 0 0,2 13 3,1 7-6,0-4 7,1 5-2,0 0 0,-1 1 0,3-4 0,0 10-2,-4-4 2,7-2 0,-2 3-1,-1-6 1,3 2 0,2 0-1,1 2 1,-2 2-1,5-7 0,-2-1-1,1 0 1,4 2-3,-5 2 3,6 0 0,0-6-2,0 6 0,0-7 1,0-2 0,0-3-1,0-1 1,0-4 0,0-2 1,0-2-1,0 0 1,0 0-2,0 0 2,0 0 1,0 0-1,0 0 1,0 0 1,0 0-1,0 0 0,0 0-1,0 0 0,0 0 0,0 0 0,0 0-4,0 0 4,0 0 6,0 0-3,0-5 0,6-11-1,0-7 2,4-6-3,-1-4 1,-2 0-1,1-5 0,2-5 1,3-6 1,-5 0-2,-4 1 1,0 1 1,-4 8 1,0-4-1,0 8-1,0-3 1,-8-2 2,-4 4-3,-10-7 1,-1 10 0,-6 4-1,0 6 1,-1 7 0,1 1-2,-1 2 0,4-1-1,0-6-2,-2 11 3,-3 4-1,8 3 1,-3 2 0,1 0-1,-4 0 1,6 0-2,2 0 2,-1 5-2,-4 9-1,4 4 3,-7 1-1,1 8-1,7 1 0,0 5 1,4-3 0,5 1-1,-3-3 1,6-3 1,3 8 0,-1-2-1,4-1 1,1 3-1,2-2-1,0-3 1,0 0 0,0 2 1,12 2-2,2 1 4,2-3-4,-1 0 2,-2-4 0,1 3 0,3-4 0,-7 0 0,7-3 0,-4-3 0,-3-6-1,0-3 0,-4-3 0,-1-2 0,-3-3 1,2 3 1,-4-5 0,0 0-1,0 0 1,2 0 2,-2 0-1,0 0 0,0 0 3,0 0-1,0 0 2,0 0 0,0 0-1,0 0-2,0 0 1,0 0 0,0 0 3,0 0-1,0 0 2,0 0 0,0 0-4,0 0-2,0-5-1,-6-9 0,-11-1-1,-4-6 0,-4 3 0,2-5-1,-6 0 1,-3-5 0,7-1 0,-3-2-1,0 4 0,0 0 1,0 2-1,-2 6 1,-1 2-3,-4 3 2,-2 2 1,-6 1 0,3 6 0,0 1 0,8 1 1,2 3-2,-2-5 1,1 5 0,0 0 1,-8 0-4,7 5 5,0 11-2,1 3-2,9-1 1,-1-3 0,-2 7 1,-1 5-1,8 7-1,0-2 0,5-1 1,-2 4-1,-1-1 0,11 2 1,1 2 0,4 4-1,0-5 0,0 1 1,12 0 0,9 0-2,-6-3 3,6-2-1,2-3 0,5-3 0,-1-3-1,-1-1 1,7-10-3,0 4 3,1-9 2,4-1-1,1-2 0,-1-5-1,1 0 2,-9 0 2,3 0-3,-2 0 0,-6 0 0,1 0 0,3 0 1,-4-2-1,3-3 1,-2 0-1,-5-2 0,-6-2 0,-2 5 1,-8 2 1,-5 2 4,0 0-2,0 0-1,0 0 1,0 0-3,0 0 1,0 0 1,0 0 3,0 0 0,0 0 3,0 0 1,0 0-8,0 0-3,0 0-1,-24 0 1,-1 0 2,-3 0-1,0 0-3,2 0 3,-3 0-1,4 0 0,-3 0 0,-13 14 0,4 4 1,-5 10-2,-2 3 2,6-1-2,-3 4 0,11-2 1,4-1-1,-2 1 0,7-1 0,2 7-1,1-1 2,-3 4 2,-2-3-1,5-3-1,9-1-1,2-6 2,2-2-2,-2 6 0,3-5 1,4 1-2,0 1 1,0-8-2,0-1 1,14 2 0,4-1 2,10-2-3,0-3 3,0-2 0,-3-2 0,11 0 3,-5-7-3,5-3 0,2-2 3,-5 0 2,3 0-2,3-2 1,-1-15-1,3 0 1,-6 4-1,10-4 0,-10-4 0,3-7 1,-1 2 0,-7-2-1,-2 0 1,-4 1 0,1 3-1,-2-3 1,-2 0 0,-9 7 1,3-1-2,-7 7 2,0 3 0,-3-3 0,3-3 0,-1-6 0,3-4-1,-2 3 3,-5 6 1,-3 11-5,0 7 0,-3 0 0,-5 0 1,6 0 0,2-2-1,0-8 0,0 1 1,0 7 1,0 2-1,-2 0 1,-4 0-3,6 0 0,0 0-1,0 0 0,0 0-1,0 0-3,0 0-1,-3 0-4,-4 0-17,2 0-29,5 0-99,0 0-91</inkml:trace>
-  <inkml:trace contextRef="#ctx0" brushRef="#br0" timeOffset="1">826 1606 75,'0'2'45,"0"1"-25,0-3 29,0 0-11,0 0-11,0 0-3,0 0 6,0 0-4,0 0-3,0 0 4,0 0-1,-3 0-4,3 0-1,0 0-4,0 0-1,0 0-6,-5 0-5,0 0-3,-3 0 0,0 0 2,-4-7 0,-1-3 3,2-6-2,-3 0-4,0-4 3,-3-4 1,3-1-1,0-1 2,1-2-2,3-5 0,0 0 0,2-5 0,5-2 0,2-2-1,1-3-3,0 4 4,0-7 1,0 4-4,6 5 0,7 2 0,0 7 2,0 6-3,2-1 1,0 2-2,1-1-2,0 2 3,1 6-1,4 0 1,7-1-1,3 3 1,-2-1-2,8 5-1,0 0 3,-2 3-1,1 4 1,-3 3-1,2 0-1,-1 0 1,-1 0 0,0 0 0,-1 3 0,1 5 1,1 5-3,-6 2 2,-3-4-1,0 1 1,-1 7-1,-8-3 0,0 3 2,8 0 0,-7 1-1,0 2 0,-3-1 0,-3 0 0,-4 3 0,3-2 2,-2 1-2,1 2 3,-5 1-4,2 0 1,-4 0 2,0 2-1,-2-2-5,0 1 6,0 2-3,0 2 4,0-1-1,0 3 1,0 2-2,-4-2 0,-6 2-2,-1-6 2,3-3 0,0-4-1,1 1 0,-6-5 2,1-2 0,-5 2 1,2-7-1,-3 1 1,5-2 0,1 1-1,-7-4-1,2 0 0,-8-2-3,4-3 3,-5 0 0,3-2 0,-3 0 0,5 0 0,4 0 0,-1 0 0,0 2 0,2-2-1,-5 0 0,9 0 1,-3 0 0,3 0 0,-2 0 1,2 0-1,-3 0 1,2 0-1,5 0 0,-1 0 0,-2 0 0,1 0 0,2 0 0,-2 0 0,1 0 0,0 0 0,1 0 1,0 0 0,4 0-1,-5 0 0,-3 0 0,2 0 0,-1-2 0,3-2 0,1 1 0,1 1-1,-1 0 0,3 2 1,0-3 0,2 1-1,-1 0 1,0-1-1,3 3-6,-3-2-18,3 2-36,0 0-79,0-2-46</inkml:trace>
+  <inkml:trace contextRef="#ctx0" brushRef="#br0">883 1699 6,'0'-3'31,"0"3"1,0 0-12,0 0-2,0 0-1,0 0-5,0 0 2,0 0 6,0 0-2,0 0-4,0 0-4,0 0 2,0 0-1,0 0 1,0 0-3,0 0 3,0 0 0,0 0-7,0 0-3,-5 0 1,-3 0 2,2 0 1,-4 5-3,0 3-1,-2-1 1,-1 6-1,0 4-1,1 1 2,1 3 0,3-2 4,0 0-6,-2 0 1,2 3 3,-2-1-3,2-1 1,1 7-1,-1-2-1,0-1 2,4 1-2,1 4-1,0-3 2,3 0-2,0-3 2,0 6 2,0-6-3,0 3 2,10 3 1,0-6-2,7-2-1,-5 5 0,3-5 1,0-2-1,2 0-1,8-6-1,-5 4 2,4-5-1,1-5 1,0 2-1,2-4 2,-4-3-1,5 1 2,-3-3-3,2 0 0,-8 0 2,7 0 1,0 0-2,0 0 3,2-6-3,-3-7 1,-1-3 2,-1-6 0,-1 1-3,2 1 3,-3-7-3,-3 1 1,-5 3-1,1 0 4,2-4 1,-5 6-2,-4 0 3,-2 4-2,-1-4 3,-4 2 0,1-2-4,-1 0-2,0-2 0,0-1 9,0 5-9,0 3 2,0 0-2,-12-5-1,-1-1 1,-3 3-2,6 3 1,3-2-1,-1 5 0,-1-4 0,3 6 1,-2 1-1,2-1 1,-1 9-1,-1-6-1,0 1 2,3-2 1,-6 2-1,7 2 0,-2 0-1,4 1 1,-2-1 0,0 3 0,2 2 0,-1 0 0,3 0 0,-2 0-1,2 0 0,0 0 0,0 0 0,0 0 1,0-3 0,0 3-1,0 0 0,0 0 0,0 0-1,0 0 1,0 0-1,0 0-1,0 0 0,0 0 0,0 0 0,0 0-2,0 0 0,0 0-2,0 0 0,0 0-4,0 0 1,0 0 3,0 0 6,0 0 1,2 10-1,11 6 0,2 2 0,3-4 0,-2 6 0,0-1 0,1 2-1,-1-2 2,7-1-1,-3 4 0,3 1-1,-5-2 1,8-2-1,-5-4 0,1 0 0,-3 5 0,2-9-4,-2 1-1,2-4 4,-2-4 0,-2 1 0,6-1-3,-4-1 2,1-3 2,-2 0-2,0 0 2,-1 0 2,7-3-1,-4-6 2,1 0-4,0-6 4,-1-1-2,4-3 0,-3 0 0,-4 0 0,4-2 0,-1-3 0,1 3 0,-3 3 0,2-3 1,-2-3-1,0 1 0,-3-4 0,1-1 0,-1 2 0,-2 4 1,-3 2 2,-2-4 2,-3 6 0,-2-5-2,-1-2-2,1-6 0,-3 4-1,0 3 2,0-3-2,0 3 3,0 5 1,0 2-1,0 1 3,-5 0-1,-5-1 0,-3 2-3,-1 1 3,1 3 0,-1 2-3,-1-1-3,-4 5 0,-2-2 0,0 2 1,2 1 0,-4 1 0,-4 1 0,2 2-2,-3 0 3,5 0-2,-1 0 0,1 0 3,6 0-5,-2 0 1,1 0 2,6 7-3,-2 0 1,2 2 1,-6 4-1,2-1 0,1-4 1,5 2 2,1-6-1,3 2 0,3-3 2,0-3-4,3 0 1,0 0-2,0 0-2,0 0 0,0 0-2,0 0-4,0 0 2,0 0 1,0 0-2,0 0 7,0 0 4,12-9 1,5 3-1,0-4-1,4-2 0,-2 1 1,1-6-1,3 1 1,0 0-2,1-6 2,-2 0 1,1-1-2,1-5 0,-2 0 1,2-6 1,-1 6-1,-2-2 1,1-3-1,2 0 0,1 0 2,-10 0-1,1 1-1,0-1 0,-2 2 4,-3 0-1,-5 14 1,0-1-4,-2-1 2,-2 2 2,0-6-2,-2 2-1,0-5 0,0 0 2,0 0-1,0 2-2,0 1 2,-10-6-2,-3 6 1,3 2 0,-2 0 3,-4 5-4,0 4 1,-1-5-3,-6 3 3,5-3-2,-4 4 3,0 3-2,2 6-2,-1-3 1,0-1 1,3 2 2,-2 1-3,-1 1 0,3 1-3,1 3 2,0 0 1,3 0-1,-7 0-1,2 0 0,2 13 3,1 7-6,-1-4 7,2 5-2,0 0 0,-1 1 0,3-4 0,0 10-2,-4-4 2,7-2 0,-2 3-1,-1-6 1,3 2 0,2 0-1,1 2 1,-2 2-1,5-7 0,-2-1-1,1 1 1,4 1-3,-5 2 3,6 0 0,0-6-2,0 6 0,0-7 1,0-2 0,0-3-1,0-1 1,0-4 0,0-2 1,0-2-1,0 0 1,0 0-2,0 0 2,0 0 1,0 0-1,0 0 1,0 0 1,0 0-1,0 0 0,0 0-1,0 0 0,0 0 0,0 0 0,0 0-4,0 0 4,0 0 6,0 0-3,0-5 0,6-11-1,0-7 2,4-6-3,-1-4 1,-2 0-1,1-6 0,2-4 1,3-6 1,-5 0-2,-4 1 1,0 1 1,-4 8 1,0-4-1,0 8-1,0-3 1,-8-2 2,-4 3-3,-10-6 1,-1 10 0,-6 4-1,0 6 1,-1 7 0,1 1-2,-2 2 0,5-1-1,0-6-2,-2 11 3,-3 4-1,8 3 1,-3 2 0,1 0-1,-4 0 1,6 0-2,2 0 2,-1 5-2,-5 9-1,5 4 3,-7 1-1,1 8-1,7 1 0,0 5 1,4-3 0,5 1-1,-3-3 1,6-2 1,3 7 0,-1-2-1,4-1 1,1 3-1,2-2-1,0-3 1,0 0 0,0 2 1,12 2-2,2 1 4,2-3-4,-1 0 2,-2-4 0,1 3 0,3-4 0,-7 1 0,7-4 0,-4-3 0,-3-6-1,0-3 0,-4-3 0,-1-2 0,-3-3 1,2 3 1,-4-5 0,0 0-1,0 0 1,2 0 2,-2 0-1,0 0 0,0 0 3,0 0-1,0 0 2,0 0 0,0 0-1,0 0-2,0 0 1,0 0 0,0 0 3,0 0-1,0 0 2,0 0 0,0 0-4,0 0-2,0-5-1,-6-9 0,-11-1-1,-4-6 0,-4 3 0,2-6-1,-6 1 1,-3-5 0,7-1 0,-3-2-1,0 4 0,0 0 1,-1 2-1,-1 6 1,-1 2-3,-4 3 2,-2 2 1,-6 1 0,3 6 0,0 1 0,7 1 1,3 3-2,-2-5 1,1 5 0,0 0 1,-8 0-4,7 5 5,1 11-2,-1 3-2,10-1 1,-2-3 0,-1 7 1,-1 5-1,8 7-1,0-2 0,5-1 1,-2 4-1,-1 0 0,11 1 1,1 2 0,4 4-1,0-5 0,0 1 1,12 0 0,9 0-2,-6-3 3,6-2-1,2-3 0,5-3 0,1-3-1,-4-1 1,8-10-3,0 4 3,1-8 2,4-2-1,1-2 0,-1-5-1,1 0 2,-8 0 2,2 0-3,-2 0 0,-6 0 0,1 0 0,3 0 1,-4-2-1,3-3 1,-2 0-1,-5-3 0,-6-1 0,-2 5 1,-8 2 1,-5 2 4,0 0-2,0 0-1,0 0 1,0 0-3,0 0 1,0 0 1,0 0 3,0 0 0,0 0 3,0 0 1,0 0-8,0 0-3,0 0-1,-24 0 1,-1 0 2,-3 0-1,0 0-3,3 0 3,-5 0-1,5 0 0,-3 0 0,-13 14 0,3 5 1,-4 9-2,-2 3 2,6-1-2,-3 4 0,11-2 1,4-1-1,-2 1 0,7-1 0,2 7-1,0-1 2,-2 4 2,-2-3-1,5-3-1,9-1-1,2-5 2,2-3-2,-2 6 0,3-5 1,4 1-2,0 1 1,0-8-2,0-1 1,14 2 0,4-1 2,10-2-3,0-3 3,1-2 0,-4-2 0,11 0 3,-5-7-3,5-3 0,2-2 3,-5 0 2,3 0-2,3-2 1,0-15-1,2 0 1,-6 4-1,10-4 0,-10-4 0,3-7 1,-1 2 0,-7-2-1,-1 0 1,-5 1 0,1 3-1,-2-3 1,-2 0 0,-9 7 1,3-2-2,-7 8 2,0 3 0,-3-3 0,3-3 0,-1-6 0,3-4-1,-2 3 3,-5 6 1,-3 11-5,0 7 0,-3 0 0,-5 0 1,6 0 0,2-2-1,0-8 0,0 1 1,0 7 1,0 2-1,-2 0 1,-4 0-3,6 0 0,0 0-1,0 0 0,0 0-1,0 0-3,0 0-1,-3 0-4,-3 0-17,0 0-29,6 0-99,0 0-91</inkml:trace>
+  <inkml:trace contextRef="#ctx0" brushRef="#br0" timeOffset="1">829 1609 75,'0'2'45,"0"1"-25,0-3 29,0 0-11,0 0-11,0 0-3,0 0 6,0 0-4,0 0-3,0 0 4,0 0-1,-3 0-4,3 0-1,0 0-4,0 0-1,0 0-6,-5 0-5,0 0-3,-3 0 0,0 0 2,-4-7 0,-1-3 3,2-6-2,-4 0-4,1-4 3,-3-4 1,3-1-1,0-1 2,1-2-2,3-5 0,0 0 0,2-5 0,5-2 0,2-2-1,1-3-3,0 3 4,0-6 1,0 4-4,6 5 0,7 2 0,0 7 2,0 6-3,2-1 1,0 2-2,1-1-2,0 2 3,2 6-1,3 0 1,7-1-1,3 3 1,-2-1-2,9 5-1,-2 0 3,-1 3-1,1 4 1,-3 3-1,3 0-1,-2 0 1,-1 0 0,0 0 0,-1 3 0,1 5 1,1 5-3,-6 2 2,-3-4-1,1 1 1,-2 7-1,-8-3 0,0 3 2,8 0 0,-7 1-1,0 2 0,-3-1 0,-3 0 0,-4 3 0,3-2 2,-2 1-2,1 2 3,-5 1-4,2 0 1,-4 0 2,0 2-1,-2-2-5,0 2 6,0 1-3,0 2 4,0-1-1,0 3 1,0 2-2,-4-2 0,-6 2-2,-1-6 2,3-3 0,0-4-1,1 1 0,-6-5 2,1-2 0,-5 2 1,2-7-1,-3 1 1,5-2 0,1 1-1,-7-4-1,2 0 0,-9-2-3,5-3 3,-5 0 0,3-2 0,-3 0 0,5 0 0,4 0 0,-1 0 0,0 2 0,2-2-1,-5 0 0,9 0 1,-3 0 0,3 0 0,-2 0 1,2 0-1,-4 0 1,3 0-1,5 0 0,-1 0 0,-2 0 0,1 0 0,2 0 0,-2 0 0,1 0 0,0 0 0,1 0 1,0 0 0,4 0-1,-5 0 0,-3 0 0,2 0 0,-1-2 0,3-2 0,1 1 0,1 1-1,-1 0 0,3 2 1,0-3 0,2 1-1,-1 0 1,0-1-1,3 3-6,-3-2-18,3 2-36,0 0-79,0-2-46</inkml:trace>
 </inkml:ink>
 </file>
 
@@ -348,7 +348,7 @@
           <inkml:channelProperty channel="F" name="resolution" value="2.82441E-6" units="1/dev"/>
         </inkml:channelProperties>
       </inkml:inkSource>
-      <inkml:timestamp xml:id="ts0" timeString="2014-03-25T18:25:39.914"/>
+      <inkml:timestamp xml:id="ts0" timeString="2015-06-06T13:13:27.487"/>
     </inkml:context>
     <inkml:brush xml:id="br0">
       <inkml:brushProperty name="width" value="0.06667" units="cm"/>
@@ -378,7 +378,7 @@
           <inkml:channelProperty channel="F" name="resolution" value="2.82441E-6" units="1/dev"/>
         </inkml:channelProperties>
       </inkml:inkSource>
-      <inkml:timestamp xml:id="ts0" timeString="2014-03-25T18:25:39.923"/>
+      <inkml:timestamp xml:id="ts0" timeString="2015-06-06T13:13:27.497"/>
     </inkml:context>
     <inkml:brush xml:id="br0">
       <inkml:brushProperty name="width" value="0.06667" units="cm"/>
@@ -387,8 +387,8 @@
       <inkml:brushProperty name="fitToCurve" value="1"/>
     </inkml:brush>
   </inkml:definitions>
-  <inkml:trace contextRef="#ctx0" brushRef="#br0">846 1596 6,'0'-2'31,"0"2"1,0 0-12,0 0-2,0 0-1,0 0-5,0 0 2,0 0 6,0 0-2,0 0-4,0 0-4,0 0 2,0 0-1,0 0 1,0 0-3,0 0 3,0 0 0,0 0-7,0 0-3,-4 0 1,-4 0 2,3 0 1,-5 4-3,0 3-1,-2 0 1,0 6-1,0 2-1,1 2 2,0 3 0,4-2 4,-1 0-6,-1 0 1,1 3 3,-2-2-3,2 1 1,2 4-1,-2 0-1,0-1 2,4 1-2,2 2-1,-1-1 2,3-1-2,0-2 2,0 5 2,0-5-3,0 2 2,9 3 1,1-5-2,6-2-1,-4 4 0,2-4 1,1-2-1,1-1-1,7-4-1,-4 2 2,4-3-1,1-5 1,1 1-1,0-3 2,-3-3-1,5 0 2,-3-2-3,2 0 0,-7 0 2,6 0 1,0 0-2,-1 0 3,4-5-3,-4-7 1,-1-4 2,-2-4 0,1 1-3,1-1 3,-3-5-3,-3 1 1,-5 2-1,2 0 4,0-3 1,-3 5-2,-4 1 3,-2 3-2,-2-4 3,-3 2 0,2-1-4,-2-2-2,0 0 0,0-2 9,0 6-9,0 2 2,0-1-2,-12-3-1,0-1 1,-4 2-2,7 2 1,2 0-1,0 3 0,-1-3 0,1 5 1,0 2-1,1-2 1,-1 10-1,0-7-1,-1 1 2,4-2 1,-7 3-1,7 2 0,-1-1-1,2 1 1,-1 0 0,1 1 0,0 3 0,1 0 0,2 0 0,-2 0-1,2 0 0,0 0 0,0 0 0,0 0 1,0-2 0,0 2-1,0 0 0,0 0 0,0 0-1,0 0 1,0 0-1,0 0-1,0 0 0,0 0 0,0 0 0,0 0-2,0 0 0,0 0-2,0 0 0,0 0-4,0 0 1,0 0 3,0 0 6,0 0 1,2 9-1,10 6 0,3 2 0,2-4 0,-2 6 0,0 0 0,2 1-1,-2-3 2,7 1-1,-3 2 0,3 2-1,-4-3 1,6-1-1,-4-4 0,2 1 0,-4 3 0,2-7-4,-1-1-1,1-2 4,-2-4 0,-2 0 0,6 1-3,-4-2 2,2-3 2,-3 0-2,0 0 2,0 0 2,6-3-1,-4-6 2,1 0-4,0-4 4,0-3-2,2-2 0,-3 1 0,-2-1 0,3-2 0,-1-2 0,1 2 0,-3 3 0,3-3 1,-2-2-1,-1-1 0,-3-2 0,2-1 0,-2 1 0,-2 4 1,-2 2 2,-2-2 2,-4 3 0,-1-4-2,0-1-2,-1-6 0,-2 3-1,0 4 2,0-4-2,0 4 3,0 5 1,0 1-1,0 0 3,-5 1-1,-4-1 0,-4 3-3,0 0 3,1 2 0,-2 2-3,-1 0-3,-3 4 0,-2-1 0,0 1 1,1 1 0,-2 2 0,-5 0 0,1 2-2,0 0 3,3 0-2,-2 0 0,3 0 3,4 0-5,-1 0 1,1 0 2,5 6-3,-1 1 1,1 1 1,-5 4-1,1 0 0,2-4 1,4 0 2,2-3-1,1 0 0,5-2 2,-1-3-4,3 0 1,0 0-2,0 0-2,0 0 0,0 0-2,0 0-4,0 0 2,0 0 1,0 0-2,0 0 7,0 0 4,12-8 1,4 2-1,0-4-1,5 0 0,-4-1 1,3-5-1,2 1 1,0-1-2,1-4 2,-1 0 1,0-2-2,0-4 0,-1-1 1,2-5 1,-1 6-1,-2-2 1,2-3-1,0 0 0,2 0 2,-9 0-1,0 1-1,0-1 0,-1 2 4,-4 0-1,-4 13 1,0-1-4,-2-1 2,-2 2 2,0-6-2,-2 3-1,0-6 0,0 1 2,0 0-1,0 0-2,0 3 2,-10-7-2,-2 7 1,2 1 0,-2 0 3,-3 5-4,0 4 1,-2-5-3,-5 2 3,4-1-2,-2 2 3,-2 4-2,3 5-2,0-2 1,-2-2 1,5 3 2,-3 0-3,-1 1 0,2 1-3,2 3 2,0 0 1,2 0-1,-6 0-1,2 0 0,1 13 3,1 5-6,0-3 7,2 6-2,0-2 0,-2 1 0,4-2 0,-1 8-2,-3-4 2,7-1 0,-4 3-1,1-7 1,3 3 0,1 1-1,1 0 1,-1 3-1,4-7 0,-2-2-1,1 3 1,4 0-3,-5 1 3,6 1 0,0-6-2,0 6 0,0-7 1,0-2 0,0-3-1,0 0 1,0-5 0,0-1 1,0-2-1,0 0 1,0 0-2,0 0 2,0 0 1,0 0-1,0 0 1,0 0 1,0 0-1,0 0 0,0 0-1,0 0 0,0 0 0,0 0 0,0 0-4,0 0 4,0 0 6,0 0-3,0-4 0,6-11-1,0-7 2,4-5-3,-2-4 1,-1 0-1,1-6 0,1-3 1,3-7 1,-3 1-2,-5 1 1,-1 1 1,-3 7 1,0-3-1,0 7-1,0-2 1,-7-4 2,-6 5-3,-7-6 1,-2 9 0,-6 4-1,0 5 1,-1 7 0,1 1-2,-2 2 0,6-2-1,-1-4-2,-2 9 3,-3 5-1,9 2 1,-4 2 0,0 0-1,-2 0 1,5 0-2,2 0 2,-2 4-2,-3 10-1,3 3 3,-6 1-1,2 7-1,6 1 0,-1 4 1,5-1 0,4 0-1,-2-3 1,5-2 1,4 8 0,-3-4-1,6 1 1,0 2-1,2-2-1,0-2 1,0-1 0,0 2 1,12 2-2,1 1 4,2-3-4,0 1 2,-3-4 0,1 2 0,4-3 0,-8-1 0,8-2 0,-5-3 0,-2-5-1,0-4 0,-4-3 0,-2-1 0,-2-3 1,2 3 1,-4-5 0,0 0-1,0 0 1,2 0 2,-2 0-1,0 0 0,0 0 3,0 0-1,0 0 2,0 0 0,0 0-1,0 0-2,0 0 1,0 0 0,0 0 3,0 0-1,0 0 2,0 0 0,0 0-4,0 0-2,0-5-1,-6-8 0,-10-1-1,-4-6 0,-5 3 0,3-6-1,-6 2 1,-2-5 0,6-2 0,-3 0-1,1 1 0,-1 2 1,0 1-1,-3 6 1,1 2-3,-5 3 2,-2 2 1,-5 0 0,3 7 0,-1 0 0,7 2 1,4 2-2,-4-5 1,3 5 0,-1 0 1,-8 0-4,9 5 5,-1 10-2,0 2-2,8 0 1,-1-3 0,-1 7 1,-1 4-1,8 7-1,-1-1 0,6-2 1,-2 4-1,-2 0 0,11 1 1,1 2 0,4 3-1,0-4 0,0 1 1,12-1 0,9 1-2,-7-3 3,6-3-1,2-1 0,5-4 0,0-3-1,-2 0 1,7-10-3,0 4 3,-1-7 2,5-2-1,2-3 0,-1-4-1,0 0 2,-7 0 2,1 0-3,-1 0 0,-5 0 0,0 0 0,2 0 1,-3-2-1,3-3 1,-2 1-1,-5-3 0,-5-2 0,-3 5 1,-7 2 1,-5 2 4,0 0-2,0 0-1,0 0 1,0 0-3,0 0 1,0 0 1,0 0 3,0 0 0,0 0 3,0 0 1,0 0-8,0 0-3,0 0-1,-23 0 1,-1 0 2,-3 0-1,0 0-3,3 0 3,-5 0-1,5 0 0,-3 0 0,-12 13 0,2 5 1,-3 9-2,-2 1 2,5 1-2,-2 3 0,11-2 1,3-1-1,-2 1 0,7-1 0,2 7-1,-1-1 2,-1 3 2,-2-3-1,4-2-1,10 0-1,2-7 2,0-1-2,0 5 0,3-5 1,3 3-2,0-1 1,0-8-2,0 1 1,12 0 0,5 0 2,11-2-3,-1-3 3,0-2 0,-3-1 0,11-2 3,-5-5-3,3-3 0,4-2 3,-5 0 2,3 0-2,2-2 1,0-13-1,3-1 1,-6 3-1,9-3 0,-10-4 0,4-6 1,-2 1 0,-5-1-1,-3 0 1,-4 0 0,0 3-1,-1-3 1,-2 2 0,-8 4 1,3 0-2,-8 7 2,1 2 0,-4-2 0,4-2 0,-1-8 0,2-1-1,0 1 3,-7 6 1,-2 10-5,0 7 0,-2 0 0,-7 0 1,8 0 0,1-2-1,0-7 0,0 1 1,0 6 1,0 2-1,-3 0 1,-2 0-3,5 0 0,0 0-1,0 0 0,0 0-1,0 0-3,0 0-1,-3 0-4,-3 0-17,0 0-29,6 0-99,0 0-91</inkml:trace>
-  <inkml:trace contextRef="#ctx0" brushRef="#br0" timeOffset="1">795 1512 75,'0'2'45,"0"0"-25,0-2 29,0 0-11,0 0-11,0 0-3,0 0 6,0 0-4,0 0-3,0 0 4,0 0-1,-3 0-4,3 0-1,0 0-4,0 0-1,0 0-6,-5 0-5,1 0-3,-5 0 0,3 0 2,-6-6 0,0-4 3,1-4-2,-3-2-4,0-2 3,-2-5 1,2-1-1,1 0 2,1-2-2,2-5 0,1 0 0,1-4 0,5-3 0,2-2-1,1-2-3,0 2 4,0-5 1,0 4-4,6 4 0,6 3 0,1 6 2,-1 5-3,3-1 1,-1 3-2,2-2-2,-2 3 3,4 5-1,2 0 1,6-1-1,4 3 1,-2-1-2,8 4-1,-1 0 3,-1 4-1,0 4 1,-2 2-1,3 0-1,-3 0 1,0 0 0,0 0 0,-2 2 0,2 6 1,1 4-3,-7 2 2,-2-4-1,1 2 1,-3 5-1,-6-2 0,0 3 2,6 0 0,-5 0-1,-1 3 0,-2-1 0,-4 0 0,-3 2 0,2-1 2,-1 1-2,0 2 3,-4 0-4,2 0 1,-3 0 2,-2 3-1,-1-3-5,0 3 6,0-1-3,0 3 4,0 0-1,0 2 1,0 2-2,-4-2 0,-6 2-2,0-6 2,3-3 0,-1-3-1,1 0 0,-5-3 2,0-3 0,-4 1 1,2-5-1,-4 0 1,6-1 0,0 0-1,-6-4-1,1 1 0,-7-3-3,5-2 3,-7 0 0,4-2 0,-2 0 0,3 0 0,5 0 0,-2 0 0,1 3 0,2-3-1,-5 0 0,8 0 1,-2 0 0,2 0 0,-1 0 1,1 0-1,-4 0 1,4 0-1,4 0 0,0 0 0,-2 0 0,0 0 0,2 0 0,-2 0 0,2 0 0,-1 0 0,2 0 1,-1 0 0,4 0-1,-4 0 0,-5 0 0,4 0 0,-2-3 0,4-1 0,0 2 0,2 0-1,-3 0 0,5 2 1,-1-3 0,2 1-1,-1 0 1,0 0-1,3 2-6,-2-2-18,2 2-36,0 0-79,0-3-46</inkml:trace>
+  <inkml:trace contextRef="#ctx0" brushRef="#br0">847 1597 6,'0'-2'31,"0"2"1,0 0-12,0 0-2,0 0-1,0 0-5,0 0 2,0 0 6,0 0-2,0 0-4,0 0-4,0 0 2,0 0-1,0 0 1,0 0-3,0 0 3,0 0 0,0 0-7,0 0-3,-5 0 1,-2 0 2,1 0 1,-4 4-3,1 3-1,-3 0 1,-1 6-1,1 2-1,0 2 2,2 3 0,2-2 4,0 0-6,0 0 1,-1 2 3,0 0-3,1-1 1,1 6-1,0-1-1,-1-2 2,4 2-2,1 3-1,0-2 2,3-2-2,0 0 2,0 4 2,0-5-3,0 1 2,10 5 1,0-6-2,6-3-1,-4 6 0,2-5 1,0-2-1,2-1-1,8-5-1,-4 4 2,2-4-1,3-5 1,-1 1-1,2-3 2,-4-3-1,4 0 2,-2-2-3,2 0 0,-7 0 2,6 0 1,0 0-2,-1 0 3,3-5-3,-2-7 1,-3-4 2,0-4 0,0 0-3,1 1 3,-3-6-3,-3 1 1,-4 2-1,0 0 4,2-3 1,-5 5-2,-2 1 3,-4 3-2,0-4 3,-4 2 0,1-2-4,-1 0-2,0-2 0,0 0 9,0 4-9,0 3 2,0 0-2,-12-5-1,0 0 1,-3 2-2,5 3 1,4-2-1,-3 5 0,1-4 0,2 5 1,-1 2-1,1-2 1,-1 10-1,0-6-1,-2-1 2,5 0 1,-6 1-1,6 3 0,-2-1-1,4 1 1,-2 0 0,1 1 0,0 3 0,1 0 0,2 0 0,-2 0-1,2 0 0,0 0 0,0 0 0,0 0 1,0-2 0,0 2-1,0 0 0,0 0 0,0 0-1,0 0 1,0 0-1,0 0-1,0 0 0,0 0 0,0 0 0,0 0-2,0 0 0,0 0-2,0 0 0,0 0-4,0 0 1,0 0 3,0 0 6,0 0 1,2 9-1,10 6 0,2 3 0,4-5 0,-3 5 0,0 0 0,2 2-1,-2-2 2,7-1-1,-3 3 0,3 2-1,-4-2 1,6-2-1,-4-4 0,2 0 0,-4 4 0,2-7-4,-1 0-1,1-4 4,-2-2 0,-2-1 0,6 0-3,-4-1 2,1-3 2,-2 0-2,1 0 2,-2 0 2,8-3-1,-6-5 2,3-1-4,-1-5 4,-1-1-2,4-3 0,-3 0 0,-4 0 0,4-1 0,0-4 0,0 4 0,-3 1 0,2-1 1,-1-4-1,-1 1 0,-3-3 0,2-1 0,-2 1 0,-2 4 1,-2 2 2,-2-2 2,-4 3 0,-1-4-2,0-1-2,-1-6 0,-2 3-1,0 4 2,0-4-2,0 4 3,0 4 1,0 2-1,0 1 3,-5 0-1,-4-1 0,-3 2-3,-2 1 3,2 2 0,-2 3-3,-1-1-3,-2 4 0,-4-2 0,1 3 1,2 0 0,-4 1 0,-4 1 0,2 2-2,-3 0 3,5 0-2,-1 0 0,1 0 3,5 0-5,0 0 1,0 0 2,4 7-3,1-1 1,-1 3 1,-4 3-1,2-1 0,1-3 1,4 1 2,2-5-1,1 1 0,5-2 2,-1-3-4,3 0 1,0 0-2,0 0-2,0 0 0,0 0-2,0 0-4,0 0 2,0 0 1,0 0-2,0 0 7,0 0 4,12-8 1,4 2-1,0-3-1,4-2 0,-2 0 1,1-5-1,4 1 1,-1 0-2,0-5 2,0-1 1,0 0-2,1-6 0,-2 1 1,2-6 1,-1 6-1,-2-3 1,2-2-1,0 0 0,3 0 2,-11 0-1,2 1-1,-2-1 0,0 2 4,-4 0-1,-4 13 1,0-1-4,-2-1 2,-2 2 2,0-6-2,-2 3-1,0-6 0,0 0 2,0 1-1,0 2-2,0 0 2,-10-5-2,-2 6 1,2 0 0,-2 2 3,-2 4-4,-2 4 1,-1-5-3,-5 2 3,5-1-2,-3 2 3,-2 4-2,2 5-2,1-3 1,-1 0 1,2 1 2,-1 2-3,-1-1 0,3 2-3,0 3 2,1 0 1,3 0-1,-8 0-1,4 0 0,0 13 3,1 6-6,0-4 7,2 5-2,0 0 0,-2 0 0,4-3 0,0 9-2,-5-3 2,8-3 0,-3 4-1,-1-6 1,4 2 0,1-1-1,1 3 1,-1 1-1,4-5 0,-2-3-1,2 2 1,2 2-3,-4 0 3,6 1 0,0-6-2,0 6 0,0-7 1,0-2 0,0-3-1,0 0 1,0-5 0,0 0 1,0-3-1,0 0 1,0 0-2,0 0 2,0 0 1,0 0-1,0 0 1,0 0 1,0 0-1,0 0 0,0 0-1,0 0 0,0 0 0,0 0 0,0 0-4,0 0 4,0 0 6,0 0-3,0-5 0,6-10-1,0-7 2,4-5-3,-2-4 1,-1 0-1,1-6 0,1-3 1,4-6 1,-5-1-2,-4 2 1,-1 2 1,-3 6 1,0-4-1,0 9-1,0-4 1,-7-2 2,-5 3-3,-9-5 1,-1 9 0,-6 4-1,0 5 1,0 7 0,0 1-2,-2 2 0,5-2-1,0-4-2,-2 9 3,-3 5-1,8 2 1,-3 2 0,1 0-1,-3 0 1,5 0-2,2 0 2,-2 4-2,-3 10-1,3 3 3,-5 1-1,0 7-1,7 1 0,0 5 1,3-2 0,5-1-1,-1-1 1,4-3 1,3 7 0,-1-2-1,4-1 1,1 3-1,2-2-1,0-2 1,0-1 0,0 3 1,12 0-2,1 2 4,2-2-4,0-1 2,-3-3 0,2 1 0,2-2 0,-6 0 0,6-3 0,-3-3 0,-4-5-1,1-4 0,-4-3 0,-2-1 0,-2-3 1,2 3 1,-4-5 0,0 0-1,0 0 1,2 0 2,-2 0-1,0 0 0,0 0 3,0 0-1,0 0 2,0 0 0,0 0-1,0 0-2,0 0 1,0 0 0,0 0 3,0 0-1,0 0 2,0 0 0,0 0-4,0 0-2,0-5-1,-6-8 0,-10-1-1,-4-6 0,-4 3 0,2-6-1,-7 2 1,0-6 0,4 0 0,-1-1-1,-2 2 0,2 1 1,-2 1-1,-1 6 1,-1 2-3,-4 3 2,-1 2 1,-6 0 0,3 7 0,-1-1 0,7 3 1,4 2-2,-3-5 1,2 5 0,-1 0 1,-8 0-4,7 5 5,1 10-2,0 3-2,9-2 1,-2-1 0,-1 5 1,-1 6-1,8 6-1,-1-2 0,6-1 1,-3 4-1,0 0 0,10 1 1,1 2 0,4 3-1,0-4 0,0 1 1,12-1 0,9 1-2,-7-3 3,5-2-1,4-3 0,4-3 0,0-2-1,-3-1 1,9-10-3,-2 4 3,1-7 2,5-3-1,1-2 0,-2-4-1,1 0 2,-7 0 2,2 0-3,-3 0 0,-4 0 0,0 0 0,2 0 1,-3-1-1,3-4 1,-2 1-1,-5-4 0,-5 0 0,-3 3 1,-7 4 1,-5 1 4,0 0-2,0 0-1,0 0 1,0 0-3,0 0 1,0 0 1,0 0 3,0 0 0,0 0 3,0 0 1,0 0-8,0 0-3,0 0-1,-23 0 1,-1 0 2,-3 0-1,0 0-3,2 0 3,-3 0-1,4 0 0,-3 0 0,-12 13 0,2 5 1,-3 8-2,-2 3 2,6-1-2,-4 4 0,11-1 1,4-2-1,-1 1 0,5-1 0,4 7-1,-2-2 2,-1 5 2,-2-4-1,4-2-1,10 0-1,2-6 2,0-3-2,0 7 0,2-7 1,4 3-2,0 0 1,0-7-2,0-1 1,13 1 0,4 0 2,11-2-3,-2-3 3,2-2 0,-4-1 0,11-1 3,-5-7-3,4-2 0,3-2 3,-6 0 2,4 0-2,2-2 1,0-13-1,3-1 1,-6 3-1,8-2 0,-8-6 0,3-5 1,-2 2 0,-6-2-1,-1-1 1,-6 2 0,2 3-1,-2-4 1,-2 1 0,-7 5 1,1 0-2,-7 7 2,1 2 0,-4-2 0,5-2 0,-3-8 0,4-1-1,-2 1 3,-6 6 1,-2 10-5,0 7 0,-2 0 0,-6 0 1,6 0 0,2-2-1,0-7 0,0 1 1,0 6 1,0 2-1,-2 0 1,-4 0-3,6 0 0,0 0-1,0 0 0,0 0-1,0 0-3,0 0-1,-2 0-4,-5 0-17,1 0-29,6 0-99,0 0-91</inkml:trace>
+  <inkml:trace contextRef="#ctx0" brushRef="#br0" timeOffset="1">795 1513 75,'0'2'45,"0"0"-25,0-2 29,0 0-11,0 0-11,0 0-3,0 0 6,0 0-4,0 0-3,0 0 4,0 0-1,-2 0-4,2 0-1,0 0-4,0 0-1,0 0-6,-6 0-5,2 0-3,-4 0 0,1 0 2,-5-6 0,-1-4 3,3-4-2,-5-2-4,2-3 3,-3-3 1,2-2-1,1 0 2,1-3-2,2-3 0,0-1 0,2-5 0,6-2 0,0-1-1,2-3-3,0 2 4,0-5 1,0 3-4,7 5 0,5 3 0,1 6 2,-1 6-3,2-2 1,1 2-2,0-1-2,0 3 3,3 5-1,2 0 1,6-1-1,4 3 1,-1-1-2,6 4-1,0 0 3,-1 4-1,0 4 1,-2 2-1,3 0-1,-3 0 1,-1 0 0,2 0 0,-3 2 0,2 6 1,0 4-3,-5 2 2,-3-4-1,1 2 1,-2 5-1,-7-2 0,-1 3 2,8 0 0,-7 1-1,0 2 0,-2-2 0,-4 1 0,-3 2 0,2-1 2,-1 1-2,1 2 3,-5 0-4,1 1 1,-2-2 2,-2 4-1,-1-3-5,0 3 6,0 0-3,0 2 4,0-1-1,0 3 1,0 3-2,-4-3 0,-5 2-2,-2-7 2,4-1 0,-1-4-1,1 0 0,-5-4 2,0-1 0,-4 0 1,2-5-1,-4 0 1,6-1 0,0 0-1,-6-4-1,1 1 0,-7-3-3,4-2 3,-5 0 0,2-2 0,-1 0 0,4 0 0,4 0 0,-2 0 0,1 3 0,2-3-1,-5 0 0,8 0 1,-2 0 0,2 0 0,-1 0 1,1 0-1,-4 0 1,4 0-1,4 0 0,0 0 0,-2 0 0,0 0 0,2 0 0,-2 0 0,2 0 0,-1 0 0,2 0 1,-1 0 0,4 0-1,-4 0 0,-4 0 0,2 0 0,-1-3 0,4-1 0,1 2 0,0 0-1,-1 0 0,4 2 1,-1-3 0,1 1-1,1 0 1,-2 0-1,4 2-6,-2-2-18,2 2-36,0 0-79,0-2-46</inkml:trace>
 </inkml:ink>
 </file>
 
@@ -468,7 +468,7 @@
           <inkml:channelProperty channel="F" name="resolution" value="2.82441E-6" units="1/dev"/>
         </inkml:channelProperties>
       </inkml:inkSource>
-      <inkml:timestamp xml:id="ts0" timeString="2014-03-25T18:25:39.811"/>
+      <inkml:timestamp xml:id="ts0" timeString="2015-06-06T13:13:27.387"/>
     </inkml:context>
     <inkml:brush xml:id="br0">
       <inkml:brushProperty name="width" value="0.06667" units="cm"/>
@@ -477,8 +477,8 @@
       <inkml:brushProperty name="fitToCurve" value="1"/>
     </inkml:brush>
   </inkml:definitions>
-  <inkml:trace contextRef="#ctx0" brushRef="#br0">1034 2153 6,'0'-3'31,"0"3"1,0 0-12,0 0-2,0 0-1,0 0-5,0 0 2,0 0 6,0 0-2,0 0-4,0 0-4,0 0 2,0 0-1,0 0 1,0 0-3,0 0 3,0 0 0,0 0-7,0 0-3,-6 0 1,-3 0 2,2 0 1,-5 6-3,0 4-1,-3-1 1,1 8-1,-1 4-1,0 2 2,2 4 0,4-3 4,-1-1-6,0 2 1,0 2 3,-2 0-3,2-1 1,2 7-1,-1 0-1,-1-3 2,5 2-2,2 4-1,-1-3 2,4 0-2,0-3 2,0 6 2,0-6-3,0 2 2,12 5 1,0-8-2,8-2-1,-5 6 0,2-7 1,0-1-1,3-2-1,10-6-1,-7 4 2,5-5-1,2-7 1,-1 2-1,3-5 2,-5-3-1,5 0 2,-2-3-3,1 0 0,-8 0 2,7 0 1,0 0-2,0 0 3,3-7-3,-3-9 1,-2-5 2,-2-6 0,1 0-3,1 1 3,-4-7-3,-3 0 1,-5 3-1,1 1 4,0-5 1,-4 7-2,-4 1 3,-3 4-2,-2-4 3,-4 2 0,2-3-4,-2 0-2,0-2 0,0-2 9,0 8-9,0 2 2,0 1-2,-15-7-1,0 0 1,-3 3-2,6 3 1,4-1-1,-2 5 0,0-5 0,2 8 1,-1 2-1,2-3 1,-1 13-1,-1-7-1,-1-1 2,5-2 1,-8 3-1,8 3 0,-2 1-1,4-1 1,-2 0 0,1 3 0,1 3 0,0 0 0,3 0 0,-2 0-1,2 0 0,0 0 0,0 0 0,0 0 1,0-3 0,0 3-1,0 0 0,0 0 0,0 0-1,0 0 1,0 0-1,0 0-1,0 0 0,0 0 0,0 0 0,0 0-2,0 0 0,0 0-2,0 0 0,0 0-4,0 0 1,0 0 3,0 0 6,0 0 1,2 12-1,13 8 0,3 4 0,4-7 0,-5 8 0,2-1 0,2 4-1,-2-5 2,7 0-1,-2 5 0,3 1-1,-6-2 1,9-3-1,-5-5 0,1 0 0,-5 6 0,4-11-4,-2 1-1,1-5 4,-2-5 0,-2 1 0,7 0-3,-5-2 2,2-4 2,-3 0-2,0 0 2,-1 0 2,9-4-1,-7-8 2,3 1-4,0-8 4,-2-1-2,5-5 0,-3 2 0,-6-2 0,6-1 0,-2-4 0,2 3 0,-5 4 0,4-4 1,-2-3-1,-2 1 0,-2-5 0,1-2 0,-1 3 0,-3 5 1,-4 2 2,-1-3 2,-5 6 0,-1-7-2,-1-1-2,0-8 0,-3 4-1,0 4 2,0-3-2,0 4 3,0 6 1,0 3-1,0 0 3,-6 1-1,-6-2 0,-2 4-3,-3 0 3,2 4 0,-2 2-3,-1 0-3,-3 5 0,-4-1 0,0 2 1,3 0 0,-5 3 0,-4 0 0,2 3-2,-4 0 3,6 0-2,-1 0 0,1 0 3,6 0-5,0 0 1,0 0 2,6 9-3,-1 0 1,2 2 1,-7 5-1,2 0 0,1-6 1,6 2 2,3-6-1,1 1 0,5-3 2,-1-4-4,4 0 1,0 0-2,0 0-2,0 0 0,0 0-2,0 0-4,0 0 2,0 0 1,0 0-2,0 0 7,0 0 4,15-11 1,4 3-1,1-5-1,5-1 0,-4-1 1,3-6-1,4 0 1,-2 0-2,2-6 2,-1 0 1,-1-3-2,2-5 0,-1-1 1,0-7 1,-1 8-1,-1-3 1,1-4-1,2 0 0,2 0 2,-13 1-1,2 0-1,-1 0 0,-1 0 4,-4 2-1,-7 18 1,2-2-4,-4-1 2,-1 2 2,-1-7-2,-2 3-1,0-8 0,0 1 2,0 1-1,0 2-2,0 0 2,-12-7-2,-2 9 1,2 1 0,-3 0 3,-3 7-4,-1 5 1,-1-7-3,-7 4 3,5-3-2,-2 4 3,-3 5-2,4 6-2,0-3 1,-2 0 1,3 1 2,-1 2-3,-1 0 0,2 2-3,2 4 2,1 0 1,2 0-1,-8 0-1,3 0 0,2 18 3,1 6-6,-1-3 7,2 6-2,2-1 0,-4 2 0,5-5 0,0 12-2,-5-4 2,9-4 0,-4 5-1,0-8 1,3 3 0,2 0-1,2 2 1,-1 2-1,5-7 0,-3-4-1,1 4 1,4 0-3,-5 2 3,7 1 0,0-8-2,0 8 0,0-10 1,0-2 0,0-3-1,0-1 1,0-8 0,0 0 1,0-3-1,0 0 1,0 0-2,0 0 2,0 0 1,0 0-1,0 0 1,0 0 1,0 0-1,0 0 0,0 0-1,0 0 0,0 0 0,0 0 0,0 0-4,0 0 4,0 0 6,0 0-3,0-6 0,7-14-1,1-9 2,3-8-3,-2-5 1,-1 0-1,2-7 0,2-5 1,3-9 1,-5 1-2,-5 1 1,-1 2 1,-4 10 1,0-6-1,0 11-1,0-4 1,-9-4 2,-6 5-3,-10-6 1,-2 11 0,-6 5-1,-2 8 1,1 9 0,-1 1-2,-1 2 0,5-1-1,0-7-2,-1 14 3,-5 5-1,11 3 1,-5 3 0,1 0-1,-3 0 1,6 0-2,3 0 2,-2 6-2,-5 12-1,5 5 3,-8 1-1,1 10-1,9 2 0,-1 5 1,5-2 0,6-1-1,-3-2 1,6-4 1,4 10 0,-2-3-1,6-1 1,0 4-1,3-2-1,0-4 1,0-1 0,0 3 1,15 2-2,1 2 4,3-4-4,-2 0 2,-2-4 0,2 2 0,3-4 0,-8 0 0,8-3 0,-5-6 0,-3-5-1,0-6 0,-5-4 0,-1-1 0,-4-4 1,3 3 1,-5-6 0,0 0-1,0 0 1,1 0 2,-1 0-1,0 0 0,0 0 3,0 0-1,0 0 2,0 0 0,0 0-1,0 0-2,0 0 1,0 0 0,0 0 3,0 0-1,0 0 2,0 0 0,0 0-4,0 0-2,0-6-1,-6-12 0,-14-1-1,-5-8 0,-4 4 0,2-7-1,-8 0 1,-1-5 0,6-2 0,-2-1-1,-2 3 0,1 2 1,0 0-1,-3 9 1,0 2-3,-5 5 2,-2 2 1,-8 0 0,5 10 0,-1-1 0,8 3 1,5 3-2,-5-7 1,4 7 0,-2 0 1,-9 0-4,8 7 5,2 13-2,0 4-2,9-2 1,0-2 0,-3 7 1,-1 7-1,11 9-1,-2-2 0,7-2 1,-3 6-1,0-1 0,12 2 1,1 2 0,5 5-1,0-5 0,0 0 1,15 0 0,9 0-2,-6-3 3,6-4-1,3-3 0,6-4 0,1-4-1,-5 0 1,11-14-3,-3 6 3,3-11 2,4-2-1,3-3 0,-3-6-1,1 0 2,-8 0 2,1 0-3,-1 0 0,-7 0 0,0 0 0,4 0 1,-5-2-1,3-5 1,-1 1-1,-7-3 0,-6-3 0,-3 6 1,-9 4 1,-6 2 4,0 0-2,0 0-1,0 0 1,0 0-3,0 0 1,0 0 1,0 0 3,0 0 0,0 0 3,0 0 1,0 0-8,0 0-3,0 0-1,-28 0 1,-1 0 2,-4 0-1,0 0-3,4 0 3,-6 0-1,6 0 0,-4 0 0,-15 18 0,3 6 1,-4 11-2,-3 4 2,8 0-2,-4 4 0,12-2 1,5-2-1,0 2 0,6-2 0,4 9-1,-2-1 2,-2 4 2,-2-3-1,6-4-1,11 0-1,2-8 2,1-2-2,-1 7 0,4-8 1,4 3-2,0 0 1,0-9-2,0-1 1,16 1 0,5 0 2,12-3-3,0-3 3,0-4 0,-3-1 0,12-1 3,-6-9-3,6-4 0,3-2 3,-7 0 2,5 0-2,2-2 1,1-19-1,2-1 1,-6 5-1,10-4 0,-11-6 0,3-8 1,-1 2 0,-7-3-1,-3 0 1,-5 3 0,2 3-1,-4-5 1,-1 1 0,-10 8 1,3-1-2,-10 9 2,2 3 0,-5-2 0,5-4 0,-2-9 0,4-3-1,-2 2 3,-7 8 1,-3 14-5,0 9 0,-3 0 0,-7 0 1,8 0 0,2-3-1,0-10 0,0 3 1,0 7 1,0 3-1,-3 0 1,-4 0-3,7 0 0,0 0-1,0 0 0,0 0-1,0 0-3,0 0-1,-3 0-4,-5 0-17,1 0-29,7 0-99,0 0-91</inkml:trace>
-  <inkml:trace contextRef="#ctx0" brushRef="#br0" timeOffset="1">971 2040 75,'0'3'45,"0"0"-25,0-3 29,0 0-11,0 0-11,0 0-3,0 0 6,0 0-4,0 0-3,0 0 4,0 0-1,-3 0-4,3 0-1,0 0-4,0 0-1,0 0-6,-7 0-5,2 0-3,-5 0 0,1 0 2,-6-9 0,0-4 3,2-6-2,-4-2-4,0-4 3,-3-6 1,3-1-1,2 0 2,0-4-2,3-5 0,0-1 0,2-6 0,8-3 0,0-3-1,2-3-3,0 4 4,0-8 1,0 5-4,7 6 0,8 5 0,1 6 2,-1 9-3,2-2 1,1 3-2,1-2-2,-1 4 3,3 6-1,4 1 1,8-2-1,3 5 1,-1-2-2,8 5-1,0 2 3,-2 3-1,2 6 1,-5 3-1,4 0-1,-3 0 1,0 0 0,0 0 0,-2 3 0,2 8 1,1 5-3,-8 3 2,-2-5-1,0 1 1,-2 9-1,-8-4 0,-1 5 2,8-2 0,-7 3-1,0 2 0,-4-2 0,-4 1 0,-4 3 0,4-2 2,-2 2-2,0 2 3,-5 0-4,2 1 1,-4 0 2,-1 3-1,-2-4-5,0 4 6,0 0-3,0 3 4,0 0-1,0 3 1,0 3-2,-5-3 0,-7 2-2,-1-8 2,4-3 0,-1-5-1,2 1 0,-5-6 2,-2-2 0,-5 1 1,3-8-1,-5 1 1,8-2 0,-1 1-1,-7-5-1,1-1 0,-8-2-3,4-3 3,-6 0 0,4-3 0,-3 0 0,6 0 0,4 0 0,-2 0 0,1 3 0,3-3-1,-7 0 0,10 0 1,-2 0 0,2 0 0,0 0 1,0 0-1,-3 0 1,3 0-1,5 0 0,1 0 0,-4 0 0,1 0 0,2 0 0,-2 0 0,2 0 0,-1 0 0,2 0 1,0 0 0,4 0-1,-5 0 0,-5 0 0,3 0 0,-1-3 0,4-3 0,2 3 0,0 0-1,-2 0 0,5 3 1,-1-2 0,2-1-1,0 0 1,-1 0-1,4 3-6,-3-3-18,3 3-36,0 0-79,0-3-46</inkml:trace>
+  <inkml:trace contextRef="#ctx0" brushRef="#br0">1034 2151 6,'0'-3'31,"0"3"1,0 0-12,0 0-2,0 0-1,0 0-5,0 0 2,0 0 6,0 0-2,0 0-4,0 0-4,0 0 2,0 0-1,0 0 1,0 0-3,0 0 3,0 0 0,0 0-7,0 0-3,-5 0 1,-4 0 2,2 0 1,-5 6-3,0 4-1,-3-2 1,1 10-1,-1 3-1,0 2 2,2 3 0,4-1 4,-1-2-6,0 2 1,0 2 3,-2-1-3,2 1 1,2 6-1,-1-1-1,-1-2 2,5 3-2,2 3-1,0-3 2,3-1-2,0-2 2,0 7 2,0-8-3,0 3 2,11 5 1,1-8-2,8-2-1,-5 6 0,1-7 1,2-1-1,2-2-1,10-6-1,-7 4 2,5-5-1,1-7 1,1 2-1,2-5 2,-6-3-1,7 0 2,-4-3-3,3 0 0,-9 0 2,7 0 1,1 0-2,-2 0 3,5-7-3,-5-9 1,-1-5 2,-1-6 0,-1 1-3,2-1 3,-3-6-3,-5 0 1,-4 3-1,1 1 4,1-5 1,-6 8-2,-3-1 3,-3 6-2,-2-6 3,-4 3 0,2-2-4,-2-2-2,0-1 0,0-1 9,0 6-9,0 4 2,0-1-2,-15-5-1,0-1 1,-3 2-2,6 5 1,4-3-1,-2 7 0,0-6 0,2 7 1,0 4-1,1-4 1,-2 13-1,0-8-1,-1 1 2,5-3 1,-8 3-1,8 3 0,-2 0-1,4 1 1,-1-1 0,0 3 0,1 3 0,0 0 0,3 0 0,-2 0-1,2 0 0,0 0 0,0 0 0,0 0 1,0-3 0,0 3-1,0 0 0,0 0 0,0 0-1,0 0 1,0 0-1,0 0-1,0 0 0,0 0 0,0 0 0,0 0-2,0 0 0,0 0-2,0 0 0,0 0-4,0 0 1,0 0 3,0 0 6,0 0 1,2 12-1,12 8 0,4 3 0,4-5 0,-4 6 0,0 1 0,3 2-1,-2-3 2,7-1-1,-2 4 0,3 3-1,-6-4 1,9-1-1,-5-7 0,1 2 0,-4 4 0,3-9-4,-3-1-1,3-4 4,-3-4 0,-3 0 0,9 0-3,-6-2 2,1-4 2,-2 0-2,1 0 2,-2 0 2,8-4-1,-5-8 2,1 0-4,1-6 4,-1-3-2,3-3 0,-2 0 0,-5 0 0,4-2 0,0-5 0,1 5 0,-5 2 0,4-2 1,-2-4-1,-1 1 0,-4-6 0,2 0 0,-1 2 0,-3 5 1,-4 2 2,-1-3 2,-5 6 0,-1-7-2,-1-1-2,0-8 0,-3 4-1,0 5 2,0-5-2,0 5 3,0 7 1,0 1-1,0 2 3,-6-1-1,-6 0 0,-2 2-3,-3 2 3,2 2 0,-2 3-3,-1 1-3,-3 4 0,-4-2 0,0 3 1,3 0 0,-5 3 0,-4 0 0,1 3-2,-3 0 3,7 0-2,-3 0 0,3 0 3,5 0-5,-1 0 1,1 0 2,7 9-3,-2 0 1,1 3 1,-6 3-1,3 1 0,0-5 1,6 0 2,2-5-1,2 1 0,5-3 2,-1-4-4,4 0 1,0 0-2,0 0-2,0 0 0,0 0-2,0 0-4,0 0 2,0 0 1,0 0-2,0 0 7,0 0 4,15-11 1,5 3-1,0-4-1,4-3 0,-2 0 1,2-6-1,3 0 1,0 1-2,1-7 2,-2-1 1,1-1-2,0-6 0,0-1 1,1-7 1,-2 8-1,-1-4 1,2-3-1,0 0 0,3 0 2,-12 1-1,0 0-1,0 0 0,-1 1 4,-4 1-1,-7 18 1,2-2-4,-4-1 2,-1 3 2,-1-9-2,-2 4-1,0-7 0,0-1 2,0 2-1,0 2-2,0 1 2,-12-8-2,-2 8 1,2 2 0,-3 1 3,-3 5-4,0 6 1,-3-6-3,-6 2 3,5-1-2,-2 2 3,-3 7-2,4 5-2,-1-3 1,-1-1 1,4 2 2,-2 2-3,-2 1 0,3 1-3,3 4 2,-1 0 1,3 0-1,-7 0-1,2 0 0,1 17 3,2 8-6,0-5 7,1 8-2,1-2 0,-2 1 0,4-3 0,0 11-2,-5-5 2,8-3 0,-2 6-1,-1-10 1,3 4 0,2 0-1,2 2 1,-2 2-1,5-7 0,-2-4-1,2 4 1,3 0-3,-5 2 3,7 1 0,0-8-2,0 8 0,0-10 1,0-2 0,0-3-1,0-2 1,0-6 0,0-1 1,0-3-1,0 0 1,0 0-2,0 0 2,0 0 1,0 0-1,0 0 1,0 0 1,0 0-1,0 0 0,0 0-1,0 0 0,0 0 0,0 0 0,0 0-4,0 0 4,0 0 6,0 0-3,0-6 0,7-14-1,0-9 2,5-8-3,-2-5 1,-2 1-1,2-9 0,2-4 1,3-8 1,-6-1-2,-4 2 1,-1 3 1,-4 8 1,0-5-1,0 11-1,0-3 1,-9-5 2,-5 5-3,-11-7 1,-3 12 0,-5 6-1,-2 7 1,1 8 0,-1 3-2,-1 1 0,5-1-1,1-7-2,-3 14 3,-3 5-1,9 3 1,-4 3 0,2 0-1,-5 0 1,8 0-2,1 0 2,-2 6-2,-3 12-1,3 5 3,-6 1-1,0 10-1,8 1 0,1 6 1,4-2 0,5 0-1,-1-3 1,5-4 1,4 10 0,-2-3-1,6-1 1,0 4-1,3-3-1,0-3 1,0-1 0,0 3 1,15 2-2,1 2 4,2-3-4,0-1 2,-3-5 0,2 3 0,2-4 0,-7 0 0,9-3 0,-6-6 0,-3-5-1,-1-6 0,-4-4 0,-1-1 0,-4-4 1,3 3 1,-5-6 0,0 0-1,0 0 1,2 0 2,-2 0-1,0 0 0,0 0 3,0 0-1,0 0 2,0 0 0,0 0-1,0 0-2,0 0 1,0 0 0,0 0 3,0 0-1,0 0 2,0 0 0,0 0-4,0 0-2,0-6-1,-7-12 0,-13-1-1,-4-8 0,-6 4 0,4-7-1,-9 1 1,-1-7 0,6-1 0,-3-1-1,0 3 0,0 2 1,0 1-1,-3 7 1,0 4-3,-6 3 2,-1 3 1,-7 1 0,3 8 0,0 0 0,9 3 1,3 3-2,-3-7 1,2 7 0,0 0 1,-11 0-4,10 7 5,0 14-2,1 2-2,9 0 1,0-4 0,-3 8 1,-1 8-1,11 8-1,-2-2 0,7-2 1,-3 6-1,0-1 0,12 1 1,1 3 0,5 5-1,0-5 0,0 0 1,15 0 0,9-1-2,-6-2 3,6-4-1,3-3 0,6-3 0,0-5-1,-3-1 1,9-12-3,0 4 3,0-9 2,6-3-1,1-3 0,-2-6-1,2 0 2,-10 0 2,3 0-3,-3 0 0,-6 0 0,0 0 0,4 0 1,-4-2-1,2-5 1,-1 1-1,-7-4 0,-6-2 0,-3 7 1,-9 3 1,-6 2 4,0 0-2,0 0-1,0 0 1,0 0-3,0 0 1,0 0 1,0 0 3,0 0 0,0 0 3,0 0 1,0 0-8,0 0-3,0 0-1,-28 0 1,-1 0 2,-4 0-1,-1 0-3,5 0 3,-6 0-1,6 0 0,-4 0 0,-15 17 0,4 8 1,-6 10-2,-1 4 2,7-1-2,-5 5 0,14-2 1,4-2-1,-1 2 0,7-2 0,3 9-1,0-1 2,-3 4 2,-2-3-1,6-4-1,11 0-1,2-8 2,1-3-2,-1 8 0,4-7 1,4 2-2,0 0 1,0-10-2,0 1 1,16 0 0,5-1 2,12-1-3,0-5 3,0-2 0,-3-3 0,12 0 3,-5-9-3,4-3 0,5-3 3,-8 0 2,4 0-2,4-3 1,-1-18-1,3 0 1,-6 3-1,10-2 0,-10-7 0,2-9 1,-1 3 0,-7-2-1,-3-1 1,-5 3 0,2 2-1,-4-4 1,-1 2 0,-10 7 1,2-2-2,-8 11 2,1 2 0,-5-2 0,5-4 0,-2-9 0,4-3-1,-3 2 3,-6 8 1,-3 14-5,0 9 0,-3 0 0,-6 0 1,7 0 0,2-3-1,0-9 0,0 1 1,0 8 1,0 3-1,-3 0 1,-4 0-3,7 0 0,0 0-1,0 0 0,0 0-1,0 0-3,0 0-1,-3 0-4,-5 0-17,1 0-29,7 0-99,0 0-91</inkml:trace>
+  <inkml:trace contextRef="#ctx0" brushRef="#br0" timeOffset="1">971 2038 75,'0'3'45,"0"0"-25,0-3 29,0 0-11,0 0-11,0 0-3,0 0 6,0 0-4,0 0-3,0 0 4,0 0-1,-3 0-4,3 0-1,0 0-4,0 0-1,0 0-6,-6 0-5,1 0-3,-5 0 0,1 0 2,-6-9 0,0-4 3,2-6-2,-4-2-4,0-4 3,-3-6 1,3-1-1,2 0 2,0-4-2,3-5 0,0-1 0,2-6 0,7-3 0,1-2-1,2-4-3,0 3 4,0-6 1,0 4-4,8 6 0,7 4 0,1 8 2,-1 8-3,2-2 1,1 2-2,1 0-2,-1 3 3,3 6-1,4 1 1,8-2-1,3 5 1,-1-2-2,8 6-1,-1 0 3,0 4-1,0 6 1,-3 3-1,3 0-1,-3 0 1,0 0 0,0 0 0,-2 3 0,2 8 1,1 5-3,-8 3 2,-2-5-1,0 1 1,-2 9-1,-8-4 0,-1 5 2,8-2 0,-7 2-1,0 4 0,-4-3 0,-3 0 0,-5 5 0,4-3 2,-2 1-2,0 4 3,-5-1-4,1 1 1,-3-1 2,-1 4-1,-2-3-5,0 3 6,0 0-3,0 3 4,0-1-1,0 4 1,0 3-2,-5-3 0,-6 2-2,-2-8 2,4-3 0,-1-5-1,2 1 0,-7-6 2,1-2 0,-6 1 1,3-8-1,-5 1 1,8-2 0,-1 1-1,-7-5-1,1-1 0,-8-2-3,4-3 3,-5 0 0,2-3 0,-2 0 0,6 0 0,4 0 0,-2 0 0,2 3 0,1-3-1,-6 0 0,10 0 1,-1 0 0,1 0 0,-1 0 1,1 0-1,-3 0 1,3 0-1,5 0 0,0 0 0,-3 0 0,1 0 0,3 0 0,-3 0 0,2 0 0,-1 0 0,2 0 1,-1 0 0,5 0-1,-5 0 0,-4 0 0,2 0 0,-1-3 0,4-3 0,1 3 0,1 0-1,-2 0 0,6 3 1,-2-2 0,2-1-1,0 0 1,-1 0-1,4 3-6,-3-3-18,3 3-36,0 0-79,0-3-46</inkml:trace>
 </inkml:ink>
 </file>
 
@@ -498,7 +498,7 @@
           <inkml:channelProperty channel="F" name="resolution" value="2.82441E-6" units="1/dev"/>
         </inkml:channelProperties>
       </inkml:inkSource>
-      <inkml:timestamp xml:id="ts0" timeString="2014-03-25T18:25:39.821"/>
+      <inkml:timestamp xml:id="ts0" timeString="2015-06-06T13:13:27.397"/>
     </inkml:context>
     <inkml:brush xml:id="br0">
       <inkml:brushProperty name="width" value="0.06667" units="cm"/>
@@ -528,7 +528,7 @@
           <inkml:channelProperty channel="F" name="resolution" value="2.82441E-6" units="1/dev"/>
         </inkml:channelProperties>
       </inkml:inkSource>
-      <inkml:timestamp xml:id="ts0" timeString="2014-03-25T18:25:39.832"/>
+      <inkml:timestamp xml:id="ts0" timeString="2015-06-06T13:13:27.409"/>
     </inkml:context>
     <inkml:brush xml:id="br0">
       <inkml:brushProperty name="width" value="0.06667" units="cm"/>
@@ -537,8 +537,8 @@
       <inkml:brushProperty name="fitToCurve" value="1"/>
     </inkml:brush>
   </inkml:definitions>
-  <inkml:trace contextRef="#ctx0" brushRef="#br0">998 2052 6,'0'-3'31,"0"3"1,0 0-12,0 0-2,0 0-1,0 0-5,0 0 2,0 0 6,0 0-2,0 0-4,0 0-4,0 0 2,0 0-1,0 0 1,0 0-3,0 0 3,0 0 0,0 0-7,0 0-3,-6 0 1,-2 0 2,1 0 1,-5 5-3,1 5-1,-3-2 1,-1 9-1,1 2-1,0 4 2,2 2 0,3-2 4,-1 0-6,0 0 1,0 3 3,-1-1-3,1 0 1,3 7-1,-2-1-1,0-2 2,4 1-2,2 5-1,-1-3 2,4-2-2,0-1 2,0 6 2,0-7-3,0 2 2,12 6 1,-1-8-2,8-3-1,-4 7 0,1-7 1,1-2-1,2-1-1,9-6-1,-5 5 2,4-6-1,2-7 1,-1 3-1,3-5 2,-6-3-1,7-1 2,-4-2-3,3 0 0,-9 0 2,7 0 1,1 0-2,-2 0 3,5-6-3,-5-10 1,-1-4 2,-1-6 0,-1 1-3,2 0 3,-3-7-3,-4 1 1,-5 3-1,1 0 4,1-5 1,-4 8-2,-5 0 3,-2 4-2,-2-4 3,-4 2 0,2-2-4,-2-1-2,0-2 0,0-1 9,0 6-9,0 4 2,0-1-2,-15-5-1,1-1 1,-4 3-2,7 3 1,3-1-1,-2 5 0,1-5 0,1 7 1,0 3-1,1-3 1,-1 12-1,-1-7-1,-1 0 2,6-2 1,-9 2-1,9 4 0,-3-1-1,4 0 1,-2 1 0,1 2 0,2 3 0,-1 0 0,3 0 0,-2 0-1,2 0 0,0 0 0,0 0 0,0 0 1,0-3 0,0 3-1,0 0 0,0 0 0,0 0-1,0 0 1,0 0-1,0 0-1,0 0 0,0 0 0,0 0 0,0 0-2,0 0 0,0 0-2,0 0 0,0 0-4,0 0 1,0 0 3,0 0 6,0 0 1,2 11-1,12 9 0,3 2 0,4-5 0,-4 6 0,1 1 0,2 2-1,-2-4 2,8 1-1,-3 3 0,3 2-1,-5-3 1,7-2-1,-4-5 0,2 0 0,-5 6 0,2-10-4,-1 0-1,2-5 4,-4-3 0,-1-1 0,8 1-3,-6-3 2,2-3 2,-3 0-2,1 0 2,-2 0 2,8-3-1,-5-8 2,2-1-4,0-5 4,-1-3-2,3-3 0,-2 0 0,-5 0 0,5-2 0,-1-4 0,1 4 0,-4 3 0,2-4 1,-1-2-1,-1 0 0,-2-5 0,0-1 0,-1 3 0,-3 4 1,-3 2 2,-1-2 2,-5 4 0,-1-5-2,-2-2-2,1-7 0,-3 4-1,0 4 2,0-4-2,0 4 3,0 7 1,0 1-1,0 2 3,-5-1-1,-7 0 0,-2 2-3,-2 1 3,1 3 0,-1 3-3,-1 0-3,-4 4 0,-3-1 0,0 2 1,3 1 0,-5 2 0,-5 0 0,3 3-2,-4 0 3,7 0-2,-3 0 0,2 0 3,6 0-5,-1 0 1,1 0 2,6 9-3,-1-1 1,1 3 1,-6 4-1,2 0 0,0-5 1,7 1 2,1-5-1,3 1 0,4-4 2,-1-3-4,4 0 1,0 0-2,0 0-2,0 0 0,0 0-2,0 0-4,0 0 2,0 0 1,0 0-2,0 0 7,0 0 4,14-10 1,6 3-1,-1-6-1,4-1 0,-2 0 1,2-6-1,4 0 1,-1 1-2,0-7 2,0 0 1,0-2-2,0-5 0,0-1 1,1-7 1,-2 7-1,-1-2 1,2-4-1,1 0 0,1 0 2,-11 0-1,1 1-1,-1 0 0,0 1 4,-5 1-1,-5 16 1,0 0-4,-3-3 2,-1 4 2,-1-8-2,-2 3-1,0-7 0,0 0 2,0 2-1,0 1-2,0 1 2,-12-8-2,-2 9 1,3 1 0,-4 1 3,-2 6-4,-1 5 1,-2-7-3,-5 3 3,4-1-2,-3 2 3,-2 6-2,3 5-2,0-2 1,0-1 1,2 1 2,-1 3-3,-2-1 0,3 2-3,2 4 2,0 0 1,3 0-1,-8 0-1,3 0 0,1 17 3,2 6-6,-1-3 7,2 6-2,0-1 0,-2 1 0,5-3 0,1 10-2,-6-4 2,7-3 0,-2 5-1,0-9 1,2 4 0,3 0-1,1 1 1,-1 3-1,4-7 0,-2-4-1,2 4 1,3 0-3,-5 2 3,7 0 0,0-6-2,0 6 0,0-8 1,0-3 0,0-3-1,0-1 1,0-6 0,0-1 1,0-3-1,0 0 1,0 0-2,0 0 2,0 0 1,0 0-1,0 0 1,0 0 1,0 0-1,0 0 0,0 0-1,0 0 0,0 0 0,0 0 0,0 0-4,0 0 4,0 0 6,0 0-3,0-6 0,7-13-1,0-9 2,5-7-3,-3-5 1,-1 0-1,1-8 0,3-3 1,2-8 1,-4-1-2,-6 2 1,0 2 1,-4 9 1,0-5-1,0 10-1,0-4 1,-8-3 2,-7 4-3,-8-6 1,-4 10 0,-6 7-1,0 6 1,0 8 0,0 3-2,-3 1 0,7-2-1,-1-5-2,-1 12 3,-4 5-1,9 3 1,-4 3 0,2 0-1,-5 0 1,8 0-2,1 0 2,-2 6-2,-3 12-1,3 3 3,-6 2-1,0 10-1,8 1 0,1 5 1,4-2 0,4-1-1,-1-1 1,6-4 1,3 9 0,-2-3-1,6-1 1,1 4-1,2-2-1,0-4 1,0 0 0,0 2 1,14 2-2,1 2 4,3-3-4,-1-1 2,-2-4 0,1 2 0,3-3 0,-8 0 0,9-4 0,-5-5 0,-4-5-1,0-5 0,-4-5 0,-1 0 0,-4-4 1,2 2 1,-4-5 0,0 0-1,0 0 1,2 0 2,-2 0-1,0 0 0,0 0 3,0 0-1,0 0 2,0 0 0,0 0-1,0 0-2,0 0 1,0 0 0,0 0 3,0 0-1,0 0 2,0 0 0,0 0-4,0 0-2,0-5-1,-6-12 0,-13-2-1,-5-6 0,-5 3 0,4-7-1,-9 1 1,-1-6 0,6-1 0,-2-1-1,-1 2 0,0 2 1,0 2-1,-2 6 1,-2 4-3,-4 3 2,-2 3 1,-6 0 0,4 8 0,-2 1 0,9 2 1,4 3-2,-4-6 1,3 6 0,-2 0 1,-8 0-4,7 6 5,2 14-2,0 2-2,9-1 1,0-2 0,-3 7 1,-1 7-1,10 8-1,0-2 0,5-2 1,-2 6-1,-1-1 0,12 2 1,2 1 0,4 6-1,0-6 0,0 1 1,14 0 0,10-1-2,-7-2 3,6-4-1,3-2 0,6-5 0,0-3-1,-3-1 1,9-12-3,-1 5 3,1-11 2,5-2-1,2-2 0,-3-6-1,2 0 2,-9 0 2,3 0-3,-3 0 0,-8 0 0,3 0 0,2 0 1,-3-2-1,2-5 1,-1 2-1,-6-4 0,-7-2 0,-3 6 1,-8 3 1,-6 2 4,0 0-2,0 0-1,0 0 1,0 0-3,0 0 1,0 0 1,0 0 3,0 0 0,0 0 3,0 0 1,0 0-8,0 0-3,0 0-1,-27 0 1,-2 0 2,-2 0-1,-1 0-3,3 0 3,-4 0-1,4 0 0,-1 0 0,-17 17 0,4 5 1,-4 11-2,-3 5 2,7-2-2,-3 5 0,11-2 1,6-2-1,-3 3 0,9-3 0,2 8-1,-1 0 2,-2 5 2,-2-5-1,5-3-1,12 0-1,1-7 2,2-4-2,-2 8 0,4-7 1,4 3-2,0-1 1,0-9-2,0 0 1,15 1 0,5 0 2,13-3-3,-2-4 3,1-2 0,-3-2 0,12-1 3,-6-8-3,5-4 0,4-2 3,-7 0 2,4 0-2,3-2 1,0-18-1,2 0 1,-7 3-1,12-3 0,-11-6 0,3-7 1,-1 1 0,-8-2-1,-2 0 1,-5 2 0,1 3-1,-2-4 1,-2 1 0,-10 7 1,3-1-2,-8 9 2,1 3 0,-6-3 0,6-2 0,-3-10 0,5-3-1,-3 3 3,-6 7 1,-3 14-5,0 8 0,-3 0 0,-6 0 1,7 0 0,2-3-1,0-9 0,0 1 1,0 9 1,0 2-1,-3 0 1,-4 0-3,7 0 0,0 0-1,0 0 0,0 0-1,0 0-3,0 0-1,-2 0-4,-6 0-17,1 0-29,7 0-99,0 0-91</inkml:trace>
-  <inkml:trace contextRef="#ctx0" brushRef="#br0" timeOffset="1">937 1944 75,'0'2'45,"0"1"-25,0-3 29,0 0-11,0 0-11,0 0-3,0 0 6,0 0-4,0 0-3,0 0 4,0 0-1,-3 0-4,3 0-1,0 0-4,0 0-1,0 0-6,-7 0-5,3 0-3,-6 0 0,2 0 2,-7-8 0,1-4 3,2-7-2,-6-1-4,2-4 3,-3-5 1,3-1-1,1-1 2,0-4-2,4-4 0,0-1 0,1-6 0,7-2 0,1-3-1,2-3-3,0 3 4,0-6 1,0 4-4,8 5 0,6 4 0,1 8 2,0 7-3,2-2 1,0 3-2,1-1-2,-1 3 3,4 7-1,3-1 1,7 0-1,5 3 1,-3-1-2,9 5-1,-1 1 3,-1 4-1,1 5 1,-4 3-1,4 0-1,-3 0 1,-1 0 0,1 0 0,-3 3 0,4 7 1,-1 6-3,-7 1 2,-2-3-1,0 0 1,-2 9-1,-8-4 0,-1 5 2,9-2 0,-8 2-1,0 3 0,-3-2 0,-4 1 0,-4 2 0,3-1 2,-1 1-2,-1 3 3,-4 0-4,2 1 1,-4-2 2,-1 5-1,-2-4-5,0 2 6,0 2-3,0 2 4,0-1-1,0 4 1,0 3-2,-5-3 0,-7 2-2,0-7 2,3-4 0,0-4-1,1 0 0,-6-4 2,0-4 0,-5 3 1,2-9-1,-3 2 1,5-3 0,1 1-1,-7-5-1,1 1 0,-9-4-3,6-2 3,-7 0 0,3-3 0,-1 0 0,4 0 0,5 0 0,-2 0 0,1 3 0,2-3-1,-6 0 0,10 0 1,-2 0 0,1 0 0,0 0 1,1 0-1,-4 0 1,4 0-1,4 0 0,0 0 0,-2 0 0,1 0 0,1 0 0,-1 0 0,1 0 0,0 0 0,1 0 1,0 0 0,4 0-1,-5 0 0,-4 0 0,3 0 0,-2-3 0,5-3 0,0 3 0,1 1-1,-1-1 0,4 3 1,-1-3 0,2 0-1,1 0 1,-2 1-1,4 2-6,-3-3-18,3 3-36,0 0-79,0-3-46</inkml:trace>
+  <inkml:trace contextRef="#ctx0" brushRef="#br0">1002 2053 6,'0'-3'31,"0"3"1,0 0-12,0 0-2,0 0-1,0 0-5,0 0 2,0 0 6,0 0-2,0 0-4,0 0-4,0 0 2,0 0-1,0 0 1,0 0-3,0 0 3,0 0 0,0 0-7,0 0-3,-6 0 1,-3 0 2,3 0 1,-6 5-3,1 5-1,-3-2 1,-1 9-1,1 2-1,0 4 2,1 2 0,5-2 4,-2 0-6,-1 0 1,2 3 3,-3-1-3,3 0 1,1 7-1,0-1-1,-2-2 2,5 1-2,2 5-1,0-3 2,3-2-2,0-1 2,0 6 2,0-7-3,0 2 2,11 6 1,1-8-2,7-3-1,-5 7 0,2-7 1,1-2-1,3-1-1,8-6-1,-5 5 2,4-6-1,1-7 1,1 3-1,2-5 2,-6-3-1,7-1 2,-3-2-3,1 0 0,-8 0 2,8 0 1,-1 0-2,0 0 3,3-6-3,-3-10 1,-2-4 2,-1-6 0,-1 1-3,2 0 3,-3-7-3,-4 1 1,-5 3-1,2 0 4,0-5 1,-5 8-2,-3 0 3,-3 4-2,-3-4 3,-3 2 0,2-2-4,-2-1-2,0-2 0,0-1 9,0 6-9,0 4 2,0-1-2,-14-5-1,0-1 1,-4 3-2,6 3 1,4-1-1,-1 5 0,-1-5 0,3 7 1,-2 3-1,2-3 1,-1 12-1,-1-7-1,0 0 2,4-2 1,-8 2-1,9 4 0,-3-1-1,4 0 1,-2 1 0,2 2 0,0 3 0,0 0 0,3 0 0,-2 0-1,2 0 0,0 0 0,0 0 0,0 0 1,0-3 0,0 3-1,0 0 0,0 0 0,0 0-1,0 0 1,0 0-1,0 0-1,0 0 0,0 0 0,0 0 0,0 0-2,0 0 0,0 0-2,0 0 0,0 0-4,0 0 1,0 0 3,0 0 6,0 0 1,2 11-1,12 9 0,3 2 0,4-5 0,-3 6 0,0 1 0,2 2-1,-2-4 2,8 1-1,-3 3 0,2 2-1,-4-3 1,8-2-1,-5-5 0,2 0 0,-5 6 0,3-10-4,-2 0-1,1-5 4,-2-3 0,-1-1 0,6 1-3,-5-3 2,2-3 2,-3 0-2,1 0 2,-2 0 2,9-3-1,-6-8 2,2-1-4,0-5 4,-1-3-2,3-3 0,-2 0 0,-5 0 0,5-2 0,-1-4 0,1 4 0,-4 3 0,3-4 1,-2-2-1,-1 0 0,-3-5 0,1-1 0,0 3 0,-4 4 1,-3 2 2,-1-2 2,-5 4 0,-1-5-2,-2-2-2,1-7 0,-3 4-1,0 4 2,0-4-2,0 4 3,0 7 1,0 1-1,0 2 3,-5-1-1,-7 0 0,-2 2-3,-2 1 3,1 3 0,-1 3-3,-1 0-3,-4 4 0,-3-1 0,0 2 1,2 1 0,-4 2 0,-4 0 0,1 3-2,-2 0 3,5 0-2,-2 0 0,2 0 3,6 0-5,-1 0 1,1 0 2,6 9-3,-1-1 1,0 3 1,-5 4-1,2 0 0,1-5 1,5 1 2,3-5-1,1 1 0,5-4 2,0-3-4,3 0 1,0 0-2,0 0-2,0 0 0,0 0-2,0 0-4,0 0 2,0 0 1,0 0-2,0 0 7,0 0 4,14-10 1,5 3-1,0-6-1,5-1 0,-3 0 1,2-6-1,4 0 1,-2 1-2,2-7 2,-1 0 1,0-2-2,0-6 0,0 0 1,1-7 1,-1 7-1,-2-2 1,1-4-1,2 0 0,2 0 2,-12 0-1,1 1-1,-1 0 0,0 1 4,-5 1-1,-5 16 1,0 0-4,-3-3 2,-1 4 2,-1-8-2,-2 3-1,0-7 0,0 0 2,0 2-1,0 1-2,0 1 2,-12-8-2,-2 9 1,3 1 0,-4 1 3,-2 6-4,-1 5 1,-2-7-3,-6 3 3,5-1-2,-3 2 3,-2 6-2,4 5-2,-1-2 1,-1-1 1,3 1 2,-1 3-3,-2-1 0,3 2-3,2 4 2,0 0 1,2 0-1,-6 0-1,2 0 0,1 17 3,1 6-6,0-3 7,2 6-2,1-1 0,-3 1 0,4-3 0,1 10-2,-5-4 2,8-3 0,-4 5-1,1-9 1,2 4 0,3 0-1,1 1 1,-1 3-1,4-7 0,-2-4-1,1 4 1,5 0-3,-6 2 3,7 0 0,0-6-2,0 6 0,0-8 1,0-3 0,0-3-1,0-1 1,0-6 0,0-1 1,0-3-1,0 0 1,0 0-2,0 0 2,0 0 1,0 0-1,0 0 1,0 0 1,0 0-1,0 0 0,0 0-1,0 0 0,0 0 0,0 0 0,0 0-4,0 0 4,0 0 6,0 0-3,0-6 0,7-13-1,0-9 2,5-7-3,-3-5 1,-1 0-1,1-8 0,3-3 1,2-8 1,-4-1-2,-5 2 1,-2 2 1,-3 9 1,0-5-1,0 10-1,0-4 1,-8-3 2,-7 4-3,-8-6 1,-4 11 0,-6 5-1,0 7 1,-1 8 0,1 3-2,-2 1 0,5-2-1,1-5-2,-3 12 3,-3 5-1,9 3 1,-4 3 0,2 0-1,-5 0 1,7 0-2,3 0 2,-3 6-2,-4 12-1,4 3 3,-6 2-1,0 10-1,8 1 0,1 5 1,3-2 0,6-1-1,-2-1 1,5-4 1,5 9 0,-3-3-1,6-1 1,0 4-1,3-2-1,0-4 1,0 0 0,0 2 1,15 2-2,0 2 4,3-3-4,-1-1 2,-2-4 0,1 2 0,3-3 0,-8 0 0,10-4 0,-7-5 0,-3-5-1,1-5 0,-6-5 0,0 0 0,-4-4 1,3 2 1,-5-5 0,0 0-1,0 0 1,2 0 2,-2 0-1,0 0 0,0 0 3,0 0-1,0 0 2,0 0 0,0 0-1,0 0-2,0 0 1,0 0 0,0 0 3,0 0-1,0 0 2,0 0 0,0 0-4,0 0-2,0-5-1,-7-12 0,-12-2-1,-5-6 0,-5 3 0,4-7-1,-9 1 1,-1-6 0,6-1 0,-2-1-1,-2 2 0,2 2 1,-2 2-1,-1 6 1,-1 4-3,-6 3 2,-1 3 1,-6 0 0,3 8 0,-1 1 0,9 2 1,3 3-2,-3-6 1,3 6 0,-2 0 1,-8 0-4,7 6 5,2 14-2,0 2-2,9-1 1,-1-2 0,-2 7 1,0 7-1,9 8-1,-1-2 0,6-2 1,-2 6-1,-1-1 0,12 2 1,2 1 0,4 6-1,0-6 0,0 1 1,14 0 0,10-1-2,-7-2 3,6-4-1,4-2 0,4-5 0,2-3-1,-5-1 1,10-12-3,0 5 3,0-10 2,5-3-1,2-2 0,-2-6-1,1 0 2,-9 0 2,2 0-3,-1 0 0,-8 0 0,2 0 0,2 0 1,-3-2-1,2-5 1,-1 2-1,-6-5 0,-7-1 0,-3 6 1,-8 3 1,-6 2 4,0 0-2,0 0-1,0 0 1,0 0-3,0 0 1,0 0 1,0 0 3,0 0 0,0 0 3,0 0 1,0 0-8,0 0-3,0 0-1,-27 0 1,-1 0 2,-4 0-1,0 0-3,3 0 3,-4 0-1,4 0 0,-2 0 0,-16 17 0,4 6 1,-5 10-2,-2 5 2,7-2-2,-3 5 0,11-2 1,6-2-1,-3 3 0,8-3 0,3 8-1,-1 0 2,-2 5 2,-1-5-1,4-3-1,11 0-1,2-7 2,2-4-2,-2 8 0,4-7 1,4 3-2,0-1 1,0-9-2,0 0 1,16 1 0,4 0 2,12-3-3,0-4 3,0-2 0,-3-2 0,12-1 3,-6-8-3,5-4 0,4-2 3,-7 0 2,4 0-2,3-2 1,0-18-1,3 0 1,-7 3-1,11-3 0,-11-6 0,3-7 1,-1 1 0,-8-2-1,-1 0 1,-6 2 0,1 3-1,-2-4 1,-2 1 0,-10 7 1,3-1-2,-8 9 2,0 3 0,-4-3 0,5-2 0,-3-10 0,5-3-1,-3 3 3,-6 7 1,-3 14-5,0 8 0,-3 0 0,-6 0 1,7 0 0,2-3-1,0-9 0,0 1 1,0 9 1,0 2-1,-3 0 1,-4 0-3,7 0 0,0 0-1,0 0 0,0 0-1,0 0-3,0 0-1,-2 0-4,-6 0-17,1 0-29,7 0-99,0 0-91</inkml:trace>
+  <inkml:trace contextRef="#ctx0" brushRef="#br0" timeOffset="1">941 1945 75,'0'2'45,"0"1"-25,0-3 29,0 0-11,0 0-11,0 0-3,0 0 6,0 0-4,0 0-3,0 0 4,0 0-1,-3 0-4,3 0-1,0 0-4,0 0-1,0 0-6,-7 0-5,2 0-3,-4 0 0,0 0 2,-5-8 0,0-4 3,1-7-2,-4-1-4,1-4 3,-3-5 1,2-1-1,2-1 2,1-4-2,2-4 0,1-1 0,1-6 0,7-2 0,1-3-1,2-3-3,0 2 4,0-5 1,0 4-4,8 5 0,6 4 0,2 8 2,-2 7-3,3-2 1,0 3-2,2-1-2,-2 3 3,4 7-1,3-1 1,7 0-1,5 3 1,-3-1-2,9 5-1,-1 1 3,-1 4-1,1 5 1,-4 3-1,5 0-1,-4 0 1,-1 0 0,1 0 0,-3 3 0,4 7 1,-1 6-3,-7 1 2,-2-3-1,1 0 1,-4 9-1,-7-4 0,0 5 2,7-2 0,-7 2-1,1 3 0,-4-2 0,-4 1 0,-4 2 0,3-1 2,-1 1-2,-1 3 3,-4 0-4,2 1 1,-4-2 2,-1 5-1,-2-4-5,0 3 6,0 1-3,0 2 4,0-1-1,0 4 1,0 3-2,-5-3 0,-7 2-2,0-7 2,3-4 0,0-4-1,1 0 0,-6-4 2,0-4 0,-6 3 1,4-9-1,-5 2 1,7-3 0,0 1-1,-7-5-1,1 1 0,-9-4-3,5-2 3,-6 0 0,4-3 0,-3 0 0,5 0 0,5 0 0,-2 0 0,1 3 0,2-3-1,-6 0 0,10 0 1,-3 0 0,3 0 0,-1 0 1,0 0-1,-3 0 1,4 0-1,4 0 0,1 0 0,-4 0 0,2 0 0,1 0 0,-1 0 0,1 0 0,0 0 0,1 0 1,0 0 0,4 0-1,-5 0 0,-4 0 0,3 0 0,-2-3 0,5-3 0,0 3 0,1 1-1,-1-1 0,4 3 1,-1-3 0,2 0-1,0 0 1,0 1-1,3 2-6,-3-3-18,3 3-36,0 0-79,0-3-46</inkml:trace>
 </inkml:ink>
 </file>
 
@@ -558,7 +558,7 @@
           <inkml:channelProperty channel="F" name="resolution" value="2.82441E-6" units="1/dev"/>
         </inkml:channelProperties>
       </inkml:inkSource>
-      <inkml:timestamp xml:id="ts0" timeString="2014-03-25T18:25:39.841"/>
+      <inkml:timestamp xml:id="ts0" timeString="2015-06-06T13:13:27.419"/>
     </inkml:context>
     <inkml:brush xml:id="br0">
       <inkml:brushProperty name="width" value="0.06667" units="cm"/>
@@ -588,7 +588,7 @@
           <inkml:channelProperty channel="F" name="resolution" value="2.82441E-6" units="1/dev"/>
         </inkml:channelProperties>
       </inkml:inkSource>
-      <inkml:timestamp xml:id="ts0" timeString="2014-03-25T18:25:39.851"/>
+      <inkml:timestamp xml:id="ts0" timeString="2015-06-06T13:13:27.428"/>
     </inkml:context>
     <inkml:brush xml:id="br0">
       <inkml:brushProperty name="width" value="0.06667" units="cm"/>
@@ -618,7 +618,7 @@
           <inkml:channelProperty channel="F" name="resolution" value="2.82441E-6" units="1/dev"/>
         </inkml:channelProperties>
       </inkml:inkSource>
-      <inkml:timestamp xml:id="ts0" timeString="2014-03-25T18:25:39.861"/>
+      <inkml:timestamp xml:id="ts0" timeString="2015-06-06T13:13:27.438"/>
     </inkml:context>
     <inkml:brush xml:id="br0">
       <inkml:brushProperty name="width" value="0.06667" units="cm"/>
@@ -813,7 +813,7 @@
           <a:p>
             <a:fld id="{699DC775-C286-4358-8C92-D7E584E969B3}" type="datetimeFigureOut">
               <a:rPr lang="en-US" smtClean="0"/>
-              <a:t>3/31/2014</a:t>
+              <a:t>6/6/2015</a:t>
             </a:fld>
             <a:endParaRPr lang="en-US"/>
           </a:p>
@@ -983,7 +983,7 @@
           <a:p>
             <a:fld id="{699DC775-C286-4358-8C92-D7E584E969B3}" type="datetimeFigureOut">
               <a:rPr lang="en-US" smtClean="0"/>
-              <a:t>3/31/2014</a:t>
+              <a:t>6/6/2015</a:t>
             </a:fld>
             <a:endParaRPr lang="en-US"/>
           </a:p>
@@ -1163,7 +1163,7 @@
           <a:p>
             <a:fld id="{699DC775-C286-4358-8C92-D7E584E969B3}" type="datetimeFigureOut">
               <a:rPr lang="en-US" smtClean="0"/>
-              <a:t>3/31/2014</a:t>
+              <a:t>6/6/2015</a:t>
             </a:fld>
             <a:endParaRPr lang="en-US"/>
           </a:p>
@@ -1405,7 +1405,7 @@
           <a:p>
             <a:fld id="{699DC775-C286-4358-8C92-D7E584E969B3}" type="datetimeFigureOut">
               <a:rPr lang="en-US" smtClean="0"/>
-              <a:t>3/31/2014</a:t>
+              <a:t>6/6/2015</a:t>
             </a:fld>
             <a:endParaRPr lang="en-US"/>
           </a:p>
@@ -1575,7 +1575,7 @@
           <a:p>
             <a:fld id="{699DC775-C286-4358-8C92-D7E584E969B3}" type="datetimeFigureOut">
               <a:rPr lang="en-US" smtClean="0"/>
-              <a:t>3/31/2014</a:t>
+              <a:t>6/6/2015</a:t>
             </a:fld>
             <a:endParaRPr lang="en-US"/>
           </a:p>
@@ -1821,7 +1821,7 @@
           <a:p>
             <a:fld id="{699DC775-C286-4358-8C92-D7E584E969B3}" type="datetimeFigureOut">
               <a:rPr lang="en-US" smtClean="0"/>
-              <a:t>3/31/2014</a:t>
+              <a:t>6/6/2015</a:t>
             </a:fld>
             <a:endParaRPr lang="en-US"/>
           </a:p>
@@ -2109,7 +2109,7 @@
           <a:p>
             <a:fld id="{699DC775-C286-4358-8C92-D7E584E969B3}" type="datetimeFigureOut">
               <a:rPr lang="en-US" smtClean="0"/>
-              <a:t>3/31/2014</a:t>
+              <a:t>6/6/2015</a:t>
             </a:fld>
             <a:endParaRPr lang="en-US"/>
           </a:p>
@@ -2531,7 +2531,7 @@
           <a:p>
             <a:fld id="{699DC775-C286-4358-8C92-D7E584E969B3}" type="datetimeFigureOut">
               <a:rPr lang="en-US" smtClean="0"/>
-              <a:t>3/31/2014</a:t>
+              <a:t>6/6/2015</a:t>
             </a:fld>
             <a:endParaRPr lang="en-US"/>
           </a:p>
@@ -2649,7 +2649,7 @@
           <a:p>
             <a:fld id="{699DC775-C286-4358-8C92-D7E584E969B3}" type="datetimeFigureOut">
               <a:rPr lang="en-US" smtClean="0"/>
-              <a:t>3/31/2014</a:t>
+              <a:t>6/6/2015</a:t>
             </a:fld>
             <a:endParaRPr lang="en-US"/>
           </a:p>
@@ -2744,7 +2744,7 @@
           <a:p>
             <a:fld id="{699DC775-C286-4358-8C92-D7E584E969B3}" type="datetimeFigureOut">
               <a:rPr lang="en-US" smtClean="0"/>
-              <a:t>3/31/2014</a:t>
+              <a:t>6/6/2015</a:t>
             </a:fld>
             <a:endParaRPr lang="en-US"/>
           </a:p>
@@ -3021,7 +3021,7 @@
           <a:p>
             <a:fld id="{699DC775-C286-4358-8C92-D7E584E969B3}" type="datetimeFigureOut">
               <a:rPr lang="en-US" smtClean="0"/>
-              <a:t>3/31/2014</a:t>
+              <a:t>6/6/2015</a:t>
             </a:fld>
             <a:endParaRPr lang="en-US"/>
           </a:p>
@@ -3191,7 +3191,7 @@
           <a:p>
             <a:fld id="{699DC775-C286-4358-8C92-D7E584E969B3}" type="datetimeFigureOut">
               <a:rPr lang="en-US" smtClean="0"/>
-              <a:t>3/31/2014</a:t>
+              <a:t>6/6/2015</a:t>
             </a:fld>
             <a:endParaRPr lang="en-US"/>
           </a:p>
@@ -3444,7 +3444,7 @@
           <a:p>
             <a:fld id="{699DC775-C286-4358-8C92-D7E584E969B3}" type="datetimeFigureOut">
               <a:rPr lang="en-US" smtClean="0"/>
-              <a:t>3/31/2014</a:t>
+              <a:t>6/6/2015</a:t>
             </a:fld>
             <a:endParaRPr lang="en-US"/>
           </a:p>
@@ -3614,7 +3614,7 @@
           <a:p>
             <a:fld id="{699DC775-C286-4358-8C92-D7E584E969B3}" type="datetimeFigureOut">
               <a:rPr lang="en-US" smtClean="0"/>
-              <a:t>3/31/2014</a:t>
+              <a:t>6/6/2015</a:t>
             </a:fld>
             <a:endParaRPr lang="en-US"/>
           </a:p>
@@ -3794,7 +3794,7 @@
           <a:p>
             <a:fld id="{699DC775-C286-4358-8C92-D7E584E969B3}" type="datetimeFigureOut">
               <a:rPr lang="en-US" smtClean="0"/>
-              <a:t>3/31/2014</a:t>
+              <a:t>6/6/2015</a:t>
             </a:fld>
             <a:endParaRPr lang="en-US"/>
           </a:p>
@@ -4044,7 +4044,7 @@
           <a:p>
             <a:fld id="{699DC775-C286-4358-8C92-D7E584E969B3}" type="datetimeFigureOut">
               <a:rPr lang="en-US" smtClean="0"/>
-              <a:t>3/31/2014</a:t>
+              <a:t>6/6/2015</a:t>
             </a:fld>
             <a:endParaRPr lang="en-US"/>
           </a:p>
@@ -4222,7 +4222,7 @@
           <a:p>
             <a:fld id="{699DC775-C286-4358-8C92-D7E584E969B3}" type="datetimeFigureOut">
               <a:rPr lang="en-US" smtClean="0"/>
-              <a:t>3/31/2014</a:t>
+              <a:t>6/6/2015</a:t>
             </a:fld>
             <a:endParaRPr lang="en-US"/>
           </a:p>
@@ -4476,7 +4476,7 @@
           <a:p>
             <a:fld id="{699DC775-C286-4358-8C92-D7E584E969B3}" type="datetimeFigureOut">
               <a:rPr lang="en-US" smtClean="0"/>
-              <a:t>3/31/2014</a:t>
+              <a:t>6/6/2015</a:t>
             </a:fld>
             <a:endParaRPr lang="en-US"/>
           </a:p>
@@ -4772,7 +4772,7 @@
           <a:p>
             <a:fld id="{699DC775-C286-4358-8C92-D7E584E969B3}" type="datetimeFigureOut">
               <a:rPr lang="en-US" smtClean="0"/>
-              <a:t>3/31/2014</a:t>
+              <a:t>6/6/2015</a:t>
             </a:fld>
             <a:endParaRPr lang="en-US"/>
           </a:p>
@@ -5202,7 +5202,7 @@
           <a:p>
             <a:fld id="{699DC775-C286-4358-8C92-D7E584E969B3}" type="datetimeFigureOut">
               <a:rPr lang="en-US" smtClean="0"/>
-              <a:t>3/31/2014</a:t>
+              <a:t>6/6/2015</a:t>
             </a:fld>
             <a:endParaRPr lang="en-US"/>
           </a:p>
@@ -5328,7 +5328,7 @@
           <a:p>
             <a:fld id="{699DC775-C286-4358-8C92-D7E584E969B3}" type="datetimeFigureOut">
               <a:rPr lang="en-US" smtClean="0"/>
-              <a:t>3/31/2014</a:t>
+              <a:t>6/6/2015</a:t>
             </a:fld>
             <a:endParaRPr lang="en-US"/>
           </a:p>
@@ -5431,7 +5431,7 @@
           <a:p>
             <a:fld id="{699DC775-C286-4358-8C92-D7E584E969B3}" type="datetimeFigureOut">
               <a:rPr lang="en-US" smtClean="0"/>
-              <a:t>3/31/2014</a:t>
+              <a:t>6/6/2015</a:t>
             </a:fld>
             <a:endParaRPr lang="en-US"/>
           </a:p>
@@ -5677,7 +5677,7 @@
           <a:p>
             <a:fld id="{699DC775-C286-4358-8C92-D7E584E969B3}" type="datetimeFigureOut">
               <a:rPr lang="en-US" smtClean="0"/>
-              <a:t>3/31/2014</a:t>
+              <a:t>6/6/2015</a:t>
             </a:fld>
             <a:endParaRPr lang="en-US"/>
           </a:p>
@@ -5962,7 +5962,7 @@
           <a:p>
             <a:fld id="{699DC775-C286-4358-8C92-D7E584E969B3}" type="datetimeFigureOut">
               <a:rPr lang="en-US" smtClean="0"/>
-              <a:t>3/31/2014</a:t>
+              <a:t>6/6/2015</a:t>
             </a:fld>
             <a:endParaRPr lang="en-US"/>
           </a:p>
@@ -6223,7 +6223,7 @@
           <a:p>
             <a:fld id="{699DC775-C286-4358-8C92-D7E584E969B3}" type="datetimeFigureOut">
               <a:rPr lang="en-US" smtClean="0"/>
-              <a:t>3/31/2014</a:t>
+              <a:t>6/6/2015</a:t>
             </a:fld>
             <a:endParaRPr lang="en-US"/>
           </a:p>
@@ -6401,7 +6401,7 @@
           <a:p>
             <a:fld id="{699DC775-C286-4358-8C92-D7E584E969B3}" type="datetimeFigureOut">
               <a:rPr lang="en-US" smtClean="0"/>
-              <a:t>3/31/2014</a:t>
+              <a:t>6/6/2015</a:t>
             </a:fld>
             <a:endParaRPr lang="en-US"/>
           </a:p>
@@ -6589,7 +6589,7 @@
           <a:p>
             <a:fld id="{699DC775-C286-4358-8C92-D7E584E969B3}" type="datetimeFigureOut">
               <a:rPr lang="en-US" smtClean="0"/>
-              <a:t>3/31/2014</a:t>
+              <a:t>6/6/2015</a:t>
             </a:fld>
             <a:endParaRPr lang="en-US"/>
           </a:p>
@@ -6877,7 +6877,7 @@
           <a:p>
             <a:fld id="{699DC775-C286-4358-8C92-D7E584E969B3}" type="datetimeFigureOut">
               <a:rPr lang="en-US" smtClean="0"/>
-              <a:t>3/31/2014</a:t>
+              <a:t>6/6/2015</a:t>
             </a:fld>
             <a:endParaRPr lang="en-US"/>
           </a:p>
@@ -7299,7 +7299,7 @@
           <a:p>
             <a:fld id="{699DC775-C286-4358-8C92-D7E584E969B3}" type="datetimeFigureOut">
               <a:rPr lang="en-US" smtClean="0"/>
-              <a:t>3/31/2014</a:t>
+              <a:t>6/6/2015</a:t>
             </a:fld>
             <a:endParaRPr lang="en-US"/>
           </a:p>
@@ -7417,7 +7417,7 @@
           <a:p>
             <a:fld id="{699DC775-C286-4358-8C92-D7E584E969B3}" type="datetimeFigureOut">
               <a:rPr lang="en-US" smtClean="0"/>
-              <a:t>3/31/2014</a:t>
+              <a:t>6/6/2015</a:t>
             </a:fld>
             <a:endParaRPr lang="en-US"/>
           </a:p>
@@ -7512,7 +7512,7 @@
           <a:p>
             <a:fld id="{699DC775-C286-4358-8C92-D7E584E969B3}" type="datetimeFigureOut">
               <a:rPr lang="en-US" smtClean="0"/>
-              <a:t>3/31/2014</a:t>
+              <a:t>6/6/2015</a:t>
             </a:fld>
             <a:endParaRPr lang="en-US"/>
           </a:p>
@@ -7789,7 +7789,7 @@
           <a:p>
             <a:fld id="{699DC775-C286-4358-8C92-D7E584E969B3}" type="datetimeFigureOut">
               <a:rPr lang="en-US" smtClean="0"/>
-              <a:t>3/31/2014</a:t>
+              <a:t>6/6/2015</a:t>
             </a:fld>
             <a:endParaRPr lang="en-US"/>
           </a:p>
@@ -8042,7 +8042,7 @@
           <a:p>
             <a:fld id="{699DC775-C286-4358-8C92-D7E584E969B3}" type="datetimeFigureOut">
               <a:rPr lang="en-US" smtClean="0"/>
-              <a:t>3/31/2014</a:t>
+              <a:t>6/6/2015</a:t>
             </a:fld>
             <a:endParaRPr lang="en-US"/>
           </a:p>
@@ -8255,7 +8255,7 @@
           <a:p>
             <a:fld id="{699DC775-C286-4358-8C92-D7E584E969B3}" type="datetimeFigureOut">
               <a:rPr lang="en-US" smtClean="0"/>
-              <a:t>3/31/2014</a:t>
+              <a:t>6/6/2015</a:t>
             </a:fld>
             <a:endParaRPr lang="en-US"/>
           </a:p>
@@ -8770,7 +8770,7 @@
           <a:p>
             <a:fld id="{699DC775-C286-4358-8C92-D7E584E969B3}" type="datetimeFigureOut">
               <a:rPr lang="en-US" smtClean="0"/>
-              <a:t>3/31/2014</a:t>
+              <a:t>6/6/2015</a:t>
             </a:fld>
             <a:endParaRPr lang="en-US"/>
           </a:p>
@@ -9283,7 +9283,7 @@
           <a:p>
             <a:fld id="{699DC775-C286-4358-8C92-D7E584E969B3}" type="datetimeFigureOut">
               <a:rPr lang="en-US" smtClean="0"/>
-              <a:t>3/31/2014</a:t>
+              <a:t>6/6/2015</a:t>
             </a:fld>
             <a:endParaRPr lang="en-US"/>
           </a:p>
@@ -25324,7 +25324,7 @@
 
 <file path=ppt/slides/slide4.xml><?xml version="1.0" encoding="utf-8"?>
 <p:sld xmlns:a="http://schemas.openxmlformats.org/drawingml/2006/main" xmlns:r="http://schemas.openxmlformats.org/officeDocument/2006/relationships" xmlns:p="http://schemas.openxmlformats.org/presentationml/2006/main">
-  <p:cSld name="PPSlideStart201403260225396403">
+  <p:cSld name="PPSlideStart201506062113272188">
     <p:bg>
       <p:bgPr>
         <a:solidFill>
@@ -25573,7 +25573,7 @@
 
 <file path=ppt/slides/slide5.xml><?xml version="1.0" encoding="utf-8"?>
 <p:sld xmlns:a="http://schemas.openxmlformats.org/drawingml/2006/main" xmlns:r="http://schemas.openxmlformats.org/officeDocument/2006/relationships" xmlns:p="http://schemas.openxmlformats.org/presentationml/2006/main">
-  <p:cSld name="PPSlideEnd201403260225396693">
+  <p:cSld name="PPSlideEnd201506062113272208">
     <p:bg>
       <p:bgPr>
         <a:solidFill>
@@ -25807,11 +25807,11 @@
   <p:clrMapOvr>
     <a:masterClrMapping/>
   </p:clrMapOvr>
-  <mc:AlternateContent xmlns:mc="http://schemas.openxmlformats.org/markup-compatibility/2006" xmlns:p14="http://schemas.microsoft.com/office/powerpoint/2010/main">
-    <mc:Choice Requires="p14">
+  <mc:AlternateContent xmlns:mc="http://schemas.openxmlformats.org/markup-compatibility/2006">
+    <mc:Choice xmlns:p14="http://schemas.microsoft.com/office/powerpoint/2010/main" Requires="p14">
       <p:transition spd="slow" p14:dur="2000"/>
     </mc:Choice>
-    <mc:Fallback xmlns="">
+    <mc:Fallback>
       <p:transition spd="slow"/>
     </mc:Fallback>
   </mc:AlternateContent>
@@ -25827,7 +25827,7 @@
 
 <file path=ppt/slides/slide6.xml><?xml version="1.0" encoding="utf-8"?>
 <p:sld xmlns:a="http://schemas.openxmlformats.org/drawingml/2006/main" xmlns:r="http://schemas.openxmlformats.org/officeDocument/2006/relationships" xmlns:p="http://schemas.openxmlformats.org/presentationml/2006/main">
-  <p:cSld name="PPSlideAnimated201403260225396403">
+  <p:cSld name="PPSlideAnimated201506062113271498">
     <p:bg>
       <p:bgPr>
         <a:solidFill>
@@ -26011,49 +26011,7 @@
       </mc:AlternateContent>
       <p:sp>
         <p:nvSpPr>
-          <p:cNvPr id="8" name="text 3"/>
-          <p:cNvSpPr txBox="1"/>
-          <p:nvPr/>
-        </p:nvSpPr>
-        <p:spPr>
-          <a:xfrm>
-            <a:off x="430386" y="6043939"/>
-            <a:ext cx="2644122" cy="523220"/>
-          </a:xfrm>
-          <a:prstGeom prst="rect">
-            <a:avLst/>
-          </a:prstGeom>
-          <a:noFill/>
-        </p:spPr>
-        <p:txBody>
-          <a:bodyPr wrap="none" rtlCol="0">
-            <a:spAutoFit/>
-          </a:bodyPr>
-          <a:lstStyle/>
-          <a:p>
-            <a:r>
-              <a:rPr lang="en-US" sz="2800" b="1" dirty="0" smtClean="0">
-                <a:solidFill>
-                  <a:schemeClr val="bg1">
-                    <a:lumMod val="75000"/>
-                  </a:schemeClr>
-                </a:solidFill>
-              </a:rPr>
-              <a:t>Expected output</a:t>
-            </a:r>
-            <a:endParaRPr lang="en-SG" sz="2800" b="1" dirty="0">
-              <a:solidFill>
-                <a:schemeClr val="bg1">
-                  <a:lumMod val="75000"/>
-                </a:schemeClr>
-              </a:solidFill>
-            </a:endParaRPr>
-          </a:p>
-        </p:txBody>
-      </p:sp>
-      <p:sp>
-        <p:nvSpPr>
-          <p:cNvPr id="9" name="Notched Right Arrow 3"/>
+          <p:cNvPr id="9" name="Notched Right Arrow 8"/>
           <p:cNvSpPr>
             <a:spLocks/>
           </p:cNvSpPr>
@@ -26095,7 +26053,7 @@
       </p:sp>
       <p:sp>
         <p:nvSpPr>
-          <p:cNvPr id="10" name="Notched Right Arrow 3"/>
+          <p:cNvPr id="10" name="Notched Right Arrow 9"/>
           <p:cNvSpPr>
             <a:spLocks/>
           </p:cNvSpPr>
@@ -26137,7 +26095,7 @@
       </p:sp>
       <p:sp>
         <p:nvSpPr>
-          <p:cNvPr id="11" name="Notched Right Arrow 3"/>
+          <p:cNvPr id="11" name="Notched Right Arrow 10"/>
           <p:cNvSpPr>
             <a:spLocks/>
           </p:cNvSpPr>
@@ -26179,7 +26137,7 @@
       </p:sp>
       <p:sp>
         <p:nvSpPr>
-          <p:cNvPr id="12" name="Notched Right Arrow 3"/>
+          <p:cNvPr id="12" name="Notched Right Arrow 11"/>
           <p:cNvSpPr>
             <a:spLocks/>
           </p:cNvSpPr>
@@ -26221,7 +26179,7 @@
       </p:sp>
       <p:sp>
         <p:nvSpPr>
-          <p:cNvPr id="13" name="Notched Right Arrow 3"/>
+          <p:cNvPr id="13" name="Notched Right Arrow 12"/>
           <p:cNvSpPr>
             <a:spLocks/>
           </p:cNvSpPr>
@@ -26263,7 +26221,7 @@
       </p:sp>
       <p:sp>
         <p:nvSpPr>
-          <p:cNvPr id="14" name="Notched Right Arrow 3"/>
+          <p:cNvPr id="14" name="Notched Right Arrow 13"/>
           <p:cNvSpPr>
             <a:spLocks/>
           </p:cNvSpPr>
@@ -26305,7 +26263,7 @@
       </p:sp>
       <p:sp>
         <p:nvSpPr>
-          <p:cNvPr id="15" name="Notched Right Arrow 3"/>
+          <p:cNvPr id="15" name="Notched Right Arrow 14"/>
           <p:cNvSpPr>
             <a:spLocks/>
           </p:cNvSpPr>
@@ -26347,7 +26305,7 @@
       </p:sp>
       <p:sp>
         <p:nvSpPr>
-          <p:cNvPr id="16" name="Notched Right Arrow 3"/>
+          <p:cNvPr id="16" name="Notched Right Arrow 15"/>
           <p:cNvSpPr>
             <a:spLocks/>
           </p:cNvSpPr>
@@ -26389,7 +26347,7 @@
       </p:sp>
       <p:sp>
         <p:nvSpPr>
-          <p:cNvPr id="17" name="Notched Right Arrow 3"/>
+          <p:cNvPr id="17" name="Notched Right Arrow 16"/>
           <p:cNvSpPr>
             <a:spLocks/>
           </p:cNvSpPr>
@@ -26431,7 +26389,7 @@
       </p:sp>
       <p:sp>
         <p:nvSpPr>
-          <p:cNvPr id="18" name="Notched Right Arrow 3"/>
+          <p:cNvPr id="18" name="Notched Right Arrow 17"/>
           <p:cNvSpPr>
             <a:spLocks/>
           </p:cNvSpPr>
@@ -26473,7 +26431,7 @@
       </p:sp>
       <p:sp>
         <p:nvSpPr>
-          <p:cNvPr id="19" name="Notched Right Arrow 3"/>
+          <p:cNvPr id="19" name="Notched Right Arrow 18"/>
           <p:cNvSpPr>
             <a:spLocks/>
           </p:cNvSpPr>
@@ -26515,7 +26473,7 @@
       </p:sp>
       <p:sp>
         <p:nvSpPr>
-          <p:cNvPr id="20" name="Notched Right Arrow 3"/>
+          <p:cNvPr id="20" name="Notched Right Arrow 19"/>
           <p:cNvSpPr>
             <a:spLocks/>
           </p:cNvSpPr>
@@ -26557,7 +26515,7 @@
       </p:sp>
       <p:sp>
         <p:nvSpPr>
-          <p:cNvPr id="21" name="Notched Right Arrow 4"/>
+          <p:cNvPr id="21" name="Notched Right Arrow 20"/>
           <p:cNvSpPr>
             <a:spLocks/>
           </p:cNvSpPr>
@@ -26599,7 +26557,7 @@
       </p:sp>
       <p:sp>
         <p:nvSpPr>
-          <p:cNvPr id="22" name="Notched Right Arrow 4"/>
+          <p:cNvPr id="22" name="Notched Right Arrow 21"/>
           <p:cNvSpPr>
             <a:spLocks/>
           </p:cNvSpPr>
@@ -26641,7 +26599,7 @@
       </p:sp>
       <p:sp>
         <p:nvSpPr>
-          <p:cNvPr id="23" name="Notched Right Arrow 4"/>
+          <p:cNvPr id="23" name="Notched Right Arrow 22"/>
           <p:cNvSpPr>
             <a:spLocks/>
           </p:cNvSpPr>
@@ -26683,7 +26641,7 @@
       </p:sp>
       <p:sp>
         <p:nvSpPr>
-          <p:cNvPr id="24" name="Notched Right Arrow 4"/>
+          <p:cNvPr id="24" name="Notched Right Arrow 23"/>
           <p:cNvSpPr>
             <a:spLocks/>
           </p:cNvSpPr>
@@ -26725,7 +26683,7 @@
       </p:sp>
       <p:sp>
         <p:nvSpPr>
-          <p:cNvPr id="25" name="Notched Right Arrow 4"/>
+          <p:cNvPr id="25" name="Notched Right Arrow 24"/>
           <p:cNvSpPr>
             <a:spLocks/>
           </p:cNvSpPr>
@@ -26767,7 +26725,7 @@
       </p:sp>
       <p:sp>
         <p:nvSpPr>
-          <p:cNvPr id="26" name="Notched Right Arrow 4"/>
+          <p:cNvPr id="26" name="Notched Right Arrow 25"/>
           <p:cNvSpPr>
             <a:spLocks/>
           </p:cNvSpPr>
@@ -26809,7 +26767,7 @@
       </p:sp>
       <p:sp>
         <p:nvSpPr>
-          <p:cNvPr id="27" name="Notched Right Arrow 4"/>
+          <p:cNvPr id="27" name="Notched Right Arrow 26"/>
           <p:cNvSpPr>
             <a:spLocks/>
           </p:cNvSpPr>
@@ -26851,7 +26809,7 @@
       </p:sp>
       <p:sp>
         <p:nvSpPr>
-          <p:cNvPr id="28" name="Notched Right Arrow 4"/>
+          <p:cNvPr id="28" name="Notched Right Arrow 27"/>
           <p:cNvSpPr>
             <a:spLocks/>
           </p:cNvSpPr>
@@ -26893,7 +26851,7 @@
       </p:sp>
       <p:sp>
         <p:nvSpPr>
-          <p:cNvPr id="29" name="Notched Right Arrow 4"/>
+          <p:cNvPr id="29" name="Notched Right Arrow 28"/>
           <p:cNvSpPr>
             <a:spLocks/>
           </p:cNvSpPr>
@@ -26935,7 +26893,7 @@
       </p:sp>
       <p:sp>
         <p:nvSpPr>
-          <p:cNvPr id="30" name="Notched Right Arrow 4"/>
+          <p:cNvPr id="30" name="Notched Right Arrow 29"/>
           <p:cNvSpPr>
             <a:spLocks/>
           </p:cNvSpPr>
@@ -26977,7 +26935,7 @@
       </p:sp>
       <p:sp>
         <p:nvSpPr>
-          <p:cNvPr id="31" name="Notched Right Arrow 4"/>
+          <p:cNvPr id="31" name="Notched Right Arrow 30"/>
           <p:cNvSpPr>
             <a:spLocks/>
           </p:cNvSpPr>
@@ -27019,7 +26977,7 @@
       </p:sp>
       <p:sp>
         <p:nvSpPr>
-          <p:cNvPr id="32" name="Notched Right Arrow 4"/>
+          <p:cNvPr id="32" name="Notched Right Arrow 31"/>
           <p:cNvSpPr>
             <a:spLocks/>
           </p:cNvSpPr>
@@ -27061,7 +27019,7 @@
       </p:sp>
       <p:sp>
         <p:nvSpPr>
-          <p:cNvPr id="33" name="Notched Right Arrow 5"/>
+          <p:cNvPr id="33" name="Notched Right Arrow 32"/>
           <p:cNvSpPr>
             <a:spLocks/>
           </p:cNvSpPr>
@@ -27103,7 +27061,7 @@
       </p:sp>
       <p:sp>
         <p:nvSpPr>
-          <p:cNvPr id="34" name="Notched Right Arrow 5"/>
+          <p:cNvPr id="34" name="Notched Right Arrow 33"/>
           <p:cNvSpPr>
             <a:spLocks/>
           </p:cNvSpPr>
@@ -27145,7 +27103,7 @@
       </p:sp>
       <p:sp>
         <p:nvSpPr>
-          <p:cNvPr id="35" name="Notched Right Arrow 5"/>
+          <p:cNvPr id="35" name="Notched Right Arrow 34"/>
           <p:cNvSpPr>
             <a:spLocks/>
           </p:cNvSpPr>
@@ -27187,7 +27145,7 @@
       </p:sp>
       <p:sp>
         <p:nvSpPr>
-          <p:cNvPr id="36" name="Notched Right Arrow 5"/>
+          <p:cNvPr id="36" name="Notched Right Arrow 35"/>
           <p:cNvSpPr>
             <a:spLocks/>
           </p:cNvSpPr>
@@ -27229,7 +27187,7 @@
       </p:sp>
       <p:sp>
         <p:nvSpPr>
-          <p:cNvPr id="37" name="Notched Right Arrow 5"/>
+          <p:cNvPr id="37" name="Notched Right Arrow 36"/>
           <p:cNvSpPr>
             <a:spLocks/>
           </p:cNvSpPr>
@@ -27271,7 +27229,7 @@
       </p:sp>
       <p:sp>
         <p:nvSpPr>
-          <p:cNvPr id="38" name="Notched Right Arrow 5"/>
+          <p:cNvPr id="38" name="Notched Right Arrow 37"/>
           <p:cNvSpPr>
             <a:spLocks/>
           </p:cNvSpPr>
@@ -27313,7 +27271,7 @@
       </p:sp>
       <p:sp>
         <p:nvSpPr>
-          <p:cNvPr id="39" name="Notched Right Arrow 5"/>
+          <p:cNvPr id="39" name="Notched Right Arrow 38"/>
           <p:cNvSpPr>
             <a:spLocks/>
           </p:cNvSpPr>
@@ -27355,7 +27313,7 @@
       </p:sp>
       <p:sp>
         <p:nvSpPr>
-          <p:cNvPr id="40" name="Notched Right Arrow 5"/>
+          <p:cNvPr id="40" name="Notched Right Arrow 39"/>
           <p:cNvSpPr>
             <a:spLocks/>
           </p:cNvSpPr>
@@ -27397,7 +27355,7 @@
       </p:sp>
       <p:sp>
         <p:nvSpPr>
-          <p:cNvPr id="41" name="Notched Right Arrow 5"/>
+          <p:cNvPr id="41" name="Notched Right Arrow 40"/>
           <p:cNvSpPr>
             <a:spLocks/>
           </p:cNvSpPr>
@@ -27439,7 +27397,7 @@
       </p:sp>
       <p:sp>
         <p:nvSpPr>
-          <p:cNvPr id="42" name="Notched Right Arrow 5"/>
+          <p:cNvPr id="42" name="Notched Right Arrow 41"/>
           <p:cNvSpPr>
             <a:spLocks/>
           </p:cNvSpPr>
@@ -27481,7 +27439,7 @@
       </p:sp>
       <p:sp>
         <p:nvSpPr>
-          <p:cNvPr id="43" name="Notched Right Arrow 5"/>
+          <p:cNvPr id="43" name="Notched Right Arrow 42"/>
           <p:cNvSpPr>
             <a:spLocks/>
           </p:cNvSpPr>
@@ -27523,7 +27481,7 @@
       </p:sp>
       <p:sp>
         <p:nvSpPr>
-          <p:cNvPr id="44" name="Notched Right Arrow 5"/>
+          <p:cNvPr id="44" name="Notched Right Arrow 43"/>
           <p:cNvSpPr>
             <a:spLocks/>
           </p:cNvSpPr>
@@ -27563,11 +27521,11 @@
           </a:p>
         </p:txBody>
       </p:sp>
-      <mc:AlternateContent xmlns:mc="http://schemas.openxmlformats.org/markup-compatibility/2006" xmlns:p14="http://schemas.microsoft.com/office/powerpoint/2010/main">
-        <mc:Choice Requires="p14">
+      <mc:AlternateContent xmlns:mc="http://schemas.openxmlformats.org/markup-compatibility/2006">
+        <mc:Choice xmlns:p14="http://schemas.microsoft.com/office/powerpoint/2010/main" Requires="p14">
           <p:contentPart p14:bwMode="auto" r:id="rId4">
             <p14:nvContentPartPr>
-              <p14:cNvPr id="45" name="Ink 6"/>
+              <p14:cNvPr id="45" name="Ink 44"/>
               <p14:cNvContentPartPr>
                 <a14:cpLocks xmlns:a14="http://schemas.microsoft.com/office/drawing/2010/main"/>
               </p14:cNvContentPartPr>
@@ -27579,10 +27537,10 @@
             </p14:xfrm>
           </p:contentPart>
         </mc:Choice>
-        <mc:Fallback xmlns="">
+        <mc:Fallback>
           <p:pic>
             <p:nvPicPr>
-              <p:cNvPr id="45" name="Ink 6"/>
+              <p:cNvPr id="45" name="Ink 44"/>
               <p:cNvPicPr>
                 <a:picLocks/>
               </p:cNvPicPr>
@@ -27596,8 +27554,8 @@
             </p:blipFill>
             <p:spPr>
               <a:xfrm rot="120116">
-                <a:off x="4101420" y="1271488"/>
-                <a:ext cx="919026" cy="1124710"/>
+                <a:off x="4101406" y="1271467"/>
+                <a:ext cx="919053" cy="1124750"/>
               </a:xfrm>
               <a:prstGeom prst="rect">
                 <a:avLst/>
@@ -27606,11 +27564,11 @@
           </p:pic>
         </mc:Fallback>
       </mc:AlternateContent>
-      <mc:AlternateContent xmlns:mc="http://schemas.openxmlformats.org/markup-compatibility/2006" xmlns:p14="http://schemas.microsoft.com/office/powerpoint/2010/main">
-        <mc:Choice Requires="p14">
+      <mc:AlternateContent xmlns:mc="http://schemas.openxmlformats.org/markup-compatibility/2006">
+        <mc:Choice xmlns:p14="http://schemas.microsoft.com/office/powerpoint/2010/main" Requires="p14">
           <p:contentPart p14:bwMode="auto" r:id="rId6">
             <p14:nvContentPartPr>
-              <p14:cNvPr id="46" name="Ink 6"/>
+              <p14:cNvPr id="46" name="Ink 45"/>
               <p14:cNvContentPartPr>
                 <a14:cpLocks xmlns:a14="http://schemas.microsoft.com/office/drawing/2010/main"/>
               </p14:cNvContentPartPr>
@@ -27622,10 +27580,10 @@
             </p14:xfrm>
           </p:contentPart>
         </mc:Choice>
-        <mc:Fallback xmlns="">
+        <mc:Fallback>
           <p:pic>
             <p:nvPicPr>
-              <p:cNvPr id="46" name="Ink 6"/>
+              <p:cNvPr id="46" name="Ink 45"/>
               <p:cNvPicPr>
                 <a:picLocks/>
               </p:cNvPicPr>
@@ -27649,11 +27607,11 @@
           </p:pic>
         </mc:Fallback>
       </mc:AlternateContent>
-      <mc:AlternateContent xmlns:mc="http://schemas.openxmlformats.org/markup-compatibility/2006" xmlns:p14="http://schemas.microsoft.com/office/powerpoint/2010/main">
-        <mc:Choice Requires="p14">
+      <mc:AlternateContent xmlns:mc="http://schemas.openxmlformats.org/markup-compatibility/2006">
+        <mc:Choice xmlns:p14="http://schemas.microsoft.com/office/powerpoint/2010/main" Requires="p14">
           <p:contentPart p14:bwMode="auto" r:id="rId8">
             <p14:nvContentPartPr>
-              <p14:cNvPr id="47" name="Ink 6"/>
+              <p14:cNvPr id="47" name="Ink 46"/>
               <p14:cNvContentPartPr>
                 <a14:cpLocks xmlns:a14="http://schemas.microsoft.com/office/drawing/2010/main"/>
               </p14:cNvContentPartPr>
@@ -27665,10 +27623,10 @@
             </p14:xfrm>
           </p:contentPart>
         </mc:Choice>
-        <mc:Fallback xmlns="">
+        <mc:Fallback>
           <p:pic>
             <p:nvPicPr>
-              <p:cNvPr id="47" name="Ink 6"/>
+              <p:cNvPr id="47" name="Ink 46"/>
               <p:cNvPicPr>
                 <a:picLocks/>
               </p:cNvPicPr>
@@ -27682,8 +27640,8 @@
             </p:blipFill>
             <p:spPr>
               <a:xfrm rot="360347">
-                <a:off x="4819026" y="1633220"/>
-                <a:ext cx="889620" cy="1073408"/>
+                <a:off x="4819049" y="1633220"/>
+                <a:ext cx="889574" cy="1073408"/>
               </a:xfrm>
               <a:prstGeom prst="rect">
                 <a:avLst/>
@@ -27692,11 +27650,11 @@
           </p:pic>
         </mc:Fallback>
       </mc:AlternateContent>
-      <mc:AlternateContent xmlns:mc="http://schemas.openxmlformats.org/markup-compatibility/2006" xmlns:p14="http://schemas.microsoft.com/office/powerpoint/2010/main">
-        <mc:Choice Requires="p14">
+      <mc:AlternateContent xmlns:mc="http://schemas.openxmlformats.org/markup-compatibility/2006">
+        <mc:Choice xmlns:p14="http://schemas.microsoft.com/office/powerpoint/2010/main" Requires="p14">
           <p:contentPart p14:bwMode="auto" r:id="rId10">
             <p14:nvContentPartPr>
-              <p14:cNvPr id="48" name="Ink 6"/>
+              <p14:cNvPr id="48" name="Ink 47"/>
               <p14:cNvContentPartPr>
                 <a14:cpLocks xmlns:a14="http://schemas.microsoft.com/office/drawing/2010/main"/>
               </p14:cNvContentPartPr>
@@ -27708,10 +27666,10 @@
             </p14:xfrm>
           </p:contentPart>
         </mc:Choice>
-        <mc:Fallback xmlns="">
+        <mc:Fallback>
           <p:pic>
             <p:nvPicPr>
-              <p:cNvPr id="48" name="Ink 6"/>
+              <p:cNvPr id="48" name="Ink 47"/>
               <p:cNvPicPr>
                 <a:picLocks/>
               </p:cNvPicPr>
@@ -27735,11 +27693,11 @@
           </p:pic>
         </mc:Fallback>
       </mc:AlternateContent>
-      <mc:AlternateContent xmlns:mc="http://schemas.openxmlformats.org/markup-compatibility/2006" xmlns:p14="http://schemas.microsoft.com/office/powerpoint/2010/main">
-        <mc:Choice Requires="p14">
+      <mc:AlternateContent xmlns:mc="http://schemas.openxmlformats.org/markup-compatibility/2006">
+        <mc:Choice xmlns:p14="http://schemas.microsoft.com/office/powerpoint/2010/main" Requires="p14">
           <p:contentPart p14:bwMode="auto" r:id="rId12">
             <p14:nvContentPartPr>
-              <p14:cNvPr id="49" name="Ink 6"/>
+              <p14:cNvPr id="49" name="Ink 48"/>
               <p14:cNvContentPartPr>
                 <a14:cpLocks xmlns:a14="http://schemas.microsoft.com/office/drawing/2010/main"/>
               </p14:cNvContentPartPr>
@@ -27751,10 +27709,10 @@
             </p14:xfrm>
           </p:contentPart>
         </mc:Choice>
-        <mc:Fallback xmlns="">
+        <mc:Fallback>
           <p:pic>
             <p:nvPicPr>
-              <p:cNvPr id="49" name="Ink 6"/>
+              <p:cNvPr id="49" name="Ink 48"/>
               <p:cNvPicPr>
                 <a:picLocks/>
               </p:cNvPicPr>
@@ -27778,11 +27736,11 @@
           </p:pic>
         </mc:Fallback>
       </mc:AlternateContent>
-      <mc:AlternateContent xmlns:mc="http://schemas.openxmlformats.org/markup-compatibility/2006" xmlns:p14="http://schemas.microsoft.com/office/powerpoint/2010/main">
-        <mc:Choice Requires="p14">
+      <mc:AlternateContent xmlns:mc="http://schemas.openxmlformats.org/markup-compatibility/2006">
+        <mc:Choice xmlns:p14="http://schemas.microsoft.com/office/powerpoint/2010/main" Requires="p14">
           <p:contentPart p14:bwMode="auto" r:id="rId14">
             <p14:nvContentPartPr>
-              <p14:cNvPr id="50" name="Ink 6"/>
+              <p14:cNvPr id="50" name="Ink 49"/>
               <p14:cNvContentPartPr>
                 <a14:cpLocks xmlns:a14="http://schemas.microsoft.com/office/drawing/2010/main"/>
               </p14:cNvContentPartPr>
@@ -27794,10 +27752,10 @@
             </p14:xfrm>
           </p:contentPart>
         </mc:Choice>
-        <mc:Fallback xmlns="">
+        <mc:Fallback>
           <p:pic>
             <p:nvPicPr>
-              <p:cNvPr id="50" name="Ink 6"/>
+              <p:cNvPr id="50" name="Ink 49"/>
               <p:cNvPicPr>
                 <a:picLocks/>
               </p:cNvPicPr>
@@ -27821,11 +27779,11 @@
           </p:pic>
         </mc:Fallback>
       </mc:AlternateContent>
-      <mc:AlternateContent xmlns:mc="http://schemas.openxmlformats.org/markup-compatibility/2006" xmlns:p14="http://schemas.microsoft.com/office/powerpoint/2010/main">
-        <mc:Choice Requires="p14">
+      <mc:AlternateContent xmlns:mc="http://schemas.openxmlformats.org/markup-compatibility/2006">
+        <mc:Choice xmlns:p14="http://schemas.microsoft.com/office/powerpoint/2010/main" Requires="p14">
           <p:contentPart p14:bwMode="auto" r:id="rId16">
             <p14:nvContentPartPr>
-              <p14:cNvPr id="51" name="Ink 6"/>
+              <p14:cNvPr id="51" name="Ink 50"/>
               <p14:cNvContentPartPr>
                 <a14:cpLocks xmlns:a14="http://schemas.microsoft.com/office/drawing/2010/main"/>
               </p14:cNvContentPartPr>
@@ -27837,10 +27795,10 @@
             </p14:xfrm>
           </p:contentPart>
         </mc:Choice>
-        <mc:Fallback xmlns="">
+        <mc:Fallback>
           <p:pic>
             <p:nvPicPr>
-              <p:cNvPr id="51" name="Ink 6"/>
+              <p:cNvPr id="51" name="Ink 50"/>
               <p:cNvPicPr>
                 <a:picLocks/>
               </p:cNvPicPr>
@@ -27864,11 +27822,11 @@
           </p:pic>
         </mc:Fallback>
       </mc:AlternateContent>
-      <mc:AlternateContent xmlns:mc="http://schemas.openxmlformats.org/markup-compatibility/2006" xmlns:p14="http://schemas.microsoft.com/office/powerpoint/2010/main">
-        <mc:Choice Requires="p14">
+      <mc:AlternateContent xmlns:mc="http://schemas.openxmlformats.org/markup-compatibility/2006">
+        <mc:Choice xmlns:p14="http://schemas.microsoft.com/office/powerpoint/2010/main" Requires="p14">
           <p:contentPart p14:bwMode="auto" r:id="rId18">
             <p14:nvContentPartPr>
-              <p14:cNvPr id="52" name="Ink 6"/>
+              <p14:cNvPr id="52" name="Ink 51"/>
               <p14:cNvContentPartPr>
                 <a14:cpLocks xmlns:a14="http://schemas.microsoft.com/office/drawing/2010/main"/>
               </p14:cNvContentPartPr>
@@ -27880,10 +27838,10 @@
             </p14:xfrm>
           </p:contentPart>
         </mc:Choice>
-        <mc:Fallback xmlns="">
+        <mc:Fallback>
           <p:pic>
             <p:nvPicPr>
-              <p:cNvPr id="52" name="Ink 6"/>
+              <p:cNvPr id="52" name="Ink 51"/>
               <p:cNvPicPr>
                 <a:picLocks/>
               </p:cNvPicPr>
@@ -27907,11 +27865,11 @@
           </p:pic>
         </mc:Fallback>
       </mc:AlternateContent>
-      <mc:AlternateContent xmlns:mc="http://schemas.openxmlformats.org/markup-compatibility/2006" xmlns:p14="http://schemas.microsoft.com/office/powerpoint/2010/main">
-        <mc:Choice Requires="p14">
+      <mc:AlternateContent xmlns:mc="http://schemas.openxmlformats.org/markup-compatibility/2006">
+        <mc:Choice xmlns:p14="http://schemas.microsoft.com/office/powerpoint/2010/main" Requires="p14">
           <p:contentPart p14:bwMode="auto" r:id="rId20">
             <p14:nvContentPartPr>
-              <p14:cNvPr id="53" name="Ink 6"/>
+              <p14:cNvPr id="53" name="Ink 52"/>
               <p14:cNvContentPartPr>
                 <a14:cpLocks xmlns:a14="http://schemas.microsoft.com/office/drawing/2010/main"/>
               </p14:cNvContentPartPr>
@@ -27923,10 +27881,10 @@
             </p14:xfrm>
           </p:contentPart>
         </mc:Choice>
-        <mc:Fallback xmlns="">
+        <mc:Fallback>
           <p:pic>
             <p:nvPicPr>
-              <p:cNvPr id="53" name="Ink 6"/>
+              <p:cNvPr id="53" name="Ink 52"/>
               <p:cNvPicPr>
                 <a:picLocks/>
               </p:cNvPicPr>
@@ -27950,11 +27908,11 @@
           </p:pic>
         </mc:Fallback>
       </mc:AlternateContent>
-      <mc:AlternateContent xmlns:mc="http://schemas.openxmlformats.org/markup-compatibility/2006" xmlns:p14="http://schemas.microsoft.com/office/powerpoint/2010/main">
-        <mc:Choice Requires="p14">
+      <mc:AlternateContent xmlns:mc="http://schemas.openxmlformats.org/markup-compatibility/2006">
+        <mc:Choice xmlns:p14="http://schemas.microsoft.com/office/powerpoint/2010/main" Requires="p14">
           <p:contentPart p14:bwMode="auto" r:id="rId22">
             <p14:nvContentPartPr>
-              <p14:cNvPr id="54" name="Ink 6"/>
+              <p14:cNvPr id="54" name="Ink 53"/>
               <p14:cNvContentPartPr>
                 <a14:cpLocks xmlns:a14="http://schemas.microsoft.com/office/drawing/2010/main"/>
               </p14:cNvContentPartPr>
@@ -27966,10 +27924,10 @@
             </p14:xfrm>
           </p:contentPart>
         </mc:Choice>
-        <mc:Fallback xmlns="">
+        <mc:Fallback>
           <p:pic>
             <p:nvPicPr>
-              <p:cNvPr id="54" name="Ink 6"/>
+              <p:cNvPr id="54" name="Ink 53"/>
               <p:cNvPicPr>
                 <a:picLocks/>
               </p:cNvPicPr>
@@ -27993,11 +27951,11 @@
           </p:pic>
         </mc:Fallback>
       </mc:AlternateContent>
-      <mc:AlternateContent xmlns:mc="http://schemas.openxmlformats.org/markup-compatibility/2006" xmlns:p14="http://schemas.microsoft.com/office/powerpoint/2010/main">
-        <mc:Choice Requires="p14">
+      <mc:AlternateContent xmlns:mc="http://schemas.openxmlformats.org/markup-compatibility/2006">
+        <mc:Choice xmlns:p14="http://schemas.microsoft.com/office/powerpoint/2010/main" Requires="p14">
           <p:contentPart p14:bwMode="auto" r:id="rId24">
             <p14:nvContentPartPr>
-              <p14:cNvPr id="55" name="Ink 6"/>
+              <p14:cNvPr id="55" name="Ink 54"/>
               <p14:cNvContentPartPr>
                 <a14:cpLocks xmlns:a14="http://schemas.microsoft.com/office/drawing/2010/main"/>
               </p14:cNvContentPartPr>
@@ -28009,10 +27967,10 @@
             </p14:xfrm>
           </p:contentPart>
         </mc:Choice>
-        <mc:Fallback xmlns="">
+        <mc:Fallback>
           <p:pic>
             <p:nvPicPr>
-              <p:cNvPr id="55" name="Ink 6"/>
+              <p:cNvPr id="55" name="Ink 54"/>
               <p:cNvPicPr>
                 <a:picLocks/>
               </p:cNvPicPr>
@@ -28036,11 +27994,11 @@
           </p:pic>
         </mc:Fallback>
       </mc:AlternateContent>
-      <mc:AlternateContent xmlns:mc="http://schemas.openxmlformats.org/markup-compatibility/2006" xmlns:p14="http://schemas.microsoft.com/office/powerpoint/2010/main">
-        <mc:Choice Requires="p14">
+      <mc:AlternateContent xmlns:mc="http://schemas.openxmlformats.org/markup-compatibility/2006">
+        <mc:Choice xmlns:p14="http://schemas.microsoft.com/office/powerpoint/2010/main" Requires="p14">
           <p:contentPart p14:bwMode="auto" r:id="rId26">
             <p14:nvContentPartPr>
-              <p14:cNvPr id="56" name="Ink 6"/>
+              <p14:cNvPr id="56" name="Ink 55"/>
               <p14:cNvContentPartPr>
                 <a14:cpLocks xmlns:a14="http://schemas.microsoft.com/office/drawing/2010/main"/>
               </p14:cNvContentPartPr>
@@ -28052,10 +28010,10 @@
             </p14:xfrm>
           </p:contentPart>
         </mc:Choice>
-        <mc:Fallback xmlns="">
+        <mc:Fallback>
           <p:pic>
             <p:nvPicPr>
-              <p:cNvPr id="56" name="Ink 6"/>
+              <p:cNvPr id="56" name="Ink 55"/>
               <p:cNvPicPr>
                 <a:picLocks/>
               </p:cNvPicPr>
@@ -28069,8 +28027,8 @@
             </p:blipFill>
             <p:spPr>
               <a:xfrm rot="1441388">
-                <a:off x="8048408" y="3261002"/>
-                <a:ext cx="756983" cy="840600"/>
+                <a:off x="8048380" y="3261021"/>
+                <a:ext cx="757037" cy="840564"/>
               </a:xfrm>
               <a:prstGeom prst="rect">
                 <a:avLst/>
@@ -28081,7 +28039,7 @@
       </mc:AlternateContent>
       <p:pic>
         <p:nvPicPr>
-          <p:cNvPr id="2" name="PPIndicator201403260225397033"/>
+          <p:cNvPr id="2" name="PPIndicator201506062113272488"/>
           <p:cNvPicPr>
             <a:picLocks/>
           </p:cNvPicPr>
@@ -28109,10 +28067,52 @@
           </a:prstGeom>
         </p:spPr>
       </p:pic>
+      <p:sp>
+        <p:nvSpPr>
+          <p:cNvPr id="57" name="text 3"/>
+          <p:cNvSpPr txBox="1"/>
+          <p:nvPr/>
+        </p:nvSpPr>
+        <p:spPr>
+          <a:xfrm>
+            <a:off x="430386" y="6043939"/>
+            <a:ext cx="2644122" cy="523220"/>
+          </a:xfrm>
+          <a:prstGeom prst="rect">
+            <a:avLst/>
+          </a:prstGeom>
+          <a:noFill/>
+        </p:spPr>
+        <p:txBody>
+          <a:bodyPr wrap="none" rtlCol="0">
+            <a:spAutoFit/>
+          </a:bodyPr>
+          <a:lstStyle/>
+          <a:p>
+            <a:r>
+              <a:rPr lang="en-US" sz="2800" b="1" dirty="0" smtClean="0">
+                <a:solidFill>
+                  <a:schemeClr val="bg1">
+                    <a:lumMod val="75000"/>
+                  </a:schemeClr>
+                </a:solidFill>
+              </a:rPr>
+              <a:t>Expected output</a:t>
+            </a:r>
+            <a:endParaRPr lang="en-SG" sz="2800" b="1" dirty="0">
+              <a:solidFill>
+                <a:schemeClr val="bg1">
+                  <a:lumMod val="75000"/>
+                </a:schemeClr>
+              </a:solidFill>
+            </a:endParaRPr>
+          </a:p>
+        </p:txBody>
+      </p:sp>
     </p:spTree>
     <p:extLst>
       <p:ext uri="{BB962C8B-B14F-4D97-AF65-F5344CB8AC3E}">
-        <p14:creationId xmlns:p14="http://schemas.microsoft.com/office/powerpoint/2010/main" val="4184262323"/>
+        <p14:creationId xmlns:p14="http://schemas.microsoft.com/office/powerpoint/2010/main" val="1343405393"/>
       </p:ext>
     </p:extLst>
   </p:cSld>
@@ -28198,49 +28198,14 @@
                                 </p:cTn>
                               </p:par>
                               <p:par>
-                                <p:cTn id="9" presetID="10" presetClass="exit" presetSubtype="0" fill="hold" grpId="0" nodeType="withEffect">
-                                  <p:stCondLst>
-                                    <p:cond delay="0"/>
-                                  </p:stCondLst>
-                                  <p:childTnLst>
-                                    <p:animEffect transition="out" filter="fade">
-                                      <p:cBhvr>
-                                        <p:cTn id="10" dur="500"/>
-                                        <p:tgtEl>
-                                          <p:spTgt spid="8"/>
-                                        </p:tgtEl>
-                                      </p:cBhvr>
-                                    </p:animEffect>
-                                    <p:set>
-                                      <p:cBhvr>
-                                        <p:cTn id="11" dur="1" fill="hold">
-                                          <p:stCondLst>
-                                            <p:cond delay="499"/>
-                                          </p:stCondLst>
-                                        </p:cTn>
-                                        <p:tgtEl>
-                                          <p:spTgt spid="8"/>
-                                        </p:tgtEl>
-                                        <p:attrNameLst>
-                                          <p:attrName>style.visibility</p:attrName>
-                                        </p:attrNameLst>
-                                      </p:cBhvr>
-                                      <p:to>
-                                        <p:strVal val="hidden"/>
-                                      </p:to>
-                                    </p:set>
-                                  </p:childTnLst>
-                                </p:cTn>
-                              </p:par>
-                              <p:par>
-                                <p:cTn id="12" presetID="1" presetClass="entr" presetSubtype="0" fill="hold" grpId="0" nodeType="withEffect">
+                                <p:cTn id="9" presetID="1" presetClass="entr" presetSubtype="0" fill="hold" grpId="0" nodeType="withEffect">
                                   <p:stCondLst>
                                     <p:cond delay="42"/>
                                   </p:stCondLst>
                                   <p:childTnLst>
                                     <p:set>
                                       <p:cBhvr>
-                                        <p:cTn id="13" dur="1" fill="hold">
+                                        <p:cTn id="10" dur="1" fill="hold">
                                           <p:stCondLst>
                                             <p:cond delay="0"/>
                                           </p:stCondLst>
@@ -28260,14 +28225,14 @@
                                 </p:cTn>
                               </p:par>
                               <p:par>
-                                <p:cTn id="14" presetID="1" presetClass="exit" presetSubtype="0" fill="hold" grpId="0" nodeType="withEffect">
+                                <p:cTn id="11" presetID="1" presetClass="exit" presetSubtype="0" fill="hold" grpId="0" nodeType="withEffect">
                                   <p:stCondLst>
                                     <p:cond delay="42"/>
                                   </p:stCondLst>
                                   <p:childTnLst>
                                     <p:set>
                                       <p:cBhvr>
-                                        <p:cTn id="15" dur="1" fill="hold">
+                                        <p:cTn id="12" dur="1" fill="hold">
                                           <p:stCondLst>
                                             <p:cond delay="0"/>
                                           </p:stCondLst>
@@ -28287,14 +28252,14 @@
                                 </p:cTn>
                               </p:par>
                               <p:par>
-                                <p:cTn id="16" presetID="1" presetClass="entr" presetSubtype="0" fill="hold" grpId="0" nodeType="withEffect">
+                                <p:cTn id="13" presetID="1" presetClass="entr" presetSubtype="0" fill="hold" grpId="0" nodeType="withEffect">
                                   <p:stCondLst>
                                     <p:cond delay="83"/>
                                   </p:stCondLst>
                                   <p:childTnLst>
                                     <p:set>
                                       <p:cBhvr>
-                                        <p:cTn id="17" dur="1" fill="hold">
+                                        <p:cTn id="14" dur="1" fill="hold">
                                           <p:stCondLst>
                                             <p:cond delay="0"/>
                                           </p:stCondLst>
@@ -28314,14 +28279,14 @@
                                 </p:cTn>
                               </p:par>
                               <p:par>
-                                <p:cTn id="18" presetID="1" presetClass="exit" presetSubtype="0" fill="hold" grpId="1" nodeType="withEffect">
+                                <p:cTn id="15" presetID="1" presetClass="exit" presetSubtype="0" fill="hold" grpId="1" nodeType="withEffect">
                                   <p:stCondLst>
                                     <p:cond delay="83"/>
                                   </p:stCondLst>
                                   <p:childTnLst>
                                     <p:set>
                                       <p:cBhvr>
-                                        <p:cTn id="19" dur="1" fill="hold">
+                                        <p:cTn id="16" dur="1" fill="hold">
                                           <p:stCondLst>
                                             <p:cond delay="0"/>
                                           </p:stCondLst>
@@ -28341,14 +28306,14 @@
                                 </p:cTn>
                               </p:par>
                               <p:par>
-                                <p:cTn id="20" presetID="1" presetClass="entr" presetSubtype="0" fill="hold" grpId="0" nodeType="withEffect">
+                                <p:cTn id="17" presetID="1" presetClass="entr" presetSubtype="0" fill="hold" grpId="0" nodeType="withEffect">
                                   <p:stCondLst>
                                     <p:cond delay="125"/>
                                   </p:stCondLst>
                                   <p:childTnLst>
                                     <p:set>
                                       <p:cBhvr>
-                                        <p:cTn id="21" dur="1" fill="hold">
+                                        <p:cTn id="18" dur="1" fill="hold">
                                           <p:stCondLst>
                                             <p:cond delay="0"/>
                                           </p:stCondLst>
@@ -28368,14 +28333,14 @@
                                 </p:cTn>
                               </p:par>
                               <p:par>
-                                <p:cTn id="22" presetID="1" presetClass="exit" presetSubtype="0" fill="hold" grpId="1" nodeType="withEffect">
+                                <p:cTn id="19" presetID="1" presetClass="exit" presetSubtype="0" fill="hold" grpId="1" nodeType="withEffect">
                                   <p:stCondLst>
                                     <p:cond delay="125"/>
                                   </p:stCondLst>
                                   <p:childTnLst>
                                     <p:set>
                                       <p:cBhvr>
-                                        <p:cTn id="23" dur="1" fill="hold">
+                                        <p:cTn id="20" dur="1" fill="hold">
                                           <p:stCondLst>
                                             <p:cond delay="0"/>
                                           </p:stCondLst>
@@ -28395,14 +28360,14 @@
                                 </p:cTn>
                               </p:par>
                               <p:par>
-                                <p:cTn id="24" presetID="1" presetClass="entr" presetSubtype="0" fill="hold" grpId="0" nodeType="withEffect">
+                                <p:cTn id="21" presetID="1" presetClass="entr" presetSubtype="0" fill="hold" grpId="0" nodeType="withEffect">
                                   <p:stCondLst>
                                     <p:cond delay="167"/>
                                   </p:stCondLst>
                                   <p:childTnLst>
                                     <p:set>
                                       <p:cBhvr>
-                                        <p:cTn id="25" dur="1" fill="hold">
+                                        <p:cTn id="22" dur="1" fill="hold">
                                           <p:stCondLst>
                                             <p:cond delay="0"/>
                                           </p:stCondLst>
@@ -28422,14 +28387,14 @@
                                 </p:cTn>
                               </p:par>
                               <p:par>
-                                <p:cTn id="26" presetID="1" presetClass="exit" presetSubtype="0" fill="hold" grpId="1" nodeType="withEffect">
+                                <p:cTn id="23" presetID="1" presetClass="exit" presetSubtype="0" fill="hold" grpId="1" nodeType="withEffect">
                                   <p:stCondLst>
                                     <p:cond delay="167"/>
                                   </p:stCondLst>
                                   <p:childTnLst>
                                     <p:set>
                                       <p:cBhvr>
-                                        <p:cTn id="27" dur="1" fill="hold">
+                                        <p:cTn id="24" dur="1" fill="hold">
                                           <p:stCondLst>
                                             <p:cond delay="0"/>
                                           </p:stCondLst>
@@ -28449,14 +28414,14 @@
                                 </p:cTn>
                               </p:par>
                               <p:par>
-                                <p:cTn id="28" presetID="1" presetClass="entr" presetSubtype="0" fill="hold" grpId="0" nodeType="withEffect">
+                                <p:cTn id="25" presetID="1" presetClass="entr" presetSubtype="0" fill="hold" grpId="0" nodeType="withEffect">
                                   <p:stCondLst>
                                     <p:cond delay="208"/>
                                   </p:stCondLst>
                                   <p:childTnLst>
                                     <p:set>
                                       <p:cBhvr>
-                                        <p:cTn id="29" dur="1" fill="hold">
+                                        <p:cTn id="26" dur="1" fill="hold">
                                           <p:stCondLst>
                                             <p:cond delay="0"/>
                                           </p:stCondLst>
@@ -28476,14 +28441,14 @@
                                 </p:cTn>
                               </p:par>
                               <p:par>
-                                <p:cTn id="30" presetID="1" presetClass="exit" presetSubtype="0" fill="hold" grpId="1" nodeType="withEffect">
+                                <p:cTn id="27" presetID="1" presetClass="exit" presetSubtype="0" fill="hold" grpId="1" nodeType="withEffect">
                                   <p:stCondLst>
                                     <p:cond delay="208"/>
                                   </p:stCondLst>
                                   <p:childTnLst>
                                     <p:set>
                                       <p:cBhvr>
-                                        <p:cTn id="31" dur="1" fill="hold">
+                                        <p:cTn id="28" dur="1" fill="hold">
                                           <p:stCondLst>
                                             <p:cond delay="0"/>
                                           </p:stCondLst>
@@ -28503,14 +28468,14 @@
                                 </p:cTn>
                               </p:par>
                               <p:par>
-                                <p:cTn id="32" presetID="1" presetClass="entr" presetSubtype="0" fill="hold" grpId="0" nodeType="withEffect">
+                                <p:cTn id="29" presetID="1" presetClass="entr" presetSubtype="0" fill="hold" grpId="0" nodeType="withEffect">
                                   <p:stCondLst>
                                     <p:cond delay="250"/>
                                   </p:stCondLst>
                                   <p:childTnLst>
                                     <p:set>
                                       <p:cBhvr>
-                                        <p:cTn id="33" dur="1" fill="hold">
+                                        <p:cTn id="30" dur="1" fill="hold">
                                           <p:stCondLst>
                                             <p:cond delay="0"/>
                                           </p:stCondLst>
@@ -28530,14 +28495,14 @@
                                 </p:cTn>
                               </p:par>
                               <p:par>
-                                <p:cTn id="34" presetID="1" presetClass="exit" presetSubtype="0" fill="hold" grpId="1" nodeType="withEffect">
+                                <p:cTn id="31" presetID="1" presetClass="exit" presetSubtype="0" fill="hold" grpId="1" nodeType="withEffect">
                                   <p:stCondLst>
                                     <p:cond delay="250"/>
                                   </p:stCondLst>
                                   <p:childTnLst>
                                     <p:set>
                                       <p:cBhvr>
-                                        <p:cTn id="35" dur="1" fill="hold">
+                                        <p:cTn id="32" dur="1" fill="hold">
                                           <p:stCondLst>
                                             <p:cond delay="0"/>
                                           </p:stCondLst>
@@ -28557,14 +28522,14 @@
                                 </p:cTn>
                               </p:par>
                               <p:par>
-                                <p:cTn id="36" presetID="1" presetClass="entr" presetSubtype="0" fill="hold" grpId="0" nodeType="withEffect">
+                                <p:cTn id="33" presetID="1" presetClass="entr" presetSubtype="0" fill="hold" grpId="0" nodeType="withEffect">
                                   <p:stCondLst>
                                     <p:cond delay="292"/>
                                   </p:stCondLst>
                                   <p:childTnLst>
                                     <p:set>
                                       <p:cBhvr>
-                                        <p:cTn id="37" dur="1" fill="hold">
+                                        <p:cTn id="34" dur="1" fill="hold">
                                           <p:stCondLst>
                                             <p:cond delay="0"/>
                                           </p:stCondLst>
@@ -28584,14 +28549,14 @@
                                 </p:cTn>
                               </p:par>
                               <p:par>
-                                <p:cTn id="38" presetID="1" presetClass="exit" presetSubtype="0" fill="hold" grpId="1" nodeType="withEffect">
+                                <p:cTn id="35" presetID="1" presetClass="exit" presetSubtype="0" fill="hold" grpId="1" nodeType="withEffect">
                                   <p:stCondLst>
                                     <p:cond delay="292"/>
                                   </p:stCondLst>
                                   <p:childTnLst>
                                     <p:set>
                                       <p:cBhvr>
-                                        <p:cTn id="39" dur="1" fill="hold">
+                                        <p:cTn id="36" dur="1" fill="hold">
                                           <p:stCondLst>
                                             <p:cond delay="0"/>
                                           </p:stCondLst>
@@ -28611,14 +28576,14 @@
                                 </p:cTn>
                               </p:par>
                               <p:par>
-                                <p:cTn id="40" presetID="1" presetClass="entr" presetSubtype="0" fill="hold" grpId="0" nodeType="withEffect">
+                                <p:cTn id="37" presetID="1" presetClass="entr" presetSubtype="0" fill="hold" grpId="0" nodeType="withEffect">
                                   <p:stCondLst>
                                     <p:cond delay="333"/>
                                   </p:stCondLst>
                                   <p:childTnLst>
                                     <p:set>
                                       <p:cBhvr>
-                                        <p:cTn id="41" dur="1" fill="hold">
+                                        <p:cTn id="38" dur="1" fill="hold">
                                           <p:stCondLst>
                                             <p:cond delay="0"/>
                                           </p:stCondLst>
@@ -28638,14 +28603,14 @@
                                 </p:cTn>
                               </p:par>
                               <p:par>
-                                <p:cTn id="42" presetID="1" presetClass="exit" presetSubtype="0" fill="hold" grpId="1" nodeType="withEffect">
+                                <p:cTn id="39" presetID="1" presetClass="exit" presetSubtype="0" fill="hold" grpId="1" nodeType="withEffect">
                                   <p:stCondLst>
                                     <p:cond delay="333"/>
                                   </p:stCondLst>
                                   <p:childTnLst>
                                     <p:set>
                                       <p:cBhvr>
-                                        <p:cTn id="43" dur="1" fill="hold">
+                                        <p:cTn id="40" dur="1" fill="hold">
                                           <p:stCondLst>
                                             <p:cond delay="0"/>
                                           </p:stCondLst>
@@ -28665,14 +28630,14 @@
                                 </p:cTn>
                               </p:par>
                               <p:par>
-                                <p:cTn id="44" presetID="1" presetClass="entr" presetSubtype="0" fill="hold" grpId="0" nodeType="withEffect">
+                                <p:cTn id="41" presetID="1" presetClass="entr" presetSubtype="0" fill="hold" grpId="0" nodeType="withEffect">
                                   <p:stCondLst>
                                     <p:cond delay="375"/>
                                   </p:stCondLst>
                                   <p:childTnLst>
                                     <p:set>
                                       <p:cBhvr>
-                                        <p:cTn id="45" dur="1" fill="hold">
+                                        <p:cTn id="42" dur="1" fill="hold">
                                           <p:stCondLst>
                                             <p:cond delay="0"/>
                                           </p:stCondLst>
@@ -28692,14 +28657,14 @@
                                 </p:cTn>
                               </p:par>
                               <p:par>
-                                <p:cTn id="46" presetID="1" presetClass="exit" presetSubtype="0" fill="hold" grpId="1" nodeType="withEffect">
+                                <p:cTn id="43" presetID="1" presetClass="exit" presetSubtype="0" fill="hold" grpId="1" nodeType="withEffect">
                                   <p:stCondLst>
                                     <p:cond delay="375"/>
                                   </p:stCondLst>
                                   <p:childTnLst>
                                     <p:set>
                                       <p:cBhvr>
-                                        <p:cTn id="47" dur="1" fill="hold">
+                                        <p:cTn id="44" dur="1" fill="hold">
                                           <p:stCondLst>
                                             <p:cond delay="0"/>
                                           </p:stCondLst>
@@ -28719,14 +28684,14 @@
                                 </p:cTn>
                               </p:par>
                               <p:par>
-                                <p:cTn id="48" presetID="1" presetClass="entr" presetSubtype="0" fill="hold" grpId="0" nodeType="withEffect">
+                                <p:cTn id="45" presetID="1" presetClass="entr" presetSubtype="0" fill="hold" grpId="0" nodeType="withEffect">
                                   <p:stCondLst>
                                     <p:cond delay="417"/>
                                   </p:stCondLst>
                                   <p:childTnLst>
                                     <p:set>
                                       <p:cBhvr>
-                                        <p:cTn id="49" dur="1" fill="hold">
+                                        <p:cTn id="46" dur="1" fill="hold">
                                           <p:stCondLst>
                                             <p:cond delay="0"/>
                                           </p:stCondLst>
@@ -28746,14 +28711,14 @@
                                 </p:cTn>
                               </p:par>
                               <p:par>
-                                <p:cTn id="50" presetID="1" presetClass="exit" presetSubtype="0" fill="hold" grpId="1" nodeType="withEffect">
+                                <p:cTn id="47" presetID="1" presetClass="exit" presetSubtype="0" fill="hold" grpId="1" nodeType="withEffect">
                                   <p:stCondLst>
                                     <p:cond delay="417"/>
                                   </p:stCondLst>
                                   <p:childTnLst>
                                     <p:set>
                                       <p:cBhvr>
-                                        <p:cTn id="51" dur="1" fill="hold">
+                                        <p:cTn id="48" dur="1" fill="hold">
                                           <p:stCondLst>
                                             <p:cond delay="0"/>
                                           </p:stCondLst>
@@ -28773,14 +28738,14 @@
                                 </p:cTn>
                               </p:par>
                               <p:par>
-                                <p:cTn id="52" presetID="1" presetClass="entr" presetSubtype="0" fill="hold" grpId="0" nodeType="withEffect">
+                                <p:cTn id="49" presetID="1" presetClass="entr" presetSubtype="0" fill="hold" grpId="0" nodeType="withEffect">
                                   <p:stCondLst>
                                     <p:cond delay="458"/>
                                   </p:stCondLst>
                                   <p:childTnLst>
                                     <p:set>
                                       <p:cBhvr>
-                                        <p:cTn id="53" dur="1" fill="hold">
+                                        <p:cTn id="50" dur="1" fill="hold">
                                           <p:stCondLst>
                                             <p:cond delay="0"/>
                                           </p:stCondLst>
@@ -28800,14 +28765,14 @@
                                 </p:cTn>
                               </p:par>
                               <p:par>
-                                <p:cTn id="54" presetID="1" presetClass="exit" presetSubtype="0" fill="hold" grpId="1" nodeType="withEffect">
+                                <p:cTn id="51" presetID="1" presetClass="exit" presetSubtype="0" fill="hold" grpId="1" nodeType="withEffect">
                                   <p:stCondLst>
                                     <p:cond delay="458"/>
                                   </p:stCondLst>
                                   <p:childTnLst>
                                     <p:set>
                                       <p:cBhvr>
-                                        <p:cTn id="55" dur="1" fill="hold">
+                                        <p:cTn id="52" dur="1" fill="hold">
                                           <p:stCondLst>
                                             <p:cond delay="0"/>
                                           </p:stCondLst>
@@ -28827,14 +28792,14 @@
                                 </p:cTn>
                               </p:par>
                               <p:par>
-                                <p:cTn id="56" presetID="1" presetClass="entr" presetSubtype="0" fill="hold" grpId="0" nodeType="withEffect">
+                                <p:cTn id="53" presetID="1" presetClass="entr" presetSubtype="0" fill="hold" grpId="0" nodeType="withEffect">
                                   <p:stCondLst>
                                     <p:cond delay="500"/>
                                   </p:stCondLst>
                                   <p:childTnLst>
                                     <p:set>
                                       <p:cBhvr>
-                                        <p:cTn id="57" dur="1" fill="hold">
+                                        <p:cTn id="54" dur="1" fill="hold">
                                           <p:stCondLst>
                                             <p:cond delay="0"/>
                                           </p:stCondLst>
@@ -28854,14 +28819,14 @@
                                 </p:cTn>
                               </p:par>
                               <p:par>
-                                <p:cTn id="58" presetID="1" presetClass="exit" presetSubtype="0" fill="hold" grpId="1" nodeType="withEffect">
+                                <p:cTn id="55" presetID="1" presetClass="exit" presetSubtype="0" fill="hold" grpId="1" nodeType="withEffect">
                                   <p:stCondLst>
                                     <p:cond delay="500"/>
                                   </p:stCondLst>
                                   <p:childTnLst>
                                     <p:set>
                                       <p:cBhvr>
-                                        <p:cTn id="59" dur="1" fill="hold">
+                                        <p:cTn id="56" dur="1" fill="hold">
                                           <p:stCondLst>
                                             <p:cond delay="0"/>
                                           </p:stCondLst>
@@ -28881,14 +28846,14 @@
                                 </p:cTn>
                               </p:par>
                               <p:par>
-                                <p:cTn id="60" presetID="1" presetClass="entr" presetSubtype="0" fill="hold" grpId="0" nodeType="withEffect">
+                                <p:cTn id="57" presetID="1" presetClass="entr" presetSubtype="0" fill="hold" grpId="0" nodeType="withEffect">
                                   <p:stCondLst>
                                     <p:cond delay="42"/>
                                   </p:stCondLst>
                                   <p:childTnLst>
                                     <p:set>
                                       <p:cBhvr>
-                                        <p:cTn id="61" dur="1" fill="hold">
+                                        <p:cTn id="58" dur="1" fill="hold">
                                           <p:stCondLst>
                                             <p:cond delay="0"/>
                                           </p:stCondLst>
@@ -28908,14 +28873,14 @@
                                 </p:cTn>
                               </p:par>
                               <p:par>
-                                <p:cTn id="62" presetID="1" presetClass="exit" presetSubtype="0" fill="hold" grpId="0" nodeType="withEffect">
+                                <p:cTn id="59" presetID="1" presetClass="exit" presetSubtype="0" fill="hold" grpId="0" nodeType="withEffect">
                                   <p:stCondLst>
                                     <p:cond delay="42"/>
                                   </p:stCondLst>
                                   <p:childTnLst>
                                     <p:set>
                                       <p:cBhvr>
-                                        <p:cTn id="63" dur="1" fill="hold">
+                                        <p:cTn id="60" dur="1" fill="hold">
                                           <p:stCondLst>
                                             <p:cond delay="0"/>
                                           </p:stCondLst>
@@ -28935,14 +28900,14 @@
                                 </p:cTn>
                               </p:par>
                               <p:par>
-                                <p:cTn id="64" presetID="1" presetClass="entr" presetSubtype="0" fill="hold" grpId="0" nodeType="withEffect">
+                                <p:cTn id="61" presetID="1" presetClass="entr" presetSubtype="0" fill="hold" grpId="0" nodeType="withEffect">
                                   <p:stCondLst>
                                     <p:cond delay="83"/>
                                   </p:stCondLst>
                                   <p:childTnLst>
                                     <p:set>
                                       <p:cBhvr>
-                                        <p:cTn id="65" dur="1" fill="hold">
+                                        <p:cTn id="62" dur="1" fill="hold">
                                           <p:stCondLst>
                                             <p:cond delay="0"/>
                                           </p:stCondLst>
@@ -28962,14 +28927,14 @@
                                 </p:cTn>
                               </p:par>
                               <p:par>
-                                <p:cTn id="66" presetID="1" presetClass="exit" presetSubtype="0" fill="hold" grpId="1" nodeType="withEffect">
+                                <p:cTn id="63" presetID="1" presetClass="exit" presetSubtype="0" fill="hold" grpId="1" nodeType="withEffect">
                                   <p:stCondLst>
                                     <p:cond delay="83"/>
                                   </p:stCondLst>
                                   <p:childTnLst>
                                     <p:set>
                                       <p:cBhvr>
-                                        <p:cTn id="67" dur="1" fill="hold">
+                                        <p:cTn id="64" dur="1" fill="hold">
                                           <p:stCondLst>
                                             <p:cond delay="0"/>
                                           </p:stCondLst>
@@ -28989,14 +28954,14 @@
                                 </p:cTn>
                               </p:par>
                               <p:par>
-                                <p:cTn id="68" presetID="1" presetClass="entr" presetSubtype="0" fill="hold" grpId="0" nodeType="withEffect">
+                                <p:cTn id="65" presetID="1" presetClass="entr" presetSubtype="0" fill="hold" grpId="0" nodeType="withEffect">
                                   <p:stCondLst>
                                     <p:cond delay="125"/>
                                   </p:stCondLst>
                                   <p:childTnLst>
                                     <p:set>
                                       <p:cBhvr>
-                                        <p:cTn id="69" dur="1" fill="hold">
+                                        <p:cTn id="66" dur="1" fill="hold">
                                           <p:stCondLst>
                                             <p:cond delay="0"/>
                                           </p:stCondLst>
@@ -29016,14 +28981,14 @@
                                 </p:cTn>
                               </p:par>
                               <p:par>
-                                <p:cTn id="70" presetID="1" presetClass="exit" presetSubtype="0" fill="hold" grpId="1" nodeType="withEffect">
+                                <p:cTn id="67" presetID="1" presetClass="exit" presetSubtype="0" fill="hold" grpId="1" nodeType="withEffect">
                                   <p:stCondLst>
                                     <p:cond delay="125"/>
                                   </p:stCondLst>
                                   <p:childTnLst>
                                     <p:set>
                                       <p:cBhvr>
-                                        <p:cTn id="71" dur="1" fill="hold">
+                                        <p:cTn id="68" dur="1" fill="hold">
                                           <p:stCondLst>
                                             <p:cond delay="0"/>
                                           </p:stCondLst>
@@ -29043,14 +29008,14 @@
                                 </p:cTn>
                               </p:par>
                               <p:par>
-                                <p:cTn id="72" presetID="1" presetClass="entr" presetSubtype="0" fill="hold" grpId="0" nodeType="withEffect">
+                                <p:cTn id="69" presetID="1" presetClass="entr" presetSubtype="0" fill="hold" grpId="0" nodeType="withEffect">
                                   <p:stCondLst>
                                     <p:cond delay="167"/>
                                   </p:stCondLst>
                                   <p:childTnLst>
                                     <p:set>
                                       <p:cBhvr>
-                                        <p:cTn id="73" dur="1" fill="hold">
+                                        <p:cTn id="70" dur="1" fill="hold">
                                           <p:stCondLst>
                                             <p:cond delay="0"/>
                                           </p:stCondLst>
@@ -29070,14 +29035,14 @@
                                 </p:cTn>
                               </p:par>
                               <p:par>
-                                <p:cTn id="74" presetID="1" presetClass="exit" presetSubtype="0" fill="hold" grpId="1" nodeType="withEffect">
+                                <p:cTn id="71" presetID="1" presetClass="exit" presetSubtype="0" fill="hold" grpId="1" nodeType="withEffect">
                                   <p:stCondLst>
                                     <p:cond delay="167"/>
                                   </p:stCondLst>
                                   <p:childTnLst>
                                     <p:set>
                                       <p:cBhvr>
-                                        <p:cTn id="75" dur="1" fill="hold">
+                                        <p:cTn id="72" dur="1" fill="hold">
                                           <p:stCondLst>
                                             <p:cond delay="0"/>
                                           </p:stCondLst>
@@ -29097,14 +29062,14 @@
                                 </p:cTn>
                               </p:par>
                               <p:par>
-                                <p:cTn id="76" presetID="1" presetClass="entr" presetSubtype="0" fill="hold" grpId="0" nodeType="withEffect">
+                                <p:cTn id="73" presetID="1" presetClass="entr" presetSubtype="0" fill="hold" grpId="0" nodeType="withEffect">
                                   <p:stCondLst>
                                     <p:cond delay="208"/>
                                   </p:stCondLst>
                                   <p:childTnLst>
                                     <p:set>
                                       <p:cBhvr>
-                                        <p:cTn id="77" dur="1" fill="hold">
+                                        <p:cTn id="74" dur="1" fill="hold">
                                           <p:stCondLst>
                                             <p:cond delay="0"/>
                                           </p:stCondLst>
@@ -29124,14 +29089,14 @@
                                 </p:cTn>
                               </p:par>
                               <p:par>
-                                <p:cTn id="78" presetID="1" presetClass="exit" presetSubtype="0" fill="hold" grpId="1" nodeType="withEffect">
+                                <p:cTn id="75" presetID="1" presetClass="exit" presetSubtype="0" fill="hold" grpId="1" nodeType="withEffect">
                                   <p:stCondLst>
                                     <p:cond delay="208"/>
                                   </p:stCondLst>
                                   <p:childTnLst>
                                     <p:set>
                                       <p:cBhvr>
-                                        <p:cTn id="79" dur="1" fill="hold">
+                                        <p:cTn id="76" dur="1" fill="hold">
                                           <p:stCondLst>
                                             <p:cond delay="0"/>
                                           </p:stCondLst>
@@ -29151,14 +29116,14 @@
                                 </p:cTn>
                               </p:par>
                               <p:par>
-                                <p:cTn id="80" presetID="1" presetClass="entr" presetSubtype="0" fill="hold" grpId="0" nodeType="withEffect">
+                                <p:cTn id="77" presetID="1" presetClass="entr" presetSubtype="0" fill="hold" grpId="0" nodeType="withEffect">
                                   <p:stCondLst>
                                     <p:cond delay="250"/>
                                   </p:stCondLst>
                                   <p:childTnLst>
                                     <p:set>
                                       <p:cBhvr>
-                                        <p:cTn id="81" dur="1" fill="hold">
+                                        <p:cTn id="78" dur="1" fill="hold">
                                           <p:stCondLst>
                                             <p:cond delay="0"/>
                                           </p:stCondLst>
@@ -29178,14 +29143,14 @@
                                 </p:cTn>
                               </p:par>
                               <p:par>
-                                <p:cTn id="82" presetID="1" presetClass="exit" presetSubtype="0" fill="hold" grpId="1" nodeType="withEffect">
+                                <p:cTn id="79" presetID="1" presetClass="exit" presetSubtype="0" fill="hold" grpId="1" nodeType="withEffect">
                                   <p:stCondLst>
                                     <p:cond delay="250"/>
                                   </p:stCondLst>
                                   <p:childTnLst>
                                     <p:set>
                                       <p:cBhvr>
-                                        <p:cTn id="83" dur="1" fill="hold">
+                                        <p:cTn id="80" dur="1" fill="hold">
                                           <p:stCondLst>
                                             <p:cond delay="0"/>
                                           </p:stCondLst>
@@ -29205,14 +29170,14 @@
                                 </p:cTn>
                               </p:par>
                               <p:par>
-                                <p:cTn id="84" presetID="1" presetClass="entr" presetSubtype="0" fill="hold" grpId="0" nodeType="withEffect">
+                                <p:cTn id="81" presetID="1" presetClass="entr" presetSubtype="0" fill="hold" grpId="0" nodeType="withEffect">
                                   <p:stCondLst>
                                     <p:cond delay="292"/>
                                   </p:stCondLst>
                                   <p:childTnLst>
                                     <p:set>
                                       <p:cBhvr>
-                                        <p:cTn id="85" dur="1" fill="hold">
+                                        <p:cTn id="82" dur="1" fill="hold">
                                           <p:stCondLst>
                                             <p:cond delay="0"/>
                                           </p:stCondLst>
@@ -29232,14 +29197,14 @@
                                 </p:cTn>
                               </p:par>
                               <p:par>
-                                <p:cTn id="86" presetID="1" presetClass="exit" presetSubtype="0" fill="hold" grpId="1" nodeType="withEffect">
+                                <p:cTn id="83" presetID="1" presetClass="exit" presetSubtype="0" fill="hold" grpId="1" nodeType="withEffect">
                                   <p:stCondLst>
                                     <p:cond delay="292"/>
                                   </p:stCondLst>
                                   <p:childTnLst>
                                     <p:set>
                                       <p:cBhvr>
-                                        <p:cTn id="87" dur="1" fill="hold">
+                                        <p:cTn id="84" dur="1" fill="hold">
                                           <p:stCondLst>
                                             <p:cond delay="0"/>
                                           </p:stCondLst>
@@ -29259,14 +29224,14 @@
                                 </p:cTn>
                               </p:par>
                               <p:par>
-                                <p:cTn id="88" presetID="1" presetClass="entr" presetSubtype="0" fill="hold" grpId="0" nodeType="withEffect">
+                                <p:cTn id="85" presetID="1" presetClass="entr" presetSubtype="0" fill="hold" grpId="0" nodeType="withEffect">
                                   <p:stCondLst>
                                     <p:cond delay="333"/>
                                   </p:stCondLst>
                                   <p:childTnLst>
                                     <p:set>
                                       <p:cBhvr>
-                                        <p:cTn id="89" dur="1" fill="hold">
+                                        <p:cTn id="86" dur="1" fill="hold">
                                           <p:stCondLst>
                                             <p:cond delay="0"/>
                                           </p:stCondLst>
@@ -29286,14 +29251,14 @@
                                 </p:cTn>
                               </p:par>
                               <p:par>
-                                <p:cTn id="90" presetID="1" presetClass="exit" presetSubtype="0" fill="hold" grpId="1" nodeType="withEffect">
+                                <p:cTn id="87" presetID="1" presetClass="exit" presetSubtype="0" fill="hold" grpId="1" nodeType="withEffect">
                                   <p:stCondLst>
                                     <p:cond delay="333"/>
                                   </p:stCondLst>
                                   <p:childTnLst>
                                     <p:set>
                                       <p:cBhvr>
-                                        <p:cTn id="91" dur="1" fill="hold">
+                                        <p:cTn id="88" dur="1" fill="hold">
                                           <p:stCondLst>
                                             <p:cond delay="0"/>
                                           </p:stCondLst>
@@ -29313,14 +29278,14 @@
                                 </p:cTn>
                               </p:par>
                               <p:par>
-                                <p:cTn id="92" presetID="1" presetClass="entr" presetSubtype="0" fill="hold" grpId="0" nodeType="withEffect">
+                                <p:cTn id="89" presetID="1" presetClass="entr" presetSubtype="0" fill="hold" grpId="0" nodeType="withEffect">
                                   <p:stCondLst>
                                     <p:cond delay="375"/>
                                   </p:stCondLst>
                                   <p:childTnLst>
                                     <p:set>
                                       <p:cBhvr>
-                                        <p:cTn id="93" dur="1" fill="hold">
+                                        <p:cTn id="90" dur="1" fill="hold">
                                           <p:stCondLst>
                                             <p:cond delay="0"/>
                                           </p:stCondLst>
@@ -29340,14 +29305,14 @@
                                 </p:cTn>
                               </p:par>
                               <p:par>
-                                <p:cTn id="94" presetID="1" presetClass="exit" presetSubtype="0" fill="hold" grpId="1" nodeType="withEffect">
+                                <p:cTn id="91" presetID="1" presetClass="exit" presetSubtype="0" fill="hold" grpId="1" nodeType="withEffect">
                                   <p:stCondLst>
                                     <p:cond delay="375"/>
                                   </p:stCondLst>
                                   <p:childTnLst>
                                     <p:set>
                                       <p:cBhvr>
-                                        <p:cTn id="95" dur="1" fill="hold">
+                                        <p:cTn id="92" dur="1" fill="hold">
                                           <p:stCondLst>
                                             <p:cond delay="0"/>
                                           </p:stCondLst>
@@ -29367,14 +29332,14 @@
                                 </p:cTn>
                               </p:par>
                               <p:par>
-                                <p:cTn id="96" presetID="1" presetClass="entr" presetSubtype="0" fill="hold" grpId="0" nodeType="withEffect">
+                                <p:cTn id="93" presetID="1" presetClass="entr" presetSubtype="0" fill="hold" grpId="0" nodeType="withEffect">
                                   <p:stCondLst>
                                     <p:cond delay="417"/>
                                   </p:stCondLst>
                                   <p:childTnLst>
                                     <p:set>
                                       <p:cBhvr>
-                                        <p:cTn id="97" dur="1" fill="hold">
+                                        <p:cTn id="94" dur="1" fill="hold">
                                           <p:stCondLst>
                                             <p:cond delay="0"/>
                                           </p:stCondLst>
@@ -29394,14 +29359,14 @@
                                 </p:cTn>
                               </p:par>
                               <p:par>
-                                <p:cTn id="98" presetID="1" presetClass="exit" presetSubtype="0" fill="hold" grpId="1" nodeType="withEffect">
+                                <p:cTn id="95" presetID="1" presetClass="exit" presetSubtype="0" fill="hold" grpId="1" nodeType="withEffect">
                                   <p:stCondLst>
                                     <p:cond delay="417"/>
                                   </p:stCondLst>
                                   <p:childTnLst>
                                     <p:set>
                                       <p:cBhvr>
-                                        <p:cTn id="99" dur="1" fill="hold">
+                                        <p:cTn id="96" dur="1" fill="hold">
                                           <p:stCondLst>
                                             <p:cond delay="0"/>
                                           </p:stCondLst>
@@ -29421,14 +29386,14 @@
                                 </p:cTn>
                               </p:par>
                               <p:par>
-                                <p:cTn id="100" presetID="1" presetClass="entr" presetSubtype="0" fill="hold" grpId="0" nodeType="withEffect">
+                                <p:cTn id="97" presetID="1" presetClass="entr" presetSubtype="0" fill="hold" grpId="0" nodeType="withEffect">
                                   <p:stCondLst>
                                     <p:cond delay="458"/>
                                   </p:stCondLst>
                                   <p:childTnLst>
                                     <p:set>
                                       <p:cBhvr>
-                                        <p:cTn id="101" dur="1" fill="hold">
+                                        <p:cTn id="98" dur="1" fill="hold">
                                           <p:stCondLst>
                                             <p:cond delay="0"/>
                                           </p:stCondLst>
@@ -29448,14 +29413,14 @@
                                 </p:cTn>
                               </p:par>
                               <p:par>
-                                <p:cTn id="102" presetID="1" presetClass="exit" presetSubtype="0" fill="hold" grpId="1" nodeType="withEffect">
+                                <p:cTn id="99" presetID="1" presetClass="exit" presetSubtype="0" fill="hold" grpId="1" nodeType="withEffect">
                                   <p:stCondLst>
                                     <p:cond delay="458"/>
                                   </p:stCondLst>
                                   <p:childTnLst>
                                     <p:set>
                                       <p:cBhvr>
-                                        <p:cTn id="103" dur="1" fill="hold">
+                                        <p:cTn id="100" dur="1" fill="hold">
                                           <p:stCondLst>
                                             <p:cond delay="0"/>
                                           </p:stCondLst>
@@ -29475,14 +29440,14 @@
                                 </p:cTn>
                               </p:par>
                               <p:par>
-                                <p:cTn id="104" presetID="1" presetClass="entr" presetSubtype="0" fill="hold" grpId="0" nodeType="withEffect">
+                                <p:cTn id="101" presetID="1" presetClass="entr" presetSubtype="0" fill="hold" grpId="0" nodeType="withEffect">
                                   <p:stCondLst>
                                     <p:cond delay="500"/>
                                   </p:stCondLst>
                                   <p:childTnLst>
                                     <p:set>
                                       <p:cBhvr>
-                                        <p:cTn id="105" dur="1" fill="hold">
+                                        <p:cTn id="102" dur="1" fill="hold">
                                           <p:stCondLst>
                                             <p:cond delay="0"/>
                                           </p:stCondLst>
@@ -29502,14 +29467,14 @@
                                 </p:cTn>
                               </p:par>
                               <p:par>
-                                <p:cTn id="106" presetID="1" presetClass="exit" presetSubtype="0" fill="hold" grpId="1" nodeType="withEffect">
+                                <p:cTn id="103" presetID="1" presetClass="exit" presetSubtype="0" fill="hold" grpId="1" nodeType="withEffect">
                                   <p:stCondLst>
                                     <p:cond delay="500"/>
                                   </p:stCondLst>
                                   <p:childTnLst>
                                     <p:set>
                                       <p:cBhvr>
-                                        <p:cTn id="107" dur="1" fill="hold">
+                                        <p:cTn id="104" dur="1" fill="hold">
                                           <p:stCondLst>
                                             <p:cond delay="0"/>
                                           </p:stCondLst>
@@ -29529,14 +29494,14 @@
                                 </p:cTn>
                               </p:par>
                               <p:par>
-                                <p:cTn id="108" presetID="1" presetClass="entr" presetSubtype="0" fill="hold" grpId="0" nodeType="withEffect">
+                                <p:cTn id="105" presetID="1" presetClass="entr" presetSubtype="0" fill="hold" grpId="0" nodeType="withEffect">
                                   <p:stCondLst>
                                     <p:cond delay="42"/>
                                   </p:stCondLst>
                                   <p:childTnLst>
                                     <p:set>
                                       <p:cBhvr>
-                                        <p:cTn id="109" dur="1" fill="hold">
+                                        <p:cTn id="106" dur="1" fill="hold">
                                           <p:stCondLst>
                                             <p:cond delay="0"/>
                                           </p:stCondLst>
@@ -29556,14 +29521,14 @@
                                 </p:cTn>
                               </p:par>
                               <p:par>
-                                <p:cTn id="110" presetID="1" presetClass="exit" presetSubtype="0" fill="hold" grpId="0" nodeType="withEffect">
+                                <p:cTn id="107" presetID="1" presetClass="exit" presetSubtype="0" fill="hold" grpId="0" nodeType="withEffect">
                                   <p:stCondLst>
                                     <p:cond delay="42"/>
                                   </p:stCondLst>
                                   <p:childTnLst>
                                     <p:set>
                                       <p:cBhvr>
-                                        <p:cTn id="111" dur="1" fill="hold">
+                                        <p:cTn id="108" dur="1" fill="hold">
                                           <p:stCondLst>
                                             <p:cond delay="0"/>
                                           </p:stCondLst>
@@ -29583,14 +29548,14 @@
                                 </p:cTn>
                               </p:par>
                               <p:par>
-                                <p:cTn id="112" presetID="1" presetClass="entr" presetSubtype="0" fill="hold" grpId="0" nodeType="withEffect">
+                                <p:cTn id="109" presetID="1" presetClass="entr" presetSubtype="0" fill="hold" grpId="0" nodeType="withEffect">
                                   <p:stCondLst>
                                     <p:cond delay="83"/>
                                   </p:stCondLst>
                                   <p:childTnLst>
                                     <p:set>
                                       <p:cBhvr>
-                                        <p:cTn id="113" dur="1" fill="hold">
+                                        <p:cTn id="110" dur="1" fill="hold">
                                           <p:stCondLst>
                                             <p:cond delay="0"/>
                                           </p:stCondLst>
@@ -29610,14 +29575,14 @@
                                 </p:cTn>
                               </p:par>
                               <p:par>
-                                <p:cTn id="114" presetID="1" presetClass="exit" presetSubtype="0" fill="hold" grpId="1" nodeType="withEffect">
+                                <p:cTn id="111" presetID="1" presetClass="exit" presetSubtype="0" fill="hold" grpId="1" nodeType="withEffect">
                                   <p:stCondLst>
                                     <p:cond delay="83"/>
                                   </p:stCondLst>
                                   <p:childTnLst>
                                     <p:set>
                                       <p:cBhvr>
-                                        <p:cTn id="115" dur="1" fill="hold">
+                                        <p:cTn id="112" dur="1" fill="hold">
                                           <p:stCondLst>
                                             <p:cond delay="0"/>
                                           </p:stCondLst>
@@ -29637,14 +29602,14 @@
                                 </p:cTn>
                               </p:par>
                               <p:par>
-                                <p:cTn id="116" presetID="1" presetClass="entr" presetSubtype="0" fill="hold" grpId="0" nodeType="withEffect">
+                                <p:cTn id="113" presetID="1" presetClass="entr" presetSubtype="0" fill="hold" grpId="0" nodeType="withEffect">
                                   <p:stCondLst>
                                     <p:cond delay="125"/>
                                   </p:stCondLst>
                                   <p:childTnLst>
                                     <p:set>
                                       <p:cBhvr>
-                                        <p:cTn id="117" dur="1" fill="hold">
+                                        <p:cTn id="114" dur="1" fill="hold">
                                           <p:stCondLst>
                                             <p:cond delay="0"/>
                                           </p:stCondLst>
@@ -29664,14 +29629,14 @@
                                 </p:cTn>
                               </p:par>
                               <p:par>
-                                <p:cTn id="118" presetID="1" presetClass="exit" presetSubtype="0" fill="hold" grpId="1" nodeType="withEffect">
+                                <p:cTn id="115" presetID="1" presetClass="exit" presetSubtype="0" fill="hold" grpId="1" nodeType="withEffect">
                                   <p:stCondLst>
                                     <p:cond delay="125"/>
                                   </p:stCondLst>
                                   <p:childTnLst>
                                     <p:set>
                                       <p:cBhvr>
-                                        <p:cTn id="119" dur="1" fill="hold">
+                                        <p:cTn id="116" dur="1" fill="hold">
                                           <p:stCondLst>
                                             <p:cond delay="0"/>
                                           </p:stCondLst>
@@ -29691,14 +29656,14 @@
                                 </p:cTn>
                               </p:par>
                               <p:par>
-                                <p:cTn id="120" presetID="1" presetClass="entr" presetSubtype="0" fill="hold" grpId="0" nodeType="withEffect">
+                                <p:cTn id="117" presetID="1" presetClass="entr" presetSubtype="0" fill="hold" grpId="0" nodeType="withEffect">
                                   <p:stCondLst>
                                     <p:cond delay="167"/>
                                   </p:stCondLst>
                                   <p:childTnLst>
                                     <p:set>
                                       <p:cBhvr>
-                                        <p:cTn id="121" dur="1" fill="hold">
+                                        <p:cTn id="118" dur="1" fill="hold">
                                           <p:stCondLst>
                                             <p:cond delay="0"/>
                                           </p:stCondLst>
@@ -29718,14 +29683,14 @@
                                 </p:cTn>
                               </p:par>
                               <p:par>
-                                <p:cTn id="122" presetID="1" presetClass="exit" presetSubtype="0" fill="hold" grpId="1" nodeType="withEffect">
+                                <p:cTn id="119" presetID="1" presetClass="exit" presetSubtype="0" fill="hold" grpId="1" nodeType="withEffect">
                                   <p:stCondLst>
                                     <p:cond delay="167"/>
                                   </p:stCondLst>
                                   <p:childTnLst>
                                     <p:set>
                                       <p:cBhvr>
-                                        <p:cTn id="123" dur="1" fill="hold">
+                                        <p:cTn id="120" dur="1" fill="hold">
                                           <p:stCondLst>
                                             <p:cond delay="0"/>
                                           </p:stCondLst>
@@ -29745,14 +29710,14 @@
                                 </p:cTn>
                               </p:par>
                               <p:par>
-                                <p:cTn id="124" presetID="1" presetClass="entr" presetSubtype="0" fill="hold" grpId="0" nodeType="withEffect">
+                                <p:cTn id="121" presetID="1" presetClass="entr" presetSubtype="0" fill="hold" grpId="0" nodeType="withEffect">
                                   <p:stCondLst>
                                     <p:cond delay="208"/>
                                   </p:stCondLst>
                                   <p:childTnLst>
                                     <p:set>
                                       <p:cBhvr>
-                                        <p:cTn id="125" dur="1" fill="hold">
+                                        <p:cTn id="122" dur="1" fill="hold">
                                           <p:stCondLst>
                                             <p:cond delay="0"/>
                                           </p:stCondLst>
@@ -29772,14 +29737,14 @@
                                 </p:cTn>
                               </p:par>
                               <p:par>
-                                <p:cTn id="126" presetID="1" presetClass="exit" presetSubtype="0" fill="hold" grpId="1" nodeType="withEffect">
+                                <p:cTn id="123" presetID="1" presetClass="exit" presetSubtype="0" fill="hold" grpId="1" nodeType="withEffect">
                                   <p:stCondLst>
                                     <p:cond delay="208"/>
                                   </p:stCondLst>
                                   <p:childTnLst>
                                     <p:set>
                                       <p:cBhvr>
-                                        <p:cTn id="127" dur="1" fill="hold">
+                                        <p:cTn id="124" dur="1" fill="hold">
                                           <p:stCondLst>
                                             <p:cond delay="0"/>
                                           </p:stCondLst>
@@ -29799,14 +29764,14 @@
                                 </p:cTn>
                               </p:par>
                               <p:par>
-                                <p:cTn id="128" presetID="1" presetClass="entr" presetSubtype="0" fill="hold" grpId="0" nodeType="withEffect">
+                                <p:cTn id="125" presetID="1" presetClass="entr" presetSubtype="0" fill="hold" grpId="0" nodeType="withEffect">
                                   <p:stCondLst>
                                     <p:cond delay="250"/>
                                   </p:stCondLst>
                                   <p:childTnLst>
                                     <p:set>
                                       <p:cBhvr>
-                                        <p:cTn id="129" dur="1" fill="hold">
+                                        <p:cTn id="126" dur="1" fill="hold">
                                           <p:stCondLst>
                                             <p:cond delay="0"/>
                                           </p:stCondLst>
@@ -29826,14 +29791,14 @@
                                 </p:cTn>
                               </p:par>
                               <p:par>
-                                <p:cTn id="130" presetID="1" presetClass="exit" presetSubtype="0" fill="hold" grpId="1" nodeType="withEffect">
+                                <p:cTn id="127" presetID="1" presetClass="exit" presetSubtype="0" fill="hold" grpId="1" nodeType="withEffect">
                                   <p:stCondLst>
                                     <p:cond delay="250"/>
                                   </p:stCondLst>
                                   <p:childTnLst>
                                     <p:set>
                                       <p:cBhvr>
-                                        <p:cTn id="131" dur="1" fill="hold">
+                                        <p:cTn id="128" dur="1" fill="hold">
                                           <p:stCondLst>
                                             <p:cond delay="0"/>
                                           </p:stCondLst>
@@ -29853,14 +29818,14 @@
                                 </p:cTn>
                               </p:par>
                               <p:par>
-                                <p:cTn id="132" presetID="1" presetClass="entr" presetSubtype="0" fill="hold" grpId="0" nodeType="withEffect">
+                                <p:cTn id="129" presetID="1" presetClass="entr" presetSubtype="0" fill="hold" grpId="0" nodeType="withEffect">
                                   <p:stCondLst>
                                     <p:cond delay="292"/>
                                   </p:stCondLst>
                                   <p:childTnLst>
                                     <p:set>
                                       <p:cBhvr>
-                                        <p:cTn id="133" dur="1" fill="hold">
+                                        <p:cTn id="130" dur="1" fill="hold">
                                           <p:stCondLst>
                                             <p:cond delay="0"/>
                                           </p:stCondLst>
@@ -29880,14 +29845,14 @@
                                 </p:cTn>
                               </p:par>
                               <p:par>
-                                <p:cTn id="134" presetID="1" presetClass="exit" presetSubtype="0" fill="hold" grpId="1" nodeType="withEffect">
+                                <p:cTn id="131" presetID="1" presetClass="exit" presetSubtype="0" fill="hold" grpId="1" nodeType="withEffect">
                                   <p:stCondLst>
                                     <p:cond delay="292"/>
                                   </p:stCondLst>
                                   <p:childTnLst>
                                     <p:set>
                                       <p:cBhvr>
-                                        <p:cTn id="135" dur="1" fill="hold">
+                                        <p:cTn id="132" dur="1" fill="hold">
                                           <p:stCondLst>
                                             <p:cond delay="0"/>
                                           </p:stCondLst>
@@ -29907,14 +29872,14 @@
                                 </p:cTn>
                               </p:par>
                               <p:par>
-                                <p:cTn id="136" presetID="1" presetClass="entr" presetSubtype="0" fill="hold" grpId="0" nodeType="withEffect">
+                                <p:cTn id="133" presetID="1" presetClass="entr" presetSubtype="0" fill="hold" grpId="0" nodeType="withEffect">
                                   <p:stCondLst>
                                     <p:cond delay="333"/>
                                   </p:stCondLst>
                                   <p:childTnLst>
                                     <p:set>
                                       <p:cBhvr>
-                                        <p:cTn id="137" dur="1" fill="hold">
+                                        <p:cTn id="134" dur="1" fill="hold">
                                           <p:stCondLst>
                                             <p:cond delay="0"/>
                                           </p:stCondLst>
@@ -29934,14 +29899,14 @@
                                 </p:cTn>
                               </p:par>
                               <p:par>
-                                <p:cTn id="138" presetID="1" presetClass="exit" presetSubtype="0" fill="hold" grpId="1" nodeType="withEffect">
+                                <p:cTn id="135" presetID="1" presetClass="exit" presetSubtype="0" fill="hold" grpId="1" nodeType="withEffect">
                                   <p:stCondLst>
                                     <p:cond delay="333"/>
                                   </p:stCondLst>
                                   <p:childTnLst>
                                     <p:set>
                                       <p:cBhvr>
-                                        <p:cTn id="139" dur="1" fill="hold">
+                                        <p:cTn id="136" dur="1" fill="hold">
                                           <p:stCondLst>
                                             <p:cond delay="0"/>
                                           </p:stCondLst>
@@ -29961,14 +29926,14 @@
                                 </p:cTn>
                               </p:par>
                               <p:par>
-                                <p:cTn id="140" presetID="1" presetClass="entr" presetSubtype="0" fill="hold" grpId="0" nodeType="withEffect">
+                                <p:cTn id="137" presetID="1" presetClass="entr" presetSubtype="0" fill="hold" grpId="0" nodeType="withEffect">
                                   <p:stCondLst>
                                     <p:cond delay="375"/>
                                   </p:stCondLst>
                                   <p:childTnLst>
                                     <p:set>
                                       <p:cBhvr>
-                                        <p:cTn id="141" dur="1" fill="hold">
+                                        <p:cTn id="138" dur="1" fill="hold">
                                           <p:stCondLst>
                                             <p:cond delay="0"/>
                                           </p:stCondLst>
@@ -29988,14 +29953,14 @@
                                 </p:cTn>
                               </p:par>
                               <p:par>
-                                <p:cTn id="142" presetID="1" presetClass="exit" presetSubtype="0" fill="hold" grpId="1" nodeType="withEffect">
+                                <p:cTn id="139" presetID="1" presetClass="exit" presetSubtype="0" fill="hold" grpId="1" nodeType="withEffect">
                                   <p:stCondLst>
                                     <p:cond delay="375"/>
                                   </p:stCondLst>
                                   <p:childTnLst>
                                     <p:set>
                                       <p:cBhvr>
-                                        <p:cTn id="143" dur="1" fill="hold">
+                                        <p:cTn id="140" dur="1" fill="hold">
                                           <p:stCondLst>
                                             <p:cond delay="0"/>
                                           </p:stCondLst>
@@ -30015,14 +29980,14 @@
                                 </p:cTn>
                               </p:par>
                               <p:par>
-                                <p:cTn id="144" presetID="1" presetClass="entr" presetSubtype="0" fill="hold" grpId="0" nodeType="withEffect">
+                                <p:cTn id="141" presetID="1" presetClass="entr" presetSubtype="0" fill="hold" grpId="0" nodeType="withEffect">
                                   <p:stCondLst>
                                     <p:cond delay="417"/>
                                   </p:stCondLst>
                                   <p:childTnLst>
                                     <p:set>
                                       <p:cBhvr>
-                                        <p:cTn id="145" dur="1" fill="hold">
+                                        <p:cTn id="142" dur="1" fill="hold">
                                           <p:stCondLst>
                                             <p:cond delay="0"/>
                                           </p:stCondLst>
@@ -30042,14 +30007,14 @@
                                 </p:cTn>
                               </p:par>
                               <p:par>
-                                <p:cTn id="146" presetID="1" presetClass="exit" presetSubtype="0" fill="hold" grpId="1" nodeType="withEffect">
+                                <p:cTn id="143" presetID="1" presetClass="exit" presetSubtype="0" fill="hold" grpId="1" nodeType="withEffect">
                                   <p:stCondLst>
                                     <p:cond delay="417"/>
                                   </p:stCondLst>
                                   <p:childTnLst>
                                     <p:set>
                                       <p:cBhvr>
-                                        <p:cTn id="147" dur="1" fill="hold">
+                                        <p:cTn id="144" dur="1" fill="hold">
                                           <p:stCondLst>
                                             <p:cond delay="0"/>
                                           </p:stCondLst>
@@ -30069,14 +30034,14 @@
                                 </p:cTn>
                               </p:par>
                               <p:par>
-                                <p:cTn id="148" presetID="1" presetClass="entr" presetSubtype="0" fill="hold" grpId="0" nodeType="withEffect">
+                                <p:cTn id="145" presetID="1" presetClass="entr" presetSubtype="0" fill="hold" grpId="0" nodeType="withEffect">
                                   <p:stCondLst>
                                     <p:cond delay="458"/>
                                   </p:stCondLst>
                                   <p:childTnLst>
                                     <p:set>
                                       <p:cBhvr>
-                                        <p:cTn id="149" dur="1" fill="hold">
+                                        <p:cTn id="146" dur="1" fill="hold">
                                           <p:stCondLst>
                                             <p:cond delay="0"/>
                                           </p:stCondLst>
@@ -30096,14 +30061,14 @@
                                 </p:cTn>
                               </p:par>
                               <p:par>
-                                <p:cTn id="150" presetID="1" presetClass="exit" presetSubtype="0" fill="hold" grpId="1" nodeType="withEffect">
+                                <p:cTn id="147" presetID="1" presetClass="exit" presetSubtype="0" fill="hold" grpId="1" nodeType="withEffect">
                                   <p:stCondLst>
                                     <p:cond delay="458"/>
                                   </p:stCondLst>
                                   <p:childTnLst>
                                     <p:set>
                                       <p:cBhvr>
-                                        <p:cTn id="151" dur="1" fill="hold">
+                                        <p:cTn id="148" dur="1" fill="hold">
                                           <p:stCondLst>
                                             <p:cond delay="0"/>
                                           </p:stCondLst>
@@ -30123,14 +30088,14 @@
                                 </p:cTn>
                               </p:par>
                               <p:par>
-                                <p:cTn id="152" presetID="1" presetClass="entr" presetSubtype="0" fill="hold" grpId="0" nodeType="withEffect">
+                                <p:cTn id="149" presetID="1" presetClass="entr" presetSubtype="0" fill="hold" grpId="0" nodeType="withEffect">
                                   <p:stCondLst>
                                     <p:cond delay="500"/>
                                   </p:stCondLst>
                                   <p:childTnLst>
                                     <p:set>
                                       <p:cBhvr>
-                                        <p:cTn id="153" dur="1" fill="hold">
+                                        <p:cTn id="150" dur="1" fill="hold">
                                           <p:stCondLst>
                                             <p:cond delay="0"/>
                                           </p:stCondLst>
@@ -30150,14 +30115,14 @@
                                 </p:cTn>
                               </p:par>
                               <p:par>
-                                <p:cTn id="154" presetID="1" presetClass="exit" presetSubtype="0" fill="hold" grpId="1" nodeType="withEffect">
+                                <p:cTn id="151" presetID="1" presetClass="exit" presetSubtype="0" fill="hold" grpId="1" nodeType="withEffect">
                                   <p:stCondLst>
                                     <p:cond delay="500"/>
                                   </p:stCondLst>
                                   <p:childTnLst>
                                     <p:set>
                                       <p:cBhvr>
-                                        <p:cTn id="155" dur="1" fill="hold">
+                                        <p:cTn id="152" dur="1" fill="hold">
                                           <p:stCondLst>
                                             <p:cond delay="0"/>
                                           </p:stCondLst>
@@ -30177,14 +30142,14 @@
                                 </p:cTn>
                               </p:par>
                               <p:par>
-                                <p:cTn id="156" presetID="1" presetClass="entr" presetSubtype="0" fill="hold" nodeType="withEffect">
+                                <p:cTn id="153" presetID="1" presetClass="entr" presetSubtype="0" fill="hold" nodeType="withEffect">
                                   <p:stCondLst>
                                     <p:cond delay="42"/>
                                   </p:stCondLst>
                                   <p:childTnLst>
                                     <p:set>
                                       <p:cBhvr>
-                                        <p:cTn id="157" dur="1" fill="hold">
+                                        <p:cTn id="154" dur="1" fill="hold">
                                           <p:stCondLst>
                                             <p:cond delay="0"/>
                                           </p:stCondLst>
@@ -30204,14 +30169,14 @@
                                 </p:cTn>
                               </p:par>
                               <p:par>
-                                <p:cTn id="158" presetID="1" presetClass="exit" presetSubtype="0" fill="hold" nodeType="withEffect">
+                                <p:cTn id="155" presetID="1" presetClass="exit" presetSubtype="0" fill="hold" nodeType="withEffect">
                                   <p:stCondLst>
                                     <p:cond delay="42"/>
                                   </p:stCondLst>
                                   <p:childTnLst>
                                     <p:set>
                                       <p:cBhvr>
-                                        <p:cTn id="159" dur="1" fill="hold">
+                                        <p:cTn id="156" dur="1" fill="hold">
                                           <p:stCondLst>
                                             <p:cond delay="0"/>
                                           </p:stCondLst>
@@ -30231,14 +30196,14 @@
                                 </p:cTn>
                               </p:par>
                               <p:par>
-                                <p:cTn id="160" presetID="1" presetClass="entr" presetSubtype="0" fill="hold" nodeType="withEffect">
+                                <p:cTn id="157" presetID="1" presetClass="entr" presetSubtype="0" fill="hold" nodeType="withEffect">
                                   <p:stCondLst>
                                     <p:cond delay="83"/>
                                   </p:stCondLst>
                                   <p:childTnLst>
                                     <p:set>
                                       <p:cBhvr>
-                                        <p:cTn id="161" dur="1" fill="hold">
+                                        <p:cTn id="158" dur="1" fill="hold">
                                           <p:stCondLst>
                                             <p:cond delay="0"/>
                                           </p:stCondLst>
@@ -30258,14 +30223,14 @@
                                 </p:cTn>
                               </p:par>
                               <p:par>
-                                <p:cTn id="162" presetID="1" presetClass="exit" presetSubtype="0" fill="hold" nodeType="withEffect">
+                                <p:cTn id="159" presetID="1" presetClass="exit" presetSubtype="0" fill="hold" nodeType="withEffect">
                                   <p:stCondLst>
                                     <p:cond delay="83"/>
                                   </p:stCondLst>
                                   <p:childTnLst>
                                     <p:set>
                                       <p:cBhvr>
-                                        <p:cTn id="163" dur="1" fill="hold">
+                                        <p:cTn id="160" dur="1" fill="hold">
                                           <p:stCondLst>
                                             <p:cond delay="0"/>
                                           </p:stCondLst>
@@ -30285,14 +30250,14 @@
                                 </p:cTn>
                               </p:par>
                               <p:par>
-                                <p:cTn id="164" presetID="1" presetClass="entr" presetSubtype="0" fill="hold" nodeType="withEffect">
+                                <p:cTn id="161" presetID="1" presetClass="entr" presetSubtype="0" fill="hold" nodeType="withEffect">
                                   <p:stCondLst>
                                     <p:cond delay="125"/>
                                   </p:stCondLst>
                                   <p:childTnLst>
                                     <p:set>
                                       <p:cBhvr>
-                                        <p:cTn id="165" dur="1" fill="hold">
+                                        <p:cTn id="162" dur="1" fill="hold">
                                           <p:stCondLst>
                                             <p:cond delay="0"/>
                                           </p:stCondLst>
@@ -30312,14 +30277,14 @@
                                 </p:cTn>
                               </p:par>
                               <p:par>
-                                <p:cTn id="166" presetID="1" presetClass="exit" presetSubtype="0" fill="hold" nodeType="withEffect">
+                                <p:cTn id="163" presetID="1" presetClass="exit" presetSubtype="0" fill="hold" nodeType="withEffect">
                                   <p:stCondLst>
                                     <p:cond delay="125"/>
                                   </p:stCondLst>
                                   <p:childTnLst>
                                     <p:set>
                                       <p:cBhvr>
-                                        <p:cTn id="167" dur="1" fill="hold">
+                                        <p:cTn id="164" dur="1" fill="hold">
                                           <p:stCondLst>
                                             <p:cond delay="0"/>
                                           </p:stCondLst>
@@ -30339,14 +30304,14 @@
                                 </p:cTn>
                               </p:par>
                               <p:par>
-                                <p:cTn id="168" presetID="1" presetClass="entr" presetSubtype="0" fill="hold" nodeType="withEffect">
+                                <p:cTn id="165" presetID="1" presetClass="entr" presetSubtype="0" fill="hold" nodeType="withEffect">
                                   <p:stCondLst>
                                     <p:cond delay="167"/>
                                   </p:stCondLst>
                                   <p:childTnLst>
                                     <p:set>
                                       <p:cBhvr>
-                                        <p:cTn id="169" dur="1" fill="hold">
+                                        <p:cTn id="166" dur="1" fill="hold">
                                           <p:stCondLst>
                                             <p:cond delay="0"/>
                                           </p:stCondLst>
@@ -30366,14 +30331,14 @@
                                 </p:cTn>
                               </p:par>
                               <p:par>
-                                <p:cTn id="170" presetID="1" presetClass="exit" presetSubtype="0" fill="hold" nodeType="withEffect">
+                                <p:cTn id="167" presetID="1" presetClass="exit" presetSubtype="0" fill="hold" nodeType="withEffect">
                                   <p:stCondLst>
                                     <p:cond delay="167"/>
                                   </p:stCondLst>
                                   <p:childTnLst>
                                     <p:set>
                                       <p:cBhvr>
-                                        <p:cTn id="171" dur="1" fill="hold">
+                                        <p:cTn id="168" dur="1" fill="hold">
                                           <p:stCondLst>
                                             <p:cond delay="0"/>
                                           </p:stCondLst>
@@ -30393,14 +30358,14 @@
                                 </p:cTn>
                               </p:par>
                               <p:par>
-                                <p:cTn id="172" presetID="1" presetClass="entr" presetSubtype="0" fill="hold" nodeType="withEffect">
+                                <p:cTn id="169" presetID="1" presetClass="entr" presetSubtype="0" fill="hold" nodeType="withEffect">
                                   <p:stCondLst>
                                     <p:cond delay="208"/>
                                   </p:stCondLst>
                                   <p:childTnLst>
                                     <p:set>
                                       <p:cBhvr>
-                                        <p:cTn id="173" dur="1" fill="hold">
+                                        <p:cTn id="170" dur="1" fill="hold">
                                           <p:stCondLst>
                                             <p:cond delay="0"/>
                                           </p:stCondLst>
@@ -30420,14 +30385,14 @@
                                 </p:cTn>
                               </p:par>
                               <p:par>
-                                <p:cTn id="174" presetID="1" presetClass="exit" presetSubtype="0" fill="hold" nodeType="withEffect">
+                                <p:cTn id="171" presetID="1" presetClass="exit" presetSubtype="0" fill="hold" nodeType="withEffect">
                                   <p:stCondLst>
                                     <p:cond delay="208"/>
                                   </p:stCondLst>
                                   <p:childTnLst>
                                     <p:set>
                                       <p:cBhvr>
-                                        <p:cTn id="175" dur="1" fill="hold">
+                                        <p:cTn id="172" dur="1" fill="hold">
                                           <p:stCondLst>
                                             <p:cond delay="0"/>
                                           </p:stCondLst>
@@ -30447,14 +30412,14 @@
                                 </p:cTn>
                               </p:par>
                               <p:par>
-                                <p:cTn id="176" presetID="1" presetClass="entr" presetSubtype="0" fill="hold" nodeType="withEffect">
+                                <p:cTn id="173" presetID="1" presetClass="entr" presetSubtype="0" fill="hold" nodeType="withEffect">
                                   <p:stCondLst>
                                     <p:cond delay="250"/>
                                   </p:stCondLst>
                                   <p:childTnLst>
                                     <p:set>
                                       <p:cBhvr>
-                                        <p:cTn id="177" dur="1" fill="hold">
+                                        <p:cTn id="174" dur="1" fill="hold">
                                           <p:stCondLst>
                                             <p:cond delay="0"/>
                                           </p:stCondLst>
@@ -30474,14 +30439,14 @@
                                 </p:cTn>
                               </p:par>
                               <p:par>
-                                <p:cTn id="178" presetID="1" presetClass="exit" presetSubtype="0" fill="hold" nodeType="withEffect">
+                                <p:cTn id="175" presetID="1" presetClass="exit" presetSubtype="0" fill="hold" nodeType="withEffect">
                                   <p:stCondLst>
                                     <p:cond delay="250"/>
                                   </p:stCondLst>
                                   <p:childTnLst>
                                     <p:set>
                                       <p:cBhvr>
-                                        <p:cTn id="179" dur="1" fill="hold">
+                                        <p:cTn id="176" dur="1" fill="hold">
                                           <p:stCondLst>
                                             <p:cond delay="0"/>
                                           </p:stCondLst>
@@ -30501,14 +30466,14 @@
                                 </p:cTn>
                               </p:par>
                               <p:par>
-                                <p:cTn id="180" presetID="1" presetClass="entr" presetSubtype="0" fill="hold" nodeType="withEffect">
+                                <p:cTn id="177" presetID="1" presetClass="entr" presetSubtype="0" fill="hold" nodeType="withEffect">
                                   <p:stCondLst>
                                     <p:cond delay="292"/>
                                   </p:stCondLst>
                                   <p:childTnLst>
                                     <p:set>
                                       <p:cBhvr>
-                                        <p:cTn id="181" dur="1" fill="hold">
+                                        <p:cTn id="178" dur="1" fill="hold">
                                           <p:stCondLst>
                                             <p:cond delay="0"/>
                                           </p:stCondLst>
@@ -30528,14 +30493,14 @@
                                 </p:cTn>
                               </p:par>
                               <p:par>
-                                <p:cTn id="182" presetID="1" presetClass="exit" presetSubtype="0" fill="hold" nodeType="withEffect">
+                                <p:cTn id="179" presetID="1" presetClass="exit" presetSubtype="0" fill="hold" nodeType="withEffect">
                                   <p:stCondLst>
                                     <p:cond delay="292"/>
                                   </p:stCondLst>
                                   <p:childTnLst>
                                     <p:set>
                                       <p:cBhvr>
-                                        <p:cTn id="183" dur="1" fill="hold">
+                                        <p:cTn id="180" dur="1" fill="hold">
                                           <p:stCondLst>
                                             <p:cond delay="0"/>
                                           </p:stCondLst>
@@ -30555,14 +30520,14 @@
                                 </p:cTn>
                               </p:par>
                               <p:par>
-                                <p:cTn id="184" presetID="1" presetClass="entr" presetSubtype="0" fill="hold" nodeType="withEffect">
+                                <p:cTn id="181" presetID="1" presetClass="entr" presetSubtype="0" fill="hold" nodeType="withEffect">
                                   <p:stCondLst>
                                     <p:cond delay="333"/>
                                   </p:stCondLst>
                                   <p:childTnLst>
                                     <p:set>
                                       <p:cBhvr>
-                                        <p:cTn id="185" dur="1" fill="hold">
+                                        <p:cTn id="182" dur="1" fill="hold">
                                           <p:stCondLst>
                                             <p:cond delay="0"/>
                                           </p:stCondLst>
@@ -30582,14 +30547,14 @@
                                 </p:cTn>
                               </p:par>
                               <p:par>
-                                <p:cTn id="186" presetID="1" presetClass="exit" presetSubtype="0" fill="hold" nodeType="withEffect">
+                                <p:cTn id="183" presetID="1" presetClass="exit" presetSubtype="0" fill="hold" nodeType="withEffect">
                                   <p:stCondLst>
                                     <p:cond delay="333"/>
                                   </p:stCondLst>
                                   <p:childTnLst>
                                     <p:set>
                                       <p:cBhvr>
-                                        <p:cTn id="187" dur="1" fill="hold">
+                                        <p:cTn id="184" dur="1" fill="hold">
                                           <p:stCondLst>
                                             <p:cond delay="0"/>
                                           </p:stCondLst>
@@ -30609,14 +30574,14 @@
                                 </p:cTn>
                               </p:par>
                               <p:par>
-                                <p:cTn id="188" presetID="1" presetClass="entr" presetSubtype="0" fill="hold" nodeType="withEffect">
+                                <p:cTn id="185" presetID="1" presetClass="entr" presetSubtype="0" fill="hold" nodeType="withEffect">
                                   <p:stCondLst>
                                     <p:cond delay="375"/>
                                   </p:stCondLst>
                                   <p:childTnLst>
                                     <p:set>
                                       <p:cBhvr>
-                                        <p:cTn id="189" dur="1" fill="hold">
+                                        <p:cTn id="186" dur="1" fill="hold">
                                           <p:stCondLst>
                                             <p:cond delay="0"/>
                                           </p:stCondLst>
@@ -30636,14 +30601,14 @@
                                 </p:cTn>
                               </p:par>
                               <p:par>
-                                <p:cTn id="190" presetID="1" presetClass="exit" presetSubtype="0" fill="hold" nodeType="withEffect">
+                                <p:cTn id="187" presetID="1" presetClass="exit" presetSubtype="0" fill="hold" nodeType="withEffect">
                                   <p:stCondLst>
                                     <p:cond delay="375"/>
                                   </p:stCondLst>
                                   <p:childTnLst>
                                     <p:set>
                                       <p:cBhvr>
-                                        <p:cTn id="191" dur="1" fill="hold">
+                                        <p:cTn id="188" dur="1" fill="hold">
                                           <p:stCondLst>
                                             <p:cond delay="0"/>
                                           </p:stCondLst>
@@ -30663,14 +30628,14 @@
                                 </p:cTn>
                               </p:par>
                               <p:par>
-                                <p:cTn id="192" presetID="1" presetClass="entr" presetSubtype="0" fill="hold" nodeType="withEffect">
+                                <p:cTn id="189" presetID="1" presetClass="entr" presetSubtype="0" fill="hold" nodeType="withEffect">
                                   <p:stCondLst>
                                     <p:cond delay="417"/>
                                   </p:stCondLst>
                                   <p:childTnLst>
                                     <p:set>
                                       <p:cBhvr>
-                                        <p:cTn id="193" dur="1" fill="hold">
+                                        <p:cTn id="190" dur="1" fill="hold">
                                           <p:stCondLst>
                                             <p:cond delay="0"/>
                                           </p:stCondLst>
@@ -30690,14 +30655,14 @@
                                 </p:cTn>
                               </p:par>
                               <p:par>
-                                <p:cTn id="194" presetID="1" presetClass="exit" presetSubtype="0" fill="hold" nodeType="withEffect">
+                                <p:cTn id="191" presetID="1" presetClass="exit" presetSubtype="0" fill="hold" nodeType="withEffect">
                                   <p:stCondLst>
                                     <p:cond delay="417"/>
                                   </p:stCondLst>
                                   <p:childTnLst>
                                     <p:set>
                                       <p:cBhvr>
-                                        <p:cTn id="195" dur="1" fill="hold">
+                                        <p:cTn id="192" dur="1" fill="hold">
                                           <p:stCondLst>
                                             <p:cond delay="0"/>
                                           </p:stCondLst>
@@ -30717,14 +30682,14 @@
                                 </p:cTn>
                               </p:par>
                               <p:par>
-                                <p:cTn id="196" presetID="1" presetClass="entr" presetSubtype="0" fill="hold" nodeType="withEffect">
+                                <p:cTn id="193" presetID="1" presetClass="entr" presetSubtype="0" fill="hold" nodeType="withEffect">
                                   <p:stCondLst>
                                     <p:cond delay="458"/>
                                   </p:stCondLst>
                                   <p:childTnLst>
                                     <p:set>
                                       <p:cBhvr>
-                                        <p:cTn id="197" dur="1" fill="hold">
+                                        <p:cTn id="194" dur="1" fill="hold">
                                           <p:stCondLst>
                                             <p:cond delay="0"/>
                                           </p:stCondLst>
@@ -30744,14 +30709,14 @@
                                 </p:cTn>
                               </p:par>
                               <p:par>
-                                <p:cTn id="198" presetID="1" presetClass="exit" presetSubtype="0" fill="hold" nodeType="withEffect">
+                                <p:cTn id="195" presetID="1" presetClass="exit" presetSubtype="0" fill="hold" nodeType="withEffect">
                                   <p:stCondLst>
                                     <p:cond delay="458"/>
                                   </p:stCondLst>
                                   <p:childTnLst>
                                     <p:set>
                                       <p:cBhvr>
-                                        <p:cTn id="199" dur="1" fill="hold">
+                                        <p:cTn id="196" dur="1" fill="hold">
                                           <p:stCondLst>
                                             <p:cond delay="0"/>
                                           </p:stCondLst>
@@ -30771,14 +30736,14 @@
                                 </p:cTn>
                               </p:par>
                               <p:par>
-                                <p:cTn id="200" presetID="1" presetClass="entr" presetSubtype="0" fill="hold" nodeType="withEffect">
+                                <p:cTn id="197" presetID="1" presetClass="entr" presetSubtype="0" fill="hold" nodeType="withEffect">
                                   <p:stCondLst>
                                     <p:cond delay="500"/>
                                   </p:stCondLst>
                                   <p:childTnLst>
                                     <p:set>
                                       <p:cBhvr>
-                                        <p:cTn id="201" dur="1" fill="hold">
+                                        <p:cTn id="198" dur="1" fill="hold">
                                           <p:stCondLst>
                                             <p:cond delay="0"/>
                                           </p:stCondLst>
@@ -30798,20 +30763,55 @@
                                 </p:cTn>
                               </p:par>
                               <p:par>
-                                <p:cTn id="202" presetID="1" presetClass="exit" presetSubtype="0" fill="hold" nodeType="withEffect">
+                                <p:cTn id="199" presetID="1" presetClass="exit" presetSubtype="0" fill="hold" nodeType="withEffect">
                                   <p:stCondLst>
                                     <p:cond delay="500"/>
                                   </p:stCondLst>
                                   <p:childTnLst>
                                     <p:set>
                                       <p:cBhvr>
-                                        <p:cTn id="203" dur="1" fill="hold">
+                                        <p:cTn id="200" dur="1" fill="hold">
                                           <p:stCondLst>
                                             <p:cond delay="0"/>
                                           </p:stCondLst>
                                         </p:cTn>
                                         <p:tgtEl>
                                           <p:spTgt spid="55"/>
+                                        </p:tgtEl>
+                                        <p:attrNameLst>
+                                          <p:attrName>style.visibility</p:attrName>
+                                        </p:attrNameLst>
+                                      </p:cBhvr>
+                                      <p:to>
+                                        <p:strVal val="hidden"/>
+                                      </p:to>
+                                    </p:set>
+                                  </p:childTnLst>
+                                </p:cTn>
+                              </p:par>
+                              <p:par>
+                                <p:cTn id="201" presetID="10" presetClass="exit" presetSubtype="0" fill="hold" grpId="0" nodeType="withEffect">
+                                  <p:stCondLst>
+                                    <p:cond delay="0"/>
+                                  </p:stCondLst>
+                                  <p:childTnLst>
+                                    <p:animEffect transition="out" filter="fade">
+                                      <p:cBhvr>
+                                        <p:cTn id="202" dur="500"/>
+                                        <p:tgtEl>
+                                          <p:spTgt spid="57"/>
+                                        </p:tgtEl>
+                                      </p:cBhvr>
+                                    </p:animEffect>
+                                    <p:set>
+                                      <p:cBhvr>
+                                        <p:cTn id="203" dur="1" fill="hold">
+                                          <p:stCondLst>
+                                            <p:cond delay="499"/>
+                                          </p:stCondLst>
+                                        </p:cTn>
+                                        <p:tgtEl>
+                                          <p:spTgt spid="57"/>
                                         </p:tgtEl>
                                         <p:attrNameLst>
                                           <p:attrName>style.visibility</p:attrName>
@@ -30855,7 +30855,6 @@
       <p:bldP spid="4" grpId="0" animBg="1"/>
       <p:bldP spid="5" grpId="0" animBg="1"/>
       <p:bldP spid="6" grpId="0" animBg="1"/>
-      <p:bldP spid="8" grpId="0"/>
       <p:bldP spid="9" grpId="0" animBg="1"/>
       <p:bldP spid="9" grpId="1" animBg="1"/>
       <p:bldP spid="10" grpId="0" animBg="1"/>
@@ -30925,6 +30924,7 @@
       <p:bldP spid="43" grpId="0" animBg="1"/>
       <p:bldP spid="43" grpId="1" animBg="1"/>
       <p:bldP spid="44" grpId="0" animBg="1"/>
+      <p:bldP spid="57" grpId="0"/>
     </p:bldLst>
   </p:timing>
 </p:sld>
@@ -30964,11 +30964,7 @@
           <a:p>
             <a:r>
               <a:rPr lang="en-US" dirty="0" smtClean="0"/>
-              <a:t>Auto Animate:: </a:t>
-            </a:r>
-            <a:r>
-              <a:rPr lang="en-US" dirty="0" smtClean="0"/>
-              <a:t>copy &amp; paste shapes</a:t>
+              <a:t>Auto Animate:: copy &amp; paste shapes</a:t>
             </a:r>
             <a:endParaRPr lang="en-SG" dirty="0"/>
           </a:p>
@@ -30996,13 +30992,8 @@
           <a:p>
             <a:r>
               <a:rPr lang="en-US" dirty="0" smtClean="0"/>
-              <a:t>Select all blue </a:t>
-            </a:r>
-            <a:r>
-              <a:rPr lang="en-US" dirty="0" smtClean="0"/>
-              <a:t>shapes in the initial slide and copy them.</a:t>
-            </a:r>
-            <a:endParaRPr lang="en-US" dirty="0" smtClean="0"/>
+              <a:t>Select all blue shapes in the initial slide and copy them.</a:t>
+            </a:r>
           </a:p>
           <a:p>
             <a:r>
@@ -31341,11 +31332,11 @@
   <p:clrMapOvr>
     <a:masterClrMapping/>
   </p:clrMapOvr>
-  <mc:AlternateContent xmlns:mc="http://schemas.openxmlformats.org/markup-compatibility/2006">
-    <mc:Choice xmlns:p14="http://schemas.microsoft.com/office/powerpoint/2010/main" Requires="p14">
+  <mc:AlternateContent xmlns:mc="http://schemas.openxmlformats.org/markup-compatibility/2006" xmlns:p14="http://schemas.microsoft.com/office/powerpoint/2010/main">
+    <mc:Choice Requires="p14">
       <p:transition spd="slow" p14:dur="2000"/>
     </mc:Choice>
-    <mc:Fallback>
+    <mc:Fallback xmlns="">
       <p:transition spd="slow"/>
     </mc:Fallback>
   </mc:AlternateContent>

</xml_diff>

<commit_message>
add ft tc, copy & paste for auto animate
</commit_message>
<xml_diff>
--- a/doc/test/AutoAnimate.pptx
+++ b/doc/test/AutoAnimate.pptx
@@ -16,7 +16,7 @@
     <p:sldId id="341" r:id="rId10"/>
     <p:sldId id="342" r:id="rId11"/>
     <p:sldId id="343" r:id="rId12"/>
-    <p:sldId id="346" r:id="rId13"/>
+    <p:sldId id="348" r:id="rId13"/>
     <p:sldId id="332" r:id="rId14"/>
     <p:sldId id="317" r:id="rId15"/>
     <p:sldId id="318" r:id="rId16"/>
@@ -146,7 +146,7 @@
             <p14:sldId id="341"/>
             <p14:sldId id="342"/>
             <p14:sldId id="343"/>
-            <p14:sldId id="346"/>
+            <p14:sldId id="348"/>
             <p14:sldId id="332"/>
             <p14:sldId id="317"/>
             <p14:sldId id="318"/>
@@ -813,7 +813,7 @@
           <a:p>
             <a:fld id="{699DC775-C286-4358-8C92-D7E584E969B3}" type="datetimeFigureOut">
               <a:rPr lang="en-US" smtClean="0"/>
-              <a:t>6/6/2015</a:t>
+              <a:t>6/9/2015</a:t>
             </a:fld>
             <a:endParaRPr lang="en-US"/>
           </a:p>
@@ -983,7 +983,7 @@
           <a:p>
             <a:fld id="{699DC775-C286-4358-8C92-D7E584E969B3}" type="datetimeFigureOut">
               <a:rPr lang="en-US" smtClean="0"/>
-              <a:t>6/6/2015</a:t>
+              <a:t>6/9/2015</a:t>
             </a:fld>
             <a:endParaRPr lang="en-US"/>
           </a:p>
@@ -1163,7 +1163,7 @@
           <a:p>
             <a:fld id="{699DC775-C286-4358-8C92-D7E584E969B3}" type="datetimeFigureOut">
               <a:rPr lang="en-US" smtClean="0"/>
-              <a:t>6/6/2015</a:t>
+              <a:t>6/9/2015</a:t>
             </a:fld>
             <a:endParaRPr lang="en-US"/>
           </a:p>
@@ -1405,7 +1405,7 @@
           <a:p>
             <a:fld id="{699DC775-C286-4358-8C92-D7E584E969B3}" type="datetimeFigureOut">
               <a:rPr lang="en-US" smtClean="0"/>
-              <a:t>6/6/2015</a:t>
+              <a:t>6/9/2015</a:t>
             </a:fld>
             <a:endParaRPr lang="en-US"/>
           </a:p>
@@ -1575,7 +1575,7 @@
           <a:p>
             <a:fld id="{699DC775-C286-4358-8C92-D7E584E969B3}" type="datetimeFigureOut">
               <a:rPr lang="en-US" smtClean="0"/>
-              <a:t>6/6/2015</a:t>
+              <a:t>6/9/2015</a:t>
             </a:fld>
             <a:endParaRPr lang="en-US"/>
           </a:p>
@@ -1821,7 +1821,7 @@
           <a:p>
             <a:fld id="{699DC775-C286-4358-8C92-D7E584E969B3}" type="datetimeFigureOut">
               <a:rPr lang="en-US" smtClean="0"/>
-              <a:t>6/6/2015</a:t>
+              <a:t>6/9/2015</a:t>
             </a:fld>
             <a:endParaRPr lang="en-US"/>
           </a:p>
@@ -2109,7 +2109,7 @@
           <a:p>
             <a:fld id="{699DC775-C286-4358-8C92-D7E584E969B3}" type="datetimeFigureOut">
               <a:rPr lang="en-US" smtClean="0"/>
-              <a:t>6/6/2015</a:t>
+              <a:t>6/9/2015</a:t>
             </a:fld>
             <a:endParaRPr lang="en-US"/>
           </a:p>
@@ -2531,7 +2531,7 @@
           <a:p>
             <a:fld id="{699DC775-C286-4358-8C92-D7E584E969B3}" type="datetimeFigureOut">
               <a:rPr lang="en-US" smtClean="0"/>
-              <a:t>6/6/2015</a:t>
+              <a:t>6/9/2015</a:t>
             </a:fld>
             <a:endParaRPr lang="en-US"/>
           </a:p>
@@ -2649,7 +2649,7 @@
           <a:p>
             <a:fld id="{699DC775-C286-4358-8C92-D7E584E969B3}" type="datetimeFigureOut">
               <a:rPr lang="en-US" smtClean="0"/>
-              <a:t>6/6/2015</a:t>
+              <a:t>6/9/2015</a:t>
             </a:fld>
             <a:endParaRPr lang="en-US"/>
           </a:p>
@@ -2744,7 +2744,7 @@
           <a:p>
             <a:fld id="{699DC775-C286-4358-8C92-D7E584E969B3}" type="datetimeFigureOut">
               <a:rPr lang="en-US" smtClean="0"/>
-              <a:t>6/6/2015</a:t>
+              <a:t>6/9/2015</a:t>
             </a:fld>
             <a:endParaRPr lang="en-US"/>
           </a:p>
@@ -3021,7 +3021,7 @@
           <a:p>
             <a:fld id="{699DC775-C286-4358-8C92-D7E584E969B3}" type="datetimeFigureOut">
               <a:rPr lang="en-US" smtClean="0"/>
-              <a:t>6/6/2015</a:t>
+              <a:t>6/9/2015</a:t>
             </a:fld>
             <a:endParaRPr lang="en-US"/>
           </a:p>
@@ -3191,7 +3191,7 @@
           <a:p>
             <a:fld id="{699DC775-C286-4358-8C92-D7E584E969B3}" type="datetimeFigureOut">
               <a:rPr lang="en-US" smtClean="0"/>
-              <a:t>6/6/2015</a:t>
+              <a:t>6/9/2015</a:t>
             </a:fld>
             <a:endParaRPr lang="en-US"/>
           </a:p>
@@ -3444,7 +3444,7 @@
           <a:p>
             <a:fld id="{699DC775-C286-4358-8C92-D7E584E969B3}" type="datetimeFigureOut">
               <a:rPr lang="en-US" smtClean="0"/>
-              <a:t>6/6/2015</a:t>
+              <a:t>6/9/2015</a:t>
             </a:fld>
             <a:endParaRPr lang="en-US"/>
           </a:p>
@@ -3614,7 +3614,7 @@
           <a:p>
             <a:fld id="{699DC775-C286-4358-8C92-D7E584E969B3}" type="datetimeFigureOut">
               <a:rPr lang="en-US" smtClean="0"/>
-              <a:t>6/6/2015</a:t>
+              <a:t>6/9/2015</a:t>
             </a:fld>
             <a:endParaRPr lang="en-US"/>
           </a:p>
@@ -3794,7 +3794,7 @@
           <a:p>
             <a:fld id="{699DC775-C286-4358-8C92-D7E584E969B3}" type="datetimeFigureOut">
               <a:rPr lang="en-US" smtClean="0"/>
-              <a:t>6/6/2015</a:t>
+              <a:t>6/9/2015</a:t>
             </a:fld>
             <a:endParaRPr lang="en-US"/>
           </a:p>
@@ -4044,7 +4044,7 @@
           <a:p>
             <a:fld id="{699DC775-C286-4358-8C92-D7E584E969B3}" type="datetimeFigureOut">
               <a:rPr lang="en-US" smtClean="0"/>
-              <a:t>6/6/2015</a:t>
+              <a:t>6/9/2015</a:t>
             </a:fld>
             <a:endParaRPr lang="en-US"/>
           </a:p>
@@ -4222,7 +4222,7 @@
           <a:p>
             <a:fld id="{699DC775-C286-4358-8C92-D7E584E969B3}" type="datetimeFigureOut">
               <a:rPr lang="en-US" smtClean="0"/>
-              <a:t>6/6/2015</a:t>
+              <a:t>6/9/2015</a:t>
             </a:fld>
             <a:endParaRPr lang="en-US"/>
           </a:p>
@@ -4476,7 +4476,7 @@
           <a:p>
             <a:fld id="{699DC775-C286-4358-8C92-D7E584E969B3}" type="datetimeFigureOut">
               <a:rPr lang="en-US" smtClean="0"/>
-              <a:t>6/6/2015</a:t>
+              <a:t>6/9/2015</a:t>
             </a:fld>
             <a:endParaRPr lang="en-US"/>
           </a:p>
@@ -4772,7 +4772,7 @@
           <a:p>
             <a:fld id="{699DC775-C286-4358-8C92-D7E584E969B3}" type="datetimeFigureOut">
               <a:rPr lang="en-US" smtClean="0"/>
-              <a:t>6/6/2015</a:t>
+              <a:t>6/9/2015</a:t>
             </a:fld>
             <a:endParaRPr lang="en-US"/>
           </a:p>
@@ -5202,7 +5202,7 @@
           <a:p>
             <a:fld id="{699DC775-C286-4358-8C92-D7E584E969B3}" type="datetimeFigureOut">
               <a:rPr lang="en-US" smtClean="0"/>
-              <a:t>6/6/2015</a:t>
+              <a:t>6/9/2015</a:t>
             </a:fld>
             <a:endParaRPr lang="en-US"/>
           </a:p>
@@ -5328,7 +5328,7 @@
           <a:p>
             <a:fld id="{699DC775-C286-4358-8C92-D7E584E969B3}" type="datetimeFigureOut">
               <a:rPr lang="en-US" smtClean="0"/>
-              <a:t>6/6/2015</a:t>
+              <a:t>6/9/2015</a:t>
             </a:fld>
             <a:endParaRPr lang="en-US"/>
           </a:p>
@@ -5431,7 +5431,7 @@
           <a:p>
             <a:fld id="{699DC775-C286-4358-8C92-D7E584E969B3}" type="datetimeFigureOut">
               <a:rPr lang="en-US" smtClean="0"/>
-              <a:t>6/6/2015</a:t>
+              <a:t>6/9/2015</a:t>
             </a:fld>
             <a:endParaRPr lang="en-US"/>
           </a:p>
@@ -5677,7 +5677,7 @@
           <a:p>
             <a:fld id="{699DC775-C286-4358-8C92-D7E584E969B3}" type="datetimeFigureOut">
               <a:rPr lang="en-US" smtClean="0"/>
-              <a:t>6/6/2015</a:t>
+              <a:t>6/9/2015</a:t>
             </a:fld>
             <a:endParaRPr lang="en-US"/>
           </a:p>
@@ -5962,7 +5962,7 @@
           <a:p>
             <a:fld id="{699DC775-C286-4358-8C92-D7E584E969B3}" type="datetimeFigureOut">
               <a:rPr lang="en-US" smtClean="0"/>
-              <a:t>6/6/2015</a:t>
+              <a:t>6/9/2015</a:t>
             </a:fld>
             <a:endParaRPr lang="en-US"/>
           </a:p>
@@ -6223,7 +6223,7 @@
           <a:p>
             <a:fld id="{699DC775-C286-4358-8C92-D7E584E969B3}" type="datetimeFigureOut">
               <a:rPr lang="en-US" smtClean="0"/>
-              <a:t>6/6/2015</a:t>
+              <a:t>6/9/2015</a:t>
             </a:fld>
             <a:endParaRPr lang="en-US"/>
           </a:p>
@@ -6401,7 +6401,7 @@
           <a:p>
             <a:fld id="{699DC775-C286-4358-8C92-D7E584E969B3}" type="datetimeFigureOut">
               <a:rPr lang="en-US" smtClean="0"/>
-              <a:t>6/6/2015</a:t>
+              <a:t>6/9/2015</a:t>
             </a:fld>
             <a:endParaRPr lang="en-US"/>
           </a:p>
@@ -6589,7 +6589,7 @@
           <a:p>
             <a:fld id="{699DC775-C286-4358-8C92-D7E584E969B3}" type="datetimeFigureOut">
               <a:rPr lang="en-US" smtClean="0"/>
-              <a:t>6/6/2015</a:t>
+              <a:t>6/9/2015</a:t>
             </a:fld>
             <a:endParaRPr lang="en-US"/>
           </a:p>
@@ -6877,7 +6877,7 @@
           <a:p>
             <a:fld id="{699DC775-C286-4358-8C92-D7E584E969B3}" type="datetimeFigureOut">
               <a:rPr lang="en-US" smtClean="0"/>
-              <a:t>6/6/2015</a:t>
+              <a:t>6/9/2015</a:t>
             </a:fld>
             <a:endParaRPr lang="en-US"/>
           </a:p>
@@ -7299,7 +7299,7 @@
           <a:p>
             <a:fld id="{699DC775-C286-4358-8C92-D7E584E969B3}" type="datetimeFigureOut">
               <a:rPr lang="en-US" smtClean="0"/>
-              <a:t>6/6/2015</a:t>
+              <a:t>6/9/2015</a:t>
             </a:fld>
             <a:endParaRPr lang="en-US"/>
           </a:p>
@@ -7417,7 +7417,7 @@
           <a:p>
             <a:fld id="{699DC775-C286-4358-8C92-D7E584E969B3}" type="datetimeFigureOut">
               <a:rPr lang="en-US" smtClean="0"/>
-              <a:t>6/6/2015</a:t>
+              <a:t>6/9/2015</a:t>
             </a:fld>
             <a:endParaRPr lang="en-US"/>
           </a:p>
@@ -7512,7 +7512,7 @@
           <a:p>
             <a:fld id="{699DC775-C286-4358-8C92-D7E584E969B3}" type="datetimeFigureOut">
               <a:rPr lang="en-US" smtClean="0"/>
-              <a:t>6/6/2015</a:t>
+              <a:t>6/9/2015</a:t>
             </a:fld>
             <a:endParaRPr lang="en-US"/>
           </a:p>
@@ -7789,7 +7789,7 @@
           <a:p>
             <a:fld id="{699DC775-C286-4358-8C92-D7E584E969B3}" type="datetimeFigureOut">
               <a:rPr lang="en-US" smtClean="0"/>
-              <a:t>6/6/2015</a:t>
+              <a:t>6/9/2015</a:t>
             </a:fld>
             <a:endParaRPr lang="en-US"/>
           </a:p>
@@ -8042,7 +8042,7 @@
           <a:p>
             <a:fld id="{699DC775-C286-4358-8C92-D7E584E969B3}" type="datetimeFigureOut">
               <a:rPr lang="en-US" smtClean="0"/>
-              <a:t>6/6/2015</a:t>
+              <a:t>6/9/2015</a:t>
             </a:fld>
             <a:endParaRPr lang="en-US"/>
           </a:p>
@@ -8255,7 +8255,7 @@
           <a:p>
             <a:fld id="{699DC775-C286-4358-8C92-D7E584E969B3}" type="datetimeFigureOut">
               <a:rPr lang="en-US" smtClean="0"/>
-              <a:t>6/6/2015</a:t>
+              <a:t>6/9/2015</a:t>
             </a:fld>
             <a:endParaRPr lang="en-US"/>
           </a:p>
@@ -8770,7 +8770,7 @@
           <a:p>
             <a:fld id="{699DC775-C286-4358-8C92-D7E584E969B3}" type="datetimeFigureOut">
               <a:rPr lang="en-US" smtClean="0"/>
-              <a:t>6/6/2015</a:t>
+              <a:t>6/9/2015</a:t>
             </a:fld>
             <a:endParaRPr lang="en-US"/>
           </a:p>
@@ -9283,7 +9283,7 @@
           <a:p>
             <a:fld id="{699DC775-C286-4358-8C92-D7E584E969B3}" type="datetimeFigureOut">
               <a:rPr lang="en-US" smtClean="0"/>
-              <a:t>6/6/2015</a:t>
+              <a:t>6/9/2015</a:t>
             </a:fld>
             <a:endParaRPr lang="en-US"/>
           </a:p>
@@ -9840,7 +9840,7 @@
 
 <file path=ppt/slides/slide10.xml><?xml version="1.0" encoding="utf-8"?>
 <p:sld xmlns:a="http://schemas.openxmlformats.org/drawingml/2006/main" xmlns:r="http://schemas.openxmlformats.org/officeDocument/2006/relationships" xmlns:p="http://schemas.openxmlformats.org/presentationml/2006/main">
-  <p:cSld name="PPSlideAnimated201403311937382787">
+  <p:cSld>
     <p:bg>
       <p:bgPr>
         <a:solidFill>
@@ -9865,7 +9865,7 @@
       </p:grpSpPr>
       <p:sp>
         <p:nvSpPr>
-          <p:cNvPr id="4" name="[Notched Right Arrow 3]"/>
+          <p:cNvPr id="4" name="Notched Right Arrow 3"/>
           <p:cNvSpPr/>
           <p:nvPr/>
         </p:nvSpPr>
@@ -9905,7 +9905,7 @@
       </p:sp>
       <p:grpSp>
         <p:nvGrpSpPr>
-          <p:cNvPr id="2" name="[Group 2]"/>
+          <p:cNvPr id="2" name="Group 2"/>
           <p:cNvGrpSpPr/>
           <p:nvPr/>
         </p:nvGrpSpPr>
@@ -9998,51 +9998,9 @@
           </p:txBody>
         </p:sp>
       </p:grpSp>
-      <p:sp>
-        <p:nvSpPr>
-          <p:cNvPr id="8" name="text 3"/>
-          <p:cNvSpPr txBox="1"/>
-          <p:nvPr/>
-        </p:nvSpPr>
-        <p:spPr>
-          <a:xfrm>
-            <a:off x="430386" y="6043939"/>
-            <a:ext cx="2644122" cy="523220"/>
-          </a:xfrm>
-          <a:prstGeom prst="rect">
-            <a:avLst/>
-          </a:prstGeom>
-          <a:noFill/>
-        </p:spPr>
-        <p:txBody>
-          <a:bodyPr wrap="none" rtlCol="0">
-            <a:spAutoFit/>
-          </a:bodyPr>
-          <a:lstStyle/>
-          <a:p>
-            <a:r>
-              <a:rPr lang="en-US" sz="2800" b="1" dirty="0" smtClean="0">
-                <a:solidFill>
-                  <a:schemeClr val="bg1">
-                    <a:lumMod val="75000"/>
-                  </a:schemeClr>
-                </a:solidFill>
-              </a:rPr>
-              <a:t>Expected output</a:t>
-            </a:r>
-            <a:endParaRPr lang="en-SG" sz="2800" b="1" dirty="0">
-              <a:solidFill>
-                <a:schemeClr val="bg1">
-                  <a:lumMod val="75000"/>
-                </a:schemeClr>
-              </a:solidFill>
-            </a:endParaRPr>
-          </a:p>
-        </p:txBody>
-      </p:sp>
       <p:pic>
         <p:nvPicPr>
-          <p:cNvPr id="3" name="PPIndicator201403311937383607"/>
+          <p:cNvPr id="3" name="PPIndicator201506090157313532"/>
           <p:cNvPicPr>
             <a:picLocks/>
           </p:cNvPicPr>
@@ -10070,10 +10028,62 @@
           </a:prstGeom>
         </p:spPr>
       </p:pic>
+      <p:sp>
+        <p:nvSpPr>
+          <p:cNvPr id="7" name="text 4"/>
+          <p:cNvSpPr txBox="1"/>
+          <p:nvPr/>
+        </p:nvSpPr>
+        <p:spPr>
+          <a:xfrm>
+            <a:off x="430386" y="6043939"/>
+            <a:ext cx="2317109" cy="523220"/>
+          </a:xfrm>
+          <a:prstGeom prst="rect">
+            <a:avLst/>
+          </a:prstGeom>
+          <a:noFill/>
+        </p:spPr>
+        <p:txBody>
+          <a:bodyPr wrap="none" rtlCol="0">
+            <a:spAutoFit/>
+          </a:bodyPr>
+          <a:lstStyle/>
+          <a:p>
+            <a:r>
+              <a:rPr lang="en-US" sz="2800" b="1" dirty="0" smtClean="0">
+                <a:solidFill>
+                  <a:schemeClr val="bg1">
+                    <a:lumMod val="75000"/>
+                  </a:schemeClr>
+                </a:solidFill>
+              </a:rPr>
+              <a:t>Expected </a:t>
+            </a:r>
+            <a:r>
+              <a:rPr lang="en-US" sz="2800" b="1" dirty="0" smtClean="0">
+                <a:solidFill>
+                  <a:schemeClr val="bg1">
+                    <a:lumMod val="75000"/>
+                  </a:schemeClr>
+                </a:solidFill>
+              </a:rPr>
+              <a:t>slide</a:t>
+            </a:r>
+            <a:endParaRPr lang="en-SG" sz="2800" b="1" dirty="0">
+              <a:solidFill>
+                <a:schemeClr val="bg1">
+                  <a:lumMod val="75000"/>
+                </a:schemeClr>
+              </a:solidFill>
+            </a:endParaRPr>
+          </a:p>
+        </p:txBody>
+      </p:sp>
     </p:spTree>
     <p:extLst>
       <p:ext uri="{BB962C8B-B14F-4D97-AF65-F5344CB8AC3E}">
-        <p14:creationId xmlns:p14="http://schemas.microsoft.com/office/powerpoint/2010/main" val="370724177"/>
+        <p14:creationId xmlns:p14="http://schemas.microsoft.com/office/powerpoint/2010/main" val="2124756108"/>
       </p:ext>
     </p:extLst>
   </p:cSld>
@@ -10158,59 +10168,24 @@
                                   </p:childTnLst>
                                 </p:cTn>
                               </p:par>
-                              <p:par>
-                                <p:cTn id="9" presetID="10" presetClass="exit" presetSubtype="0" fill="hold" grpId="0" nodeType="withEffect">
-                                  <p:stCondLst>
-                                    <p:cond delay="0"/>
-                                  </p:stCondLst>
-                                  <p:childTnLst>
-                                    <p:animEffect transition="out" filter="fade">
-                                      <p:cBhvr>
-                                        <p:cTn id="10" dur="500"/>
-                                        <p:tgtEl>
-                                          <p:spTgt spid="8"/>
-                                        </p:tgtEl>
-                                      </p:cBhvr>
-                                    </p:animEffect>
-                                    <p:set>
-                                      <p:cBhvr>
-                                        <p:cTn id="11" dur="1" fill="hold">
-                                          <p:stCondLst>
-                                            <p:cond delay="499"/>
-                                          </p:stCondLst>
-                                        </p:cTn>
-                                        <p:tgtEl>
-                                          <p:spTgt spid="8"/>
-                                        </p:tgtEl>
-                                        <p:attrNameLst>
-                                          <p:attrName>style.visibility</p:attrName>
-                                        </p:attrNameLst>
-                                      </p:cBhvr>
-                                      <p:to>
-                                        <p:strVal val="hidden"/>
-                                      </p:to>
-                                    </p:set>
-                                  </p:childTnLst>
-                                </p:cTn>
-                              </p:par>
                             </p:childTnLst>
                           </p:cTn>
                         </p:par>
                         <p:par>
-                          <p:cTn id="12" fill="hold">
+                          <p:cTn id="9" fill="hold">
                             <p:stCondLst>
-                              <p:cond delay="500"/>
+                              <p:cond delay="0"/>
                             </p:stCondLst>
                             <p:childTnLst>
                               <p:par>
-                                <p:cTn id="13" presetID="8" presetClass="emph" presetSubtype="0" fill="hold" grpId="0" nodeType="afterEffect">
+                                <p:cTn id="10" presetID="8" presetClass="emph" presetSubtype="0" fill="hold" grpId="0" nodeType="afterEffect">
                                   <p:stCondLst>
                                     <p:cond delay="0"/>
                                   </p:stCondLst>
                                   <p:childTnLst>
                                     <p:animRot by="5395071">
                                       <p:cBhvr>
-                                        <p:cTn id="14" dur="500" fill="hold"/>
+                                        <p:cTn id="11" dur="500" fill="hold"/>
                                         <p:tgtEl>
                                           <p:spTgt spid="4"/>
                                         </p:tgtEl>
@@ -10223,14 +10198,14 @@
                                 </p:cTn>
                               </p:par>
                               <p:par>
-                                <p:cTn id="15" presetID="8" presetClass="emph" presetSubtype="0" fill="hold" nodeType="withEffect">
+                                <p:cTn id="12" presetID="8" presetClass="emph" presetSubtype="0" fill="hold" nodeType="withEffect">
                                   <p:stCondLst>
                                     <p:cond delay="0"/>
                                   </p:stCondLst>
                                   <p:childTnLst>
                                     <p:animRot by="5395070">
                                       <p:cBhvr>
-                                        <p:cTn id="16" dur="500" fill="hold"/>
+                                        <p:cTn id="13" dur="500" fill="hold"/>
                                         <p:tgtEl>
                                           <p:spTgt spid="2"/>
                                         </p:tgtEl>
@@ -10271,7 +10246,6 @@
     </p:tnLst>
     <p:bldLst>
       <p:bldP spid="4" grpId="0" animBg="1"/>
-      <p:bldP spid="8" grpId="0"/>
     </p:bldLst>
   </p:timing>
 </p:sld>
@@ -25807,11 +25781,11 @@
   <p:clrMapOvr>
     <a:masterClrMapping/>
   </p:clrMapOvr>
-  <mc:AlternateContent xmlns:mc="http://schemas.openxmlformats.org/markup-compatibility/2006">
-    <mc:Choice xmlns:p14="http://schemas.microsoft.com/office/powerpoint/2010/main" Requires="p14">
+  <mc:AlternateContent xmlns:mc="http://schemas.openxmlformats.org/markup-compatibility/2006" xmlns:p14="http://schemas.microsoft.com/office/powerpoint/2010/main">
+    <mc:Choice Requires="p14">
       <p:transition spd="slow" p14:dur="2000"/>
     </mc:Choice>
-    <mc:Fallback>
+    <mc:Fallback xmlns="">
       <p:transition spd="slow"/>
     </mc:Fallback>
   </mc:AlternateContent>
@@ -27521,8 +27495,8 @@
           </a:p>
         </p:txBody>
       </p:sp>
-      <mc:AlternateContent xmlns:mc="http://schemas.openxmlformats.org/markup-compatibility/2006">
-        <mc:Choice xmlns:p14="http://schemas.microsoft.com/office/powerpoint/2010/main" Requires="p14">
+      <mc:AlternateContent xmlns:mc="http://schemas.openxmlformats.org/markup-compatibility/2006" xmlns:p14="http://schemas.microsoft.com/office/powerpoint/2010/main">
+        <mc:Choice Requires="p14">
           <p:contentPart p14:bwMode="auto" r:id="rId4">
             <p14:nvContentPartPr>
               <p14:cNvPr id="45" name="Ink 44"/>
@@ -27537,7 +27511,7 @@
             </p14:xfrm>
           </p:contentPart>
         </mc:Choice>
-        <mc:Fallback>
+        <mc:Fallback xmlns="">
           <p:pic>
             <p:nvPicPr>
               <p:cNvPr id="45" name="Ink 44"/>
@@ -27564,8 +27538,8 @@
           </p:pic>
         </mc:Fallback>
       </mc:AlternateContent>
-      <mc:AlternateContent xmlns:mc="http://schemas.openxmlformats.org/markup-compatibility/2006">
-        <mc:Choice xmlns:p14="http://schemas.microsoft.com/office/powerpoint/2010/main" Requires="p14">
+      <mc:AlternateContent xmlns:mc="http://schemas.openxmlformats.org/markup-compatibility/2006" xmlns:p14="http://schemas.microsoft.com/office/powerpoint/2010/main">
+        <mc:Choice Requires="p14">
           <p:contentPart p14:bwMode="auto" r:id="rId6">
             <p14:nvContentPartPr>
               <p14:cNvPr id="46" name="Ink 45"/>
@@ -27580,7 +27554,7 @@
             </p14:xfrm>
           </p:contentPart>
         </mc:Choice>
-        <mc:Fallback>
+        <mc:Fallback xmlns="">
           <p:pic>
             <p:nvPicPr>
               <p:cNvPr id="46" name="Ink 45"/>
@@ -27607,8 +27581,8 @@
           </p:pic>
         </mc:Fallback>
       </mc:AlternateContent>
-      <mc:AlternateContent xmlns:mc="http://schemas.openxmlformats.org/markup-compatibility/2006">
-        <mc:Choice xmlns:p14="http://schemas.microsoft.com/office/powerpoint/2010/main" Requires="p14">
+      <mc:AlternateContent xmlns:mc="http://schemas.openxmlformats.org/markup-compatibility/2006" xmlns:p14="http://schemas.microsoft.com/office/powerpoint/2010/main">
+        <mc:Choice Requires="p14">
           <p:contentPart p14:bwMode="auto" r:id="rId8">
             <p14:nvContentPartPr>
               <p14:cNvPr id="47" name="Ink 46"/>
@@ -27623,7 +27597,7 @@
             </p14:xfrm>
           </p:contentPart>
         </mc:Choice>
-        <mc:Fallback>
+        <mc:Fallback xmlns="">
           <p:pic>
             <p:nvPicPr>
               <p:cNvPr id="47" name="Ink 46"/>
@@ -27650,8 +27624,8 @@
           </p:pic>
         </mc:Fallback>
       </mc:AlternateContent>
-      <mc:AlternateContent xmlns:mc="http://schemas.openxmlformats.org/markup-compatibility/2006">
-        <mc:Choice xmlns:p14="http://schemas.microsoft.com/office/powerpoint/2010/main" Requires="p14">
+      <mc:AlternateContent xmlns:mc="http://schemas.openxmlformats.org/markup-compatibility/2006" xmlns:p14="http://schemas.microsoft.com/office/powerpoint/2010/main">
+        <mc:Choice Requires="p14">
           <p:contentPart p14:bwMode="auto" r:id="rId10">
             <p14:nvContentPartPr>
               <p14:cNvPr id="48" name="Ink 47"/>
@@ -27666,7 +27640,7 @@
             </p14:xfrm>
           </p:contentPart>
         </mc:Choice>
-        <mc:Fallback>
+        <mc:Fallback xmlns="">
           <p:pic>
             <p:nvPicPr>
               <p:cNvPr id="48" name="Ink 47"/>
@@ -27693,8 +27667,8 @@
           </p:pic>
         </mc:Fallback>
       </mc:AlternateContent>
-      <mc:AlternateContent xmlns:mc="http://schemas.openxmlformats.org/markup-compatibility/2006">
-        <mc:Choice xmlns:p14="http://schemas.microsoft.com/office/powerpoint/2010/main" Requires="p14">
+      <mc:AlternateContent xmlns:mc="http://schemas.openxmlformats.org/markup-compatibility/2006" xmlns:p14="http://schemas.microsoft.com/office/powerpoint/2010/main">
+        <mc:Choice Requires="p14">
           <p:contentPart p14:bwMode="auto" r:id="rId12">
             <p14:nvContentPartPr>
               <p14:cNvPr id="49" name="Ink 48"/>
@@ -27709,7 +27683,7 @@
             </p14:xfrm>
           </p:contentPart>
         </mc:Choice>
-        <mc:Fallback>
+        <mc:Fallback xmlns="">
           <p:pic>
             <p:nvPicPr>
               <p:cNvPr id="49" name="Ink 48"/>
@@ -27736,8 +27710,8 @@
           </p:pic>
         </mc:Fallback>
       </mc:AlternateContent>
-      <mc:AlternateContent xmlns:mc="http://schemas.openxmlformats.org/markup-compatibility/2006">
-        <mc:Choice xmlns:p14="http://schemas.microsoft.com/office/powerpoint/2010/main" Requires="p14">
+      <mc:AlternateContent xmlns:mc="http://schemas.openxmlformats.org/markup-compatibility/2006" xmlns:p14="http://schemas.microsoft.com/office/powerpoint/2010/main">
+        <mc:Choice Requires="p14">
           <p:contentPart p14:bwMode="auto" r:id="rId14">
             <p14:nvContentPartPr>
               <p14:cNvPr id="50" name="Ink 49"/>
@@ -27752,7 +27726,7 @@
             </p14:xfrm>
           </p:contentPart>
         </mc:Choice>
-        <mc:Fallback>
+        <mc:Fallback xmlns="">
           <p:pic>
             <p:nvPicPr>
               <p:cNvPr id="50" name="Ink 49"/>
@@ -27779,8 +27753,8 @@
           </p:pic>
         </mc:Fallback>
       </mc:AlternateContent>
-      <mc:AlternateContent xmlns:mc="http://schemas.openxmlformats.org/markup-compatibility/2006">
-        <mc:Choice xmlns:p14="http://schemas.microsoft.com/office/powerpoint/2010/main" Requires="p14">
+      <mc:AlternateContent xmlns:mc="http://schemas.openxmlformats.org/markup-compatibility/2006" xmlns:p14="http://schemas.microsoft.com/office/powerpoint/2010/main">
+        <mc:Choice Requires="p14">
           <p:contentPart p14:bwMode="auto" r:id="rId16">
             <p14:nvContentPartPr>
               <p14:cNvPr id="51" name="Ink 50"/>
@@ -27795,7 +27769,7 @@
             </p14:xfrm>
           </p:contentPart>
         </mc:Choice>
-        <mc:Fallback>
+        <mc:Fallback xmlns="">
           <p:pic>
             <p:nvPicPr>
               <p:cNvPr id="51" name="Ink 50"/>
@@ -27822,8 +27796,8 @@
           </p:pic>
         </mc:Fallback>
       </mc:AlternateContent>
-      <mc:AlternateContent xmlns:mc="http://schemas.openxmlformats.org/markup-compatibility/2006">
-        <mc:Choice xmlns:p14="http://schemas.microsoft.com/office/powerpoint/2010/main" Requires="p14">
+      <mc:AlternateContent xmlns:mc="http://schemas.openxmlformats.org/markup-compatibility/2006" xmlns:p14="http://schemas.microsoft.com/office/powerpoint/2010/main">
+        <mc:Choice Requires="p14">
           <p:contentPart p14:bwMode="auto" r:id="rId18">
             <p14:nvContentPartPr>
               <p14:cNvPr id="52" name="Ink 51"/>
@@ -27838,7 +27812,7 @@
             </p14:xfrm>
           </p:contentPart>
         </mc:Choice>
-        <mc:Fallback>
+        <mc:Fallback xmlns="">
           <p:pic>
             <p:nvPicPr>
               <p:cNvPr id="52" name="Ink 51"/>
@@ -27865,8 +27839,8 @@
           </p:pic>
         </mc:Fallback>
       </mc:AlternateContent>
-      <mc:AlternateContent xmlns:mc="http://schemas.openxmlformats.org/markup-compatibility/2006">
-        <mc:Choice xmlns:p14="http://schemas.microsoft.com/office/powerpoint/2010/main" Requires="p14">
+      <mc:AlternateContent xmlns:mc="http://schemas.openxmlformats.org/markup-compatibility/2006" xmlns:p14="http://schemas.microsoft.com/office/powerpoint/2010/main">
+        <mc:Choice Requires="p14">
           <p:contentPart p14:bwMode="auto" r:id="rId20">
             <p14:nvContentPartPr>
               <p14:cNvPr id="53" name="Ink 52"/>
@@ -27881,7 +27855,7 @@
             </p14:xfrm>
           </p:contentPart>
         </mc:Choice>
-        <mc:Fallback>
+        <mc:Fallback xmlns="">
           <p:pic>
             <p:nvPicPr>
               <p:cNvPr id="53" name="Ink 52"/>
@@ -27908,8 +27882,8 @@
           </p:pic>
         </mc:Fallback>
       </mc:AlternateContent>
-      <mc:AlternateContent xmlns:mc="http://schemas.openxmlformats.org/markup-compatibility/2006">
-        <mc:Choice xmlns:p14="http://schemas.microsoft.com/office/powerpoint/2010/main" Requires="p14">
+      <mc:AlternateContent xmlns:mc="http://schemas.openxmlformats.org/markup-compatibility/2006" xmlns:p14="http://schemas.microsoft.com/office/powerpoint/2010/main">
+        <mc:Choice Requires="p14">
           <p:contentPart p14:bwMode="auto" r:id="rId22">
             <p14:nvContentPartPr>
               <p14:cNvPr id="54" name="Ink 53"/>
@@ -27924,7 +27898,7 @@
             </p14:xfrm>
           </p:contentPart>
         </mc:Choice>
-        <mc:Fallback>
+        <mc:Fallback xmlns="">
           <p:pic>
             <p:nvPicPr>
               <p:cNvPr id="54" name="Ink 53"/>
@@ -27951,8 +27925,8 @@
           </p:pic>
         </mc:Fallback>
       </mc:AlternateContent>
-      <mc:AlternateContent xmlns:mc="http://schemas.openxmlformats.org/markup-compatibility/2006">
-        <mc:Choice xmlns:p14="http://schemas.microsoft.com/office/powerpoint/2010/main" Requires="p14">
+      <mc:AlternateContent xmlns:mc="http://schemas.openxmlformats.org/markup-compatibility/2006" xmlns:p14="http://schemas.microsoft.com/office/powerpoint/2010/main">
+        <mc:Choice Requires="p14">
           <p:contentPart p14:bwMode="auto" r:id="rId24">
             <p14:nvContentPartPr>
               <p14:cNvPr id="55" name="Ink 54"/>
@@ -27967,7 +27941,7 @@
             </p14:xfrm>
           </p:contentPart>
         </mc:Choice>
-        <mc:Fallback>
+        <mc:Fallback xmlns="">
           <p:pic>
             <p:nvPicPr>
               <p:cNvPr id="55" name="Ink 54"/>
@@ -27994,8 +27968,8 @@
           </p:pic>
         </mc:Fallback>
       </mc:AlternateContent>
-      <mc:AlternateContent xmlns:mc="http://schemas.openxmlformats.org/markup-compatibility/2006">
-        <mc:Choice xmlns:p14="http://schemas.microsoft.com/office/powerpoint/2010/main" Requires="p14">
+      <mc:AlternateContent xmlns:mc="http://schemas.openxmlformats.org/markup-compatibility/2006" xmlns:p14="http://schemas.microsoft.com/office/powerpoint/2010/main">
+        <mc:Choice Requires="p14">
           <p:contentPart p14:bwMode="auto" r:id="rId26">
             <p14:nvContentPartPr>
               <p14:cNvPr id="56" name="Ink 55"/>
@@ -28010,7 +27984,7 @@
             </p14:xfrm>
           </p:contentPart>
         </mc:Choice>
-        <mc:Fallback>
+        <mc:Fallback xmlns="">
           <p:pic>
             <p:nvPicPr>
               <p:cNvPr id="56" name="Ink 55"/>
@@ -31032,7 +31006,7 @@
 
 <file path=ppt/slides/slide8.xml><?xml version="1.0" encoding="utf-8"?>
 <p:sld xmlns:a="http://schemas.openxmlformats.org/drawingml/2006/main" xmlns:r="http://schemas.openxmlformats.org/officeDocument/2006/relationships" xmlns:p="http://schemas.openxmlformats.org/presentationml/2006/main">
-  <p:cSld>
+  <p:cSld name="PPSlideStart201506090157313272">
     <p:bg>
       <p:bgPr>
         <a:solidFill>

</xml_diff>